<commit_message>
Edited Matlab with the total volume of pipes, modified PIs in both models accordingly, removed the "BR" mark on ppt slides.
</commit_message>
<xml_diff>
--- a/Aes_Project_2021_2022.pptx
+++ b/Aes_Project_2021_2022.pptx
@@ -247,7 +247,7 @@
             <a:pPr rtl="0"/>
             <a:fld id="{14E13FA4-5A6A-4920-8854-843EBE8DDFDE}" type="datetime1">
               <a:rPr lang="it-IT" smtClean="0"/>
-              <a:t>30/05/2022</a:t>
+              <a:t>31/05/2022</a:t>
             </a:fld>
             <a:endParaRPr lang="it-IT" dirty="0"/>
           </a:p>
@@ -429,7 +429,7 @@
             <a:fld id="{3952339E-5782-4E34-93C0-C2AC43169E1F}" type="datetime1">
               <a:rPr lang="it-IT" smtClean="0"/>
               <a:pPr/>
-              <a:t>30/05/2022</a:t>
+              <a:t>31/05/2022</a:t>
             </a:fld>
             <a:endParaRPr lang="it-IT" dirty="0"/>
           </a:p>
@@ -3740,47 +3740,6 @@
       </p:grpSp>
       <p:sp>
         <p:nvSpPr>
-          <p:cNvPr id="25" name="Casella di testo 24">
-            <a:extLst>
-              <a:ext uri="{FF2B5EF4-FFF2-40B4-BE49-F238E27FC236}">
-                <a16:creationId xmlns:a16="http://schemas.microsoft.com/office/drawing/2014/main" id="{F0BB4D3D-930C-4FF4-BB7C-2CB24208150C}"/>
-              </a:ext>
-            </a:extLst>
-          </p:cNvPr>
-          <p:cNvSpPr txBox="1"/>
-          <p:nvPr userDrawn="1"/>
-        </p:nvSpPr>
-        <p:spPr>
-          <a:xfrm>
-            <a:off x="11072378" y="235732"/>
-            <a:ext cx="814647" cy="615553"/>
-          </a:xfrm>
-          <a:prstGeom prst="rect">
-            <a:avLst/>
-          </a:prstGeom>
-          <a:noFill/>
-        </p:spPr>
-        <p:txBody>
-          <a:bodyPr wrap="none" rtlCol="0">
-            <a:spAutoFit/>
-          </a:bodyPr>
-          <a:lstStyle/>
-          <a:p>
-            <a:pPr rtl="0"/>
-            <a:r>
-              <a:rPr lang="it-IT" sz="3400" b="1" noProof="0" dirty="0">
-                <a:solidFill>
-                  <a:schemeClr val="accent6"/>
-                </a:solidFill>
-                <a:latin typeface="Arial Black" panose="020B0A04020102020204" pitchFamily="34" charset="0"/>
-              </a:rPr>
-              <a:t>FR</a:t>
-            </a:r>
-          </a:p>
-        </p:txBody>
-      </p:sp>
-      <p:sp>
-        <p:nvSpPr>
           <p:cNvPr id="36" name="Parallelogramma 35">
             <a:extLst>
               <a:ext uri="{FF2B5EF4-FFF2-40B4-BE49-F238E27FC236}">
@@ -4075,7 +4034,7 @@
   <p:clrMapOvr>
     <a:masterClrMapping/>
   </p:clrMapOvr>
-  <p:extLst>
+  <p:extLst mod="1">
     <p:ext uri="{DCECCB84-F9BA-43D5-87BE-67443E8EF086}">
       <p15:sldGuideLst xmlns:p15="http://schemas.microsoft.com/office/powerpoint/2012/main">
         <p15:guide id="1" orient="horz" pos="2160">
@@ -4349,47 +4308,6 @@
       </p:grpSp>
       <p:sp>
         <p:nvSpPr>
-          <p:cNvPr id="25" name="Casella di testo 24">
-            <a:extLst>
-              <a:ext uri="{FF2B5EF4-FFF2-40B4-BE49-F238E27FC236}">
-                <a16:creationId xmlns:a16="http://schemas.microsoft.com/office/drawing/2014/main" id="{F0BB4D3D-930C-4FF4-BB7C-2CB24208150C}"/>
-              </a:ext>
-            </a:extLst>
-          </p:cNvPr>
-          <p:cNvSpPr txBox="1"/>
-          <p:nvPr userDrawn="1"/>
-        </p:nvSpPr>
-        <p:spPr>
-          <a:xfrm>
-            <a:off x="11072378" y="235732"/>
-            <a:ext cx="814647" cy="615553"/>
-          </a:xfrm>
-          <a:prstGeom prst="rect">
-            <a:avLst/>
-          </a:prstGeom>
-          <a:noFill/>
-        </p:spPr>
-        <p:txBody>
-          <a:bodyPr wrap="none" rtlCol="0">
-            <a:spAutoFit/>
-          </a:bodyPr>
-          <a:lstStyle/>
-          <a:p>
-            <a:pPr rtl="0"/>
-            <a:r>
-              <a:rPr lang="it-IT" sz="3400" b="1" noProof="0" dirty="0">
-                <a:solidFill>
-                  <a:schemeClr val="accent6"/>
-                </a:solidFill>
-                <a:latin typeface="Arial Black" panose="020B0A04020102020204" pitchFamily="34" charset="0"/>
-              </a:rPr>
-              <a:t>FR</a:t>
-            </a:r>
-          </a:p>
-        </p:txBody>
-      </p:sp>
-      <p:sp>
-        <p:nvSpPr>
           <p:cNvPr id="36" name="Parallelogramma 35">
             <a:extLst>
               <a:ext uri="{FF2B5EF4-FFF2-40B4-BE49-F238E27FC236}">
@@ -4801,7 +4719,7 @@
   <p:clrMapOvr>
     <a:masterClrMapping/>
   </p:clrMapOvr>
-  <p:extLst>
+  <p:extLst mod="1">
     <p:ext uri="{DCECCB84-F9BA-43D5-87BE-67443E8EF086}">
       <p15:sldGuideLst xmlns:p15="http://schemas.microsoft.com/office/powerpoint/2012/main">
         <p15:guide id="1" orient="horz" pos="2160">
@@ -5075,47 +4993,6 @@
       </p:grpSp>
       <p:sp>
         <p:nvSpPr>
-          <p:cNvPr id="25" name="Casella di testo 24">
-            <a:extLst>
-              <a:ext uri="{FF2B5EF4-FFF2-40B4-BE49-F238E27FC236}">
-                <a16:creationId xmlns:a16="http://schemas.microsoft.com/office/drawing/2014/main" id="{F0BB4D3D-930C-4FF4-BB7C-2CB24208150C}"/>
-              </a:ext>
-            </a:extLst>
-          </p:cNvPr>
-          <p:cNvSpPr txBox="1"/>
-          <p:nvPr userDrawn="1"/>
-        </p:nvSpPr>
-        <p:spPr>
-          <a:xfrm>
-            <a:off x="11072378" y="235732"/>
-            <a:ext cx="814647" cy="615553"/>
-          </a:xfrm>
-          <a:prstGeom prst="rect">
-            <a:avLst/>
-          </a:prstGeom>
-          <a:noFill/>
-        </p:spPr>
-        <p:txBody>
-          <a:bodyPr wrap="none" rtlCol="0">
-            <a:spAutoFit/>
-          </a:bodyPr>
-          <a:lstStyle/>
-          <a:p>
-            <a:pPr rtl="0"/>
-            <a:r>
-              <a:rPr lang="it-IT" sz="3400" b="1" noProof="0" dirty="0">
-                <a:solidFill>
-                  <a:schemeClr val="accent6"/>
-                </a:solidFill>
-                <a:latin typeface="Arial Black" panose="020B0A04020102020204" pitchFamily="34" charset="0"/>
-              </a:rPr>
-              <a:t>FR</a:t>
-            </a:r>
-          </a:p>
-        </p:txBody>
-      </p:sp>
-      <p:sp>
-        <p:nvSpPr>
           <p:cNvPr id="36" name="Parallelogramma 35">
             <a:extLst>
               <a:ext uri="{FF2B5EF4-FFF2-40B4-BE49-F238E27FC236}">
@@ -5651,7 +5528,7 @@
   <p:clrMapOvr>
     <a:masterClrMapping/>
   </p:clrMapOvr>
-  <p:extLst>
+  <p:extLst mod="1">
     <p:ext uri="{DCECCB84-F9BA-43D5-87BE-67443E8EF086}">
       <p15:sldGuideLst xmlns:p15="http://schemas.microsoft.com/office/powerpoint/2012/main">
         <p15:guide id="1" orient="horz" pos="2160">
@@ -6650,47 +6527,6 @@
           <a:chExt cx="0" cy="0"/>
         </a:xfrm>
       </p:grpSpPr>
-      <p:sp>
-        <p:nvSpPr>
-          <p:cNvPr id="18" name="Casella di testo 17">
-            <a:extLst>
-              <a:ext uri="{FF2B5EF4-FFF2-40B4-BE49-F238E27FC236}">
-                <a16:creationId xmlns:a16="http://schemas.microsoft.com/office/drawing/2014/main" id="{CC52C5C1-EC33-44C1-9D54-A1058BBF1812}"/>
-              </a:ext>
-            </a:extLst>
-          </p:cNvPr>
-          <p:cNvSpPr txBox="1"/>
-          <p:nvPr userDrawn="1"/>
-        </p:nvSpPr>
-        <p:spPr>
-          <a:xfrm>
-            <a:off x="11072378" y="235732"/>
-            <a:ext cx="814647" cy="615553"/>
-          </a:xfrm>
-          <a:prstGeom prst="rect">
-            <a:avLst/>
-          </a:prstGeom>
-          <a:noFill/>
-        </p:spPr>
-        <p:txBody>
-          <a:bodyPr wrap="none" rtlCol="0">
-            <a:spAutoFit/>
-          </a:bodyPr>
-          <a:lstStyle/>
-          <a:p>
-            <a:pPr rtl="0"/>
-            <a:r>
-              <a:rPr lang="it-IT" sz="3400" b="1" noProof="0" dirty="0">
-                <a:solidFill>
-                  <a:schemeClr val="accent1"/>
-                </a:solidFill>
-                <a:latin typeface="Arial Black" panose="020B0A04020102020204" pitchFamily="34" charset="0"/>
-              </a:rPr>
-              <a:t>FR</a:t>
-            </a:r>
-          </a:p>
-        </p:txBody>
-      </p:sp>
       <p:grpSp>
         <p:nvGrpSpPr>
           <p:cNvPr id="26" name="Gruppo 25">
@@ -6997,7 +6833,7 @@
   <p:clrMapOvr>
     <a:masterClrMapping/>
   </p:clrMapOvr>
-  <p:extLst>
+  <p:extLst mod="1">
     <p:ext uri="{DCECCB84-F9BA-43D5-87BE-67443E8EF086}">
       <p15:sldGuideLst xmlns:p15="http://schemas.microsoft.com/office/powerpoint/2012/main">
         <p15:guide id="1" orient="horz" pos="142">
@@ -7038,47 +6874,6 @@
           <a:chExt cx="0" cy="0"/>
         </a:xfrm>
       </p:grpSpPr>
-      <p:sp>
-        <p:nvSpPr>
-          <p:cNvPr id="21" name="Casella di testo 20">
-            <a:extLst>
-              <a:ext uri="{FF2B5EF4-FFF2-40B4-BE49-F238E27FC236}">
-                <a16:creationId xmlns:a16="http://schemas.microsoft.com/office/drawing/2014/main" id="{7E8A2C98-F26E-415A-B931-1B89CA46C1CF}"/>
-              </a:ext>
-            </a:extLst>
-          </p:cNvPr>
-          <p:cNvSpPr txBox="1"/>
-          <p:nvPr userDrawn="1"/>
-        </p:nvSpPr>
-        <p:spPr>
-          <a:xfrm>
-            <a:off x="11072378" y="235732"/>
-            <a:ext cx="814647" cy="615553"/>
-          </a:xfrm>
-          <a:prstGeom prst="rect">
-            <a:avLst/>
-          </a:prstGeom>
-          <a:noFill/>
-        </p:spPr>
-        <p:txBody>
-          <a:bodyPr wrap="none" rtlCol="0">
-            <a:spAutoFit/>
-          </a:bodyPr>
-          <a:lstStyle/>
-          <a:p>
-            <a:pPr rtl="0"/>
-            <a:r>
-              <a:rPr lang="it-IT" sz="3400" b="1" noProof="0" dirty="0">
-                <a:solidFill>
-                  <a:schemeClr val="accent1"/>
-                </a:solidFill>
-                <a:latin typeface="Arial Black" panose="020B0A04020102020204" pitchFamily="34" charset="0"/>
-              </a:rPr>
-              <a:t>FR</a:t>
-            </a:r>
-          </a:p>
-        </p:txBody>
-      </p:sp>
       <p:grpSp>
         <p:nvGrpSpPr>
           <p:cNvPr id="27" name="Gruppo 26">
@@ -7432,7 +7227,7 @@
   <p:clrMapOvr>
     <a:masterClrMapping/>
   </p:clrMapOvr>
-  <p:extLst>
+  <p:extLst mod="1">
     <p:ext uri="{DCECCB84-F9BA-43D5-87BE-67443E8EF086}">
       <p15:sldGuideLst xmlns:p15="http://schemas.microsoft.com/office/powerpoint/2012/main">
         <p15:guide id="1" orient="horz" pos="142">
@@ -10502,47 +10297,6 @@
           <a:chExt cx="0" cy="0"/>
         </a:xfrm>
       </p:grpSpPr>
-      <p:sp>
-        <p:nvSpPr>
-          <p:cNvPr id="16" name="Casella di testo 15">
-            <a:extLst>
-              <a:ext uri="{FF2B5EF4-FFF2-40B4-BE49-F238E27FC236}">
-                <a16:creationId xmlns:a16="http://schemas.microsoft.com/office/drawing/2014/main" id="{A4F49194-9068-41AA-B460-962319BF96A4}"/>
-              </a:ext>
-            </a:extLst>
-          </p:cNvPr>
-          <p:cNvSpPr txBox="1"/>
-          <p:nvPr userDrawn="1"/>
-        </p:nvSpPr>
-        <p:spPr>
-          <a:xfrm>
-            <a:off x="11072378" y="235732"/>
-            <a:ext cx="814647" cy="615553"/>
-          </a:xfrm>
-          <a:prstGeom prst="rect">
-            <a:avLst/>
-          </a:prstGeom>
-          <a:noFill/>
-        </p:spPr>
-        <p:txBody>
-          <a:bodyPr wrap="none" rtlCol="0">
-            <a:spAutoFit/>
-          </a:bodyPr>
-          <a:lstStyle/>
-          <a:p>
-            <a:pPr rtl="0"/>
-            <a:r>
-              <a:rPr lang="it-IT" sz="3400" b="1" noProof="0" dirty="0">
-                <a:solidFill>
-                  <a:schemeClr val="accent1"/>
-                </a:solidFill>
-                <a:latin typeface="Arial Black" panose="020B0A04020102020204" pitchFamily="34" charset="0"/>
-              </a:rPr>
-              <a:t>FR</a:t>
-            </a:r>
-          </a:p>
-        </p:txBody>
-      </p:sp>
       <p:grpSp>
         <p:nvGrpSpPr>
           <p:cNvPr id="28" name="Gruppo 27">
@@ -11075,7 +10829,7 @@
   <p:clrMapOvr>
     <a:masterClrMapping/>
   </p:clrMapOvr>
-  <p:extLst>
+  <p:extLst mod="1">
     <p:ext uri="{DCECCB84-F9BA-43D5-87BE-67443E8EF086}">
       <p15:sldGuideLst xmlns:p15="http://schemas.microsoft.com/office/powerpoint/2012/main">
         <p15:guide id="1" orient="horz" pos="142">
@@ -11163,47 +10917,6 @@
               <a:t>Fare clic sull'icona per inserire una tabella</a:t>
             </a:r>
             <a:endParaRPr lang="it-IT" noProof="0" dirty="0"/>
-          </a:p>
-        </p:txBody>
-      </p:sp>
-      <p:sp>
-        <p:nvSpPr>
-          <p:cNvPr id="16" name="Casella di testo 15">
-            <a:extLst>
-              <a:ext uri="{FF2B5EF4-FFF2-40B4-BE49-F238E27FC236}">
-                <a16:creationId xmlns:a16="http://schemas.microsoft.com/office/drawing/2014/main" id="{B84020D1-D35E-497E-97F1-84A6EA9D048E}"/>
-              </a:ext>
-            </a:extLst>
-          </p:cNvPr>
-          <p:cNvSpPr txBox="1"/>
-          <p:nvPr userDrawn="1"/>
-        </p:nvSpPr>
-        <p:spPr>
-          <a:xfrm>
-            <a:off x="11072378" y="235732"/>
-            <a:ext cx="814647" cy="615553"/>
-          </a:xfrm>
-          <a:prstGeom prst="rect">
-            <a:avLst/>
-          </a:prstGeom>
-          <a:noFill/>
-        </p:spPr>
-        <p:txBody>
-          <a:bodyPr wrap="none" rtlCol="0">
-            <a:spAutoFit/>
-          </a:bodyPr>
-          <a:lstStyle/>
-          <a:p>
-            <a:pPr rtl="0"/>
-            <a:r>
-              <a:rPr lang="it-IT" sz="3400" b="1" noProof="0" dirty="0">
-                <a:solidFill>
-                  <a:schemeClr val="accent1"/>
-                </a:solidFill>
-                <a:latin typeface="Arial Black" panose="020B0A04020102020204" pitchFamily="34" charset="0"/>
-              </a:rPr>
-              <a:t>FR</a:t>
-            </a:r>
           </a:p>
         </p:txBody>
       </p:sp>
@@ -11610,7 +11323,7 @@
   <p:clrMapOvr>
     <a:masterClrMapping/>
   </p:clrMapOvr>
-  <p:extLst>
+  <p:extLst mod="1">
     <p:ext uri="{DCECCB84-F9BA-43D5-87BE-67443E8EF086}">
       <p15:sldGuideLst xmlns:p15="http://schemas.microsoft.com/office/powerpoint/2012/main">
         <p15:guide id="1" orient="horz" pos="142">
@@ -16809,12 +16522,12 @@
 </file>
 
 <file path=customXml/item1.xml><?xml version="1.0" encoding="utf-8"?>
-<p:properties xmlns:p="http://schemas.microsoft.com/office/2006/metadata/properties" xmlns:xsi="http://www.w3.org/2001/XMLSchema-instance" xmlns:pc="http://schemas.microsoft.com/office/infopath/2007/PartnerControls">
-  <documentManagement>
-    <_ip_UnifiedCompliancePolicyUIAction xmlns="http://schemas.microsoft.com/sharepoint/v3" xsi:nil="true"/>
-    <_ip_UnifiedCompliancePolicyProperties xmlns="http://schemas.microsoft.com/sharepoint/v3" xsi:nil="true"/>
-  </documentManagement>
-</p:properties>
+<?mso-contentType ?>
+<FormTemplates xmlns="http://schemas.microsoft.com/sharepoint/v3/contenttype/forms">
+  <Display>DocumentLibraryForm</Display>
+  <Edit>DocumentLibraryForm</Edit>
+  <New>DocumentLibraryForm</New>
+</FormTemplates>
 </file>
 
 <file path=customXml/item2.xml><?xml version="1.0" encoding="utf-8"?>
@@ -17026,20 +16739,18 @@
 </file>
 
 <file path=customXml/item3.xml><?xml version="1.0" encoding="utf-8"?>
-<?mso-contentType ?>
-<FormTemplates xmlns="http://schemas.microsoft.com/sharepoint/v3/contenttype/forms">
-  <Display>DocumentLibraryForm</Display>
-  <Edit>DocumentLibraryForm</Edit>
-  <New>DocumentLibraryForm</New>
-</FormTemplates>
+<p:properties xmlns:p="http://schemas.microsoft.com/office/2006/metadata/properties" xmlns:xsi="http://www.w3.org/2001/XMLSchema-instance" xmlns:pc="http://schemas.microsoft.com/office/infopath/2007/PartnerControls">
+  <documentManagement>
+    <_ip_UnifiedCompliancePolicyUIAction xmlns="http://schemas.microsoft.com/sharepoint/v3" xsi:nil="true"/>
+    <_ip_UnifiedCompliancePolicyProperties xmlns="http://schemas.microsoft.com/sharepoint/v3" xsi:nil="true"/>
+  </documentManagement>
+</p:properties>
 </file>
 
 <file path=customXml/itemProps1.xml><?xml version="1.0" encoding="utf-8"?>
-<ds:datastoreItem xmlns:ds="http://schemas.openxmlformats.org/officeDocument/2006/customXml" ds:itemID="{374D15D6-87BC-477C-8E91-9F90829C2FC8}">
+<ds:datastoreItem xmlns:ds="http://schemas.openxmlformats.org/officeDocument/2006/customXml" ds:itemID="{F79AA90D-A39D-4F83-B1BD-92099B1CAD0D}">
   <ds:schemaRefs>
-    <ds:schemaRef ds:uri="http://schemas.microsoft.com/office/2006/metadata/properties"/>
-    <ds:schemaRef ds:uri="http://schemas.microsoft.com/office/infopath/2007/PartnerControls"/>
-    <ds:schemaRef ds:uri="http://schemas.microsoft.com/sharepoint/v3"/>
+    <ds:schemaRef ds:uri="http://schemas.microsoft.com/sharepoint/v3/contenttype/forms"/>
   </ds:schemaRefs>
 </ds:datastoreItem>
 </file>
@@ -17065,9 +16776,11 @@
 </file>
 
 <file path=customXml/itemProps3.xml><?xml version="1.0" encoding="utf-8"?>
-<ds:datastoreItem xmlns:ds="http://schemas.openxmlformats.org/officeDocument/2006/customXml" ds:itemID="{F79AA90D-A39D-4F83-B1BD-92099B1CAD0D}">
+<ds:datastoreItem xmlns:ds="http://schemas.openxmlformats.org/officeDocument/2006/customXml" ds:itemID="{374D15D6-87BC-477C-8E91-9F90829C2FC8}">
   <ds:schemaRefs>
-    <ds:schemaRef ds:uri="http://schemas.microsoft.com/sharepoint/v3/contenttype/forms"/>
+    <ds:schemaRef ds:uri="http://schemas.microsoft.com/office/2006/metadata/properties"/>
+    <ds:schemaRef ds:uri="http://schemas.microsoft.com/office/infopath/2007/PartnerControls"/>
+    <ds:schemaRef ds:uri="http://schemas.microsoft.com/sharepoint/v3"/>
   </ds:schemaRefs>
 </ds:datastoreItem>
 </file>
</xml_diff>

<commit_message>
modification of a slide
</commit_message>
<xml_diff>
--- a/Aes_Project_2021_2022.pptx
+++ b/Aes_Project_2021_2022.pptx
@@ -250,7 +250,7 @@
             <a:pPr rtl="0"/>
             <a:fld id="{14E13FA4-5A6A-4920-8854-843EBE8DDFDE}" type="datetime1">
               <a:rPr lang="it-IT" smtClean="0"/>
-              <a:t>12/06/2022</a:t>
+              <a:t>13/06/2022</a:t>
             </a:fld>
             <a:endParaRPr lang="it-IT" dirty="0"/>
           </a:p>
@@ -330,7 +330,7 @@
             <a:pPr rtl="0"/>
             <a:fld id="{9F1072A3-100F-40A9-915F-8D2D9E6962D8}" type="slidenum">
               <a:rPr lang="it-IT" smtClean="0"/>
-              <a:t>‹#›</a:t>
+              <a:t>‹N›</a:t>
             </a:fld>
             <a:endParaRPr lang="it-IT" dirty="0"/>
           </a:p>
@@ -432,7 +432,7 @@
             <a:fld id="{3952339E-5782-4E34-93C0-C2AC43169E1F}" type="datetime1">
               <a:rPr lang="it-IT" smtClean="0"/>
               <a:pPr/>
-              <a:t>12/06/2022</a:t>
+              <a:t>13/06/2022</a:t>
             </a:fld>
             <a:endParaRPr lang="it-IT" dirty="0"/>
           </a:p>
@@ -593,7 +593,7 @@
             <a:pPr rtl="0"/>
             <a:fld id="{79230CFA-805A-4FD3-B3A0-DAAA5993DA17}" type="slidenum">
               <a:rPr lang="it-IT" noProof="0" smtClean="0"/>
-              <a:t>‹#›</a:t>
+              <a:t>‹N›</a:t>
             </a:fld>
             <a:endParaRPr lang="it-IT" noProof="0" dirty="0"/>
           </a:p>
@@ -3635,7 +3635,7 @@
             <a:pPr rtl="0"/>
             <a:fld id="{8699F50C-BE38-4BD0-BA84-9B090E1F2B9B}" type="slidenum">
               <a:rPr lang="it-IT" noProof="0" smtClean="0"/>
-              <a:t>‹#›</a:t>
+              <a:t>‹N›</a:t>
             </a:fld>
             <a:endParaRPr lang="it-IT" noProof="0" dirty="0"/>
           </a:p>
@@ -4215,7 +4215,7 @@
             <a:pPr rtl="0"/>
             <a:fld id="{8699F50C-BE38-4BD0-BA84-9B090E1F2B9B}" type="slidenum">
               <a:rPr lang="it-IT" noProof="0" smtClean="0"/>
-              <a:t>‹#›</a:t>
+              <a:t>‹N›</a:t>
             </a:fld>
             <a:endParaRPr lang="it-IT" noProof="0" dirty="0"/>
           </a:p>
@@ -4912,7 +4912,7 @@
             <a:pPr rtl="0"/>
             <a:fld id="{8699F50C-BE38-4BD0-BA84-9B090E1F2B9B}" type="slidenum">
               <a:rPr lang="it-IT" noProof="0" smtClean="0"/>
-              <a:t>‹#›</a:t>
+              <a:t>‹N›</a:t>
             </a:fld>
             <a:endParaRPr lang="it-IT" noProof="0" dirty="0"/>
           </a:p>
@@ -6658,7 +6658,7 @@
             <a:pPr rtl="0"/>
             <a:fld id="{8699F50C-BE38-4BD0-BA84-9B090E1F2B9B}" type="slidenum">
               <a:rPr lang="it-IT" noProof="0" smtClean="0"/>
-              <a:t>‹#›</a:t>
+              <a:t>‹N›</a:t>
             </a:fld>
             <a:endParaRPr lang="it-IT" noProof="0" dirty="0"/>
           </a:p>
@@ -7064,7 +7064,7 @@
             <a:pPr rtl="0"/>
             <a:fld id="{8699F50C-BE38-4BD0-BA84-9B090E1F2B9B}" type="slidenum">
               <a:rPr lang="it-IT" noProof="0" smtClean="0"/>
-              <a:t>‹#›</a:t>
+              <a:t>‹N›</a:t>
             </a:fld>
             <a:endParaRPr lang="it-IT" noProof="0" dirty="0"/>
           </a:p>
@@ -8593,7 +8593,7 @@
             <a:pPr rtl="0"/>
             <a:fld id="{8699F50C-BE38-4BD0-BA84-9B090E1F2B9B}" type="slidenum">
               <a:rPr lang="it-IT" noProof="0" smtClean="0"/>
-              <a:t>‹#›</a:t>
+              <a:t>‹N›</a:t>
             </a:fld>
             <a:endParaRPr lang="it-IT" noProof="0" dirty="0"/>
           </a:p>
@@ -9222,7 +9222,7 @@
             <a:pPr rtl="0"/>
             <a:fld id="{8699F50C-BE38-4BD0-BA84-9B090E1F2B9B}" type="slidenum">
               <a:rPr lang="it-IT" noProof="0" smtClean="0"/>
-              <a:t>‹#›</a:t>
+              <a:t>‹N›</a:t>
             </a:fld>
             <a:endParaRPr lang="it-IT" noProof="0" dirty="0"/>
           </a:p>
@@ -10096,7 +10096,7 @@
             <a:pPr rtl="0"/>
             <a:fld id="{8699F50C-BE38-4BD0-BA84-9B090E1F2B9B}" type="slidenum">
               <a:rPr lang="it-IT" noProof="0" smtClean="0"/>
-              <a:t>‹#›</a:t>
+              <a:t>‹N›</a:t>
             </a:fld>
             <a:endParaRPr lang="it-IT" noProof="0" dirty="0"/>
           </a:p>
@@ -10562,7 +10562,7 @@
             <a:pPr rtl="0"/>
             <a:fld id="{8699F50C-BE38-4BD0-BA84-9B090E1F2B9B}" type="slidenum">
               <a:rPr lang="it-IT" noProof="0" smtClean="0"/>
-              <a:t>‹#›</a:t>
+              <a:t>‹N›</a:t>
             </a:fld>
             <a:endParaRPr lang="it-IT" noProof="0" dirty="0"/>
           </a:p>
@@ -11197,7 +11197,7 @@
             <a:pPr rtl="0"/>
             <a:fld id="{8699F50C-BE38-4BD0-BA84-9B090E1F2B9B}" type="slidenum">
               <a:rPr lang="it-IT" noProof="0" smtClean="0"/>
-              <a:t>‹#›</a:t>
+              <a:t>‹N›</a:t>
             </a:fld>
             <a:endParaRPr lang="it-IT" noProof="0" dirty="0"/>
           </a:p>
@@ -13592,7 +13592,7 @@
             <a:fld id="{8699F50C-BE38-4BD0-BA84-9B090E1F2B9B}" type="slidenum">
               <a:rPr lang="it-IT" noProof="0" smtClean="0"/>
               <a:pPr rtl="0"/>
-              <a:t>‹#›</a:t>
+              <a:t>‹N›</a:t>
             </a:fld>
             <a:endParaRPr lang="it-IT" noProof="0" dirty="0"/>
           </a:p>
@@ -15679,13 +15679,13 @@
   <p:clrMapOvr>
     <a:masterClrMapping/>
   </p:clrMapOvr>
-  <mc:AlternateContent xmlns:mc="http://schemas.openxmlformats.org/markup-compatibility/2006">
-    <mc:Choice xmlns:p14="http://schemas.microsoft.com/office/powerpoint/2010/main" Requires="p14">
+  <mc:AlternateContent xmlns:mc="http://schemas.openxmlformats.org/markup-compatibility/2006" xmlns:p14="http://schemas.microsoft.com/office/powerpoint/2010/main">
+    <mc:Choice Requires="p14">
       <p:transition spd="med" p14:dur="700">
         <p:fade/>
       </p:transition>
     </mc:Choice>
-    <mc:Fallback>
+    <mc:Fallback xmlns="">
       <p:transition spd="med">
         <p:fade/>
       </p:transition>
@@ -15793,7 +15793,7 @@
         </p:blipFill>
         <p:spPr>
           <a:xfrm>
-            <a:off x="3244629" y="1592450"/>
+            <a:off x="3774576" y="1227325"/>
             <a:ext cx="4752481" cy="4763900"/>
           </a:xfrm>
           <a:prstGeom prst="rect">
@@ -15815,7 +15815,7 @@
         </p:nvSpPr>
         <p:spPr>
           <a:xfrm>
-            <a:off x="338530" y="580994"/>
+            <a:off x="338530" y="455189"/>
             <a:ext cx="8794239" cy="646331"/>
           </a:xfrm>
           <a:prstGeom prst="rect">
@@ -15843,6 +15843,96 @@
           </a:p>
         </p:txBody>
       </p:sp>
+      <p:pic>
+        <p:nvPicPr>
+          <p:cNvPr id="7" name="Immagine 6" descr="Immagine che contiene testo&#10;&#10;Descrizione generata automaticamente">
+            <a:extLst>
+              <a:ext uri="{FF2B5EF4-FFF2-40B4-BE49-F238E27FC236}">
+                <a16:creationId xmlns:a16="http://schemas.microsoft.com/office/drawing/2014/main" id="{A83747FB-3679-2B17-481B-8CD6D3896B67}"/>
+              </a:ext>
+            </a:extLst>
+          </p:cNvPr>
+          <p:cNvPicPr>
+            <a:picLocks noChangeAspect="1"/>
+          </p:cNvPicPr>
+          <p:nvPr/>
+        </p:nvPicPr>
+        <p:blipFill>
+          <a:blip r:embed="rId4"/>
+          <a:stretch>
+            <a:fillRect/>
+          </a:stretch>
+        </p:blipFill>
+        <p:spPr>
+          <a:xfrm>
+            <a:off x="8892278" y="3762564"/>
+            <a:ext cx="3048264" cy="1767993"/>
+          </a:xfrm>
+          <a:prstGeom prst="rect">
+            <a:avLst/>
+          </a:prstGeom>
+        </p:spPr>
+      </p:pic>
+      <p:pic>
+        <p:nvPicPr>
+          <p:cNvPr id="9" name="Immagine 8" descr="Immagine che contiene testo&#10;&#10;Descrizione generata automaticamente">
+            <a:extLst>
+              <a:ext uri="{FF2B5EF4-FFF2-40B4-BE49-F238E27FC236}">
+                <a16:creationId xmlns:a16="http://schemas.microsoft.com/office/drawing/2014/main" id="{9140DDCB-DE90-6E18-23A5-EAA94ABDB423}"/>
+              </a:ext>
+            </a:extLst>
+          </p:cNvPr>
+          <p:cNvPicPr>
+            <a:picLocks noChangeAspect="1"/>
+          </p:cNvPicPr>
+          <p:nvPr/>
+        </p:nvPicPr>
+        <p:blipFill>
+          <a:blip r:embed="rId5"/>
+          <a:stretch>
+            <a:fillRect/>
+          </a:stretch>
+        </p:blipFill>
+        <p:spPr>
+          <a:xfrm>
+            <a:off x="37526" y="1510746"/>
+            <a:ext cx="3371829" cy="3947662"/>
+          </a:xfrm>
+          <a:prstGeom prst="rect">
+            <a:avLst/>
+          </a:prstGeom>
+        </p:spPr>
+      </p:pic>
+      <p:pic>
+        <p:nvPicPr>
+          <p:cNvPr id="11" name="Immagine 10" descr="Immagine che contiene testo&#10;&#10;Descrizione generata automaticamente">
+            <a:extLst>
+              <a:ext uri="{FF2B5EF4-FFF2-40B4-BE49-F238E27FC236}">
+                <a16:creationId xmlns:a16="http://schemas.microsoft.com/office/drawing/2014/main" id="{6158926C-3F2F-7FC7-B711-69BEF4F137B1}"/>
+              </a:ext>
+            </a:extLst>
+          </p:cNvPr>
+          <p:cNvPicPr>
+            <a:picLocks noChangeAspect="1"/>
+          </p:cNvPicPr>
+          <p:nvPr/>
+        </p:nvPicPr>
+        <p:blipFill>
+          <a:blip r:embed="rId6"/>
+          <a:stretch>
+            <a:fillRect/>
+          </a:stretch>
+        </p:blipFill>
+        <p:spPr>
+          <a:xfrm>
+            <a:off x="8892278" y="1510746"/>
+            <a:ext cx="2994920" cy="1767993"/>
+          </a:xfrm>
+          <a:prstGeom prst="rect">
+            <a:avLst/>
+          </a:prstGeom>
+        </p:spPr>
+      </p:pic>
     </p:spTree>
     <p:extLst>
       <p:ext uri="{BB962C8B-B14F-4D97-AF65-F5344CB8AC3E}">
@@ -15853,13 +15943,13 @@
   <p:clrMapOvr>
     <a:masterClrMapping/>
   </p:clrMapOvr>
-  <mc:AlternateContent xmlns:mc="http://schemas.openxmlformats.org/markup-compatibility/2006">
-    <mc:Choice xmlns:p14="http://schemas.microsoft.com/office/powerpoint/2010/main" Requires="p14">
+  <mc:AlternateContent xmlns:mc="http://schemas.openxmlformats.org/markup-compatibility/2006" xmlns:p14="http://schemas.microsoft.com/office/powerpoint/2010/main">
+    <mc:Choice Requires="p14">
       <p:transition spd="med" p14:dur="700">
         <p:fade/>
       </p:transition>
     </mc:Choice>
-    <mc:Fallback>
+    <mc:Fallback xmlns="">
       <p:transition spd="med">
         <p:fade/>
       </p:transition>
@@ -16042,13 +16132,13 @@
   <p:clrMapOvr>
     <a:masterClrMapping/>
   </p:clrMapOvr>
-  <mc:AlternateContent xmlns:mc="http://schemas.openxmlformats.org/markup-compatibility/2006">
-    <mc:Choice xmlns:p14="http://schemas.microsoft.com/office/powerpoint/2010/main" Requires="p14">
+  <mc:AlternateContent xmlns:mc="http://schemas.openxmlformats.org/markup-compatibility/2006" xmlns:p14="http://schemas.microsoft.com/office/powerpoint/2010/main">
+    <mc:Choice Requires="p14">
       <p:transition spd="med" p14:dur="700">
         <p:fade/>
       </p:transition>
     </mc:Choice>
-    <mc:Fallback>
+    <mc:Fallback xmlns="">
       <p:transition spd="med">
         <p:fade/>
       </p:transition>
@@ -16231,13 +16321,13 @@
   <p:clrMapOvr>
     <a:masterClrMapping/>
   </p:clrMapOvr>
-  <mc:AlternateContent xmlns:mc="http://schemas.openxmlformats.org/markup-compatibility/2006">
-    <mc:Choice xmlns:p159="http://schemas.microsoft.com/office/powerpoint/2015/09/main" Requires="p159">
+  <mc:AlternateContent xmlns:mc="http://schemas.openxmlformats.org/markup-compatibility/2006" xmlns:p159="http://schemas.microsoft.com/office/powerpoint/2015/09/main">
+    <mc:Choice Requires="p159">
       <p:transition xmlns:p14="http://schemas.microsoft.com/office/powerpoint/2010/main" spd="slow" p14:dur="2000">
         <p159:morph option="byObject"/>
       </p:transition>
     </mc:Choice>
-    <mc:Fallback>
+    <mc:Fallback xmlns="">
       <p:transition spd="slow">
         <p:fade/>
       </p:transition>
@@ -16521,13 +16611,13 @@
   <p:clrMapOvr>
     <a:masterClrMapping/>
   </p:clrMapOvr>
-  <mc:AlternateContent xmlns:mc="http://schemas.openxmlformats.org/markup-compatibility/2006">
-    <mc:Choice xmlns:p14="http://schemas.microsoft.com/office/powerpoint/2010/main" Requires="p14">
+  <mc:AlternateContent xmlns:mc="http://schemas.openxmlformats.org/markup-compatibility/2006" xmlns:p14="http://schemas.microsoft.com/office/powerpoint/2010/main">
+    <mc:Choice Requires="p14">
       <p:transition spd="med" p14:dur="700">
         <p:fade/>
       </p:transition>
     </mc:Choice>
-    <mc:Fallback>
+    <mc:Fallback xmlns="">
       <p:transition spd="med">
         <p:fade/>
       </p:transition>
@@ -19569,8 +19659,8 @@
           </a:p>
         </p:txBody>
       </p:sp>
-      <mc:AlternateContent xmlns:mc="http://schemas.openxmlformats.org/markup-compatibility/2006">
-        <mc:Choice xmlns:a14="http://schemas.microsoft.com/office/drawing/2010/main" Requires="a14">
+      <mc:AlternateContent xmlns:mc="http://schemas.openxmlformats.org/markup-compatibility/2006" xmlns:a14="http://schemas.microsoft.com/office/drawing/2010/main">
+        <mc:Choice Requires="a14">
           <p:sp>
             <p:nvSpPr>
               <p:cNvPr id="11" name="CasellaDiTesto 10">
@@ -19919,7 +20009,7 @@
             </p:txBody>
           </p:sp>
         </mc:Choice>
-        <mc:Fallback>
+        <mc:Fallback xmlns="">
           <p:sp>
             <p:nvSpPr>
               <p:cNvPr id="11" name="CasellaDiTesto 10">
@@ -22184,24 +22274,6 @@
 </file>
 
 <file path=customXml/item1.xml><?xml version="1.0" encoding="utf-8"?>
-<?mso-contentType ?>
-<FormTemplates xmlns="http://schemas.microsoft.com/sharepoint/v3/contenttype/forms">
-  <Display>DocumentLibraryForm</Display>
-  <Edit>DocumentLibraryForm</Edit>
-  <New>DocumentLibraryForm</New>
-</FormTemplates>
-</file>
-
-<file path=customXml/item2.xml><?xml version="1.0" encoding="utf-8"?>
-<p:properties xmlns:p="http://schemas.microsoft.com/office/2006/metadata/properties" xmlns:xsi="http://www.w3.org/2001/XMLSchema-instance" xmlns:pc="http://schemas.microsoft.com/office/infopath/2007/PartnerControls">
-  <documentManagement>
-    <_ip_UnifiedCompliancePolicyUIAction xmlns="http://schemas.microsoft.com/sharepoint/v3" xsi:nil="true"/>
-    <_ip_UnifiedCompliancePolicyProperties xmlns="http://schemas.microsoft.com/sharepoint/v3" xsi:nil="true"/>
-  </documentManagement>
-</p:properties>
-</file>
-
-<file path=customXml/item3.xml><?xml version="1.0" encoding="utf-8"?>
 <ct:contentTypeSchema xmlns:ct="http://schemas.microsoft.com/office/2006/metadata/contentType" xmlns:ma="http://schemas.microsoft.com/office/2006/metadata/properties/metaAttributes" ct:_="" ma:_="" ma:contentTypeName="Document" ma:contentTypeID="0x010100DEEA25CC0A0AC24199CDC46C25B8B0BC" ma:contentTypeVersion="10" ma:contentTypeDescription="Create a new document." ma:contentTypeScope="" ma:versionID="e3b47856d4cf355c0dacb39e1084d14f">
   <xsd:schema xmlns:xsd="http://www.w3.org/2001/XMLSchema" xmlns:xs="http://www.w3.org/2001/XMLSchema" xmlns:p="http://schemas.microsoft.com/office/2006/metadata/properties" xmlns:ns1="http://schemas.microsoft.com/sharepoint/v3" xmlns:ns2="6dc4bcd6-49db-4c07-9060-8acfc67cef9f" xmlns:ns3="fb0879af-3eba-417a-a55a-ffe6dcd6ca77" targetNamespace="http://schemas.microsoft.com/office/2006/metadata/properties" ma:root="true" ma:fieldsID="a845a615265fdb1f7b12cc65ac20ecbd" ns1:_="" ns2:_="" ns3:_="">
     <xsd:import namespace="http://schemas.microsoft.com/sharepoint/v3"/>
@@ -22409,25 +22481,25 @@
 </ct:contentTypeSchema>
 </file>
 
-<file path=customXml/itemProps1.xml><?xml version="1.0" encoding="utf-8"?>
-<ds:datastoreItem xmlns:ds="http://schemas.openxmlformats.org/officeDocument/2006/customXml" ds:itemID="{F79AA90D-A39D-4F83-B1BD-92099B1CAD0D}">
-  <ds:schemaRefs>
-    <ds:schemaRef ds:uri="http://schemas.microsoft.com/sharepoint/v3/contenttype/forms"/>
-  </ds:schemaRefs>
-</ds:datastoreItem>
+<file path=customXml/item2.xml><?xml version="1.0" encoding="utf-8"?>
+<p:properties xmlns:p="http://schemas.microsoft.com/office/2006/metadata/properties" xmlns:xsi="http://www.w3.org/2001/XMLSchema-instance" xmlns:pc="http://schemas.microsoft.com/office/infopath/2007/PartnerControls">
+  <documentManagement>
+    <_ip_UnifiedCompliancePolicyUIAction xmlns="http://schemas.microsoft.com/sharepoint/v3" xsi:nil="true"/>
+    <_ip_UnifiedCompliancePolicyProperties xmlns="http://schemas.microsoft.com/sharepoint/v3" xsi:nil="true"/>
+  </documentManagement>
+</p:properties>
 </file>
 
-<file path=customXml/itemProps2.xml><?xml version="1.0" encoding="utf-8"?>
-<ds:datastoreItem xmlns:ds="http://schemas.openxmlformats.org/officeDocument/2006/customXml" ds:itemID="{374D15D6-87BC-477C-8E91-9F90829C2FC8}">
-  <ds:schemaRefs>
-    <ds:schemaRef ds:uri="http://schemas.microsoft.com/office/2006/metadata/properties"/>
-    <ds:schemaRef ds:uri="http://schemas.microsoft.com/office/infopath/2007/PartnerControls"/>
-    <ds:schemaRef ds:uri="http://schemas.microsoft.com/sharepoint/v3"/>
-  </ds:schemaRefs>
-</ds:datastoreItem>
+<file path=customXml/item3.xml><?xml version="1.0" encoding="utf-8"?>
+<?mso-contentType ?>
+<FormTemplates xmlns="http://schemas.microsoft.com/sharepoint/v3/contenttype/forms">
+  <Display>DocumentLibraryForm</Display>
+  <Edit>DocumentLibraryForm</Edit>
+  <New>DocumentLibraryForm</New>
+</FormTemplates>
 </file>
 
-<file path=customXml/itemProps3.xml><?xml version="1.0" encoding="utf-8"?>
+<file path=customXml/itemProps1.xml><?xml version="1.0" encoding="utf-8"?>
 <ds:datastoreItem xmlns:ds="http://schemas.openxmlformats.org/officeDocument/2006/customXml" ds:itemID="{D19A80A7-0DD1-4CF4-ABD5-362A6549C557}">
   <ds:schemaRefs>
     <ds:schemaRef ds:uri="http://schemas.microsoft.com/office/2006/metadata/contentType"/>
@@ -22445,4 +22517,22 @@
     <ds:schemaRef ds:uri="http://schemas.microsoft.com/internal/obd"/>
   </ds:schemaRefs>
 </ds:datastoreItem>
+</file>
+
+<file path=customXml/itemProps2.xml><?xml version="1.0" encoding="utf-8"?>
+<ds:datastoreItem xmlns:ds="http://schemas.openxmlformats.org/officeDocument/2006/customXml" ds:itemID="{374D15D6-87BC-477C-8E91-9F90829C2FC8}">
+  <ds:schemaRefs>
+    <ds:schemaRef ds:uri="http://schemas.microsoft.com/office/2006/metadata/properties"/>
+    <ds:schemaRef ds:uri="http://schemas.microsoft.com/office/infopath/2007/PartnerControls"/>
+    <ds:schemaRef ds:uri="http://schemas.microsoft.com/sharepoint/v3"/>
+  </ds:schemaRefs>
+</ds:datastoreItem>
+</file>
+
+<file path=customXml/itemProps3.xml><?xml version="1.0" encoding="utf-8"?>
+<ds:datastoreItem xmlns:ds="http://schemas.openxmlformats.org/officeDocument/2006/customXml" ds:itemID="{F79AA90D-A39D-4F83-B1BD-92099B1CAD0D}">
+  <ds:schemaRefs>
+    <ds:schemaRef ds:uri="http://schemas.microsoft.com/sharepoint/v3/contenttype/forms"/>
+  </ds:schemaRefs>
+</ds:datastoreItem>
 </file>
</xml_diff>

<commit_message>
Merged also Michele's ppt and reviewed some grammar.
</commit_message>
<xml_diff>
--- a/Aes_Project_2021_2022.pptx
+++ b/Aes_Project_2021_2022.pptx
@@ -5,10 +5,10 @@
     <p:sldMasterId id="2147483648" r:id="rId4"/>
   </p:sldMasterIdLst>
   <p:notesMasterIdLst>
-    <p:notesMasterId r:id="rId23"/>
+    <p:notesMasterId r:id="rId28"/>
   </p:notesMasterIdLst>
   <p:handoutMasterIdLst>
-    <p:handoutMasterId r:id="rId24"/>
+    <p:handoutMasterId r:id="rId29"/>
   </p:handoutMasterIdLst>
   <p:sldIdLst>
     <p:sldId id="256" r:id="rId5"/>
@@ -29,6 +29,11 @@
     <p:sldId id="293" r:id="rId20"/>
     <p:sldId id="294" r:id="rId21"/>
     <p:sldId id="295" r:id="rId22"/>
+    <p:sldId id="296" r:id="rId23"/>
+    <p:sldId id="297" r:id="rId24"/>
+    <p:sldId id="298" r:id="rId25"/>
+    <p:sldId id="299" r:id="rId26"/>
+    <p:sldId id="300" r:id="rId27"/>
   </p:sldIdLst>
   <p:sldSz cx="12192000" cy="6858000"/>
   <p:notesSz cx="6858000" cy="9144000"/>
@@ -250,7 +255,7 @@
             <a:pPr rtl="0"/>
             <a:fld id="{14E13FA4-5A6A-4920-8854-843EBE8DDFDE}" type="datetime1">
               <a:rPr lang="it-IT" smtClean="0"/>
-              <a:t>12/06/2022</a:t>
+              <a:t>13/06/2022</a:t>
             </a:fld>
             <a:endParaRPr lang="it-IT" dirty="0"/>
           </a:p>
@@ -432,7 +437,7 @@
             <a:fld id="{3952339E-5782-4E34-93C0-C2AC43169E1F}" type="datetime1">
               <a:rPr lang="it-IT" smtClean="0"/>
               <a:pPr/>
-              <a:t>12/06/2022</a:t>
+              <a:t>13/06/2022</a:t>
             </a:fld>
             <a:endParaRPr lang="it-IT" dirty="0"/>
           </a:p>
@@ -15679,13 +15684,13 @@
   <p:clrMapOvr>
     <a:masterClrMapping/>
   </p:clrMapOvr>
-  <mc:AlternateContent xmlns:mc="http://schemas.openxmlformats.org/markup-compatibility/2006">
-    <mc:Choice xmlns:p14="http://schemas.microsoft.com/office/powerpoint/2010/main" Requires="p14">
+  <mc:AlternateContent xmlns:mc="http://schemas.openxmlformats.org/markup-compatibility/2006" xmlns:p14="http://schemas.microsoft.com/office/powerpoint/2010/main">
+    <mc:Choice Requires="p14">
       <p:transition spd="med" p14:dur="700">
         <p:fade/>
       </p:transition>
     </mc:Choice>
-    <mc:Fallback>
+    <mc:Fallback xmlns="">
       <p:transition spd="med">
         <p:fade/>
       </p:transition>
@@ -15853,13 +15858,13 @@
   <p:clrMapOvr>
     <a:masterClrMapping/>
   </p:clrMapOvr>
-  <mc:AlternateContent xmlns:mc="http://schemas.openxmlformats.org/markup-compatibility/2006">
-    <mc:Choice xmlns:p14="http://schemas.microsoft.com/office/powerpoint/2010/main" Requires="p14">
+  <mc:AlternateContent xmlns:mc="http://schemas.openxmlformats.org/markup-compatibility/2006" xmlns:p14="http://schemas.microsoft.com/office/powerpoint/2010/main">
+    <mc:Choice Requires="p14">
       <p:transition spd="med" p14:dur="700">
         <p:fade/>
       </p:transition>
     </mc:Choice>
-    <mc:Fallback>
+    <mc:Fallback xmlns="">
       <p:transition spd="med">
         <p:fade/>
       </p:transition>
@@ -16042,13 +16047,13 @@
   <p:clrMapOvr>
     <a:masterClrMapping/>
   </p:clrMapOvr>
-  <mc:AlternateContent xmlns:mc="http://schemas.openxmlformats.org/markup-compatibility/2006">
-    <mc:Choice xmlns:p14="http://schemas.microsoft.com/office/powerpoint/2010/main" Requires="p14">
+  <mc:AlternateContent xmlns:mc="http://schemas.openxmlformats.org/markup-compatibility/2006" xmlns:p14="http://schemas.microsoft.com/office/powerpoint/2010/main">
+    <mc:Choice Requires="p14">
       <p:transition spd="med" p14:dur="700">
         <p:fade/>
       </p:transition>
     </mc:Choice>
-    <mc:Fallback>
+    <mc:Fallback xmlns="">
       <p:transition spd="med">
         <p:fade/>
       </p:transition>
@@ -16231,13 +16236,13 @@
   <p:clrMapOvr>
     <a:masterClrMapping/>
   </p:clrMapOvr>
-  <mc:AlternateContent xmlns:mc="http://schemas.openxmlformats.org/markup-compatibility/2006">
-    <mc:Choice xmlns:p159="http://schemas.microsoft.com/office/powerpoint/2015/09/main" Requires="p159">
+  <mc:AlternateContent xmlns:mc="http://schemas.openxmlformats.org/markup-compatibility/2006" xmlns:p159="http://schemas.microsoft.com/office/powerpoint/2015/09/main">
+    <mc:Choice Requires="p159">
       <p:transition xmlns:p14="http://schemas.microsoft.com/office/powerpoint/2010/main" spd="slow" p14:dur="2000">
         <p159:morph option="byObject"/>
       </p:transition>
     </mc:Choice>
-    <mc:Fallback>
+    <mc:Fallback xmlns="">
       <p:transition spd="slow">
         <p:fade/>
       </p:transition>
@@ -16521,13 +16526,505 @@
   <p:clrMapOvr>
     <a:masterClrMapping/>
   </p:clrMapOvr>
-  <mc:AlternateContent xmlns:mc="http://schemas.openxmlformats.org/markup-compatibility/2006">
-    <mc:Choice xmlns:p14="http://schemas.microsoft.com/office/powerpoint/2010/main" Requires="p14">
+  <mc:AlternateContent xmlns:mc="http://schemas.openxmlformats.org/markup-compatibility/2006" xmlns:p14="http://schemas.microsoft.com/office/powerpoint/2010/main">
+    <mc:Choice Requires="p14">
       <p:transition spd="med" p14:dur="700">
         <p:fade/>
       </p:transition>
     </mc:Choice>
-    <mc:Fallback>
+    <mc:Fallback xmlns="">
+      <p:transition spd="med">
+        <p:fade/>
+      </p:transition>
+    </mc:Fallback>
+  </mc:AlternateContent>
+</p:sld>
+</file>
+
+<file path=ppt/slides/slide19.xml><?xml version="1.0" encoding="utf-8"?>
+<p:sld xmlns:a="http://schemas.openxmlformats.org/drawingml/2006/main" xmlns:r="http://schemas.openxmlformats.org/officeDocument/2006/relationships" xmlns:p="http://schemas.openxmlformats.org/presentationml/2006/main">
+  <p:cSld>
+    <p:spTree>
+      <p:nvGrpSpPr>
+        <p:cNvPr id="1" name=""/>
+        <p:cNvGrpSpPr/>
+        <p:nvPr/>
+      </p:nvGrpSpPr>
+      <p:grpSpPr>
+        <a:xfrm>
+          <a:off x="0" y="0"/>
+          <a:ext cx="0" cy="0"/>
+          <a:chOff x="0" y="0"/>
+          <a:chExt cx="0" cy="0"/>
+        </a:xfrm>
+      </p:grpSpPr>
+      <p:sp>
+        <p:nvSpPr>
+          <p:cNvPr id="3" name="Segnaposto piè di pagina 2">
+            <a:extLst>
+              <a:ext uri="{FF2B5EF4-FFF2-40B4-BE49-F238E27FC236}">
+                <a16:creationId xmlns:a16="http://schemas.microsoft.com/office/drawing/2014/main" id="{99E8B753-8F9B-FB27-A65B-8B8775D38FCE}"/>
+              </a:ext>
+            </a:extLst>
+          </p:cNvPr>
+          <p:cNvSpPr>
+            <a:spLocks noGrp="1"/>
+          </p:cNvSpPr>
+          <p:nvPr>
+            <p:ph type="ftr" sz="quarter" idx="17"/>
+          </p:nvPr>
+        </p:nvSpPr>
+        <p:spPr/>
+        <p:txBody>
+          <a:bodyPr/>
+          <a:lstStyle/>
+          <a:p>
+            <a:pPr rtl="0"/>
+            <a:r>
+              <a:rPr lang="it-IT" noProof="0" dirty="0"/>
+              <a:t>Aggiungere un piè di pagina</a:t>
+            </a:r>
+          </a:p>
+        </p:txBody>
+      </p:sp>
+      <p:sp>
+        <p:nvSpPr>
+          <p:cNvPr id="4" name="Segnaposto numero diapositiva 3">
+            <a:extLst>
+              <a:ext uri="{FF2B5EF4-FFF2-40B4-BE49-F238E27FC236}">
+                <a16:creationId xmlns:a16="http://schemas.microsoft.com/office/drawing/2014/main" id="{9BF2CC3D-E6AB-538A-F788-163E463EDEC1}"/>
+              </a:ext>
+            </a:extLst>
+          </p:cNvPr>
+          <p:cNvSpPr>
+            <a:spLocks noGrp="1"/>
+          </p:cNvSpPr>
+          <p:nvPr>
+            <p:ph type="sldNum" sz="quarter" idx="18"/>
+          </p:nvPr>
+        </p:nvSpPr>
+        <p:spPr/>
+        <p:txBody>
+          <a:bodyPr/>
+          <a:lstStyle/>
+          <a:p>
+            <a:pPr rtl="0"/>
+            <a:fld id="{8699F50C-BE38-4BD0-BA84-9B090E1F2B9B}" type="slidenum">
+              <a:rPr lang="it-IT" noProof="0" smtClean="0"/>
+              <a:t>19</a:t>
+            </a:fld>
+            <a:endParaRPr lang="it-IT" noProof="0" dirty="0"/>
+          </a:p>
+        </p:txBody>
+      </p:sp>
+      <p:sp>
+        <p:nvSpPr>
+          <p:cNvPr id="5" name="Titolo 4">
+            <a:extLst>
+              <a:ext uri="{FF2B5EF4-FFF2-40B4-BE49-F238E27FC236}">
+                <a16:creationId xmlns:a16="http://schemas.microsoft.com/office/drawing/2014/main" id="{23B11D5B-8EE9-BA95-85EB-A66526317EC6}"/>
+              </a:ext>
+            </a:extLst>
+          </p:cNvPr>
+          <p:cNvSpPr>
+            <a:spLocks noGrp="1"/>
+          </p:cNvSpPr>
+          <p:nvPr>
+            <p:ph type="title"/>
+          </p:nvPr>
+        </p:nvSpPr>
+        <p:spPr>
+          <a:xfrm>
+            <a:off x="531814" y="352425"/>
+            <a:ext cx="10722571" cy="1241632"/>
+          </a:xfrm>
+        </p:spPr>
+        <p:txBody>
+          <a:bodyPr>
+            <a:normAutofit/>
+          </a:bodyPr>
+          <a:lstStyle/>
+          <a:p>
+            <a:pPr algn="ctr"/>
+            <a:r>
+              <a:rPr lang="it-IT" sz="3600" dirty="0"/>
+              <a:t>Power consumption with different outlet temperatures in day mode</a:t>
+            </a:r>
+          </a:p>
+        </p:txBody>
+      </p:sp>
+      <mc:AlternateContent xmlns:mc="http://schemas.openxmlformats.org/markup-compatibility/2006">
+        <mc:Choice xmlns:a14="http://schemas.microsoft.com/office/drawing/2010/main" Requires="a14">
+          <p:sp>
+            <p:nvSpPr>
+              <p:cNvPr id="6" name="Segnaposto testo 5">
+                <a:extLst>
+                  <a:ext uri="{FF2B5EF4-FFF2-40B4-BE49-F238E27FC236}">
+                    <a16:creationId xmlns:a16="http://schemas.microsoft.com/office/drawing/2014/main" id="{21130B6F-AF23-5D3F-9A1C-13E67C11364D}"/>
+                  </a:ext>
+                </a:extLst>
+              </p:cNvPr>
+              <p:cNvSpPr>
+                <a:spLocks noGrp="1"/>
+              </p:cNvSpPr>
+              <p:nvPr>
+                <p:ph type="body" sz="quarter" idx="19"/>
+              </p:nvPr>
+            </p:nvSpPr>
+            <p:spPr>
+              <a:xfrm>
+                <a:off x="531813" y="5263944"/>
+                <a:ext cx="11422059" cy="1092406"/>
+              </a:xfrm>
+            </p:spPr>
+            <p:txBody>
+              <a:bodyPr/>
+              <a:lstStyle/>
+              <a:p>
+                <a:r>
+                  <a:rPr lang="it-IT" sz="1800" dirty="0"/>
+                  <a:t>If</a:t>
+                </a:r>
+                <a:r>
+                  <a:rPr lang="it-IT" sz="1600" dirty="0"/>
+                  <a:t> </a:t>
+                </a:r>
+                <a:r>
+                  <a:rPr lang="it-IT" sz="1800" dirty="0"/>
+                  <a:t>I change the reference outlet temperature of the heater I get the following power consumption diagrams, </a:t>
+                </a:r>
+              </a:p>
+              <a:p>
+                <a:r>
+                  <a:rPr lang="it-IT" sz="1800" dirty="0"/>
+                  <a:t>where </a:t>
+                </a:r>
+                <a14:m>
+                  <m:oMath xmlns:m="http://schemas.openxmlformats.org/officeDocument/2006/math">
+                    <m:r>
+                      <a:rPr lang="it-IT" sz="1800" b="0" i="0" smtClean="0">
+                        <a:latin typeface="Cambria Math" panose="02040503050406030204" pitchFamily="18" charset="0"/>
+                      </a:rPr>
+                      <m:t> </m:t>
+                    </m:r>
+                    <m:r>
+                      <a:rPr lang="it-IT" sz="1800"/>
+                      <m:t> </m:t>
+                    </m:r>
+                    <m:sSub>
+                      <m:sSubPr>
+                        <m:ctrlPr>
+                          <a:rPr lang="it-IT" sz="1800"/>
+                        </m:ctrlPr>
+                      </m:sSubPr>
+                      <m:e>
+                        <m:r>
+                          <a:rPr lang="it-IT" sz="1800"/>
+                          <m:t>𝑃</m:t>
+                        </m:r>
+                      </m:e>
+                      <m:sub>
+                        <m:r>
+                          <a:rPr lang="it-IT" sz="1800"/>
+                          <m:t>𝑎𝑣𝑒𝑟𝑎𝑔𝑒</m:t>
+                        </m:r>
+                      </m:sub>
+                    </m:sSub>
+                    <m:r>
+                      <a:rPr lang="it-IT" sz="1800"/>
+                      <m:t>=</m:t>
+                    </m:r>
+                    <m:f>
+                      <m:fPr>
+                        <m:ctrlPr>
+                          <a:rPr lang="it-IT" sz="1800"/>
+                        </m:ctrlPr>
+                      </m:fPr>
+                      <m:num>
+                        <m:nary>
+                          <m:naryPr>
+                            <m:ctrlPr>
+                              <a:rPr lang="it-IT" sz="1800"/>
+                            </m:ctrlPr>
+                          </m:naryPr>
+                          <m:sub>
+                            <m:r>
+                              <m:rPr>
+                                <m:brk m:alnAt="23"/>
+                              </m:rPr>
+                              <a:rPr lang="it-IT" sz="1800"/>
+                              <m:t>0</m:t>
+                            </m:r>
+                          </m:sub>
+                          <m:sup>
+                            <m:r>
+                              <a:rPr lang="it-IT" sz="1800"/>
+                              <m:t>𝑡</m:t>
+                            </m:r>
+                          </m:sup>
+                          <m:e>
+                            <m:sSub>
+                              <m:sSubPr>
+                                <m:ctrlPr>
+                                  <a:rPr lang="it-IT" sz="1800"/>
+                                </m:ctrlPr>
+                              </m:sSubPr>
+                              <m:e>
+                                <m:r>
+                                  <a:rPr lang="it-IT" sz="1800"/>
+                                  <m:t>𝑃</m:t>
+                                </m:r>
+                              </m:e>
+                              <m:sub>
+                                <m:r>
+                                  <a:rPr lang="it-IT" sz="1800"/>
+                                  <m:t>𝑡𝑜𝑡</m:t>
+                                </m:r>
+                              </m:sub>
+                            </m:sSub>
+                          </m:e>
+                        </m:nary>
+                      </m:num>
+                      <m:den>
+                        <m:r>
+                          <a:rPr lang="it-IT" sz="1800"/>
+                          <m:t>𝑡</m:t>
+                        </m:r>
+                      </m:den>
+                    </m:f>
+                  </m:oMath>
+                </a14:m>
+                <a:r>
+                  <a:rPr lang="it-IT" sz="1800" dirty="0"/>
+                  <a:t>. </a:t>
+                </a:r>
+              </a:p>
+            </p:txBody>
+          </p:sp>
+        </mc:Choice>
+        <mc:Fallback>
+          <p:sp>
+            <p:nvSpPr>
+              <p:cNvPr id="6" name="Segnaposto testo 5">
+                <a:extLst>
+                  <a:ext uri="{FF2B5EF4-FFF2-40B4-BE49-F238E27FC236}">
+                    <a16:creationId xmlns:a16="http://schemas.microsoft.com/office/drawing/2014/main" id="{21130B6F-AF23-5D3F-9A1C-13E67C11364D}"/>
+                  </a:ext>
+                </a:extLst>
+              </p:cNvPr>
+              <p:cNvSpPr>
+                <a:spLocks noGrp="1" noRot="1" noChangeAspect="1" noMove="1" noResize="1" noEditPoints="1" noAdjustHandles="1" noChangeArrowheads="1" noChangeShapeType="1" noTextEdit="1"/>
+              </p:cNvSpPr>
+              <p:nvPr>
+                <p:ph type="body" sz="quarter" idx="19"/>
+              </p:nvPr>
+            </p:nvSpPr>
+            <p:spPr>
+              <a:xfrm>
+                <a:off x="531813" y="5263944"/>
+                <a:ext cx="11422059" cy="1092406"/>
+              </a:xfrm>
+              <a:blipFill>
+                <a:blip r:embed="rId5"/>
+                <a:stretch>
+                  <a:fillRect l="-427" t="-5587"/>
+                </a:stretch>
+              </a:blipFill>
+            </p:spPr>
+            <p:txBody>
+              <a:bodyPr/>
+              <a:lstStyle/>
+              <a:p>
+                <a:r>
+                  <a:rPr lang="en-GB">
+                    <a:noFill/>
+                  </a:rPr>
+                  <a:t> </a:t>
+                </a:r>
+              </a:p>
+            </p:txBody>
+          </p:sp>
+        </mc:Fallback>
+      </mc:AlternateContent>
+      <p:pic>
+        <p:nvPicPr>
+          <p:cNvPr id="9" name="Immagine 8">
+            <a:extLst>
+              <a:ext uri="{FF2B5EF4-FFF2-40B4-BE49-F238E27FC236}">
+                <a16:creationId xmlns:a16="http://schemas.microsoft.com/office/drawing/2014/main" id="{6D97D7FA-335D-C1CF-5A4A-A3F9853B509D}"/>
+              </a:ext>
+            </a:extLst>
+          </p:cNvPr>
+          <p:cNvPicPr>
+            <a:picLocks noChangeAspect="1"/>
+          </p:cNvPicPr>
+          <p:nvPr/>
+        </p:nvPicPr>
+        <p:blipFill>
+          <a:blip r:embed="rId6"/>
+          <a:stretch>
+            <a:fillRect/>
+          </a:stretch>
+        </p:blipFill>
+        <p:spPr>
+          <a:xfrm>
+            <a:off x="467872" y="1594057"/>
+            <a:ext cx="5301678" cy="3314286"/>
+          </a:xfrm>
+          <a:prstGeom prst="rect">
+            <a:avLst/>
+          </a:prstGeom>
+        </p:spPr>
+      </p:pic>
+      <p:pic>
+        <p:nvPicPr>
+          <p:cNvPr id="11" name="Immagine 10">
+            <a:extLst>
+              <a:ext uri="{FF2B5EF4-FFF2-40B4-BE49-F238E27FC236}">
+                <a16:creationId xmlns:a16="http://schemas.microsoft.com/office/drawing/2014/main" id="{04A87ED5-08EC-8BE4-D744-FE55903F866F}"/>
+              </a:ext>
+            </a:extLst>
+          </p:cNvPr>
+          <p:cNvPicPr>
+            <a:picLocks noChangeAspect="1"/>
+          </p:cNvPicPr>
+          <p:nvPr/>
+        </p:nvPicPr>
+        <p:blipFill>
+          <a:blip r:embed="rId7"/>
+          <a:stretch>
+            <a:fillRect/>
+          </a:stretch>
+        </p:blipFill>
+        <p:spPr>
+          <a:xfrm>
+            <a:off x="6196708" y="1594057"/>
+            <a:ext cx="5757165" cy="3314286"/>
+          </a:xfrm>
+          <a:prstGeom prst="rect">
+            <a:avLst/>
+          </a:prstGeom>
+        </p:spPr>
+      </p:pic>
+      <p:pic>
+        <p:nvPicPr>
+          <p:cNvPr id="13" name="Picture 12" descr="\documentclass{article}&#10;\usepackage{amsmath}&#10;\pagestyle{empty}&#10;\begin{document}&#10;\begin{equation*}&#10;T^o=40^{\circ}C&#10;\end{equation*}&#10;\end{document}" title="IguanaTex Bitmap Display">
+            <a:extLst>
+              <a:ext uri="{FF2B5EF4-FFF2-40B4-BE49-F238E27FC236}">
+                <a16:creationId xmlns:a16="http://schemas.microsoft.com/office/drawing/2014/main" id="{B777AF15-E6F2-9130-85AA-52BD3FE5C4B4}"/>
+              </a:ext>
+            </a:extLst>
+          </p:cNvPr>
+          <p:cNvPicPr>
+            <a:picLocks noChangeAspect="1"/>
+          </p:cNvPicPr>
+          <p:nvPr>
+            <p:custDataLst>
+              <p:tags r:id="rId1"/>
+            </p:custDataLst>
+          </p:nvPr>
+        </p:nvPicPr>
+        <p:blipFill>
+          <a:blip r:embed="rId8"/>
+          <a:stretch>
+            <a:fillRect/>
+          </a:stretch>
+        </p:blipFill>
+        <p:spPr>
+          <a:xfrm>
+            <a:off x="4360411" y="2124536"/>
+            <a:ext cx="1190095" cy="193524"/>
+          </a:xfrm>
+          <a:prstGeom prst="rect">
+            <a:avLst/>
+          </a:prstGeom>
+        </p:spPr>
+      </p:pic>
+      <p:pic>
+        <p:nvPicPr>
+          <p:cNvPr id="15" name="Picture 14" descr="\documentclass{article}&#10;\usepackage{amsmath}&#10;\pagestyle{empty}&#10;\begin{document}&#10;\begin{equation*}&#10;T^o=50^{\circ}C&#10;\end{equation*}&#10;\end{document}" title="IguanaTex Bitmap Display">
+            <a:extLst>
+              <a:ext uri="{FF2B5EF4-FFF2-40B4-BE49-F238E27FC236}">
+                <a16:creationId xmlns:a16="http://schemas.microsoft.com/office/drawing/2014/main" id="{91E7DEB6-F0C8-6197-9E19-8AAFB161F7DA}"/>
+              </a:ext>
+            </a:extLst>
+          </p:cNvPr>
+          <p:cNvPicPr>
+            <a:picLocks noChangeAspect="1"/>
+          </p:cNvPicPr>
+          <p:nvPr>
+            <p:custDataLst>
+              <p:tags r:id="rId2"/>
+            </p:custDataLst>
+          </p:nvPr>
+        </p:nvPicPr>
+        <p:blipFill>
+          <a:blip r:embed="rId9"/>
+          <a:stretch>
+            <a:fillRect/>
+          </a:stretch>
+        </p:blipFill>
+        <p:spPr>
+          <a:xfrm>
+            <a:off x="10326989" y="2124536"/>
+            <a:ext cx="1190095" cy="193524"/>
+          </a:xfrm>
+          <a:prstGeom prst="rect">
+            <a:avLst/>
+          </a:prstGeom>
+        </p:spPr>
+      </p:pic>
+      <p:pic>
+        <p:nvPicPr>
+          <p:cNvPr id="19" name="Picture 18" descr="\documentclass{article}&#10;\usepackage{amsmath}&#10;\pagestyle{empty}&#10;\begin{document}&#10;\begin{equation*}&#10;T^o \uparrow \; \Rightarrow \, P_{average}\uparrow&#10;\end{equation*}&#10;\end{document}" title="IguanaTex Bitmap Display">
+            <a:extLst>
+              <a:ext uri="{FF2B5EF4-FFF2-40B4-BE49-F238E27FC236}">
+                <a16:creationId xmlns:a16="http://schemas.microsoft.com/office/drawing/2014/main" id="{8B5C604A-E5E4-12BC-6B28-E61BDF853F06}"/>
+              </a:ext>
+            </a:extLst>
+          </p:cNvPr>
+          <p:cNvPicPr>
+            <a:picLocks noChangeAspect="1"/>
+          </p:cNvPicPr>
+          <p:nvPr>
+            <p:custDataLst>
+              <p:tags r:id="rId3"/>
+            </p:custDataLst>
+          </p:nvPr>
+        </p:nvPicPr>
+        <p:blipFill>
+          <a:blip r:embed="rId10"/>
+          <a:stretch>
+            <a:fillRect/>
+          </a:stretch>
+        </p:blipFill>
+        <p:spPr>
+          <a:xfrm>
+            <a:off x="5088762" y="5859185"/>
+            <a:ext cx="2014476" cy="257524"/>
+          </a:xfrm>
+          <a:prstGeom prst="rect">
+            <a:avLst/>
+          </a:prstGeom>
+        </p:spPr>
+      </p:pic>
+    </p:spTree>
+    <p:extLst>
+      <p:ext uri="{BB962C8B-B14F-4D97-AF65-F5344CB8AC3E}">
+        <p14:creationId xmlns:p14="http://schemas.microsoft.com/office/powerpoint/2010/main" val="2601754529"/>
+      </p:ext>
+    </p:extLst>
+  </p:cSld>
+  <p:clrMapOvr>
+    <a:masterClrMapping/>
+  </p:clrMapOvr>
+  <mc:AlternateContent xmlns:mc="http://schemas.openxmlformats.org/markup-compatibility/2006" xmlns:p14="http://schemas.microsoft.com/office/powerpoint/2010/main">
+    <mc:Choice Requires="p14">
+      <p:transition spd="med" p14:dur="700">
+        <p:fade/>
+      </p:transition>
+    </mc:Choice>
+    <mc:Fallback xmlns="">
       <p:transition spd="med">
         <p:fade/>
       </p:transition>
@@ -16676,6 +17173,1264 @@
     <p:extLst>
       <p:ext uri="{BB962C8B-B14F-4D97-AF65-F5344CB8AC3E}">
         <p14:creationId xmlns:p14="http://schemas.microsoft.com/office/powerpoint/2010/main" val="2367392682"/>
+      </p:ext>
+    </p:extLst>
+  </p:cSld>
+  <p:clrMapOvr>
+    <a:masterClrMapping/>
+  </p:clrMapOvr>
+  <mc:AlternateContent xmlns:mc="http://schemas.openxmlformats.org/markup-compatibility/2006" xmlns:p14="http://schemas.microsoft.com/office/powerpoint/2010/main">
+    <mc:Choice Requires="p14">
+      <p:transition spd="med" p14:dur="700">
+        <p:fade/>
+      </p:transition>
+    </mc:Choice>
+    <mc:Fallback xmlns="">
+      <p:transition spd="med">
+        <p:fade/>
+      </p:transition>
+    </mc:Fallback>
+  </mc:AlternateContent>
+</p:sld>
+</file>
+
+<file path=ppt/slides/slide20.xml><?xml version="1.0" encoding="utf-8"?>
+<p:sld xmlns:a="http://schemas.openxmlformats.org/drawingml/2006/main" xmlns:r="http://schemas.openxmlformats.org/officeDocument/2006/relationships" xmlns:p="http://schemas.openxmlformats.org/presentationml/2006/main">
+  <p:cSld>
+    <p:spTree>
+      <p:nvGrpSpPr>
+        <p:cNvPr id="1" name=""/>
+        <p:cNvGrpSpPr/>
+        <p:nvPr/>
+      </p:nvGrpSpPr>
+      <p:grpSpPr>
+        <a:xfrm>
+          <a:off x="0" y="0"/>
+          <a:ext cx="0" cy="0"/>
+          <a:chOff x="0" y="0"/>
+          <a:chExt cx="0" cy="0"/>
+        </a:xfrm>
+      </p:grpSpPr>
+      <p:sp>
+        <p:nvSpPr>
+          <p:cNvPr id="3" name="Segnaposto piè di pagina 2">
+            <a:extLst>
+              <a:ext uri="{FF2B5EF4-FFF2-40B4-BE49-F238E27FC236}">
+                <a16:creationId xmlns:a16="http://schemas.microsoft.com/office/drawing/2014/main" id="{ACBC0392-A449-DD19-5455-22BD88D5F610}"/>
+              </a:ext>
+            </a:extLst>
+          </p:cNvPr>
+          <p:cNvSpPr>
+            <a:spLocks noGrp="1"/>
+          </p:cNvSpPr>
+          <p:nvPr>
+            <p:ph type="ftr" sz="quarter" idx="17"/>
+          </p:nvPr>
+        </p:nvSpPr>
+        <p:spPr/>
+        <p:txBody>
+          <a:bodyPr/>
+          <a:lstStyle/>
+          <a:p>
+            <a:pPr rtl="0"/>
+            <a:r>
+              <a:rPr lang="it-IT" noProof="0"/>
+              <a:t>Aggiungere un piè di pagina</a:t>
+            </a:r>
+            <a:endParaRPr lang="it-IT" noProof="0" dirty="0"/>
+          </a:p>
+        </p:txBody>
+      </p:sp>
+      <p:sp>
+        <p:nvSpPr>
+          <p:cNvPr id="4" name="Segnaposto numero diapositiva 3">
+            <a:extLst>
+              <a:ext uri="{FF2B5EF4-FFF2-40B4-BE49-F238E27FC236}">
+                <a16:creationId xmlns:a16="http://schemas.microsoft.com/office/drawing/2014/main" id="{BD428E3B-F9EB-B71D-A4D0-FB83BF670720}"/>
+              </a:ext>
+            </a:extLst>
+          </p:cNvPr>
+          <p:cNvSpPr>
+            <a:spLocks noGrp="1"/>
+          </p:cNvSpPr>
+          <p:nvPr>
+            <p:ph type="sldNum" sz="quarter" idx="18"/>
+          </p:nvPr>
+        </p:nvSpPr>
+        <p:spPr/>
+        <p:txBody>
+          <a:bodyPr/>
+          <a:lstStyle/>
+          <a:p>
+            <a:pPr rtl="0"/>
+            <a:fld id="{8699F50C-BE38-4BD0-BA84-9B090E1F2B9B}" type="slidenum">
+              <a:rPr lang="it-IT" noProof="0" smtClean="0"/>
+              <a:t>20</a:t>
+            </a:fld>
+            <a:endParaRPr lang="it-IT" noProof="0" dirty="0"/>
+          </a:p>
+        </p:txBody>
+      </p:sp>
+      <p:sp>
+        <p:nvSpPr>
+          <p:cNvPr id="5" name="Titolo 4">
+            <a:extLst>
+              <a:ext uri="{FF2B5EF4-FFF2-40B4-BE49-F238E27FC236}">
+                <a16:creationId xmlns:a16="http://schemas.microsoft.com/office/drawing/2014/main" id="{7096C3E5-7585-78DF-317F-8794E408BAAA}"/>
+              </a:ext>
+            </a:extLst>
+          </p:cNvPr>
+          <p:cNvSpPr>
+            <a:spLocks noGrp="1"/>
+          </p:cNvSpPr>
+          <p:nvPr>
+            <p:ph type="title"/>
+          </p:nvPr>
+        </p:nvSpPr>
+        <p:spPr>
+          <a:xfrm>
+            <a:off x="518678" y="209028"/>
+            <a:ext cx="10435072" cy="1497852"/>
+          </a:xfrm>
+        </p:spPr>
+        <p:txBody>
+          <a:bodyPr>
+            <a:normAutofit/>
+          </a:bodyPr>
+          <a:lstStyle/>
+          <a:p>
+            <a:pPr algn="ctr"/>
+            <a:r>
+              <a:rPr lang="it-IT" sz="3600" dirty="0"/>
+              <a:t>Power </a:t>
+            </a:r>
+            <a:r>
+              <a:rPr lang="it-IT" sz="3600" dirty="0" err="1"/>
+              <a:t>consumption</a:t>
+            </a:r>
+            <a:r>
+              <a:rPr lang="it-IT" sz="3600" dirty="0"/>
+              <a:t> with </a:t>
+            </a:r>
+            <a:r>
+              <a:rPr lang="it-IT" sz="3600" dirty="0" err="1"/>
+              <a:t>different</a:t>
+            </a:r>
+            <a:r>
+              <a:rPr lang="it-IT" sz="3600" dirty="0"/>
+              <a:t> outlet pressure in day mode</a:t>
+            </a:r>
+          </a:p>
+        </p:txBody>
+      </p:sp>
+      <p:sp>
+        <p:nvSpPr>
+          <p:cNvPr id="6" name="Segnaposto testo 5">
+            <a:extLst>
+              <a:ext uri="{FF2B5EF4-FFF2-40B4-BE49-F238E27FC236}">
+                <a16:creationId xmlns:a16="http://schemas.microsoft.com/office/drawing/2014/main" id="{B642BB4C-A0FB-4F69-9220-8658910171F1}"/>
+              </a:ext>
+            </a:extLst>
+          </p:cNvPr>
+          <p:cNvSpPr>
+            <a:spLocks noGrp="1"/>
+          </p:cNvSpPr>
+          <p:nvPr>
+            <p:ph type="body" sz="quarter" idx="19"/>
+          </p:nvPr>
+        </p:nvSpPr>
+        <p:spPr>
+          <a:xfrm>
+            <a:off x="518678" y="5352039"/>
+            <a:ext cx="11195802" cy="757742"/>
+          </a:xfrm>
+        </p:spPr>
+        <p:txBody>
+          <a:bodyPr/>
+          <a:lstStyle/>
+          <a:p>
+            <a:r>
+              <a:rPr lang="it-IT" sz="1800" dirty="0"/>
+              <a:t>The</a:t>
+            </a:r>
+            <a:r>
+              <a:rPr lang="it-IT" sz="1600" dirty="0"/>
+              <a:t> </a:t>
+            </a:r>
+            <a:r>
+              <a:rPr lang="it-IT" sz="1800" dirty="0"/>
+              <a:t>higher the reference pressure, the more the pump will be used. As the overall consumption remains the same, I can decrease or increase the pressure reference based on the efficiency of the heater and the pump.</a:t>
+            </a:r>
+          </a:p>
+        </p:txBody>
+      </p:sp>
+      <p:pic>
+        <p:nvPicPr>
+          <p:cNvPr id="9" name="Immagine 8">
+            <a:extLst>
+              <a:ext uri="{FF2B5EF4-FFF2-40B4-BE49-F238E27FC236}">
+                <a16:creationId xmlns:a16="http://schemas.microsoft.com/office/drawing/2014/main" id="{2ADE09C8-1C44-5BCC-7D23-837B6B788A8C}"/>
+              </a:ext>
+            </a:extLst>
+          </p:cNvPr>
+          <p:cNvPicPr>
+            <a:picLocks noChangeAspect="1"/>
+          </p:cNvPicPr>
+          <p:nvPr/>
+        </p:nvPicPr>
+        <p:blipFill>
+          <a:blip r:embed="rId4"/>
+          <a:stretch>
+            <a:fillRect/>
+          </a:stretch>
+        </p:blipFill>
+        <p:spPr>
+          <a:xfrm>
+            <a:off x="294189" y="1648127"/>
+            <a:ext cx="5344612" cy="3289275"/>
+          </a:xfrm>
+          <a:prstGeom prst="rect">
+            <a:avLst/>
+          </a:prstGeom>
+        </p:spPr>
+      </p:pic>
+      <p:pic>
+        <p:nvPicPr>
+          <p:cNvPr id="11" name="Immagine 10">
+            <a:extLst>
+              <a:ext uri="{FF2B5EF4-FFF2-40B4-BE49-F238E27FC236}">
+                <a16:creationId xmlns:a16="http://schemas.microsoft.com/office/drawing/2014/main" id="{7EA66E4F-CF81-A6E5-7B95-F0B014123A79}"/>
+              </a:ext>
+            </a:extLst>
+          </p:cNvPr>
+          <p:cNvPicPr>
+            <a:picLocks noChangeAspect="1"/>
+          </p:cNvPicPr>
+          <p:nvPr/>
+        </p:nvPicPr>
+        <p:blipFill>
+          <a:blip r:embed="rId5"/>
+          <a:stretch>
+            <a:fillRect/>
+          </a:stretch>
+        </p:blipFill>
+        <p:spPr>
+          <a:xfrm>
+            <a:off x="5863290" y="1648127"/>
+            <a:ext cx="5527040" cy="3339364"/>
+          </a:xfrm>
+          <a:prstGeom prst="rect">
+            <a:avLst/>
+          </a:prstGeom>
+        </p:spPr>
+      </p:pic>
+      <p:pic>
+        <p:nvPicPr>
+          <p:cNvPr id="10" name="Picture 9" descr="\documentclass{article}&#10;\usepackage{amsmath}&#10;\pagestyle{empty}&#10;\begin{document}&#10;\begin{equation*}&#10;\Delta p^o = 1 \, bar&#10;\end{equation*}&#10;\end{document}" title="IguanaTex Bitmap Display">
+            <a:extLst>
+              <a:ext uri="{FF2B5EF4-FFF2-40B4-BE49-F238E27FC236}">
+                <a16:creationId xmlns:a16="http://schemas.microsoft.com/office/drawing/2014/main" id="{04C9E87F-765E-7F0D-899C-479662D02B18}"/>
+              </a:ext>
+            </a:extLst>
+          </p:cNvPr>
+          <p:cNvPicPr>
+            <a:picLocks noChangeAspect="1"/>
+          </p:cNvPicPr>
+          <p:nvPr>
+            <p:custDataLst>
+              <p:tags r:id="rId1"/>
+            </p:custDataLst>
+          </p:nvPr>
+        </p:nvPicPr>
+        <p:blipFill>
+          <a:blip r:embed="rId6"/>
+          <a:stretch>
+            <a:fillRect/>
+          </a:stretch>
+        </p:blipFill>
+        <p:spPr>
+          <a:xfrm>
+            <a:off x="4050019" y="2121517"/>
+            <a:ext cx="1298286" cy="231619"/>
+          </a:xfrm>
+          <a:prstGeom prst="rect">
+            <a:avLst/>
+          </a:prstGeom>
+        </p:spPr>
+      </p:pic>
+      <p:pic>
+        <p:nvPicPr>
+          <p:cNvPr id="14" name="Picture 13" descr="\documentclass{article}&#10;\usepackage{amsmath}&#10;\pagestyle{empty}&#10;\begin{document}&#10;\begin{equation*}&#10;\Delta p^o = 3 \, bar&#10;\end{equation*}&#10;\end{document}" title="IguanaTex Bitmap Display">
+            <a:extLst>
+              <a:ext uri="{FF2B5EF4-FFF2-40B4-BE49-F238E27FC236}">
+                <a16:creationId xmlns:a16="http://schemas.microsoft.com/office/drawing/2014/main" id="{BBD96118-2100-D539-D62B-C28E6C68C372}"/>
+              </a:ext>
+            </a:extLst>
+          </p:cNvPr>
+          <p:cNvPicPr>
+            <a:picLocks noChangeAspect="1"/>
+          </p:cNvPicPr>
+          <p:nvPr>
+            <p:custDataLst>
+              <p:tags r:id="rId2"/>
+            </p:custDataLst>
+          </p:nvPr>
+        </p:nvPicPr>
+        <p:blipFill>
+          <a:blip r:embed="rId7"/>
+          <a:stretch>
+            <a:fillRect/>
+          </a:stretch>
+        </p:blipFill>
+        <p:spPr>
+          <a:xfrm>
+            <a:off x="9848685" y="2121517"/>
+            <a:ext cx="1298286" cy="231619"/>
+          </a:xfrm>
+          <a:prstGeom prst="rect">
+            <a:avLst/>
+          </a:prstGeom>
+        </p:spPr>
+      </p:pic>
+    </p:spTree>
+    <p:extLst>
+      <p:ext uri="{BB962C8B-B14F-4D97-AF65-F5344CB8AC3E}">
+        <p14:creationId xmlns:p14="http://schemas.microsoft.com/office/powerpoint/2010/main" val="1003796257"/>
+      </p:ext>
+    </p:extLst>
+  </p:cSld>
+  <p:clrMapOvr>
+    <a:masterClrMapping/>
+  </p:clrMapOvr>
+  <mc:AlternateContent xmlns:mc="http://schemas.openxmlformats.org/markup-compatibility/2006" xmlns:p14="http://schemas.microsoft.com/office/powerpoint/2010/main">
+    <mc:Choice Requires="p14">
+      <p:transition spd="med" p14:dur="700">
+        <p:fade/>
+      </p:transition>
+    </mc:Choice>
+    <mc:Fallback xmlns="">
+      <p:transition spd="med">
+        <p:fade/>
+      </p:transition>
+    </mc:Fallback>
+  </mc:AlternateContent>
+</p:sld>
+</file>
+
+<file path=ppt/slides/slide21.xml><?xml version="1.0" encoding="utf-8"?>
+<p:sld xmlns:a="http://schemas.openxmlformats.org/drawingml/2006/main" xmlns:r="http://schemas.openxmlformats.org/officeDocument/2006/relationships" xmlns:p="http://schemas.openxmlformats.org/presentationml/2006/main">
+  <p:cSld>
+    <p:spTree>
+      <p:nvGrpSpPr>
+        <p:cNvPr id="1" name=""/>
+        <p:cNvGrpSpPr/>
+        <p:nvPr/>
+      </p:nvGrpSpPr>
+      <p:grpSpPr>
+        <a:xfrm>
+          <a:off x="0" y="0"/>
+          <a:ext cx="0" cy="0"/>
+          <a:chOff x="0" y="0"/>
+          <a:chExt cx="0" cy="0"/>
+        </a:xfrm>
+      </p:grpSpPr>
+      <p:sp>
+        <p:nvSpPr>
+          <p:cNvPr id="3" name="Segnaposto piè di pagina 2">
+            <a:extLst>
+              <a:ext uri="{FF2B5EF4-FFF2-40B4-BE49-F238E27FC236}">
+                <a16:creationId xmlns:a16="http://schemas.microsoft.com/office/drawing/2014/main" id="{127FAE9C-4E5A-44B2-7485-E2B1DBC18D5D}"/>
+              </a:ext>
+            </a:extLst>
+          </p:cNvPr>
+          <p:cNvSpPr>
+            <a:spLocks noGrp="1"/>
+          </p:cNvSpPr>
+          <p:nvPr>
+            <p:ph type="ftr" sz="quarter" idx="17"/>
+          </p:nvPr>
+        </p:nvSpPr>
+        <p:spPr/>
+        <p:txBody>
+          <a:bodyPr/>
+          <a:lstStyle/>
+          <a:p>
+            <a:pPr rtl="0"/>
+            <a:r>
+              <a:rPr lang="it-IT" noProof="0" dirty="0"/>
+              <a:t>Aggiungere un piè di pagina</a:t>
+            </a:r>
+          </a:p>
+        </p:txBody>
+      </p:sp>
+      <p:sp>
+        <p:nvSpPr>
+          <p:cNvPr id="4" name="Segnaposto numero diapositiva 3">
+            <a:extLst>
+              <a:ext uri="{FF2B5EF4-FFF2-40B4-BE49-F238E27FC236}">
+                <a16:creationId xmlns:a16="http://schemas.microsoft.com/office/drawing/2014/main" id="{191DB7C2-72B3-855C-92E6-A0BEB5E79C9C}"/>
+              </a:ext>
+            </a:extLst>
+          </p:cNvPr>
+          <p:cNvSpPr>
+            <a:spLocks noGrp="1"/>
+          </p:cNvSpPr>
+          <p:nvPr>
+            <p:ph type="sldNum" sz="quarter" idx="18"/>
+          </p:nvPr>
+        </p:nvSpPr>
+        <p:spPr/>
+        <p:txBody>
+          <a:bodyPr/>
+          <a:lstStyle/>
+          <a:p>
+            <a:pPr rtl="0"/>
+            <a:fld id="{8699F50C-BE38-4BD0-BA84-9B090E1F2B9B}" type="slidenum">
+              <a:rPr lang="it-IT" noProof="0" smtClean="0"/>
+              <a:t>21</a:t>
+            </a:fld>
+            <a:endParaRPr lang="it-IT" noProof="0" dirty="0"/>
+          </a:p>
+        </p:txBody>
+      </p:sp>
+      <p:sp>
+        <p:nvSpPr>
+          <p:cNvPr id="5" name="Titolo 4">
+            <a:extLst>
+              <a:ext uri="{FF2B5EF4-FFF2-40B4-BE49-F238E27FC236}">
+                <a16:creationId xmlns:a16="http://schemas.microsoft.com/office/drawing/2014/main" id="{1351CB6A-E4AE-F8BF-6913-5BEB470DFDD7}"/>
+              </a:ext>
+            </a:extLst>
+          </p:cNvPr>
+          <p:cNvSpPr>
+            <a:spLocks noGrp="1"/>
+          </p:cNvSpPr>
+          <p:nvPr>
+            <p:ph type="title"/>
+          </p:nvPr>
+        </p:nvSpPr>
+        <p:spPr>
+          <a:xfrm>
+            <a:off x="518678" y="209028"/>
+            <a:ext cx="10435072" cy="1000647"/>
+          </a:xfrm>
+        </p:spPr>
+        <p:txBody>
+          <a:bodyPr>
+            <a:normAutofit/>
+          </a:bodyPr>
+          <a:lstStyle/>
+          <a:p>
+            <a:r>
+              <a:rPr lang="it-IT" sz="3600" dirty="0" err="1"/>
+              <a:t>Comparison</a:t>
+            </a:r>
+            <a:r>
+              <a:rPr lang="it-IT" sz="3600" dirty="0"/>
+              <a:t> of </a:t>
+            </a:r>
+            <a:r>
+              <a:rPr lang="it-IT" sz="3600" dirty="0" err="1"/>
+              <a:t>different</a:t>
+            </a:r>
+            <a:r>
+              <a:rPr lang="it-IT" sz="3600" dirty="0"/>
+              <a:t> </a:t>
+            </a:r>
+            <a:r>
+              <a:rPr lang="it-IT" sz="3600" dirty="0" err="1"/>
+              <a:t>reference</a:t>
+            </a:r>
+            <a:r>
+              <a:rPr lang="it-IT" sz="3600" dirty="0"/>
+              <a:t> </a:t>
+            </a:r>
+            <a:r>
+              <a:rPr lang="it-IT" sz="3600" dirty="0" err="1"/>
+              <a:t>values</a:t>
+            </a:r>
+            <a:r>
+              <a:rPr lang="it-IT" sz="3600" dirty="0"/>
+              <a:t> in day mode</a:t>
+            </a:r>
+          </a:p>
+        </p:txBody>
+      </p:sp>
+      <p:sp>
+        <p:nvSpPr>
+          <p:cNvPr id="6" name="Segnaposto testo 5">
+            <a:extLst>
+              <a:ext uri="{FF2B5EF4-FFF2-40B4-BE49-F238E27FC236}">
+                <a16:creationId xmlns:a16="http://schemas.microsoft.com/office/drawing/2014/main" id="{C0E8B029-14A1-4D00-1E22-77C22EB834AE}"/>
+              </a:ext>
+            </a:extLst>
+          </p:cNvPr>
+          <p:cNvSpPr>
+            <a:spLocks noGrp="1"/>
+          </p:cNvSpPr>
+          <p:nvPr>
+            <p:ph type="body" sz="quarter" idx="19"/>
+          </p:nvPr>
+        </p:nvSpPr>
+        <p:spPr>
+          <a:xfrm>
+            <a:off x="531814" y="5483224"/>
+            <a:ext cx="10898186" cy="708025"/>
+          </a:xfrm>
+        </p:spPr>
+        <p:txBody>
+          <a:bodyPr/>
+          <a:lstStyle/>
+          <a:p>
+            <a:r>
+              <a:rPr lang="it-IT" sz="1800" dirty="0"/>
+              <a:t>Modifying the pressure and outlet temperature references I don’t change the room temperature dynamics. I only have a small reduction of the amplitude of oscillations in the case I operate at higher pressure. It is not advisable therefore to operate at higher fluid temperatures because I don’t have consistent advantages.</a:t>
+            </a:r>
+          </a:p>
+        </p:txBody>
+      </p:sp>
+      <p:pic>
+        <p:nvPicPr>
+          <p:cNvPr id="9" name="Immagine 8">
+            <a:extLst>
+              <a:ext uri="{FF2B5EF4-FFF2-40B4-BE49-F238E27FC236}">
+                <a16:creationId xmlns:a16="http://schemas.microsoft.com/office/drawing/2014/main" id="{BF15D188-5F90-3A70-0C01-BCB4658582C5}"/>
+              </a:ext>
+            </a:extLst>
+          </p:cNvPr>
+          <p:cNvPicPr>
+            <a:picLocks noChangeAspect="1"/>
+          </p:cNvPicPr>
+          <p:nvPr/>
+        </p:nvPicPr>
+        <p:blipFill>
+          <a:blip r:embed="rId4"/>
+          <a:stretch>
+            <a:fillRect/>
+          </a:stretch>
+        </p:blipFill>
+        <p:spPr>
+          <a:xfrm>
+            <a:off x="518678" y="1374776"/>
+            <a:ext cx="4948672" cy="3511549"/>
+          </a:xfrm>
+          <a:prstGeom prst="rect">
+            <a:avLst/>
+          </a:prstGeom>
+        </p:spPr>
+      </p:pic>
+      <p:pic>
+        <p:nvPicPr>
+          <p:cNvPr id="11" name="Immagine 10">
+            <a:extLst>
+              <a:ext uri="{FF2B5EF4-FFF2-40B4-BE49-F238E27FC236}">
+                <a16:creationId xmlns:a16="http://schemas.microsoft.com/office/drawing/2014/main" id="{728F5374-4441-9CC9-ACBB-F973280BA474}"/>
+              </a:ext>
+            </a:extLst>
+          </p:cNvPr>
+          <p:cNvPicPr>
+            <a:picLocks noChangeAspect="1"/>
+          </p:cNvPicPr>
+          <p:nvPr/>
+        </p:nvPicPr>
+        <p:blipFill>
+          <a:blip r:embed="rId5"/>
+          <a:stretch>
+            <a:fillRect/>
+          </a:stretch>
+        </p:blipFill>
+        <p:spPr>
+          <a:xfrm>
+            <a:off x="5736214" y="1572039"/>
+            <a:ext cx="4867275" cy="3314286"/>
+          </a:xfrm>
+          <a:prstGeom prst="rect">
+            <a:avLst/>
+          </a:prstGeom>
+        </p:spPr>
+      </p:pic>
+      <p:pic>
+        <p:nvPicPr>
+          <p:cNvPr id="8" name="Picture 7" descr="\documentclass{article}&#10;\usepackage{amsmath}&#10;\pagestyle{empty}&#10;\begin{document}&#10;\begin{equation*}&#10;\Delta p^o = 1 \, bar&#10;\end{equation*}&#10;\end{document}" title="IguanaTex Bitmap Display">
+            <a:extLst>
+              <a:ext uri="{FF2B5EF4-FFF2-40B4-BE49-F238E27FC236}">
+                <a16:creationId xmlns:a16="http://schemas.microsoft.com/office/drawing/2014/main" id="{395A2E64-B2F8-581C-2D19-B1ECDD568F26}"/>
+              </a:ext>
+            </a:extLst>
+          </p:cNvPr>
+          <p:cNvPicPr>
+            <a:picLocks noChangeAspect="1"/>
+          </p:cNvPicPr>
+          <p:nvPr>
+            <p:custDataLst>
+              <p:tags r:id="rId1"/>
+            </p:custDataLst>
+          </p:nvPr>
+        </p:nvPicPr>
+        <p:blipFill>
+          <a:blip r:embed="rId6"/>
+          <a:stretch>
+            <a:fillRect/>
+          </a:stretch>
+        </p:blipFill>
+        <p:spPr>
+          <a:xfrm>
+            <a:off x="3804187" y="3748981"/>
+            <a:ext cx="1298286" cy="231619"/>
+          </a:xfrm>
+          <a:prstGeom prst="rect">
+            <a:avLst/>
+          </a:prstGeom>
+        </p:spPr>
+      </p:pic>
+      <p:pic>
+        <p:nvPicPr>
+          <p:cNvPr id="10" name="Picture 9" descr="\documentclass{article}&#10;\usepackage{amsmath}&#10;\pagestyle{empty}&#10;\begin{document}&#10;\begin{equation*}&#10;\Delta p^o = 3 \, bar&#10;\end{equation*}&#10;\end{document}" title="IguanaTex Bitmap Display">
+            <a:extLst>
+              <a:ext uri="{FF2B5EF4-FFF2-40B4-BE49-F238E27FC236}">
+                <a16:creationId xmlns:a16="http://schemas.microsoft.com/office/drawing/2014/main" id="{FDDD51E8-DB81-B665-2410-79D0090CC966}"/>
+              </a:ext>
+            </a:extLst>
+          </p:cNvPr>
+          <p:cNvPicPr>
+            <a:picLocks noChangeAspect="1"/>
+          </p:cNvPicPr>
+          <p:nvPr>
+            <p:custDataLst>
+              <p:tags r:id="rId2"/>
+            </p:custDataLst>
+          </p:nvPr>
+        </p:nvPicPr>
+        <p:blipFill>
+          <a:blip r:embed="rId7"/>
+          <a:stretch>
+            <a:fillRect/>
+          </a:stretch>
+        </p:blipFill>
+        <p:spPr>
+          <a:xfrm>
+            <a:off x="9127232" y="3748981"/>
+            <a:ext cx="1298286" cy="231619"/>
+          </a:xfrm>
+          <a:prstGeom prst="rect">
+            <a:avLst/>
+          </a:prstGeom>
+        </p:spPr>
+      </p:pic>
+    </p:spTree>
+    <p:extLst>
+      <p:ext uri="{BB962C8B-B14F-4D97-AF65-F5344CB8AC3E}">
+        <p14:creationId xmlns:p14="http://schemas.microsoft.com/office/powerpoint/2010/main" val="719467809"/>
+      </p:ext>
+    </p:extLst>
+  </p:cSld>
+  <p:clrMapOvr>
+    <a:masterClrMapping/>
+  </p:clrMapOvr>
+  <mc:AlternateContent xmlns:mc="http://schemas.openxmlformats.org/markup-compatibility/2006" xmlns:p14="http://schemas.microsoft.com/office/powerpoint/2010/main">
+    <mc:Choice Requires="p14">
+      <p:transition spd="med" p14:dur="700">
+        <p:fade/>
+      </p:transition>
+    </mc:Choice>
+    <mc:Fallback xmlns="">
+      <p:transition spd="med">
+        <p:fade/>
+      </p:transition>
+    </mc:Fallback>
+  </mc:AlternateContent>
+</p:sld>
+</file>
+
+<file path=ppt/slides/slide22.xml><?xml version="1.0" encoding="utf-8"?>
+<p:sld xmlns:a="http://schemas.openxmlformats.org/drawingml/2006/main" xmlns:r="http://schemas.openxmlformats.org/officeDocument/2006/relationships" xmlns:p="http://schemas.openxmlformats.org/presentationml/2006/main">
+  <p:cSld>
+    <p:spTree>
+      <p:nvGrpSpPr>
+        <p:cNvPr id="1" name=""/>
+        <p:cNvGrpSpPr/>
+        <p:nvPr/>
+      </p:nvGrpSpPr>
+      <p:grpSpPr>
+        <a:xfrm>
+          <a:off x="0" y="0"/>
+          <a:ext cx="0" cy="0"/>
+          <a:chOff x="0" y="0"/>
+          <a:chExt cx="0" cy="0"/>
+        </a:xfrm>
+      </p:grpSpPr>
+      <p:sp>
+        <p:nvSpPr>
+          <p:cNvPr id="3" name="Segnaposto piè di pagina 2">
+            <a:extLst>
+              <a:ext uri="{FF2B5EF4-FFF2-40B4-BE49-F238E27FC236}">
+                <a16:creationId xmlns:a16="http://schemas.microsoft.com/office/drawing/2014/main" id="{75CEE3CA-029A-E4C7-4671-951CC53E6AD7}"/>
+              </a:ext>
+            </a:extLst>
+          </p:cNvPr>
+          <p:cNvSpPr>
+            <a:spLocks noGrp="1"/>
+          </p:cNvSpPr>
+          <p:nvPr>
+            <p:ph type="ftr" sz="quarter" idx="17"/>
+          </p:nvPr>
+        </p:nvSpPr>
+        <p:spPr/>
+        <p:txBody>
+          <a:bodyPr/>
+          <a:lstStyle/>
+          <a:p>
+            <a:pPr rtl="0"/>
+            <a:r>
+              <a:rPr lang="it-IT" noProof="0" dirty="0"/>
+              <a:t>Aggiungere un piè di pagina</a:t>
+            </a:r>
+          </a:p>
+        </p:txBody>
+      </p:sp>
+      <p:sp>
+        <p:nvSpPr>
+          <p:cNvPr id="4" name="Segnaposto numero diapositiva 3">
+            <a:extLst>
+              <a:ext uri="{FF2B5EF4-FFF2-40B4-BE49-F238E27FC236}">
+                <a16:creationId xmlns:a16="http://schemas.microsoft.com/office/drawing/2014/main" id="{9477162B-BD6B-EF7E-E4D8-483519E4C2EE}"/>
+              </a:ext>
+            </a:extLst>
+          </p:cNvPr>
+          <p:cNvSpPr>
+            <a:spLocks noGrp="1"/>
+          </p:cNvSpPr>
+          <p:nvPr>
+            <p:ph type="sldNum" sz="quarter" idx="18"/>
+          </p:nvPr>
+        </p:nvSpPr>
+        <p:spPr/>
+        <p:txBody>
+          <a:bodyPr/>
+          <a:lstStyle/>
+          <a:p>
+            <a:pPr rtl="0"/>
+            <a:fld id="{8699F50C-BE38-4BD0-BA84-9B090E1F2B9B}" type="slidenum">
+              <a:rPr lang="it-IT" noProof="0" smtClean="0"/>
+              <a:t>22</a:t>
+            </a:fld>
+            <a:endParaRPr lang="it-IT" noProof="0" dirty="0"/>
+          </a:p>
+        </p:txBody>
+      </p:sp>
+      <p:sp>
+        <p:nvSpPr>
+          <p:cNvPr id="5" name="Titolo 4">
+            <a:extLst>
+              <a:ext uri="{FF2B5EF4-FFF2-40B4-BE49-F238E27FC236}">
+                <a16:creationId xmlns:a16="http://schemas.microsoft.com/office/drawing/2014/main" id="{97942E0A-E5D1-8CCF-308E-D82760195ED3}"/>
+              </a:ext>
+            </a:extLst>
+          </p:cNvPr>
+          <p:cNvSpPr>
+            <a:spLocks noGrp="1"/>
+          </p:cNvSpPr>
+          <p:nvPr>
+            <p:ph type="title"/>
+          </p:nvPr>
+        </p:nvSpPr>
+        <p:spPr>
+          <a:xfrm>
+            <a:off x="518676" y="136526"/>
+            <a:ext cx="10840017" cy="1602536"/>
+          </a:xfrm>
+        </p:spPr>
+        <p:txBody>
+          <a:bodyPr>
+            <a:normAutofit/>
+          </a:bodyPr>
+          <a:lstStyle/>
+          <a:p>
+            <a:r>
+              <a:rPr lang="it-IT" sz="3600" dirty="0"/>
+              <a:t>Power consumption with different outlet temperatures in day/night mode</a:t>
+            </a:r>
+          </a:p>
+        </p:txBody>
+      </p:sp>
+      <p:sp>
+        <p:nvSpPr>
+          <p:cNvPr id="6" name="Segnaposto testo 5">
+            <a:extLst>
+              <a:ext uri="{FF2B5EF4-FFF2-40B4-BE49-F238E27FC236}">
+                <a16:creationId xmlns:a16="http://schemas.microsoft.com/office/drawing/2014/main" id="{01C64ADB-39BD-ABFB-2041-0B4318133C29}"/>
+              </a:ext>
+            </a:extLst>
+          </p:cNvPr>
+          <p:cNvSpPr>
+            <a:spLocks noGrp="1"/>
+          </p:cNvSpPr>
+          <p:nvPr>
+            <p:ph type="body" sz="quarter" idx="19"/>
+          </p:nvPr>
+        </p:nvSpPr>
+        <p:spPr>
+          <a:xfrm>
+            <a:off x="531813" y="5362574"/>
+            <a:ext cx="11129721" cy="581025"/>
+          </a:xfrm>
+        </p:spPr>
+        <p:txBody>
+          <a:bodyPr/>
+          <a:lstStyle/>
+          <a:p>
+            <a:r>
+              <a:rPr lang="it-IT" sz="1800" dirty="0"/>
+              <a:t>The same behavior can also be observed in the day/night mode. The only difference with the previous case is that the same increment of the fluid temperature produces now a higher average power increase: 12% compared to a 10.7% increase in the day mode.</a:t>
+            </a:r>
+          </a:p>
+        </p:txBody>
+      </p:sp>
+      <p:pic>
+        <p:nvPicPr>
+          <p:cNvPr id="9" name="Immagine 8">
+            <a:extLst>
+              <a:ext uri="{FF2B5EF4-FFF2-40B4-BE49-F238E27FC236}">
+                <a16:creationId xmlns:a16="http://schemas.microsoft.com/office/drawing/2014/main" id="{96FC68D7-63FE-0AB2-DFEB-0B2AE443CF73}"/>
+              </a:ext>
+            </a:extLst>
+          </p:cNvPr>
+          <p:cNvPicPr>
+            <a:picLocks noChangeAspect="1"/>
+          </p:cNvPicPr>
+          <p:nvPr/>
+        </p:nvPicPr>
+        <p:blipFill>
+          <a:blip r:embed="rId4"/>
+          <a:stretch>
+            <a:fillRect/>
+          </a:stretch>
+        </p:blipFill>
+        <p:spPr>
+          <a:xfrm>
+            <a:off x="518677" y="1826464"/>
+            <a:ext cx="5571429" cy="3314286"/>
+          </a:xfrm>
+          <a:prstGeom prst="rect">
+            <a:avLst/>
+          </a:prstGeom>
+        </p:spPr>
+      </p:pic>
+      <p:pic>
+        <p:nvPicPr>
+          <p:cNvPr id="13" name="Immagine 12">
+            <a:extLst>
+              <a:ext uri="{FF2B5EF4-FFF2-40B4-BE49-F238E27FC236}">
+                <a16:creationId xmlns:a16="http://schemas.microsoft.com/office/drawing/2014/main" id="{5076AE8A-F4B8-E252-E7B5-78B1C4D0B929}"/>
+              </a:ext>
+            </a:extLst>
+          </p:cNvPr>
+          <p:cNvPicPr>
+            <a:picLocks noChangeAspect="1"/>
+          </p:cNvPicPr>
+          <p:nvPr/>
+        </p:nvPicPr>
+        <p:blipFill>
+          <a:blip r:embed="rId5"/>
+          <a:stretch>
+            <a:fillRect/>
+          </a:stretch>
+        </p:blipFill>
+        <p:spPr>
+          <a:xfrm>
+            <a:off x="6177310" y="1804653"/>
+            <a:ext cx="5571429" cy="3314286"/>
+          </a:xfrm>
+          <a:prstGeom prst="rect">
+            <a:avLst/>
+          </a:prstGeom>
+        </p:spPr>
+      </p:pic>
+      <p:pic>
+        <p:nvPicPr>
+          <p:cNvPr id="8" name="Picture 7" descr="\documentclass{article}&#10;\usepackage{amsmath}&#10;\pagestyle{empty}&#10;\begin{document}&#10;\begin{equation*}&#10;T^o=40^{\circ}C&#10;\end{equation*}&#10;\end{document}" title="IguanaTex Bitmap Display">
+            <a:extLst>
+              <a:ext uri="{FF2B5EF4-FFF2-40B4-BE49-F238E27FC236}">
+                <a16:creationId xmlns:a16="http://schemas.microsoft.com/office/drawing/2014/main" id="{13C86144-A422-097F-5ABC-33BB14716837}"/>
+              </a:ext>
+            </a:extLst>
+          </p:cNvPr>
+          <p:cNvPicPr>
+            <a:picLocks noChangeAspect="1"/>
+          </p:cNvPicPr>
+          <p:nvPr>
+            <p:custDataLst>
+              <p:tags r:id="rId1"/>
+            </p:custDataLst>
+          </p:nvPr>
+        </p:nvPicPr>
+        <p:blipFill>
+          <a:blip r:embed="rId6"/>
+          <a:stretch>
+            <a:fillRect/>
+          </a:stretch>
+        </p:blipFill>
+        <p:spPr>
+          <a:xfrm>
+            <a:off x="4642729" y="2384594"/>
+            <a:ext cx="1190095" cy="193524"/>
+          </a:xfrm>
+          <a:prstGeom prst="rect">
+            <a:avLst/>
+          </a:prstGeom>
+        </p:spPr>
+      </p:pic>
+      <p:pic>
+        <p:nvPicPr>
+          <p:cNvPr id="10" name="Picture 9" descr="\documentclass{article}&#10;\usepackage{amsmath}&#10;\pagestyle{empty}&#10;\begin{document}&#10;\begin{equation*}&#10;T^o=50^{\circ}C&#10;\end{equation*}&#10;\end{document}" title="IguanaTex Bitmap Display">
+            <a:extLst>
+              <a:ext uri="{FF2B5EF4-FFF2-40B4-BE49-F238E27FC236}">
+                <a16:creationId xmlns:a16="http://schemas.microsoft.com/office/drawing/2014/main" id="{9A027BDD-6CB9-D42A-07C7-8DB97BD6BC92}"/>
+              </a:ext>
+            </a:extLst>
+          </p:cNvPr>
+          <p:cNvPicPr>
+            <a:picLocks noChangeAspect="1"/>
+          </p:cNvPicPr>
+          <p:nvPr>
+            <p:custDataLst>
+              <p:tags r:id="rId2"/>
+            </p:custDataLst>
+          </p:nvPr>
+        </p:nvPicPr>
+        <p:blipFill>
+          <a:blip r:embed="rId7"/>
+          <a:stretch>
+            <a:fillRect/>
+          </a:stretch>
+        </p:blipFill>
+        <p:spPr>
+          <a:xfrm>
+            <a:off x="10326989" y="2384594"/>
+            <a:ext cx="1190095" cy="193524"/>
+          </a:xfrm>
+          <a:prstGeom prst="rect">
+            <a:avLst/>
+          </a:prstGeom>
+        </p:spPr>
+      </p:pic>
+    </p:spTree>
+    <p:extLst>
+      <p:ext uri="{BB962C8B-B14F-4D97-AF65-F5344CB8AC3E}">
+        <p14:creationId xmlns:p14="http://schemas.microsoft.com/office/powerpoint/2010/main" val="3671401032"/>
+      </p:ext>
+    </p:extLst>
+  </p:cSld>
+  <p:clrMapOvr>
+    <a:masterClrMapping/>
+  </p:clrMapOvr>
+  <mc:AlternateContent xmlns:mc="http://schemas.openxmlformats.org/markup-compatibility/2006" xmlns:p14="http://schemas.microsoft.com/office/powerpoint/2010/main">
+    <mc:Choice Requires="p14">
+      <p:transition spd="med" p14:dur="700">
+        <p:fade/>
+      </p:transition>
+    </mc:Choice>
+    <mc:Fallback xmlns="">
+      <p:transition spd="med">
+        <p:fade/>
+      </p:transition>
+    </mc:Fallback>
+  </mc:AlternateContent>
+</p:sld>
+</file>
+
+<file path=ppt/slides/slide23.xml><?xml version="1.0" encoding="utf-8"?>
+<p:sld xmlns:a="http://schemas.openxmlformats.org/drawingml/2006/main" xmlns:r="http://schemas.openxmlformats.org/officeDocument/2006/relationships" xmlns:p="http://schemas.openxmlformats.org/presentationml/2006/main">
+  <p:cSld>
+    <p:spTree>
+      <p:nvGrpSpPr>
+        <p:cNvPr id="1" name=""/>
+        <p:cNvGrpSpPr/>
+        <p:nvPr/>
+      </p:nvGrpSpPr>
+      <p:grpSpPr>
+        <a:xfrm>
+          <a:off x="0" y="0"/>
+          <a:ext cx="0" cy="0"/>
+          <a:chOff x="0" y="0"/>
+          <a:chExt cx="0" cy="0"/>
+        </a:xfrm>
+      </p:grpSpPr>
+      <p:sp>
+        <p:nvSpPr>
+          <p:cNvPr id="3" name="Segnaposto piè di pagina 2">
+            <a:extLst>
+              <a:ext uri="{FF2B5EF4-FFF2-40B4-BE49-F238E27FC236}">
+                <a16:creationId xmlns:a16="http://schemas.microsoft.com/office/drawing/2014/main" id="{40DA9E81-8302-ACF8-0225-335F0205CE43}"/>
+              </a:ext>
+            </a:extLst>
+          </p:cNvPr>
+          <p:cNvSpPr>
+            <a:spLocks noGrp="1"/>
+          </p:cNvSpPr>
+          <p:nvPr>
+            <p:ph type="ftr" sz="quarter" idx="17"/>
+          </p:nvPr>
+        </p:nvSpPr>
+        <p:spPr/>
+        <p:txBody>
+          <a:bodyPr/>
+          <a:lstStyle/>
+          <a:p>
+            <a:pPr rtl="0"/>
+            <a:r>
+              <a:rPr lang="it-IT" noProof="0" dirty="0"/>
+              <a:t>Aggiungere un piè di pagina</a:t>
+            </a:r>
+          </a:p>
+        </p:txBody>
+      </p:sp>
+      <p:sp>
+        <p:nvSpPr>
+          <p:cNvPr id="4" name="Segnaposto numero diapositiva 3">
+            <a:extLst>
+              <a:ext uri="{FF2B5EF4-FFF2-40B4-BE49-F238E27FC236}">
+                <a16:creationId xmlns:a16="http://schemas.microsoft.com/office/drawing/2014/main" id="{5D4309CA-12AE-A66E-86CC-7FFC4EDD29C7}"/>
+              </a:ext>
+            </a:extLst>
+          </p:cNvPr>
+          <p:cNvSpPr>
+            <a:spLocks noGrp="1"/>
+          </p:cNvSpPr>
+          <p:nvPr>
+            <p:ph type="sldNum" sz="quarter" idx="18"/>
+          </p:nvPr>
+        </p:nvSpPr>
+        <p:spPr/>
+        <p:txBody>
+          <a:bodyPr/>
+          <a:lstStyle/>
+          <a:p>
+            <a:pPr rtl="0"/>
+            <a:fld id="{8699F50C-BE38-4BD0-BA84-9B090E1F2B9B}" type="slidenum">
+              <a:rPr lang="it-IT" noProof="0" smtClean="0"/>
+              <a:t>23</a:t>
+            </a:fld>
+            <a:endParaRPr lang="it-IT" noProof="0" dirty="0"/>
+          </a:p>
+        </p:txBody>
+      </p:sp>
+      <p:sp>
+        <p:nvSpPr>
+          <p:cNvPr id="5" name="Titolo 4">
+            <a:extLst>
+              <a:ext uri="{FF2B5EF4-FFF2-40B4-BE49-F238E27FC236}">
+                <a16:creationId xmlns:a16="http://schemas.microsoft.com/office/drawing/2014/main" id="{D4093925-7FB1-5E1F-15EE-A673F6FFDA15}"/>
+              </a:ext>
+            </a:extLst>
+          </p:cNvPr>
+          <p:cNvSpPr>
+            <a:spLocks noGrp="1"/>
+          </p:cNvSpPr>
+          <p:nvPr>
+            <p:ph type="title"/>
+          </p:nvPr>
+        </p:nvSpPr>
+        <p:spPr>
+          <a:xfrm>
+            <a:off x="518677" y="767768"/>
+            <a:ext cx="10482697" cy="851482"/>
+          </a:xfrm>
+        </p:spPr>
+        <p:txBody>
+          <a:bodyPr>
+            <a:normAutofit fontScale="90000"/>
+          </a:bodyPr>
+          <a:lstStyle/>
+          <a:p>
+            <a:r>
+              <a:rPr lang="it-IT" sz="3600" dirty="0"/>
+              <a:t>Power </a:t>
+            </a:r>
+            <a:r>
+              <a:rPr lang="it-IT" sz="3600" dirty="0" err="1"/>
+              <a:t>consumption</a:t>
+            </a:r>
+            <a:r>
+              <a:rPr lang="it-IT" sz="3600" dirty="0"/>
+              <a:t> with </a:t>
+            </a:r>
+            <a:r>
+              <a:rPr lang="it-IT" sz="3600" dirty="0" err="1"/>
+              <a:t>different</a:t>
+            </a:r>
+            <a:r>
+              <a:rPr lang="it-IT" sz="3600" dirty="0"/>
+              <a:t> outlet pressure in day/night mode</a:t>
+            </a:r>
+          </a:p>
+        </p:txBody>
+      </p:sp>
+      <p:sp>
+        <p:nvSpPr>
+          <p:cNvPr id="6" name="Segnaposto testo 5">
+            <a:extLst>
+              <a:ext uri="{FF2B5EF4-FFF2-40B4-BE49-F238E27FC236}">
+                <a16:creationId xmlns:a16="http://schemas.microsoft.com/office/drawing/2014/main" id="{5D9566AB-7F37-B9D0-5E5F-982F275C1DC1}"/>
+              </a:ext>
+            </a:extLst>
+          </p:cNvPr>
+          <p:cNvSpPr>
+            <a:spLocks noGrp="1"/>
+          </p:cNvSpPr>
+          <p:nvPr>
+            <p:ph type="body" sz="quarter" idx="19"/>
+          </p:nvPr>
+        </p:nvSpPr>
+        <p:spPr>
+          <a:xfrm>
+            <a:off x="531813" y="5324474"/>
+            <a:ext cx="10615157" cy="765175"/>
+          </a:xfrm>
+        </p:spPr>
+        <p:txBody>
+          <a:bodyPr/>
+          <a:lstStyle/>
+          <a:p>
+            <a:r>
+              <a:rPr lang="it-IT" sz="1800" dirty="0"/>
+              <a:t>As in the other case, higher pressure references mean more utilization of the pump instead of the heater. As during the night one of our objectives is to minimize the heater usage, we are more inclined to consider the second option.</a:t>
+            </a:r>
+          </a:p>
+        </p:txBody>
+      </p:sp>
+      <p:pic>
+        <p:nvPicPr>
+          <p:cNvPr id="9" name="Immagine 8">
+            <a:extLst>
+              <a:ext uri="{FF2B5EF4-FFF2-40B4-BE49-F238E27FC236}">
+                <a16:creationId xmlns:a16="http://schemas.microsoft.com/office/drawing/2014/main" id="{72B18C46-2F3A-D4AF-84EF-D21358F58AEE}"/>
+              </a:ext>
+            </a:extLst>
+          </p:cNvPr>
+          <p:cNvPicPr>
+            <a:picLocks noChangeAspect="1"/>
+          </p:cNvPicPr>
+          <p:nvPr/>
+        </p:nvPicPr>
+        <p:blipFill>
+          <a:blip r:embed="rId4"/>
+          <a:stretch>
+            <a:fillRect/>
+          </a:stretch>
+        </p:blipFill>
+        <p:spPr>
+          <a:xfrm>
+            <a:off x="531814" y="1666875"/>
+            <a:ext cx="5571429" cy="3314286"/>
+          </a:xfrm>
+          <a:prstGeom prst="rect">
+            <a:avLst/>
+          </a:prstGeom>
+        </p:spPr>
+      </p:pic>
+      <p:pic>
+        <p:nvPicPr>
+          <p:cNvPr id="11" name="Immagine 10">
+            <a:extLst>
+              <a:ext uri="{FF2B5EF4-FFF2-40B4-BE49-F238E27FC236}">
+                <a16:creationId xmlns:a16="http://schemas.microsoft.com/office/drawing/2014/main" id="{EC76F8BA-7D1D-6455-3DFB-88F46E8E7AF4}"/>
+              </a:ext>
+            </a:extLst>
+          </p:cNvPr>
+          <p:cNvPicPr>
+            <a:picLocks noChangeAspect="1"/>
+          </p:cNvPicPr>
+          <p:nvPr/>
+        </p:nvPicPr>
+        <p:blipFill>
+          <a:blip r:embed="rId5"/>
+          <a:stretch>
+            <a:fillRect/>
+          </a:stretch>
+        </p:blipFill>
+        <p:spPr>
+          <a:xfrm>
+            <a:off x="6103243" y="1666875"/>
+            <a:ext cx="5571429" cy="3314286"/>
+          </a:xfrm>
+          <a:prstGeom prst="rect">
+            <a:avLst/>
+          </a:prstGeom>
+        </p:spPr>
+      </p:pic>
+      <p:pic>
+        <p:nvPicPr>
+          <p:cNvPr id="8" name="Picture 7" descr="\documentclass{article}&#10;\usepackage{amsmath}&#10;\pagestyle{empty}&#10;\begin{document}&#10;\begin{equation*}&#10;\Delta p^o = 1 \, bar&#10;\end{equation*}&#10;\end{document}" title="IguanaTex Bitmap Display">
+            <a:extLst>
+              <a:ext uri="{FF2B5EF4-FFF2-40B4-BE49-F238E27FC236}">
+                <a16:creationId xmlns:a16="http://schemas.microsoft.com/office/drawing/2014/main" id="{3A7B6878-6EEB-5CBC-0E29-D8058CEECD18}"/>
+              </a:ext>
+            </a:extLst>
+          </p:cNvPr>
+          <p:cNvPicPr>
+            <a:picLocks noChangeAspect="1"/>
+          </p:cNvPicPr>
+          <p:nvPr>
+            <p:custDataLst>
+              <p:tags r:id="rId1"/>
+            </p:custDataLst>
+          </p:nvPr>
+        </p:nvPicPr>
+        <p:blipFill>
+          <a:blip r:embed="rId6"/>
+          <a:stretch>
+            <a:fillRect/>
+          </a:stretch>
+        </p:blipFill>
+        <p:spPr>
+          <a:xfrm>
+            <a:off x="4541105" y="2138295"/>
+            <a:ext cx="1298286" cy="231619"/>
+          </a:xfrm>
+          <a:prstGeom prst="rect">
+            <a:avLst/>
+          </a:prstGeom>
+        </p:spPr>
+      </p:pic>
+      <p:pic>
+        <p:nvPicPr>
+          <p:cNvPr id="10" name="Picture 9" descr="\documentclass{article}&#10;\usepackage{amsmath}&#10;\pagestyle{empty}&#10;\begin{document}&#10;\begin{equation*}&#10;\Delta p^o = 3 \, bar&#10;\end{equation*}&#10;\end{document}" title="IguanaTex Bitmap Display">
+            <a:extLst>
+              <a:ext uri="{FF2B5EF4-FFF2-40B4-BE49-F238E27FC236}">
+                <a16:creationId xmlns:a16="http://schemas.microsoft.com/office/drawing/2014/main" id="{D93040EB-1827-0833-05C2-EDABB1AB6557}"/>
+              </a:ext>
+            </a:extLst>
+          </p:cNvPr>
+          <p:cNvPicPr>
+            <a:picLocks noChangeAspect="1"/>
+          </p:cNvPicPr>
+          <p:nvPr>
+            <p:custDataLst>
+              <p:tags r:id="rId2"/>
+            </p:custDataLst>
+          </p:nvPr>
+        </p:nvPicPr>
+        <p:blipFill>
+          <a:blip r:embed="rId7"/>
+          <a:stretch>
+            <a:fillRect/>
+          </a:stretch>
+        </p:blipFill>
+        <p:spPr>
+          <a:xfrm>
+            <a:off x="10033243" y="2138294"/>
+            <a:ext cx="1298286" cy="231619"/>
+          </a:xfrm>
+          <a:prstGeom prst="rect">
+            <a:avLst/>
+          </a:prstGeom>
+        </p:spPr>
+      </p:pic>
+    </p:spTree>
+    <p:extLst>
+      <p:ext uri="{BB962C8B-B14F-4D97-AF65-F5344CB8AC3E}">
+        <p14:creationId xmlns:p14="http://schemas.microsoft.com/office/powerpoint/2010/main" val="2811123625"/>
       </p:ext>
     </p:extLst>
   </p:cSld>
@@ -16805,8 +18560,8 @@
           </a:p>
         </p:txBody>
       </p:sp>
-      <mc:AlternateContent xmlns:mc="http://schemas.openxmlformats.org/markup-compatibility/2006" xmlns:a14="http://schemas.microsoft.com/office/drawing/2010/main">
-        <mc:Choice Requires="a14">
+      <mc:AlternateContent xmlns:mc="http://schemas.openxmlformats.org/markup-compatibility/2006">
+        <mc:Choice xmlns:a14="http://schemas.microsoft.com/office/drawing/2010/main" Requires="a14">
           <p:sp>
             <p:nvSpPr>
               <p:cNvPr id="5" name="Segnaposto contenuto 4"/>
@@ -17369,15 +19124,81 @@
                   </a:rPr>
                   <a:t> volume of water in the network, </a:t>
                 </a:r>
-                <a:r>
-                  <a:rPr lang="it-IT" sz="1800" dirty="0" err="1">
-                    <a:effectLst/>
-                    <a:latin typeface="Calibri" panose="020F0502020204030204" pitchFamily="34" charset="0"/>
-                    <a:ea typeface="Calibri" panose="020F0502020204030204" pitchFamily="34" charset="0"/>
-                    <a:cs typeface="Times New Roman" panose="02020603050405020304" pitchFamily="18" charset="0"/>
-                  </a:rPr>
-                  <a:t>wn</a:t>
-                </a:r>
+                <a14:m>
+                  <m:oMath xmlns:m="http://schemas.openxmlformats.org/officeDocument/2006/math">
+                    <m:sSub>
+                      <m:sSubPr>
+                        <m:ctrlPr>
+                          <a:rPr lang="it-IT" sz="1800" i="1" dirty="0" smtClean="0">
+                            <a:effectLst/>
+                            <a:latin typeface="Cambria Math" panose="02040503050406030204" pitchFamily="18" charset="0"/>
+                            <a:cs typeface="Times New Roman" panose="02020603050405020304" pitchFamily="18" charset="0"/>
+                          </a:rPr>
+                        </m:ctrlPr>
+                      </m:sSubPr>
+                      <m:e>
+                        <m:r>
+                          <a:rPr lang="it-IT" sz="1800" b="0" i="1" dirty="0" smtClean="0">
+                            <a:effectLst/>
+                            <a:latin typeface="Cambria Math" panose="02040503050406030204" pitchFamily="18" charset="0"/>
+                            <a:cs typeface="Times New Roman" panose="02020603050405020304" pitchFamily="18" charset="0"/>
+                          </a:rPr>
+                          <m:t>𝑤</m:t>
+                        </m:r>
+                      </m:e>
+                      <m:sub>
+                        <m:r>
+                          <a:rPr lang="it-IT" sz="1800" b="0" i="1" dirty="0" smtClean="0">
+                            <a:effectLst/>
+                            <a:latin typeface="Cambria Math" panose="02040503050406030204" pitchFamily="18" charset="0"/>
+                            <a:cs typeface="Times New Roman" panose="02020603050405020304" pitchFamily="18" charset="0"/>
+                          </a:rPr>
+                          <m:t>𝑛</m:t>
+                        </m:r>
+                      </m:sub>
+                    </m:sSub>
+                    <m:r>
+                      <a:rPr lang="it-IT" sz="1800" i="1" dirty="0">
+                        <a:effectLst/>
+                        <a:latin typeface="Cambria Math" panose="02040503050406030204" pitchFamily="18" charset="0"/>
+                        <a:ea typeface="Calibri" panose="020F0502020204030204" pitchFamily="34" charset="0"/>
+                        <a:cs typeface="Times New Roman" panose="02020603050405020304" pitchFamily="18" charset="0"/>
+                      </a:rPr>
+                      <m:t>= 0.5</m:t>
+                    </m:r>
+                    <m:f>
+                      <m:fPr>
+                        <m:ctrlPr>
+                          <a:rPr lang="it-IT" sz="1800" i="1" dirty="0" smtClean="0">
+                            <a:effectLst/>
+                            <a:latin typeface="Cambria Math" panose="02040503050406030204" pitchFamily="18" charset="0"/>
+                            <a:cs typeface="Times New Roman" panose="02020603050405020304" pitchFamily="18" charset="0"/>
+                          </a:rPr>
+                        </m:ctrlPr>
+                      </m:fPr>
+                      <m:num>
+                        <m:r>
+                          <a:rPr lang="it-IT" sz="1800" b="0" i="1" dirty="0" smtClean="0">
+                            <a:effectLst/>
+                            <a:latin typeface="Cambria Math" panose="02040503050406030204" pitchFamily="18" charset="0"/>
+                            <a:cs typeface="Times New Roman" panose="02020603050405020304" pitchFamily="18" charset="0"/>
+                          </a:rPr>
+                          <m:t>𝑘𝑔</m:t>
+                        </m:r>
+                      </m:num>
+                      <m:den>
+                        <m:r>
+                          <a:rPr lang="it-IT" sz="1800" b="0" i="1" dirty="0" smtClean="0">
+                            <a:effectLst/>
+                            <a:latin typeface="Cambria Math" panose="02040503050406030204" pitchFamily="18" charset="0"/>
+                            <a:cs typeface="Times New Roman" panose="02020603050405020304" pitchFamily="18" charset="0"/>
+                          </a:rPr>
+                          <m:t>𝑠</m:t>
+                        </m:r>
+                      </m:den>
+                    </m:f>
+                  </m:oMath>
+                </a14:m>
                 <a:r>
                   <a:rPr lang="it-IT" sz="1800" dirty="0">
                     <a:effectLst/>
@@ -17385,56 +19206,124 @@
                     <a:ea typeface="Calibri" panose="020F0502020204030204" pitchFamily="34" charset="0"/>
                     <a:cs typeface="Times New Roman" panose="02020603050405020304" pitchFamily="18" charset="0"/>
                   </a:rPr>
-                  <a:t> = 0.5kg/s  </a:t>
+                  <a:t> nominal  flow rate</a:t>
                 </a:r>
-                <a:r>
-                  <a:rPr lang="it-IT" sz="1800" dirty="0" err="1">
-                    <a:effectLst/>
-                    <a:latin typeface="Calibri" panose="020F0502020204030204" pitchFamily="34" charset="0"/>
-                    <a:ea typeface="Calibri" panose="020F0502020204030204" pitchFamily="34" charset="0"/>
-                    <a:cs typeface="Times New Roman" panose="02020603050405020304" pitchFamily="18" charset="0"/>
-                  </a:rPr>
-                  <a:t>nominal</a:t>
-                </a:r>
-                <a:r>
-                  <a:rPr lang="it-IT" sz="1800" dirty="0">
-                    <a:effectLst/>
-                    <a:latin typeface="Calibri" panose="020F0502020204030204" pitchFamily="34" charset="0"/>
-                    <a:ea typeface="Calibri" panose="020F0502020204030204" pitchFamily="34" charset="0"/>
-                    <a:cs typeface="Times New Roman" panose="02020603050405020304" pitchFamily="18" charset="0"/>
-                  </a:rPr>
-                  <a:t>  flow rate</a:t>
-                </a:r>
-              </a:p>
-              <a:p>
                 <a:endParaRPr lang="en-GB" dirty="0"/>
               </a:p>
               <a:p>
                 <a:r>
                   <a:rPr lang="en-GB" sz="2000" dirty="0"/>
-                  <a:t>Try impose a Settling time (not exact, since the model is approximated) Ta = 10min</a:t>
+                  <a:t>Try impose a Settling time (not exact, since the model is approximated) </a:t>
                 </a:r>
+                <a14:m>
+                  <m:oMath xmlns:m="http://schemas.openxmlformats.org/officeDocument/2006/math">
+                    <m:r>
+                      <a:rPr lang="en-GB" sz="2000" i="1" dirty="0" smtClean="0">
+                        <a:latin typeface="Cambria Math" panose="02040503050406030204" pitchFamily="18" charset="0"/>
+                      </a:rPr>
+                      <m:t>𝑇𝑎</m:t>
+                    </m:r>
+                    <m:r>
+                      <a:rPr lang="en-GB" sz="2000" i="1" dirty="0" smtClean="0">
+                        <a:latin typeface="Cambria Math" panose="02040503050406030204" pitchFamily="18" charset="0"/>
+                      </a:rPr>
+                      <m:t> = 10 </m:t>
+                    </m:r>
+                    <m:r>
+                      <a:rPr lang="it-IT" sz="2000" b="0" i="1" dirty="0" smtClean="0">
+                        <a:latin typeface="Cambria Math" panose="02040503050406030204" pitchFamily="18" charset="0"/>
+                      </a:rPr>
+                      <m:t>𝑚𝑖𝑛</m:t>
+                    </m:r>
+                    <m:r>
+                      <a:rPr lang="en-GB" sz="2000" i="1" dirty="0" smtClean="0">
+                        <a:latin typeface="Cambria Math" panose="02040503050406030204" pitchFamily="18" charset="0"/>
+                      </a:rPr>
+                      <m:t>⁡</m:t>
+                    </m:r>
+                  </m:oMath>
+                </a14:m>
+                <a:endParaRPr lang="en-GB" sz="2000" dirty="0"/>
               </a:p>
               <a:p>
-                <a:r>
-                  <a:rPr lang="en-GB" sz="2000" dirty="0" err="1"/>
-                  <a:t>Ti</a:t>
-                </a:r>
-                <a:r>
-                  <a:rPr lang="en-GB" sz="2000" dirty="0"/>
-                  <a:t>  = 1,145*10^3</a:t>
-                </a:r>
+                <a14:m>
+                  <m:oMath xmlns:m="http://schemas.openxmlformats.org/officeDocument/2006/math">
+                    <m:r>
+                      <a:rPr lang="it-IT" sz="2000" b="0" i="1" smtClean="0">
+                        <a:latin typeface="Cambria Math" panose="02040503050406030204" pitchFamily="18" charset="0"/>
+                      </a:rPr>
+                      <m:t>𝑇𝑖</m:t>
+                    </m:r>
+                    <m:r>
+                      <a:rPr lang="it-IT" sz="2000" b="0" i="1" smtClean="0">
+                        <a:latin typeface="Cambria Math" panose="02040503050406030204" pitchFamily="18" charset="0"/>
+                      </a:rPr>
+                      <m:t>=1.145∙</m:t>
+                    </m:r>
+                    <m:sSup>
+                      <m:sSupPr>
+                        <m:ctrlPr>
+                          <a:rPr lang="it-IT" sz="2000" b="0" i="1" smtClean="0">
+                            <a:latin typeface="Cambria Math" panose="02040503050406030204" pitchFamily="18" charset="0"/>
+                          </a:rPr>
+                        </m:ctrlPr>
+                      </m:sSupPr>
+                      <m:e>
+                        <m:r>
+                          <a:rPr lang="it-IT" sz="2000" b="0" i="1" smtClean="0">
+                            <a:latin typeface="Cambria Math" panose="02040503050406030204" pitchFamily="18" charset="0"/>
+                          </a:rPr>
+                          <m:t>10</m:t>
+                        </m:r>
+                      </m:e>
+                      <m:sup>
+                        <m:r>
+                          <a:rPr lang="it-IT" sz="2000" b="0" i="1" smtClean="0">
+                            <a:latin typeface="Cambria Math" panose="02040503050406030204" pitchFamily="18" charset="0"/>
+                          </a:rPr>
+                          <m:t>3</m:t>
+                        </m:r>
+                      </m:sup>
+                    </m:sSup>
+                  </m:oMath>
+                </a14:m>
+                <a:endParaRPr lang="it-IT" sz="2000" b="0" i="1" dirty="0">
+                  <a:latin typeface="Cambria Math" panose="02040503050406030204" pitchFamily="18" charset="0"/>
+                </a:endParaRPr>
               </a:p>
               <a:p>
-                <a:r>
-                  <a:rPr lang="en-GB" sz="2000" dirty="0"/>
-                  <a:t>K = 8,287</a:t>
-                </a:r>
+                <a14:m>
+                  <m:oMath xmlns:m="http://schemas.openxmlformats.org/officeDocument/2006/math">
+                    <m:r>
+                      <a:rPr lang="it-IT" sz="2000" b="0" i="1" smtClean="0">
+                        <a:latin typeface="Cambria Math" panose="02040503050406030204" pitchFamily="18" charset="0"/>
+                      </a:rPr>
+                      <m:t>𝐾</m:t>
+                    </m:r>
+                    <m:r>
+                      <a:rPr lang="it-IT" sz="2000" b="0" i="1" smtClean="0">
+                        <a:latin typeface="Cambria Math" panose="02040503050406030204" pitchFamily="18" charset="0"/>
+                      </a:rPr>
+                      <m:t>=</m:t>
+                    </m:r>
+                    <m:r>
+                      <m:rPr>
+                        <m:nor/>
+                      </m:rPr>
+                      <a:rPr lang="en-GB" sz="2000" dirty="0"/>
+                      <m:t>8,287</m:t>
+                    </m:r>
+                  </m:oMath>
+                </a14:m>
+                <a:endParaRPr lang="en-GB" sz="2000" dirty="0"/>
+              </a:p>
+              <a:p>
+                <a:endParaRPr lang="en-GB" sz="2000" dirty="0"/>
               </a:p>
             </p:txBody>
           </p:sp>
         </mc:Choice>
-        <mc:Fallback xmlns="">
+        <mc:Fallback>
           <p:sp>
             <p:nvSpPr>
               <p:cNvPr id="5" name="Segnaposto contenuto 4"/>
@@ -17458,7 +19347,7 @@
               <a:lstStyle/>
               <a:p>
                 <a:r>
-                  <a:rPr lang="it-IT">
+                  <a:rPr lang="en-GB">
                     <a:noFill/>
                   </a:rPr>
                   <a:t> </a:t>
@@ -19569,8 +21458,8 @@
           </a:p>
         </p:txBody>
       </p:sp>
-      <mc:AlternateContent xmlns:mc="http://schemas.openxmlformats.org/markup-compatibility/2006">
-        <mc:Choice xmlns:a14="http://schemas.microsoft.com/office/drawing/2010/main" Requires="a14">
+      <mc:AlternateContent xmlns:mc="http://schemas.openxmlformats.org/markup-compatibility/2006" xmlns:a14="http://schemas.microsoft.com/office/drawing/2010/main">
+        <mc:Choice Requires="a14">
           <p:sp>
             <p:nvSpPr>
               <p:cNvPr id="11" name="CasellaDiTesto 10">
@@ -19919,7 +21808,7 @@
             </p:txBody>
           </p:sp>
         </mc:Choice>
-        <mc:Fallback>
+        <mc:Fallback xmlns="">
           <p:sp>
             <p:nvSpPr>
               <p:cNvPr id="11" name="CasellaDiTesto 10">
@@ -20097,10 +21986,10 @@
       </p:sp>
       <p:pic>
         <p:nvPicPr>
-          <p:cNvPr id="8" name="Picture 7" descr="\documentclass{article}&#10;\usepackage{amsmath}&#10;\pagestyle{empty}&#10;\begin{document}&#10;&#10;\begin{equation}&#10;\delta \bar{T}_{z}=\left[-\frac{\bar{\alpha} G}{c_{z}}-\frac{G_{\text {Loss }}}{c_{z}}\right] \delta T_{s}+\left[\frac{G}{c_{z}}\left(T_{\mathrm{Grid}}-\bar{T}_{z}\right) \frac{K_{\mathrm{he}}}{c_{z}}\right]\left[\begin{array}{l}&#10;\delta \alpha \\&#10;\delta \beta&#10;\end{array}\right]&#10;\end{equation}&#10;&#10;&#10;\end{document}" title="IguanaTex Bitmap Display">
-            <a:extLst>
-              <a:ext uri="{FF2B5EF4-FFF2-40B4-BE49-F238E27FC236}">
-                <a16:creationId xmlns:a16="http://schemas.microsoft.com/office/drawing/2014/main" id="{9F9C7C88-9188-F4DF-2A53-4D15F31EAA6F}"/>
+          <p:cNvPr id="13" name="Picture 12" descr="\documentclass{article}&#10;\usepackage{amsmath}&#10;\pagestyle{empty}&#10;\begin{document}&#10;&#10;\begin{equation*}&#10;\delta \bar{T}_{z}=\left[-\frac{\bar{\alpha} G}{c_{z}}-\frac{G_{\text {Loss }}}{c_{z}}\right] \delta T_{s}+\left[\frac{G}{c_{z}}\left(T_{\mathrm{Grid}}-\bar{T}_{z}\right)\: \frac{K_{\mathrm{he}}}{c_{z}}\right]\left[\begin{array}{l}&#10;\delta \alpha \\&#10;\delta \beta&#10;\end{array}\right]&#10;\end{equation*}&#10;&#10;&#10;\end{document}" title="IguanaTex Bitmap Display">
+            <a:extLst>
+              <a:ext uri="{FF2B5EF4-FFF2-40B4-BE49-F238E27FC236}">
+                <a16:creationId xmlns:a16="http://schemas.microsoft.com/office/drawing/2014/main" id="{23FA9A32-C8C7-39F8-2278-705F591302A0}"/>
               </a:ext>
             </a:extLst>
           </p:cNvPr>
@@ -20113,15 +22002,16 @@
             </p:custDataLst>
           </p:nvPr>
         </p:nvPicPr>
-        <p:blipFill rotWithShape="1">
+        <p:blipFill>
           <a:blip r:embed="rId6"/>
-          <a:srcRect r="12787"/>
-          <a:stretch/>
+          <a:stretch>
+            <a:fillRect/>
+          </a:stretch>
         </p:blipFill>
         <p:spPr>
           <a:xfrm>
-            <a:off x="2395930" y="5234818"/>
-            <a:ext cx="6705920" cy="608000"/>
+            <a:off x="3017776" y="5258382"/>
+            <a:ext cx="5846084" cy="608000"/>
           </a:xfrm>
           <a:prstGeom prst="rect">
             <a:avLst/>
@@ -21072,10 +22962,10 @@
 <p:tagLst xmlns:a="http://schemas.openxmlformats.org/drawingml/2006/main" xmlns:r="http://schemas.openxmlformats.org/officeDocument/2006/relationships" xmlns:p="http://schemas.openxmlformats.org/presentationml/2006/main">
   <p:tag name="OUTPUTDPI" val="1200"/>
   <p:tag name="ORIGINALHEIGHT" val="299.2126"/>
-  <p:tag name="ORIGINALWIDTH" val="3784.027"/>
-  <p:tag name="LATEXADDIN" val="\documentclass{article}&#10;\usepackage{amsmath}&#10;\pagestyle{empty}&#10;\begin{document}&#10;&#10;\begin{equation}&#10;\delta \bar{T}_{z}=\left[-\frac{\bar{\alpha} G}{c_{z}}-\frac{G_{\text {Loss }}}{c_{z}}\right] \delta T_{s}+\left[\frac{G}{c_{z}}\left(T_{\mathrm{Grid}}-\bar{T}_{z}\right) \frac{K_{\mathrm{he}}}{c_{z}}\right]\left[\begin{array}{l}&#10;\delta \alpha \\&#10;\delta \beta&#10;\end{array}\right]&#10;\end{equation}&#10;&#10;&#10;\end{document}"/>
+  <p:tag name="ORIGINALWIDTH" val="3298.838"/>
+  <p:tag name="LATEXADDIN" val="\documentclass{article}&#10;\usepackage{amsmath}&#10;\pagestyle{empty}&#10;\begin{document}&#10;&#10;\begin{equation*}&#10;\delta \bar{T}_{z}=\left[-\frac{\bar{\alpha} G}{c_{z}}-\frac{G_{\text {Loss }}}{c_{z}}\right] \delta T_{s}+\left[\frac{G}{c_{z}}\left(T_{\mathrm{Grid}}-\bar{T}_{z}\right)\: \frac{K_{\mathrm{he}}}{c_{z}}\right]\left[\begin{array}{l}&#10;\delta \alpha \\&#10;\delta \beta&#10;\end{array}\right]&#10;\end{equation*}&#10;&#10;&#10;\end{document}"/>
   <p:tag name="IGUANATEXSIZE" val="20"/>
-  <p:tag name="IGUANATEXCURSOR" val="391"/>
+  <p:tag name="IGUANATEXCURSOR" val="271"/>
   <p:tag name="TRANSPARENCY" val="True"/>
   <p:tag name="LATEXENGINEID" val="0"/>
   <p:tag name="TEMPFOLDER" val=".\"/>
@@ -21181,6 +23071,96 @@
 </p:tagLst>
 </file>
 
+<file path=ppt/tags/tag15.xml><?xml version="1.0" encoding="utf-8"?>
+<p:tagLst xmlns:a="http://schemas.openxmlformats.org/drawingml/2006/main" xmlns:r="http://schemas.openxmlformats.org/officeDocument/2006/relationships" xmlns:p="http://schemas.openxmlformats.org/presentationml/2006/main">
+  <p:tag name="OUTPUTDPI" val="1200"/>
+  <p:tag name="ORIGINALHEIGHT" val="95.23811"/>
+  <p:tag name="ORIGINALWIDTH" val="585.6768"/>
+  <p:tag name="LATEXADDIN" val="\documentclass{article}&#10;\usepackage{amsmath}&#10;\pagestyle{empty}&#10;\begin{document}&#10;\begin{equation*}&#10;T^o=40^{\circ}C&#10;\end{equation*}&#10;\end{document}"/>
+  <p:tag name="IGUANATEXSIZE" val="20"/>
+  <p:tag name="IGUANATEXCURSOR" val="113"/>
+  <p:tag name="TRANSPARENCY" val="True"/>
+  <p:tag name="LATEXENGINEID" val="0"/>
+  <p:tag name="TEMPFOLDER" val=".\"/>
+  <p:tag name="LATEXFORMHEIGHT" val="312"/>
+  <p:tag name="LATEXFORMWIDTH" val="384"/>
+  <p:tag name="LATEXFORMWRAP" val="True"/>
+  <p:tag name="BITMAPVECTOR" val="0"/>
+</p:tagLst>
+</file>
+
+<file path=ppt/tags/tag16.xml><?xml version="1.0" encoding="utf-8"?>
+<p:tagLst xmlns:a="http://schemas.openxmlformats.org/drawingml/2006/main" xmlns:r="http://schemas.openxmlformats.org/officeDocument/2006/relationships" xmlns:p="http://schemas.openxmlformats.org/presentationml/2006/main">
+  <p:tag name="OUTPUTDPI" val="1200"/>
+  <p:tag name="ORIGINALHEIGHT" val="95.23811"/>
+  <p:tag name="ORIGINALWIDTH" val="585.6768"/>
+  <p:tag name="LATEXADDIN" val="\documentclass{article}&#10;\usepackage{amsmath}&#10;\pagestyle{empty}&#10;\begin{document}&#10;\begin{equation*}&#10;T^o=50^{\circ}C&#10;\end{equation*}&#10;\end{document}"/>
+  <p:tag name="IGUANATEXSIZE" val="20"/>
+  <p:tag name="IGUANATEXCURSOR" val="113"/>
+  <p:tag name="TRANSPARENCY" val="True"/>
+  <p:tag name="LATEXENGINEID" val="0"/>
+  <p:tag name="TEMPFOLDER" val=".\"/>
+  <p:tag name="LATEXFORMHEIGHT" val="312"/>
+  <p:tag name="LATEXFORMWIDTH" val="384"/>
+  <p:tag name="LATEXFORMWRAP" val="True"/>
+  <p:tag name="BITMAPVECTOR" val="0"/>
+</p:tagLst>
+</file>
+
+<file path=ppt/tags/tag17.xml><?xml version="1.0" encoding="utf-8"?>
+<p:tagLst xmlns:a="http://schemas.openxmlformats.org/drawingml/2006/main" xmlns:r="http://schemas.openxmlformats.org/officeDocument/2006/relationships" xmlns:p="http://schemas.openxmlformats.org/presentationml/2006/main">
+  <p:tag name="OUTPUTDPI" val="1200"/>
+  <p:tag name="ORIGINALHEIGHT" val="126.7342"/>
+  <p:tag name="ORIGINALWIDTH" val="991.376"/>
+  <p:tag name="LATEXADDIN" val="\documentclass{article}&#10;\usepackage{amsmath}&#10;\pagestyle{empty}&#10;\begin{document}&#10;\begin{equation*}&#10;T^o \uparrow \; \Rightarrow \, P_{average}\uparrow&#10;\end{equation*}&#10;\end{document}"/>
+  <p:tag name="IGUANATEXSIZE" val="20"/>
+  <p:tag name="IGUANATEXCURSOR" val="129"/>
+  <p:tag name="TRANSPARENCY" val="True"/>
+  <p:tag name="LATEXENGINEID" val="0"/>
+  <p:tag name="TEMPFOLDER" val=".\"/>
+  <p:tag name="LATEXFORMHEIGHT" val="312"/>
+  <p:tag name="LATEXFORMWIDTH" val="384"/>
+  <p:tag name="LATEXFORMWRAP" val="True"/>
+  <p:tag name="BITMAPVECTOR" val="0"/>
+</p:tagLst>
+</file>
+
+<file path=ppt/tags/tag18.xml><?xml version="1.0" encoding="utf-8"?>
+<p:tagLst xmlns:a="http://schemas.openxmlformats.org/drawingml/2006/main" xmlns:r="http://schemas.openxmlformats.org/officeDocument/2006/relationships" xmlns:p="http://schemas.openxmlformats.org/presentationml/2006/main">
+  <p:tag name="OUTPUTDPI" val="1200"/>
+  <p:tag name="ORIGINALHEIGHT" val="113.9857"/>
+  <p:tag name="ORIGINALWIDTH" val="638.9202"/>
+  <p:tag name="LATEXADDIN" val="\documentclass{article}&#10;\usepackage{amsmath}&#10;\pagestyle{empty}&#10;\begin{document}&#10;\begin{equation*}&#10;\Delta p^o = 1 \, bar&#10;\end{equation*}&#10;\end{document}"/>
+  <p:tag name="IGUANATEXSIZE" val="20"/>
+  <p:tag name="IGUANATEXCURSOR" val="115"/>
+  <p:tag name="TRANSPARENCY" val="True"/>
+  <p:tag name="LATEXENGINEID" val="0"/>
+  <p:tag name="TEMPFOLDER" val=".\"/>
+  <p:tag name="LATEXFORMHEIGHT" val="312"/>
+  <p:tag name="LATEXFORMWIDTH" val="384"/>
+  <p:tag name="LATEXFORMWRAP" val="True"/>
+  <p:tag name="BITMAPVECTOR" val="0"/>
+</p:tagLst>
+</file>
+
+<file path=ppt/tags/tag19.xml><?xml version="1.0" encoding="utf-8"?>
+<p:tagLst xmlns:a="http://schemas.openxmlformats.org/drawingml/2006/main" xmlns:r="http://schemas.openxmlformats.org/officeDocument/2006/relationships" xmlns:p="http://schemas.openxmlformats.org/presentationml/2006/main">
+  <p:tag name="OUTPUTDPI" val="1200"/>
+  <p:tag name="ORIGINALHEIGHT" val="113.9857"/>
+  <p:tag name="ORIGINALWIDTH" val="638.9202"/>
+  <p:tag name="LATEXADDIN" val="\documentclass{article}&#10;\usepackage{amsmath}&#10;\pagestyle{empty}&#10;\begin{document}&#10;\begin{equation*}&#10;\Delta p^o = 3 \, bar&#10;\end{equation*}&#10;\end{document}"/>
+  <p:tag name="IGUANATEXSIZE" val="20"/>
+  <p:tag name="IGUANATEXCURSOR" val="112"/>
+  <p:tag name="TRANSPARENCY" val="True"/>
+  <p:tag name="LATEXENGINEID" val="0"/>
+  <p:tag name="TEMPFOLDER" val=".\"/>
+  <p:tag name="LATEXFORMHEIGHT" val="312"/>
+  <p:tag name="LATEXFORMWIDTH" val="384"/>
+  <p:tag name="LATEXFORMWRAP" val="True"/>
+  <p:tag name="BITMAPVECTOR" val="0"/>
+</p:tagLst>
+</file>
+
 <file path=ppt/tags/tag2.xml><?xml version="1.0" encoding="utf-8"?>
 <p:tagLst xmlns:a="http://schemas.openxmlformats.org/drawingml/2006/main" xmlns:r="http://schemas.openxmlformats.org/officeDocument/2006/relationships" xmlns:p="http://schemas.openxmlformats.org/presentationml/2006/main">
   <p:tag name="OUTPUTDPI" val="1200"/>
@@ -21191,6 +23171,114 @@
   <p:tag name="IGUANATEXCURSOR" val="191"/>
   <p:tag name="TRANSPARENCY" val="True"/>
   <p:tag name="FILENAME" val="D:\PoliMi\Magistrale\Primo anno\Secondo semestre\AUTOMATION OF ENERGY SYSTEMS (LEVA ALBERTO) {055511 - MODELLING AND CONTROL OF ENERGY SYSTEMS\Project theme\AES_project_2021_2022\Images\Assignment 1\Latex\equations.tex"/>
+  <p:tag name="LATEXENGINEID" val="0"/>
+  <p:tag name="TEMPFOLDER" val=".\"/>
+  <p:tag name="LATEXFORMHEIGHT" val="312"/>
+  <p:tag name="LATEXFORMWIDTH" val="384"/>
+  <p:tag name="LATEXFORMWRAP" val="True"/>
+  <p:tag name="BITMAPVECTOR" val="0"/>
+</p:tagLst>
+</file>
+
+<file path=ppt/tags/tag20.xml><?xml version="1.0" encoding="utf-8"?>
+<p:tagLst xmlns:a="http://schemas.openxmlformats.org/drawingml/2006/main" xmlns:r="http://schemas.openxmlformats.org/officeDocument/2006/relationships" xmlns:p="http://schemas.openxmlformats.org/presentationml/2006/main">
+  <p:tag name="OUTPUTDPI" val="1200"/>
+  <p:tag name="ORIGINALHEIGHT" val="113.9857"/>
+  <p:tag name="ORIGINALWIDTH" val="638.9202"/>
+  <p:tag name="LATEXADDIN" val="\documentclass{article}&#10;\usepackage{amsmath}&#10;\pagestyle{empty}&#10;\begin{document}&#10;\begin{equation*}&#10;\Delta p^o = 1 \, bar&#10;\end{equation*}&#10;\end{document}"/>
+  <p:tag name="IGUANATEXSIZE" val="20"/>
+  <p:tag name="IGUANATEXCURSOR" val="115"/>
+  <p:tag name="TRANSPARENCY" val="True"/>
+  <p:tag name="LATEXENGINEID" val="0"/>
+  <p:tag name="TEMPFOLDER" val=".\"/>
+  <p:tag name="LATEXFORMHEIGHT" val="312"/>
+  <p:tag name="LATEXFORMWIDTH" val="384"/>
+  <p:tag name="LATEXFORMWRAP" val="True"/>
+  <p:tag name="BITMAPVECTOR" val="0"/>
+</p:tagLst>
+</file>
+
+<file path=ppt/tags/tag21.xml><?xml version="1.0" encoding="utf-8"?>
+<p:tagLst xmlns:a="http://schemas.openxmlformats.org/drawingml/2006/main" xmlns:r="http://schemas.openxmlformats.org/officeDocument/2006/relationships" xmlns:p="http://schemas.openxmlformats.org/presentationml/2006/main">
+  <p:tag name="OUTPUTDPI" val="1200"/>
+  <p:tag name="ORIGINALHEIGHT" val="113.9857"/>
+  <p:tag name="ORIGINALWIDTH" val="638.9202"/>
+  <p:tag name="LATEXADDIN" val="\documentclass{article}&#10;\usepackage{amsmath}&#10;\pagestyle{empty}&#10;\begin{document}&#10;\begin{equation*}&#10;\Delta p^o = 3 \, bar&#10;\end{equation*}&#10;\end{document}"/>
+  <p:tag name="IGUANATEXSIZE" val="20"/>
+  <p:tag name="IGUANATEXCURSOR" val="112"/>
+  <p:tag name="TRANSPARENCY" val="True"/>
+  <p:tag name="LATEXENGINEID" val="0"/>
+  <p:tag name="TEMPFOLDER" val=".\"/>
+  <p:tag name="LATEXFORMHEIGHT" val="312"/>
+  <p:tag name="LATEXFORMWIDTH" val="384"/>
+  <p:tag name="LATEXFORMWRAP" val="True"/>
+  <p:tag name="BITMAPVECTOR" val="0"/>
+</p:tagLst>
+</file>
+
+<file path=ppt/tags/tag22.xml><?xml version="1.0" encoding="utf-8"?>
+<p:tagLst xmlns:a="http://schemas.openxmlformats.org/drawingml/2006/main" xmlns:r="http://schemas.openxmlformats.org/officeDocument/2006/relationships" xmlns:p="http://schemas.openxmlformats.org/presentationml/2006/main">
+  <p:tag name="OUTPUTDPI" val="1200"/>
+  <p:tag name="ORIGINALHEIGHT" val="95.23811"/>
+  <p:tag name="ORIGINALWIDTH" val="585.6768"/>
+  <p:tag name="LATEXADDIN" val="\documentclass{article}&#10;\usepackage{amsmath}&#10;\pagestyle{empty}&#10;\begin{document}&#10;\begin{equation*}&#10;T^o=40^{\circ}C&#10;\end{equation*}&#10;\end{document}"/>
+  <p:tag name="IGUANATEXSIZE" val="20"/>
+  <p:tag name="IGUANATEXCURSOR" val="113"/>
+  <p:tag name="TRANSPARENCY" val="True"/>
+  <p:tag name="LATEXENGINEID" val="0"/>
+  <p:tag name="TEMPFOLDER" val=".\"/>
+  <p:tag name="LATEXFORMHEIGHT" val="312"/>
+  <p:tag name="LATEXFORMWIDTH" val="384"/>
+  <p:tag name="LATEXFORMWRAP" val="True"/>
+  <p:tag name="BITMAPVECTOR" val="0"/>
+</p:tagLst>
+</file>
+
+<file path=ppt/tags/tag23.xml><?xml version="1.0" encoding="utf-8"?>
+<p:tagLst xmlns:a="http://schemas.openxmlformats.org/drawingml/2006/main" xmlns:r="http://schemas.openxmlformats.org/officeDocument/2006/relationships" xmlns:p="http://schemas.openxmlformats.org/presentationml/2006/main">
+  <p:tag name="OUTPUTDPI" val="1200"/>
+  <p:tag name="ORIGINALHEIGHT" val="95.23811"/>
+  <p:tag name="ORIGINALWIDTH" val="585.6768"/>
+  <p:tag name="LATEXADDIN" val="\documentclass{article}&#10;\usepackage{amsmath}&#10;\pagestyle{empty}&#10;\begin{document}&#10;\begin{equation*}&#10;T^o=50^{\circ}C&#10;\end{equation*}&#10;\end{document}"/>
+  <p:tag name="IGUANATEXSIZE" val="20"/>
+  <p:tag name="IGUANATEXCURSOR" val="113"/>
+  <p:tag name="TRANSPARENCY" val="True"/>
+  <p:tag name="LATEXENGINEID" val="0"/>
+  <p:tag name="TEMPFOLDER" val=".\"/>
+  <p:tag name="LATEXFORMHEIGHT" val="312"/>
+  <p:tag name="LATEXFORMWIDTH" val="384"/>
+  <p:tag name="LATEXFORMWRAP" val="True"/>
+  <p:tag name="BITMAPVECTOR" val="0"/>
+</p:tagLst>
+</file>
+
+<file path=ppt/tags/tag24.xml><?xml version="1.0" encoding="utf-8"?>
+<p:tagLst xmlns:a="http://schemas.openxmlformats.org/drawingml/2006/main" xmlns:r="http://schemas.openxmlformats.org/officeDocument/2006/relationships" xmlns:p="http://schemas.openxmlformats.org/presentationml/2006/main">
+  <p:tag name="OUTPUTDPI" val="1200"/>
+  <p:tag name="ORIGINALHEIGHT" val="113.9857"/>
+  <p:tag name="ORIGINALWIDTH" val="638.9202"/>
+  <p:tag name="LATEXADDIN" val="\documentclass{article}&#10;\usepackage{amsmath}&#10;\pagestyle{empty}&#10;\begin{document}&#10;\begin{equation*}&#10;\Delta p^o = 1 \, bar&#10;\end{equation*}&#10;\end{document}"/>
+  <p:tag name="IGUANATEXSIZE" val="20"/>
+  <p:tag name="IGUANATEXCURSOR" val="115"/>
+  <p:tag name="TRANSPARENCY" val="True"/>
+  <p:tag name="LATEXENGINEID" val="0"/>
+  <p:tag name="TEMPFOLDER" val=".\"/>
+  <p:tag name="LATEXFORMHEIGHT" val="312"/>
+  <p:tag name="LATEXFORMWIDTH" val="384"/>
+  <p:tag name="LATEXFORMWRAP" val="True"/>
+  <p:tag name="BITMAPVECTOR" val="0"/>
+</p:tagLst>
+</file>
+
+<file path=ppt/tags/tag25.xml><?xml version="1.0" encoding="utf-8"?>
+<p:tagLst xmlns:a="http://schemas.openxmlformats.org/drawingml/2006/main" xmlns:r="http://schemas.openxmlformats.org/officeDocument/2006/relationships" xmlns:p="http://schemas.openxmlformats.org/presentationml/2006/main">
+  <p:tag name="OUTPUTDPI" val="1200"/>
+  <p:tag name="ORIGINALHEIGHT" val="113.9857"/>
+  <p:tag name="ORIGINALWIDTH" val="638.9202"/>
+  <p:tag name="LATEXADDIN" val="\documentclass{article}&#10;\usepackage{amsmath}&#10;\pagestyle{empty}&#10;\begin{document}&#10;\begin{equation*}&#10;\Delta p^o = 3 \, bar&#10;\end{equation*}&#10;\end{document}"/>
+  <p:tag name="IGUANATEXSIZE" val="20"/>
+  <p:tag name="IGUANATEXCURSOR" val="112"/>
+  <p:tag name="TRANSPARENCY" val="True"/>
   <p:tag name="LATEXENGINEID" val="0"/>
   <p:tag name="TEMPFOLDER" val=".\"/>
   <p:tag name="LATEXFORMHEIGHT" val="312"/>

</xml_diff>

<commit_message>
Finally merged all powerpoints together, please give it a look!
</commit_message>
<xml_diff>
--- a/Aes_Project_2021_2022.pptx
+++ b/Aes_Project_2021_2022.pptx
@@ -5,10 +5,10 @@
     <p:sldMasterId id="2147483648" r:id="rId4"/>
   </p:sldMasterIdLst>
   <p:notesMasterIdLst>
-    <p:notesMasterId r:id="rId23"/>
+    <p:notesMasterId r:id="rId28"/>
   </p:notesMasterIdLst>
   <p:handoutMasterIdLst>
-    <p:handoutMasterId r:id="rId24"/>
+    <p:handoutMasterId r:id="rId29"/>
   </p:handoutMasterIdLst>
   <p:sldIdLst>
     <p:sldId id="256" r:id="rId5"/>
@@ -25,10 +25,15 @@
     <p:sldId id="284" r:id="rId16"/>
     <p:sldId id="285" r:id="rId17"/>
     <p:sldId id="291" r:id="rId18"/>
-    <p:sldId id="292" r:id="rId19"/>
+    <p:sldId id="301" r:id="rId19"/>
     <p:sldId id="293" r:id="rId20"/>
     <p:sldId id="294" r:id="rId21"/>
     <p:sldId id="295" r:id="rId22"/>
+    <p:sldId id="296" r:id="rId23"/>
+    <p:sldId id="297" r:id="rId24"/>
+    <p:sldId id="298" r:id="rId25"/>
+    <p:sldId id="299" r:id="rId26"/>
+    <p:sldId id="300" r:id="rId27"/>
   </p:sldIdLst>
   <p:sldSz cx="12192000" cy="6858000"/>
   <p:notesSz cx="6858000" cy="9144000"/>
@@ -330,7 +335,7 @@
             <a:pPr rtl="0"/>
             <a:fld id="{9F1072A3-100F-40A9-915F-8D2D9E6962D8}" type="slidenum">
               <a:rPr lang="it-IT" smtClean="0"/>
-              <a:t>‹N›</a:t>
+              <a:t>‹#›</a:t>
             </a:fld>
             <a:endParaRPr lang="it-IT" dirty="0"/>
           </a:p>
@@ -593,7 +598,7 @@
             <a:pPr rtl="0"/>
             <a:fld id="{79230CFA-805A-4FD3-B3A0-DAAA5993DA17}" type="slidenum">
               <a:rPr lang="it-IT" noProof="0" smtClean="0"/>
-              <a:t>‹N›</a:t>
+              <a:t>‹#›</a:t>
             </a:fld>
             <a:endParaRPr lang="it-IT" noProof="0" dirty="0"/>
           </a:p>
@@ -3635,7 +3640,7 @@
             <a:pPr rtl="0"/>
             <a:fld id="{8699F50C-BE38-4BD0-BA84-9B090E1F2B9B}" type="slidenum">
               <a:rPr lang="it-IT" noProof="0" smtClean="0"/>
-              <a:t>‹N›</a:t>
+              <a:t>‹#›</a:t>
             </a:fld>
             <a:endParaRPr lang="it-IT" noProof="0" dirty="0"/>
           </a:p>
@@ -4215,7 +4220,7 @@
             <a:pPr rtl="0"/>
             <a:fld id="{8699F50C-BE38-4BD0-BA84-9B090E1F2B9B}" type="slidenum">
               <a:rPr lang="it-IT" noProof="0" smtClean="0"/>
-              <a:t>‹N›</a:t>
+              <a:t>‹#›</a:t>
             </a:fld>
             <a:endParaRPr lang="it-IT" noProof="0" dirty="0"/>
           </a:p>
@@ -4912,7 +4917,7 @@
             <a:pPr rtl="0"/>
             <a:fld id="{8699F50C-BE38-4BD0-BA84-9B090E1F2B9B}" type="slidenum">
               <a:rPr lang="it-IT" noProof="0" smtClean="0"/>
-              <a:t>‹N›</a:t>
+              <a:t>‹#›</a:t>
             </a:fld>
             <a:endParaRPr lang="it-IT" noProof="0" dirty="0"/>
           </a:p>
@@ -6658,7 +6663,7 @@
             <a:pPr rtl="0"/>
             <a:fld id="{8699F50C-BE38-4BD0-BA84-9B090E1F2B9B}" type="slidenum">
               <a:rPr lang="it-IT" noProof="0" smtClean="0"/>
-              <a:t>‹N›</a:t>
+              <a:t>‹#›</a:t>
             </a:fld>
             <a:endParaRPr lang="it-IT" noProof="0" dirty="0"/>
           </a:p>
@@ -7064,7 +7069,7 @@
             <a:pPr rtl="0"/>
             <a:fld id="{8699F50C-BE38-4BD0-BA84-9B090E1F2B9B}" type="slidenum">
               <a:rPr lang="it-IT" noProof="0" smtClean="0"/>
-              <a:t>‹N›</a:t>
+              <a:t>‹#›</a:t>
             </a:fld>
             <a:endParaRPr lang="it-IT" noProof="0" dirty="0"/>
           </a:p>
@@ -8593,7 +8598,7 @@
             <a:pPr rtl="0"/>
             <a:fld id="{8699F50C-BE38-4BD0-BA84-9B090E1F2B9B}" type="slidenum">
               <a:rPr lang="it-IT" noProof="0" smtClean="0"/>
-              <a:t>‹N›</a:t>
+              <a:t>‹#›</a:t>
             </a:fld>
             <a:endParaRPr lang="it-IT" noProof="0" dirty="0"/>
           </a:p>
@@ -9222,7 +9227,7 @@
             <a:pPr rtl="0"/>
             <a:fld id="{8699F50C-BE38-4BD0-BA84-9B090E1F2B9B}" type="slidenum">
               <a:rPr lang="it-IT" noProof="0" smtClean="0"/>
-              <a:t>‹N›</a:t>
+              <a:t>‹#›</a:t>
             </a:fld>
             <a:endParaRPr lang="it-IT" noProof="0" dirty="0"/>
           </a:p>
@@ -10096,7 +10101,7 @@
             <a:pPr rtl="0"/>
             <a:fld id="{8699F50C-BE38-4BD0-BA84-9B090E1F2B9B}" type="slidenum">
               <a:rPr lang="it-IT" noProof="0" smtClean="0"/>
-              <a:t>‹N›</a:t>
+              <a:t>‹#›</a:t>
             </a:fld>
             <a:endParaRPr lang="it-IT" noProof="0" dirty="0"/>
           </a:p>
@@ -10562,7 +10567,7 @@
             <a:pPr rtl="0"/>
             <a:fld id="{8699F50C-BE38-4BD0-BA84-9B090E1F2B9B}" type="slidenum">
               <a:rPr lang="it-IT" noProof="0" smtClean="0"/>
-              <a:t>‹N›</a:t>
+              <a:t>‹#›</a:t>
             </a:fld>
             <a:endParaRPr lang="it-IT" noProof="0" dirty="0"/>
           </a:p>
@@ -11197,7 +11202,7 @@
             <a:pPr rtl="0"/>
             <a:fld id="{8699F50C-BE38-4BD0-BA84-9B090E1F2B9B}" type="slidenum">
               <a:rPr lang="it-IT" noProof="0" smtClean="0"/>
-              <a:t>‹N›</a:t>
+              <a:t>‹#›</a:t>
             </a:fld>
             <a:endParaRPr lang="it-IT" noProof="0" dirty="0"/>
           </a:p>
@@ -13592,7 +13597,7 @@
             <a:fld id="{8699F50C-BE38-4BD0-BA84-9B090E1F2B9B}" type="slidenum">
               <a:rPr lang="it-IT" noProof="0" smtClean="0"/>
               <a:pPr rtl="0"/>
-              <a:t>‹N›</a:t>
+              <a:t>‹#›</a:t>
             </a:fld>
             <a:endParaRPr lang="it-IT" noProof="0" dirty="0"/>
           </a:p>
@@ -15936,7 +15941,7 @@
     </p:spTree>
     <p:extLst>
       <p:ext uri="{BB962C8B-B14F-4D97-AF65-F5344CB8AC3E}">
-        <p14:creationId xmlns:p14="http://schemas.microsoft.com/office/powerpoint/2010/main" val="888413685"/>
+        <p14:creationId xmlns:p14="http://schemas.microsoft.com/office/powerpoint/2010/main" val="2195985039"/>
       </p:ext>
     </p:extLst>
   </p:cSld>
@@ -16626,6 +16631,524 @@
 </p:sld>
 </file>
 
+<file path=ppt/slides/slide19.xml><?xml version="1.0" encoding="utf-8"?>
+<p:sld xmlns:a="http://schemas.openxmlformats.org/drawingml/2006/main" xmlns:r="http://schemas.openxmlformats.org/officeDocument/2006/relationships" xmlns:p="http://schemas.openxmlformats.org/presentationml/2006/main">
+  <p:cSld>
+    <p:spTree>
+      <p:nvGrpSpPr>
+        <p:cNvPr id="1" name=""/>
+        <p:cNvGrpSpPr/>
+        <p:nvPr/>
+      </p:nvGrpSpPr>
+      <p:grpSpPr>
+        <a:xfrm>
+          <a:off x="0" y="0"/>
+          <a:ext cx="0" cy="0"/>
+          <a:chOff x="0" y="0"/>
+          <a:chExt cx="0" cy="0"/>
+        </a:xfrm>
+      </p:grpSpPr>
+      <p:sp>
+        <p:nvSpPr>
+          <p:cNvPr id="3" name="Segnaposto piè di pagina 2">
+            <a:extLst>
+              <a:ext uri="{FF2B5EF4-FFF2-40B4-BE49-F238E27FC236}">
+                <a16:creationId xmlns:a16="http://schemas.microsoft.com/office/drawing/2014/main" id="{99E8B753-8F9B-FB27-A65B-8B8775D38FCE}"/>
+              </a:ext>
+            </a:extLst>
+          </p:cNvPr>
+          <p:cNvSpPr>
+            <a:spLocks noGrp="1"/>
+          </p:cNvSpPr>
+          <p:nvPr>
+            <p:ph type="ftr" sz="quarter" idx="17"/>
+          </p:nvPr>
+        </p:nvSpPr>
+        <p:spPr/>
+        <p:txBody>
+          <a:bodyPr/>
+          <a:lstStyle/>
+          <a:p>
+            <a:pPr rtl="0"/>
+            <a:r>
+              <a:rPr lang="it-IT" noProof="0" dirty="0"/>
+              <a:t>Aggiungere un piè di pagina</a:t>
+            </a:r>
+          </a:p>
+        </p:txBody>
+      </p:sp>
+      <p:sp>
+        <p:nvSpPr>
+          <p:cNvPr id="4" name="Segnaposto numero diapositiva 3">
+            <a:extLst>
+              <a:ext uri="{FF2B5EF4-FFF2-40B4-BE49-F238E27FC236}">
+                <a16:creationId xmlns:a16="http://schemas.microsoft.com/office/drawing/2014/main" id="{9BF2CC3D-E6AB-538A-F788-163E463EDEC1}"/>
+              </a:ext>
+            </a:extLst>
+          </p:cNvPr>
+          <p:cNvSpPr>
+            <a:spLocks noGrp="1"/>
+          </p:cNvSpPr>
+          <p:nvPr>
+            <p:ph type="sldNum" sz="quarter" idx="18"/>
+          </p:nvPr>
+        </p:nvSpPr>
+        <p:spPr/>
+        <p:txBody>
+          <a:bodyPr/>
+          <a:lstStyle/>
+          <a:p>
+            <a:pPr rtl="0"/>
+            <a:fld id="{8699F50C-BE38-4BD0-BA84-9B090E1F2B9B}" type="slidenum">
+              <a:rPr lang="it-IT" noProof="0" smtClean="0"/>
+              <a:t>19</a:t>
+            </a:fld>
+            <a:endParaRPr lang="it-IT" noProof="0" dirty="0"/>
+          </a:p>
+        </p:txBody>
+      </p:sp>
+      <p:sp>
+        <p:nvSpPr>
+          <p:cNvPr id="5" name="Titolo 4">
+            <a:extLst>
+              <a:ext uri="{FF2B5EF4-FFF2-40B4-BE49-F238E27FC236}">
+                <a16:creationId xmlns:a16="http://schemas.microsoft.com/office/drawing/2014/main" id="{23B11D5B-8EE9-BA95-85EB-A66526317EC6}"/>
+              </a:ext>
+            </a:extLst>
+          </p:cNvPr>
+          <p:cNvSpPr>
+            <a:spLocks noGrp="1"/>
+          </p:cNvSpPr>
+          <p:nvPr>
+            <p:ph type="title"/>
+          </p:nvPr>
+        </p:nvSpPr>
+        <p:spPr>
+          <a:xfrm>
+            <a:off x="531814" y="352425"/>
+            <a:ext cx="10722571" cy="1241632"/>
+          </a:xfrm>
+        </p:spPr>
+        <p:txBody>
+          <a:bodyPr>
+            <a:normAutofit/>
+          </a:bodyPr>
+          <a:lstStyle/>
+          <a:p>
+            <a:pPr algn="ctr"/>
+            <a:r>
+              <a:rPr lang="it-IT" sz="3600" dirty="0"/>
+              <a:t>Power consumption with different outlet temperatures in day mode</a:t>
+            </a:r>
+          </a:p>
+        </p:txBody>
+      </p:sp>
+      <mc:AlternateContent xmlns:mc="http://schemas.openxmlformats.org/markup-compatibility/2006" xmlns:a14="http://schemas.microsoft.com/office/drawing/2010/main">
+        <mc:Choice Requires="a14">
+          <p:sp>
+            <p:nvSpPr>
+              <p:cNvPr id="6" name="Segnaposto testo 5">
+                <a:extLst>
+                  <a:ext uri="{FF2B5EF4-FFF2-40B4-BE49-F238E27FC236}">
+                    <a16:creationId xmlns:a16="http://schemas.microsoft.com/office/drawing/2014/main" id="{21130B6F-AF23-5D3F-9A1C-13E67C11364D}"/>
+                  </a:ext>
+                </a:extLst>
+              </p:cNvPr>
+              <p:cNvSpPr>
+                <a:spLocks noGrp="1"/>
+              </p:cNvSpPr>
+              <p:nvPr>
+                <p:ph type="body" sz="quarter" idx="19"/>
+              </p:nvPr>
+            </p:nvSpPr>
+            <p:spPr>
+              <a:xfrm>
+                <a:off x="531813" y="5263944"/>
+                <a:ext cx="11422059" cy="1092406"/>
+              </a:xfrm>
+            </p:spPr>
+            <p:txBody>
+              <a:bodyPr/>
+              <a:lstStyle/>
+              <a:p>
+                <a:r>
+                  <a:rPr lang="it-IT" sz="1800" dirty="0"/>
+                  <a:t>If</a:t>
+                </a:r>
+                <a:r>
+                  <a:rPr lang="it-IT" sz="1600" dirty="0"/>
+                  <a:t> </a:t>
+                </a:r>
+                <a:r>
+                  <a:rPr lang="it-IT" sz="1800" dirty="0"/>
+                  <a:t>I change the reference outlet temperature of the heater I get the following power consumption diagrams, </a:t>
+                </a:r>
+              </a:p>
+              <a:p>
+                <a:r>
+                  <a:rPr lang="it-IT" sz="1800" dirty="0"/>
+                  <a:t>where </a:t>
+                </a:r>
+                <a14:m>
+                  <m:oMath xmlns:m="http://schemas.openxmlformats.org/officeDocument/2006/math">
+                    <m:r>
+                      <a:rPr lang="it-IT" sz="1800" b="0" i="0" smtClean="0">
+                        <a:latin typeface="Cambria Math" panose="02040503050406030204" pitchFamily="18" charset="0"/>
+                      </a:rPr>
+                      <m:t> </m:t>
+                    </m:r>
+                    <m:r>
+                      <a:rPr lang="it-IT" sz="1800">
+                        <a:latin typeface="Cambria Math" panose="02040503050406030204" pitchFamily="18" charset="0"/>
+                      </a:rPr>
+                      <m:t> </m:t>
+                    </m:r>
+                    <m:sSub>
+                      <m:sSubPr>
+                        <m:ctrlPr>
+                          <a:rPr lang="it-IT" sz="1800" i="1">
+                            <a:latin typeface="Cambria Math" panose="02040503050406030204" pitchFamily="18" charset="0"/>
+                          </a:rPr>
+                        </m:ctrlPr>
+                      </m:sSubPr>
+                      <m:e>
+                        <m:r>
+                          <a:rPr lang="it-IT" sz="1800">
+                            <a:latin typeface="Cambria Math" panose="02040503050406030204" pitchFamily="18" charset="0"/>
+                          </a:rPr>
+                          <m:t>𝑃</m:t>
+                        </m:r>
+                      </m:e>
+                      <m:sub>
+                        <m:r>
+                          <a:rPr lang="it-IT" sz="1800">
+                            <a:latin typeface="Cambria Math" panose="02040503050406030204" pitchFamily="18" charset="0"/>
+                          </a:rPr>
+                          <m:t>𝑎𝑣𝑒𝑟𝑎𝑔𝑒</m:t>
+                        </m:r>
+                      </m:sub>
+                    </m:sSub>
+                    <m:r>
+                      <a:rPr lang="it-IT" sz="1800">
+                        <a:latin typeface="Cambria Math" panose="02040503050406030204" pitchFamily="18" charset="0"/>
+                      </a:rPr>
+                      <m:t>=</m:t>
+                    </m:r>
+                    <m:f>
+                      <m:fPr>
+                        <m:ctrlPr>
+                          <a:rPr lang="it-IT" sz="1800" i="1">
+                            <a:latin typeface="Cambria Math" panose="02040503050406030204" pitchFamily="18" charset="0"/>
+                          </a:rPr>
+                        </m:ctrlPr>
+                      </m:fPr>
+                      <m:num>
+                        <m:nary>
+                          <m:naryPr>
+                            <m:ctrlPr>
+                              <a:rPr lang="it-IT" sz="1800" i="1">
+                                <a:latin typeface="Cambria Math" panose="02040503050406030204" pitchFamily="18" charset="0"/>
+                              </a:rPr>
+                            </m:ctrlPr>
+                          </m:naryPr>
+                          <m:sub>
+                            <m:r>
+                              <m:rPr>
+                                <m:brk m:alnAt="23"/>
+                              </m:rPr>
+                              <a:rPr lang="it-IT" sz="1800">
+                                <a:latin typeface="Cambria Math" panose="02040503050406030204" pitchFamily="18" charset="0"/>
+                              </a:rPr>
+                              <m:t>0</m:t>
+                            </m:r>
+                          </m:sub>
+                          <m:sup>
+                            <m:r>
+                              <a:rPr lang="it-IT" sz="1800">
+                                <a:latin typeface="Cambria Math" panose="02040503050406030204" pitchFamily="18" charset="0"/>
+                              </a:rPr>
+                              <m:t>𝑡</m:t>
+                            </m:r>
+                          </m:sup>
+                          <m:e>
+                            <m:sSub>
+                              <m:sSubPr>
+                                <m:ctrlPr>
+                                  <a:rPr lang="it-IT" sz="1800" i="1">
+                                    <a:latin typeface="Cambria Math" panose="02040503050406030204" pitchFamily="18" charset="0"/>
+                                  </a:rPr>
+                                </m:ctrlPr>
+                              </m:sSubPr>
+                              <m:e>
+                                <m:r>
+                                  <a:rPr lang="it-IT" sz="1800">
+                                    <a:latin typeface="Cambria Math" panose="02040503050406030204" pitchFamily="18" charset="0"/>
+                                  </a:rPr>
+                                  <m:t>𝑃</m:t>
+                                </m:r>
+                              </m:e>
+                              <m:sub>
+                                <m:r>
+                                  <a:rPr lang="it-IT" sz="1800">
+                                    <a:latin typeface="Cambria Math" panose="02040503050406030204" pitchFamily="18" charset="0"/>
+                                  </a:rPr>
+                                  <m:t>𝑡𝑜𝑡</m:t>
+                                </m:r>
+                              </m:sub>
+                            </m:sSub>
+                          </m:e>
+                        </m:nary>
+                      </m:num>
+                      <m:den>
+                        <m:r>
+                          <a:rPr lang="it-IT" sz="1800">
+                            <a:latin typeface="Cambria Math" panose="02040503050406030204" pitchFamily="18" charset="0"/>
+                          </a:rPr>
+                          <m:t>𝑡</m:t>
+                        </m:r>
+                      </m:den>
+                    </m:f>
+                  </m:oMath>
+                </a14:m>
+                <a:r>
+                  <a:rPr lang="it-IT" sz="1800" dirty="0"/>
+                  <a:t>. </a:t>
+                </a:r>
+              </a:p>
+            </p:txBody>
+          </p:sp>
+        </mc:Choice>
+        <mc:Fallback xmlns="">
+          <p:sp>
+            <p:nvSpPr>
+              <p:cNvPr id="6" name="Segnaposto testo 5">
+                <a:extLst>
+                  <a:ext uri="{FF2B5EF4-FFF2-40B4-BE49-F238E27FC236}">
+                    <a16:creationId xmlns:a16="http://schemas.microsoft.com/office/drawing/2014/main" id="{21130B6F-AF23-5D3F-9A1C-13E67C11364D}"/>
+                  </a:ext>
+                </a:extLst>
+              </p:cNvPr>
+              <p:cNvSpPr>
+                <a:spLocks noGrp="1" noRot="1" noChangeAspect="1" noMove="1" noResize="1" noEditPoints="1" noAdjustHandles="1" noChangeArrowheads="1" noChangeShapeType="1" noTextEdit="1"/>
+              </p:cNvSpPr>
+              <p:nvPr>
+                <p:ph type="body" sz="quarter" idx="19"/>
+              </p:nvPr>
+            </p:nvSpPr>
+            <p:spPr>
+              <a:xfrm>
+                <a:off x="531813" y="5263944"/>
+                <a:ext cx="11422059" cy="1092406"/>
+              </a:xfrm>
+              <a:blipFill>
+                <a:blip r:embed="rId5"/>
+                <a:stretch>
+                  <a:fillRect l="-427" t="-5587"/>
+                </a:stretch>
+              </a:blipFill>
+            </p:spPr>
+            <p:txBody>
+              <a:bodyPr/>
+              <a:lstStyle/>
+              <a:p>
+                <a:r>
+                  <a:rPr lang="en-GB">
+                    <a:noFill/>
+                  </a:rPr>
+                  <a:t> </a:t>
+                </a:r>
+              </a:p>
+            </p:txBody>
+          </p:sp>
+        </mc:Fallback>
+      </mc:AlternateContent>
+      <p:pic>
+        <p:nvPicPr>
+          <p:cNvPr id="9" name="Immagine 8">
+            <a:extLst>
+              <a:ext uri="{FF2B5EF4-FFF2-40B4-BE49-F238E27FC236}">
+                <a16:creationId xmlns:a16="http://schemas.microsoft.com/office/drawing/2014/main" id="{6D97D7FA-335D-C1CF-5A4A-A3F9853B509D}"/>
+              </a:ext>
+            </a:extLst>
+          </p:cNvPr>
+          <p:cNvPicPr>
+            <a:picLocks noChangeAspect="1"/>
+          </p:cNvPicPr>
+          <p:nvPr/>
+        </p:nvPicPr>
+        <p:blipFill>
+          <a:blip r:embed="rId6"/>
+          <a:stretch>
+            <a:fillRect/>
+          </a:stretch>
+        </p:blipFill>
+        <p:spPr>
+          <a:xfrm>
+            <a:off x="467872" y="1594057"/>
+            <a:ext cx="5301678" cy="3314286"/>
+          </a:xfrm>
+          <a:prstGeom prst="rect">
+            <a:avLst/>
+          </a:prstGeom>
+        </p:spPr>
+      </p:pic>
+      <p:pic>
+        <p:nvPicPr>
+          <p:cNvPr id="11" name="Immagine 10">
+            <a:extLst>
+              <a:ext uri="{FF2B5EF4-FFF2-40B4-BE49-F238E27FC236}">
+                <a16:creationId xmlns:a16="http://schemas.microsoft.com/office/drawing/2014/main" id="{04A87ED5-08EC-8BE4-D744-FE55903F866F}"/>
+              </a:ext>
+            </a:extLst>
+          </p:cNvPr>
+          <p:cNvPicPr>
+            <a:picLocks noChangeAspect="1"/>
+          </p:cNvPicPr>
+          <p:nvPr/>
+        </p:nvPicPr>
+        <p:blipFill>
+          <a:blip r:embed="rId7"/>
+          <a:stretch>
+            <a:fillRect/>
+          </a:stretch>
+        </p:blipFill>
+        <p:spPr>
+          <a:xfrm>
+            <a:off x="6196708" y="1594057"/>
+            <a:ext cx="5757165" cy="3314286"/>
+          </a:xfrm>
+          <a:prstGeom prst="rect">
+            <a:avLst/>
+          </a:prstGeom>
+        </p:spPr>
+      </p:pic>
+      <p:pic>
+        <p:nvPicPr>
+          <p:cNvPr id="13" name="Picture 12" descr="\documentclass{article}&#10;\usepackage{amsmath}&#10;\pagestyle{empty}&#10;\begin{document}&#10;\begin{equation*}&#10;T^o=40^{\circ}C&#10;\end{equation*}&#10;\end{document}" title="IguanaTex Bitmap Display">
+            <a:extLst>
+              <a:ext uri="{FF2B5EF4-FFF2-40B4-BE49-F238E27FC236}">
+                <a16:creationId xmlns:a16="http://schemas.microsoft.com/office/drawing/2014/main" id="{B777AF15-E6F2-9130-85AA-52BD3FE5C4B4}"/>
+              </a:ext>
+            </a:extLst>
+          </p:cNvPr>
+          <p:cNvPicPr>
+            <a:picLocks noChangeAspect="1"/>
+          </p:cNvPicPr>
+          <p:nvPr>
+            <p:custDataLst>
+              <p:tags r:id="rId1"/>
+            </p:custDataLst>
+          </p:nvPr>
+        </p:nvPicPr>
+        <p:blipFill>
+          <a:blip r:embed="rId8"/>
+          <a:stretch>
+            <a:fillRect/>
+          </a:stretch>
+        </p:blipFill>
+        <p:spPr>
+          <a:xfrm>
+            <a:off x="4360411" y="2124536"/>
+            <a:ext cx="1190095" cy="193524"/>
+          </a:xfrm>
+          <a:prstGeom prst="rect">
+            <a:avLst/>
+          </a:prstGeom>
+        </p:spPr>
+      </p:pic>
+      <p:pic>
+        <p:nvPicPr>
+          <p:cNvPr id="15" name="Picture 14" descr="\documentclass{article}&#10;\usepackage{amsmath}&#10;\pagestyle{empty}&#10;\begin{document}&#10;\begin{equation*}&#10;T^o=50^{\circ}C&#10;\end{equation*}&#10;\end{document}" title="IguanaTex Bitmap Display">
+            <a:extLst>
+              <a:ext uri="{FF2B5EF4-FFF2-40B4-BE49-F238E27FC236}">
+                <a16:creationId xmlns:a16="http://schemas.microsoft.com/office/drawing/2014/main" id="{91E7DEB6-F0C8-6197-9E19-8AAFB161F7DA}"/>
+              </a:ext>
+            </a:extLst>
+          </p:cNvPr>
+          <p:cNvPicPr>
+            <a:picLocks noChangeAspect="1"/>
+          </p:cNvPicPr>
+          <p:nvPr>
+            <p:custDataLst>
+              <p:tags r:id="rId2"/>
+            </p:custDataLst>
+          </p:nvPr>
+        </p:nvPicPr>
+        <p:blipFill>
+          <a:blip r:embed="rId9"/>
+          <a:stretch>
+            <a:fillRect/>
+          </a:stretch>
+        </p:blipFill>
+        <p:spPr>
+          <a:xfrm>
+            <a:off x="10326989" y="2124536"/>
+            <a:ext cx="1190095" cy="193524"/>
+          </a:xfrm>
+          <a:prstGeom prst="rect">
+            <a:avLst/>
+          </a:prstGeom>
+        </p:spPr>
+      </p:pic>
+      <p:pic>
+        <p:nvPicPr>
+          <p:cNvPr id="19" name="Picture 18" descr="\documentclass{article}&#10;\usepackage{amsmath}&#10;\pagestyle{empty}&#10;\begin{document}&#10;\begin{equation*}&#10;T^o \uparrow \; \Rightarrow \, P_{average}\uparrow&#10;\end{equation*}&#10;\end{document}" title="IguanaTex Bitmap Display">
+            <a:extLst>
+              <a:ext uri="{FF2B5EF4-FFF2-40B4-BE49-F238E27FC236}">
+                <a16:creationId xmlns:a16="http://schemas.microsoft.com/office/drawing/2014/main" id="{8B5C604A-E5E4-12BC-6B28-E61BDF853F06}"/>
+              </a:ext>
+            </a:extLst>
+          </p:cNvPr>
+          <p:cNvPicPr>
+            <a:picLocks noChangeAspect="1"/>
+          </p:cNvPicPr>
+          <p:nvPr>
+            <p:custDataLst>
+              <p:tags r:id="rId3"/>
+            </p:custDataLst>
+          </p:nvPr>
+        </p:nvPicPr>
+        <p:blipFill>
+          <a:blip r:embed="rId10"/>
+          <a:stretch>
+            <a:fillRect/>
+          </a:stretch>
+        </p:blipFill>
+        <p:spPr>
+          <a:xfrm>
+            <a:off x="5088762" y="5859185"/>
+            <a:ext cx="2014476" cy="257524"/>
+          </a:xfrm>
+          <a:prstGeom prst="rect">
+            <a:avLst/>
+          </a:prstGeom>
+        </p:spPr>
+      </p:pic>
+    </p:spTree>
+    <p:extLst>
+      <p:ext uri="{BB962C8B-B14F-4D97-AF65-F5344CB8AC3E}">
+        <p14:creationId xmlns:p14="http://schemas.microsoft.com/office/powerpoint/2010/main" val="2601754529"/>
+      </p:ext>
+    </p:extLst>
+  </p:cSld>
+  <p:clrMapOvr>
+    <a:masterClrMapping/>
+  </p:clrMapOvr>
+  <mc:AlternateContent xmlns:mc="http://schemas.openxmlformats.org/markup-compatibility/2006" xmlns:p14="http://schemas.microsoft.com/office/powerpoint/2010/main">
+    <mc:Choice Requires="p14">
+      <p:transition spd="med" p14:dur="700">
+        <p:fade/>
+      </p:transition>
+    </mc:Choice>
+    <mc:Fallback xmlns="">
+      <p:transition spd="med">
+        <p:fade/>
+      </p:transition>
+    </mc:Fallback>
+  </mc:AlternateContent>
+</p:sld>
+</file>
+
 <file path=ppt/slides/slide2.xml><?xml version="1.0" encoding="utf-8"?>
 <p:sld xmlns:a="http://schemas.openxmlformats.org/drawingml/2006/main" xmlns:r="http://schemas.openxmlformats.org/officeDocument/2006/relationships" xmlns:p="http://schemas.openxmlformats.org/presentationml/2006/main">
   <p:cSld>
@@ -16766,6 +17289,1264 @@
     <p:extLst>
       <p:ext uri="{BB962C8B-B14F-4D97-AF65-F5344CB8AC3E}">
         <p14:creationId xmlns:p14="http://schemas.microsoft.com/office/powerpoint/2010/main" val="2367392682"/>
+      </p:ext>
+    </p:extLst>
+  </p:cSld>
+  <p:clrMapOvr>
+    <a:masterClrMapping/>
+  </p:clrMapOvr>
+  <mc:AlternateContent xmlns:mc="http://schemas.openxmlformats.org/markup-compatibility/2006" xmlns:p14="http://schemas.microsoft.com/office/powerpoint/2010/main">
+    <mc:Choice Requires="p14">
+      <p:transition spd="med" p14:dur="700">
+        <p:fade/>
+      </p:transition>
+    </mc:Choice>
+    <mc:Fallback xmlns="">
+      <p:transition spd="med">
+        <p:fade/>
+      </p:transition>
+    </mc:Fallback>
+  </mc:AlternateContent>
+</p:sld>
+</file>
+
+<file path=ppt/slides/slide20.xml><?xml version="1.0" encoding="utf-8"?>
+<p:sld xmlns:a="http://schemas.openxmlformats.org/drawingml/2006/main" xmlns:r="http://schemas.openxmlformats.org/officeDocument/2006/relationships" xmlns:p="http://schemas.openxmlformats.org/presentationml/2006/main">
+  <p:cSld>
+    <p:spTree>
+      <p:nvGrpSpPr>
+        <p:cNvPr id="1" name=""/>
+        <p:cNvGrpSpPr/>
+        <p:nvPr/>
+      </p:nvGrpSpPr>
+      <p:grpSpPr>
+        <a:xfrm>
+          <a:off x="0" y="0"/>
+          <a:ext cx="0" cy="0"/>
+          <a:chOff x="0" y="0"/>
+          <a:chExt cx="0" cy="0"/>
+        </a:xfrm>
+      </p:grpSpPr>
+      <p:sp>
+        <p:nvSpPr>
+          <p:cNvPr id="3" name="Segnaposto piè di pagina 2">
+            <a:extLst>
+              <a:ext uri="{FF2B5EF4-FFF2-40B4-BE49-F238E27FC236}">
+                <a16:creationId xmlns:a16="http://schemas.microsoft.com/office/drawing/2014/main" id="{ACBC0392-A449-DD19-5455-22BD88D5F610}"/>
+              </a:ext>
+            </a:extLst>
+          </p:cNvPr>
+          <p:cNvSpPr>
+            <a:spLocks noGrp="1"/>
+          </p:cNvSpPr>
+          <p:nvPr>
+            <p:ph type="ftr" sz="quarter" idx="17"/>
+          </p:nvPr>
+        </p:nvSpPr>
+        <p:spPr/>
+        <p:txBody>
+          <a:bodyPr/>
+          <a:lstStyle/>
+          <a:p>
+            <a:pPr rtl="0"/>
+            <a:r>
+              <a:rPr lang="it-IT" noProof="0"/>
+              <a:t>Aggiungere un piè di pagina</a:t>
+            </a:r>
+            <a:endParaRPr lang="it-IT" noProof="0" dirty="0"/>
+          </a:p>
+        </p:txBody>
+      </p:sp>
+      <p:sp>
+        <p:nvSpPr>
+          <p:cNvPr id="4" name="Segnaposto numero diapositiva 3">
+            <a:extLst>
+              <a:ext uri="{FF2B5EF4-FFF2-40B4-BE49-F238E27FC236}">
+                <a16:creationId xmlns:a16="http://schemas.microsoft.com/office/drawing/2014/main" id="{BD428E3B-F9EB-B71D-A4D0-FB83BF670720}"/>
+              </a:ext>
+            </a:extLst>
+          </p:cNvPr>
+          <p:cNvSpPr>
+            <a:spLocks noGrp="1"/>
+          </p:cNvSpPr>
+          <p:nvPr>
+            <p:ph type="sldNum" sz="quarter" idx="18"/>
+          </p:nvPr>
+        </p:nvSpPr>
+        <p:spPr/>
+        <p:txBody>
+          <a:bodyPr/>
+          <a:lstStyle/>
+          <a:p>
+            <a:pPr rtl="0"/>
+            <a:fld id="{8699F50C-BE38-4BD0-BA84-9B090E1F2B9B}" type="slidenum">
+              <a:rPr lang="it-IT" noProof="0" smtClean="0"/>
+              <a:t>20</a:t>
+            </a:fld>
+            <a:endParaRPr lang="it-IT" noProof="0" dirty="0"/>
+          </a:p>
+        </p:txBody>
+      </p:sp>
+      <p:sp>
+        <p:nvSpPr>
+          <p:cNvPr id="5" name="Titolo 4">
+            <a:extLst>
+              <a:ext uri="{FF2B5EF4-FFF2-40B4-BE49-F238E27FC236}">
+                <a16:creationId xmlns:a16="http://schemas.microsoft.com/office/drawing/2014/main" id="{7096C3E5-7585-78DF-317F-8794E408BAAA}"/>
+              </a:ext>
+            </a:extLst>
+          </p:cNvPr>
+          <p:cNvSpPr>
+            <a:spLocks noGrp="1"/>
+          </p:cNvSpPr>
+          <p:nvPr>
+            <p:ph type="title"/>
+          </p:nvPr>
+        </p:nvSpPr>
+        <p:spPr>
+          <a:xfrm>
+            <a:off x="518678" y="209028"/>
+            <a:ext cx="10435072" cy="1497852"/>
+          </a:xfrm>
+        </p:spPr>
+        <p:txBody>
+          <a:bodyPr>
+            <a:normAutofit/>
+          </a:bodyPr>
+          <a:lstStyle/>
+          <a:p>
+            <a:pPr algn="ctr"/>
+            <a:r>
+              <a:rPr lang="it-IT" sz="3600" dirty="0"/>
+              <a:t>Power </a:t>
+            </a:r>
+            <a:r>
+              <a:rPr lang="it-IT" sz="3600" dirty="0" err="1"/>
+              <a:t>consumption</a:t>
+            </a:r>
+            <a:r>
+              <a:rPr lang="it-IT" sz="3600" dirty="0"/>
+              <a:t> with </a:t>
+            </a:r>
+            <a:r>
+              <a:rPr lang="it-IT" sz="3600" dirty="0" err="1"/>
+              <a:t>different</a:t>
+            </a:r>
+            <a:r>
+              <a:rPr lang="it-IT" sz="3600" dirty="0"/>
+              <a:t> outlet pressure in day mode</a:t>
+            </a:r>
+          </a:p>
+        </p:txBody>
+      </p:sp>
+      <p:sp>
+        <p:nvSpPr>
+          <p:cNvPr id="6" name="Segnaposto testo 5">
+            <a:extLst>
+              <a:ext uri="{FF2B5EF4-FFF2-40B4-BE49-F238E27FC236}">
+                <a16:creationId xmlns:a16="http://schemas.microsoft.com/office/drawing/2014/main" id="{B642BB4C-A0FB-4F69-9220-8658910171F1}"/>
+              </a:ext>
+            </a:extLst>
+          </p:cNvPr>
+          <p:cNvSpPr>
+            <a:spLocks noGrp="1"/>
+          </p:cNvSpPr>
+          <p:nvPr>
+            <p:ph type="body" sz="quarter" idx="19"/>
+          </p:nvPr>
+        </p:nvSpPr>
+        <p:spPr>
+          <a:xfrm>
+            <a:off x="518678" y="5352039"/>
+            <a:ext cx="11195802" cy="757742"/>
+          </a:xfrm>
+        </p:spPr>
+        <p:txBody>
+          <a:bodyPr/>
+          <a:lstStyle/>
+          <a:p>
+            <a:r>
+              <a:rPr lang="it-IT" sz="1800" dirty="0"/>
+              <a:t>The</a:t>
+            </a:r>
+            <a:r>
+              <a:rPr lang="it-IT" sz="1600" dirty="0"/>
+              <a:t> </a:t>
+            </a:r>
+            <a:r>
+              <a:rPr lang="it-IT" sz="1800" dirty="0"/>
+              <a:t>higher the reference pressure, the more the pump will be used. As the overall consumption remains the same, I can decrease or increase the pressure reference based on the efficiency of the heater and the pump.</a:t>
+            </a:r>
+          </a:p>
+        </p:txBody>
+      </p:sp>
+      <p:pic>
+        <p:nvPicPr>
+          <p:cNvPr id="9" name="Immagine 8">
+            <a:extLst>
+              <a:ext uri="{FF2B5EF4-FFF2-40B4-BE49-F238E27FC236}">
+                <a16:creationId xmlns:a16="http://schemas.microsoft.com/office/drawing/2014/main" id="{2ADE09C8-1C44-5BCC-7D23-837B6B788A8C}"/>
+              </a:ext>
+            </a:extLst>
+          </p:cNvPr>
+          <p:cNvPicPr>
+            <a:picLocks noChangeAspect="1"/>
+          </p:cNvPicPr>
+          <p:nvPr/>
+        </p:nvPicPr>
+        <p:blipFill>
+          <a:blip r:embed="rId4"/>
+          <a:stretch>
+            <a:fillRect/>
+          </a:stretch>
+        </p:blipFill>
+        <p:spPr>
+          <a:xfrm>
+            <a:off x="294189" y="1648127"/>
+            <a:ext cx="5344612" cy="3289275"/>
+          </a:xfrm>
+          <a:prstGeom prst="rect">
+            <a:avLst/>
+          </a:prstGeom>
+        </p:spPr>
+      </p:pic>
+      <p:pic>
+        <p:nvPicPr>
+          <p:cNvPr id="11" name="Immagine 10">
+            <a:extLst>
+              <a:ext uri="{FF2B5EF4-FFF2-40B4-BE49-F238E27FC236}">
+                <a16:creationId xmlns:a16="http://schemas.microsoft.com/office/drawing/2014/main" id="{7EA66E4F-CF81-A6E5-7B95-F0B014123A79}"/>
+              </a:ext>
+            </a:extLst>
+          </p:cNvPr>
+          <p:cNvPicPr>
+            <a:picLocks noChangeAspect="1"/>
+          </p:cNvPicPr>
+          <p:nvPr/>
+        </p:nvPicPr>
+        <p:blipFill>
+          <a:blip r:embed="rId5"/>
+          <a:stretch>
+            <a:fillRect/>
+          </a:stretch>
+        </p:blipFill>
+        <p:spPr>
+          <a:xfrm>
+            <a:off x="5863290" y="1648127"/>
+            <a:ext cx="5527040" cy="3339364"/>
+          </a:xfrm>
+          <a:prstGeom prst="rect">
+            <a:avLst/>
+          </a:prstGeom>
+        </p:spPr>
+      </p:pic>
+      <p:pic>
+        <p:nvPicPr>
+          <p:cNvPr id="10" name="Picture 9" descr="\documentclass{article}&#10;\usepackage{amsmath}&#10;\pagestyle{empty}&#10;\begin{document}&#10;\begin{equation*}&#10;\Delta p^o = 1 \, bar&#10;\end{equation*}&#10;\end{document}" title="IguanaTex Bitmap Display">
+            <a:extLst>
+              <a:ext uri="{FF2B5EF4-FFF2-40B4-BE49-F238E27FC236}">
+                <a16:creationId xmlns:a16="http://schemas.microsoft.com/office/drawing/2014/main" id="{04C9E87F-765E-7F0D-899C-479662D02B18}"/>
+              </a:ext>
+            </a:extLst>
+          </p:cNvPr>
+          <p:cNvPicPr>
+            <a:picLocks noChangeAspect="1"/>
+          </p:cNvPicPr>
+          <p:nvPr>
+            <p:custDataLst>
+              <p:tags r:id="rId1"/>
+            </p:custDataLst>
+          </p:nvPr>
+        </p:nvPicPr>
+        <p:blipFill>
+          <a:blip r:embed="rId6"/>
+          <a:stretch>
+            <a:fillRect/>
+          </a:stretch>
+        </p:blipFill>
+        <p:spPr>
+          <a:xfrm>
+            <a:off x="4050019" y="2121517"/>
+            <a:ext cx="1298286" cy="231619"/>
+          </a:xfrm>
+          <a:prstGeom prst="rect">
+            <a:avLst/>
+          </a:prstGeom>
+        </p:spPr>
+      </p:pic>
+      <p:pic>
+        <p:nvPicPr>
+          <p:cNvPr id="14" name="Picture 13" descr="\documentclass{article}&#10;\usepackage{amsmath}&#10;\pagestyle{empty}&#10;\begin{document}&#10;\begin{equation*}&#10;\Delta p^o = 3 \, bar&#10;\end{equation*}&#10;\end{document}" title="IguanaTex Bitmap Display">
+            <a:extLst>
+              <a:ext uri="{FF2B5EF4-FFF2-40B4-BE49-F238E27FC236}">
+                <a16:creationId xmlns:a16="http://schemas.microsoft.com/office/drawing/2014/main" id="{BBD96118-2100-D539-D62B-C28E6C68C372}"/>
+              </a:ext>
+            </a:extLst>
+          </p:cNvPr>
+          <p:cNvPicPr>
+            <a:picLocks noChangeAspect="1"/>
+          </p:cNvPicPr>
+          <p:nvPr>
+            <p:custDataLst>
+              <p:tags r:id="rId2"/>
+            </p:custDataLst>
+          </p:nvPr>
+        </p:nvPicPr>
+        <p:blipFill>
+          <a:blip r:embed="rId7"/>
+          <a:stretch>
+            <a:fillRect/>
+          </a:stretch>
+        </p:blipFill>
+        <p:spPr>
+          <a:xfrm>
+            <a:off x="9848685" y="2121517"/>
+            <a:ext cx="1298286" cy="231619"/>
+          </a:xfrm>
+          <a:prstGeom prst="rect">
+            <a:avLst/>
+          </a:prstGeom>
+        </p:spPr>
+      </p:pic>
+    </p:spTree>
+    <p:extLst>
+      <p:ext uri="{BB962C8B-B14F-4D97-AF65-F5344CB8AC3E}">
+        <p14:creationId xmlns:p14="http://schemas.microsoft.com/office/powerpoint/2010/main" val="1003796257"/>
+      </p:ext>
+    </p:extLst>
+  </p:cSld>
+  <p:clrMapOvr>
+    <a:masterClrMapping/>
+  </p:clrMapOvr>
+  <mc:AlternateContent xmlns:mc="http://schemas.openxmlformats.org/markup-compatibility/2006" xmlns:p14="http://schemas.microsoft.com/office/powerpoint/2010/main">
+    <mc:Choice Requires="p14">
+      <p:transition spd="med" p14:dur="700">
+        <p:fade/>
+      </p:transition>
+    </mc:Choice>
+    <mc:Fallback xmlns="">
+      <p:transition spd="med">
+        <p:fade/>
+      </p:transition>
+    </mc:Fallback>
+  </mc:AlternateContent>
+</p:sld>
+</file>
+
+<file path=ppt/slides/slide21.xml><?xml version="1.0" encoding="utf-8"?>
+<p:sld xmlns:a="http://schemas.openxmlformats.org/drawingml/2006/main" xmlns:r="http://schemas.openxmlformats.org/officeDocument/2006/relationships" xmlns:p="http://schemas.openxmlformats.org/presentationml/2006/main">
+  <p:cSld>
+    <p:spTree>
+      <p:nvGrpSpPr>
+        <p:cNvPr id="1" name=""/>
+        <p:cNvGrpSpPr/>
+        <p:nvPr/>
+      </p:nvGrpSpPr>
+      <p:grpSpPr>
+        <a:xfrm>
+          <a:off x="0" y="0"/>
+          <a:ext cx="0" cy="0"/>
+          <a:chOff x="0" y="0"/>
+          <a:chExt cx="0" cy="0"/>
+        </a:xfrm>
+      </p:grpSpPr>
+      <p:sp>
+        <p:nvSpPr>
+          <p:cNvPr id="3" name="Segnaposto piè di pagina 2">
+            <a:extLst>
+              <a:ext uri="{FF2B5EF4-FFF2-40B4-BE49-F238E27FC236}">
+                <a16:creationId xmlns:a16="http://schemas.microsoft.com/office/drawing/2014/main" id="{127FAE9C-4E5A-44B2-7485-E2B1DBC18D5D}"/>
+              </a:ext>
+            </a:extLst>
+          </p:cNvPr>
+          <p:cNvSpPr>
+            <a:spLocks noGrp="1"/>
+          </p:cNvSpPr>
+          <p:nvPr>
+            <p:ph type="ftr" sz="quarter" idx="17"/>
+          </p:nvPr>
+        </p:nvSpPr>
+        <p:spPr/>
+        <p:txBody>
+          <a:bodyPr/>
+          <a:lstStyle/>
+          <a:p>
+            <a:pPr rtl="0"/>
+            <a:r>
+              <a:rPr lang="it-IT" noProof="0" dirty="0"/>
+              <a:t>Aggiungere un piè di pagina</a:t>
+            </a:r>
+          </a:p>
+        </p:txBody>
+      </p:sp>
+      <p:sp>
+        <p:nvSpPr>
+          <p:cNvPr id="4" name="Segnaposto numero diapositiva 3">
+            <a:extLst>
+              <a:ext uri="{FF2B5EF4-FFF2-40B4-BE49-F238E27FC236}">
+                <a16:creationId xmlns:a16="http://schemas.microsoft.com/office/drawing/2014/main" id="{191DB7C2-72B3-855C-92E6-A0BEB5E79C9C}"/>
+              </a:ext>
+            </a:extLst>
+          </p:cNvPr>
+          <p:cNvSpPr>
+            <a:spLocks noGrp="1"/>
+          </p:cNvSpPr>
+          <p:nvPr>
+            <p:ph type="sldNum" sz="quarter" idx="18"/>
+          </p:nvPr>
+        </p:nvSpPr>
+        <p:spPr/>
+        <p:txBody>
+          <a:bodyPr/>
+          <a:lstStyle/>
+          <a:p>
+            <a:pPr rtl="0"/>
+            <a:fld id="{8699F50C-BE38-4BD0-BA84-9B090E1F2B9B}" type="slidenum">
+              <a:rPr lang="it-IT" noProof="0" smtClean="0"/>
+              <a:t>21</a:t>
+            </a:fld>
+            <a:endParaRPr lang="it-IT" noProof="0" dirty="0"/>
+          </a:p>
+        </p:txBody>
+      </p:sp>
+      <p:sp>
+        <p:nvSpPr>
+          <p:cNvPr id="5" name="Titolo 4">
+            <a:extLst>
+              <a:ext uri="{FF2B5EF4-FFF2-40B4-BE49-F238E27FC236}">
+                <a16:creationId xmlns:a16="http://schemas.microsoft.com/office/drawing/2014/main" id="{1351CB6A-E4AE-F8BF-6913-5BEB470DFDD7}"/>
+              </a:ext>
+            </a:extLst>
+          </p:cNvPr>
+          <p:cNvSpPr>
+            <a:spLocks noGrp="1"/>
+          </p:cNvSpPr>
+          <p:nvPr>
+            <p:ph type="title"/>
+          </p:nvPr>
+        </p:nvSpPr>
+        <p:spPr>
+          <a:xfrm>
+            <a:off x="518678" y="209028"/>
+            <a:ext cx="10435072" cy="1000647"/>
+          </a:xfrm>
+        </p:spPr>
+        <p:txBody>
+          <a:bodyPr>
+            <a:normAutofit/>
+          </a:bodyPr>
+          <a:lstStyle/>
+          <a:p>
+            <a:r>
+              <a:rPr lang="it-IT" sz="3600" dirty="0" err="1"/>
+              <a:t>Comparison</a:t>
+            </a:r>
+            <a:r>
+              <a:rPr lang="it-IT" sz="3600" dirty="0"/>
+              <a:t> of </a:t>
+            </a:r>
+            <a:r>
+              <a:rPr lang="it-IT" sz="3600" dirty="0" err="1"/>
+              <a:t>different</a:t>
+            </a:r>
+            <a:r>
+              <a:rPr lang="it-IT" sz="3600" dirty="0"/>
+              <a:t> </a:t>
+            </a:r>
+            <a:r>
+              <a:rPr lang="it-IT" sz="3600" dirty="0" err="1"/>
+              <a:t>reference</a:t>
+            </a:r>
+            <a:r>
+              <a:rPr lang="it-IT" sz="3600" dirty="0"/>
+              <a:t> </a:t>
+            </a:r>
+            <a:r>
+              <a:rPr lang="it-IT" sz="3600" dirty="0" err="1"/>
+              <a:t>values</a:t>
+            </a:r>
+            <a:r>
+              <a:rPr lang="it-IT" sz="3600" dirty="0"/>
+              <a:t> in day mode</a:t>
+            </a:r>
+          </a:p>
+        </p:txBody>
+      </p:sp>
+      <p:sp>
+        <p:nvSpPr>
+          <p:cNvPr id="6" name="Segnaposto testo 5">
+            <a:extLst>
+              <a:ext uri="{FF2B5EF4-FFF2-40B4-BE49-F238E27FC236}">
+                <a16:creationId xmlns:a16="http://schemas.microsoft.com/office/drawing/2014/main" id="{C0E8B029-14A1-4D00-1E22-77C22EB834AE}"/>
+              </a:ext>
+            </a:extLst>
+          </p:cNvPr>
+          <p:cNvSpPr>
+            <a:spLocks noGrp="1"/>
+          </p:cNvSpPr>
+          <p:nvPr>
+            <p:ph type="body" sz="quarter" idx="19"/>
+          </p:nvPr>
+        </p:nvSpPr>
+        <p:spPr>
+          <a:xfrm>
+            <a:off x="531814" y="5483224"/>
+            <a:ext cx="10898186" cy="708025"/>
+          </a:xfrm>
+        </p:spPr>
+        <p:txBody>
+          <a:bodyPr/>
+          <a:lstStyle/>
+          <a:p>
+            <a:r>
+              <a:rPr lang="it-IT" sz="1800" dirty="0"/>
+              <a:t>Modifying the pressure and outlet temperature references I don’t change the room temperature dynamics. I only have a small reduction of the amplitude of oscillations in the case I operate at higher pressure. It is not advisable therefore to operate at higher fluid temperatures because I don’t have consistent advantages.</a:t>
+            </a:r>
+          </a:p>
+        </p:txBody>
+      </p:sp>
+      <p:pic>
+        <p:nvPicPr>
+          <p:cNvPr id="9" name="Immagine 8">
+            <a:extLst>
+              <a:ext uri="{FF2B5EF4-FFF2-40B4-BE49-F238E27FC236}">
+                <a16:creationId xmlns:a16="http://schemas.microsoft.com/office/drawing/2014/main" id="{BF15D188-5F90-3A70-0C01-BCB4658582C5}"/>
+              </a:ext>
+            </a:extLst>
+          </p:cNvPr>
+          <p:cNvPicPr>
+            <a:picLocks noChangeAspect="1"/>
+          </p:cNvPicPr>
+          <p:nvPr/>
+        </p:nvPicPr>
+        <p:blipFill>
+          <a:blip r:embed="rId4"/>
+          <a:stretch>
+            <a:fillRect/>
+          </a:stretch>
+        </p:blipFill>
+        <p:spPr>
+          <a:xfrm>
+            <a:off x="518678" y="1374776"/>
+            <a:ext cx="4948672" cy="3511549"/>
+          </a:xfrm>
+          <a:prstGeom prst="rect">
+            <a:avLst/>
+          </a:prstGeom>
+        </p:spPr>
+      </p:pic>
+      <p:pic>
+        <p:nvPicPr>
+          <p:cNvPr id="11" name="Immagine 10">
+            <a:extLst>
+              <a:ext uri="{FF2B5EF4-FFF2-40B4-BE49-F238E27FC236}">
+                <a16:creationId xmlns:a16="http://schemas.microsoft.com/office/drawing/2014/main" id="{728F5374-4441-9CC9-ACBB-F973280BA474}"/>
+              </a:ext>
+            </a:extLst>
+          </p:cNvPr>
+          <p:cNvPicPr>
+            <a:picLocks noChangeAspect="1"/>
+          </p:cNvPicPr>
+          <p:nvPr/>
+        </p:nvPicPr>
+        <p:blipFill>
+          <a:blip r:embed="rId5"/>
+          <a:stretch>
+            <a:fillRect/>
+          </a:stretch>
+        </p:blipFill>
+        <p:spPr>
+          <a:xfrm>
+            <a:off x="5736214" y="1572039"/>
+            <a:ext cx="4867275" cy="3314286"/>
+          </a:xfrm>
+          <a:prstGeom prst="rect">
+            <a:avLst/>
+          </a:prstGeom>
+        </p:spPr>
+      </p:pic>
+      <p:pic>
+        <p:nvPicPr>
+          <p:cNvPr id="8" name="Picture 7" descr="\documentclass{article}&#10;\usepackage{amsmath}&#10;\pagestyle{empty}&#10;\begin{document}&#10;\begin{equation*}&#10;\Delta p^o = 1 \, bar&#10;\end{equation*}&#10;\end{document}" title="IguanaTex Bitmap Display">
+            <a:extLst>
+              <a:ext uri="{FF2B5EF4-FFF2-40B4-BE49-F238E27FC236}">
+                <a16:creationId xmlns:a16="http://schemas.microsoft.com/office/drawing/2014/main" id="{395A2E64-B2F8-581C-2D19-B1ECDD568F26}"/>
+              </a:ext>
+            </a:extLst>
+          </p:cNvPr>
+          <p:cNvPicPr>
+            <a:picLocks noChangeAspect="1"/>
+          </p:cNvPicPr>
+          <p:nvPr>
+            <p:custDataLst>
+              <p:tags r:id="rId1"/>
+            </p:custDataLst>
+          </p:nvPr>
+        </p:nvPicPr>
+        <p:blipFill>
+          <a:blip r:embed="rId6"/>
+          <a:stretch>
+            <a:fillRect/>
+          </a:stretch>
+        </p:blipFill>
+        <p:spPr>
+          <a:xfrm>
+            <a:off x="3804187" y="3748981"/>
+            <a:ext cx="1298286" cy="231619"/>
+          </a:xfrm>
+          <a:prstGeom prst="rect">
+            <a:avLst/>
+          </a:prstGeom>
+        </p:spPr>
+      </p:pic>
+      <p:pic>
+        <p:nvPicPr>
+          <p:cNvPr id="10" name="Picture 9" descr="\documentclass{article}&#10;\usepackage{amsmath}&#10;\pagestyle{empty}&#10;\begin{document}&#10;\begin{equation*}&#10;\Delta p^o = 3 \, bar&#10;\end{equation*}&#10;\end{document}" title="IguanaTex Bitmap Display">
+            <a:extLst>
+              <a:ext uri="{FF2B5EF4-FFF2-40B4-BE49-F238E27FC236}">
+                <a16:creationId xmlns:a16="http://schemas.microsoft.com/office/drawing/2014/main" id="{FDDD51E8-DB81-B665-2410-79D0090CC966}"/>
+              </a:ext>
+            </a:extLst>
+          </p:cNvPr>
+          <p:cNvPicPr>
+            <a:picLocks noChangeAspect="1"/>
+          </p:cNvPicPr>
+          <p:nvPr>
+            <p:custDataLst>
+              <p:tags r:id="rId2"/>
+            </p:custDataLst>
+          </p:nvPr>
+        </p:nvPicPr>
+        <p:blipFill>
+          <a:blip r:embed="rId7"/>
+          <a:stretch>
+            <a:fillRect/>
+          </a:stretch>
+        </p:blipFill>
+        <p:spPr>
+          <a:xfrm>
+            <a:off x="9127232" y="3748981"/>
+            <a:ext cx="1298286" cy="231619"/>
+          </a:xfrm>
+          <a:prstGeom prst="rect">
+            <a:avLst/>
+          </a:prstGeom>
+        </p:spPr>
+      </p:pic>
+    </p:spTree>
+    <p:extLst>
+      <p:ext uri="{BB962C8B-B14F-4D97-AF65-F5344CB8AC3E}">
+        <p14:creationId xmlns:p14="http://schemas.microsoft.com/office/powerpoint/2010/main" val="719467809"/>
+      </p:ext>
+    </p:extLst>
+  </p:cSld>
+  <p:clrMapOvr>
+    <a:masterClrMapping/>
+  </p:clrMapOvr>
+  <mc:AlternateContent xmlns:mc="http://schemas.openxmlformats.org/markup-compatibility/2006" xmlns:p14="http://schemas.microsoft.com/office/powerpoint/2010/main">
+    <mc:Choice Requires="p14">
+      <p:transition spd="med" p14:dur="700">
+        <p:fade/>
+      </p:transition>
+    </mc:Choice>
+    <mc:Fallback xmlns="">
+      <p:transition spd="med">
+        <p:fade/>
+      </p:transition>
+    </mc:Fallback>
+  </mc:AlternateContent>
+</p:sld>
+</file>
+
+<file path=ppt/slides/slide22.xml><?xml version="1.0" encoding="utf-8"?>
+<p:sld xmlns:a="http://schemas.openxmlformats.org/drawingml/2006/main" xmlns:r="http://schemas.openxmlformats.org/officeDocument/2006/relationships" xmlns:p="http://schemas.openxmlformats.org/presentationml/2006/main">
+  <p:cSld>
+    <p:spTree>
+      <p:nvGrpSpPr>
+        <p:cNvPr id="1" name=""/>
+        <p:cNvGrpSpPr/>
+        <p:nvPr/>
+      </p:nvGrpSpPr>
+      <p:grpSpPr>
+        <a:xfrm>
+          <a:off x="0" y="0"/>
+          <a:ext cx="0" cy="0"/>
+          <a:chOff x="0" y="0"/>
+          <a:chExt cx="0" cy="0"/>
+        </a:xfrm>
+      </p:grpSpPr>
+      <p:sp>
+        <p:nvSpPr>
+          <p:cNvPr id="3" name="Segnaposto piè di pagina 2">
+            <a:extLst>
+              <a:ext uri="{FF2B5EF4-FFF2-40B4-BE49-F238E27FC236}">
+                <a16:creationId xmlns:a16="http://schemas.microsoft.com/office/drawing/2014/main" id="{75CEE3CA-029A-E4C7-4671-951CC53E6AD7}"/>
+              </a:ext>
+            </a:extLst>
+          </p:cNvPr>
+          <p:cNvSpPr>
+            <a:spLocks noGrp="1"/>
+          </p:cNvSpPr>
+          <p:nvPr>
+            <p:ph type="ftr" sz="quarter" idx="17"/>
+          </p:nvPr>
+        </p:nvSpPr>
+        <p:spPr/>
+        <p:txBody>
+          <a:bodyPr/>
+          <a:lstStyle/>
+          <a:p>
+            <a:pPr rtl="0"/>
+            <a:r>
+              <a:rPr lang="it-IT" noProof="0" dirty="0"/>
+              <a:t>Aggiungere un piè di pagina</a:t>
+            </a:r>
+          </a:p>
+        </p:txBody>
+      </p:sp>
+      <p:sp>
+        <p:nvSpPr>
+          <p:cNvPr id="4" name="Segnaposto numero diapositiva 3">
+            <a:extLst>
+              <a:ext uri="{FF2B5EF4-FFF2-40B4-BE49-F238E27FC236}">
+                <a16:creationId xmlns:a16="http://schemas.microsoft.com/office/drawing/2014/main" id="{9477162B-BD6B-EF7E-E4D8-483519E4C2EE}"/>
+              </a:ext>
+            </a:extLst>
+          </p:cNvPr>
+          <p:cNvSpPr>
+            <a:spLocks noGrp="1"/>
+          </p:cNvSpPr>
+          <p:nvPr>
+            <p:ph type="sldNum" sz="quarter" idx="18"/>
+          </p:nvPr>
+        </p:nvSpPr>
+        <p:spPr/>
+        <p:txBody>
+          <a:bodyPr/>
+          <a:lstStyle/>
+          <a:p>
+            <a:pPr rtl="0"/>
+            <a:fld id="{8699F50C-BE38-4BD0-BA84-9B090E1F2B9B}" type="slidenum">
+              <a:rPr lang="it-IT" noProof="0" smtClean="0"/>
+              <a:t>22</a:t>
+            </a:fld>
+            <a:endParaRPr lang="it-IT" noProof="0" dirty="0"/>
+          </a:p>
+        </p:txBody>
+      </p:sp>
+      <p:sp>
+        <p:nvSpPr>
+          <p:cNvPr id="5" name="Titolo 4">
+            <a:extLst>
+              <a:ext uri="{FF2B5EF4-FFF2-40B4-BE49-F238E27FC236}">
+                <a16:creationId xmlns:a16="http://schemas.microsoft.com/office/drawing/2014/main" id="{97942E0A-E5D1-8CCF-308E-D82760195ED3}"/>
+              </a:ext>
+            </a:extLst>
+          </p:cNvPr>
+          <p:cNvSpPr>
+            <a:spLocks noGrp="1"/>
+          </p:cNvSpPr>
+          <p:nvPr>
+            <p:ph type="title"/>
+          </p:nvPr>
+        </p:nvSpPr>
+        <p:spPr>
+          <a:xfrm>
+            <a:off x="518676" y="136526"/>
+            <a:ext cx="10840017" cy="1602536"/>
+          </a:xfrm>
+        </p:spPr>
+        <p:txBody>
+          <a:bodyPr>
+            <a:normAutofit/>
+          </a:bodyPr>
+          <a:lstStyle/>
+          <a:p>
+            <a:r>
+              <a:rPr lang="it-IT" sz="3600" dirty="0"/>
+              <a:t>Power consumption with different outlet temperatures in day/night mode</a:t>
+            </a:r>
+          </a:p>
+        </p:txBody>
+      </p:sp>
+      <p:sp>
+        <p:nvSpPr>
+          <p:cNvPr id="6" name="Segnaposto testo 5">
+            <a:extLst>
+              <a:ext uri="{FF2B5EF4-FFF2-40B4-BE49-F238E27FC236}">
+                <a16:creationId xmlns:a16="http://schemas.microsoft.com/office/drawing/2014/main" id="{01C64ADB-39BD-ABFB-2041-0B4318133C29}"/>
+              </a:ext>
+            </a:extLst>
+          </p:cNvPr>
+          <p:cNvSpPr>
+            <a:spLocks noGrp="1"/>
+          </p:cNvSpPr>
+          <p:nvPr>
+            <p:ph type="body" sz="quarter" idx="19"/>
+          </p:nvPr>
+        </p:nvSpPr>
+        <p:spPr>
+          <a:xfrm>
+            <a:off x="531813" y="5362574"/>
+            <a:ext cx="11129721" cy="581025"/>
+          </a:xfrm>
+        </p:spPr>
+        <p:txBody>
+          <a:bodyPr/>
+          <a:lstStyle/>
+          <a:p>
+            <a:r>
+              <a:rPr lang="it-IT" sz="1800" dirty="0"/>
+              <a:t>The same behavior can also be observed in the day/night mode. The only difference with the previous case is that the same increment of the fluid temperature produces now a higher average power increase: 12% compared to a 10.7% increase in the day mode.</a:t>
+            </a:r>
+          </a:p>
+        </p:txBody>
+      </p:sp>
+      <p:pic>
+        <p:nvPicPr>
+          <p:cNvPr id="9" name="Immagine 8">
+            <a:extLst>
+              <a:ext uri="{FF2B5EF4-FFF2-40B4-BE49-F238E27FC236}">
+                <a16:creationId xmlns:a16="http://schemas.microsoft.com/office/drawing/2014/main" id="{96FC68D7-63FE-0AB2-DFEB-0B2AE443CF73}"/>
+              </a:ext>
+            </a:extLst>
+          </p:cNvPr>
+          <p:cNvPicPr>
+            <a:picLocks noChangeAspect="1"/>
+          </p:cNvPicPr>
+          <p:nvPr/>
+        </p:nvPicPr>
+        <p:blipFill>
+          <a:blip r:embed="rId4"/>
+          <a:stretch>
+            <a:fillRect/>
+          </a:stretch>
+        </p:blipFill>
+        <p:spPr>
+          <a:xfrm>
+            <a:off x="518677" y="1826464"/>
+            <a:ext cx="5571429" cy="3314286"/>
+          </a:xfrm>
+          <a:prstGeom prst="rect">
+            <a:avLst/>
+          </a:prstGeom>
+        </p:spPr>
+      </p:pic>
+      <p:pic>
+        <p:nvPicPr>
+          <p:cNvPr id="13" name="Immagine 12">
+            <a:extLst>
+              <a:ext uri="{FF2B5EF4-FFF2-40B4-BE49-F238E27FC236}">
+                <a16:creationId xmlns:a16="http://schemas.microsoft.com/office/drawing/2014/main" id="{5076AE8A-F4B8-E252-E7B5-78B1C4D0B929}"/>
+              </a:ext>
+            </a:extLst>
+          </p:cNvPr>
+          <p:cNvPicPr>
+            <a:picLocks noChangeAspect="1"/>
+          </p:cNvPicPr>
+          <p:nvPr/>
+        </p:nvPicPr>
+        <p:blipFill>
+          <a:blip r:embed="rId5"/>
+          <a:stretch>
+            <a:fillRect/>
+          </a:stretch>
+        </p:blipFill>
+        <p:spPr>
+          <a:xfrm>
+            <a:off x="6177310" y="1804653"/>
+            <a:ext cx="5571429" cy="3314286"/>
+          </a:xfrm>
+          <a:prstGeom prst="rect">
+            <a:avLst/>
+          </a:prstGeom>
+        </p:spPr>
+      </p:pic>
+      <p:pic>
+        <p:nvPicPr>
+          <p:cNvPr id="8" name="Picture 7" descr="\documentclass{article}&#10;\usepackage{amsmath}&#10;\pagestyle{empty}&#10;\begin{document}&#10;\begin{equation*}&#10;T^o=40^{\circ}C&#10;\end{equation*}&#10;\end{document}" title="IguanaTex Bitmap Display">
+            <a:extLst>
+              <a:ext uri="{FF2B5EF4-FFF2-40B4-BE49-F238E27FC236}">
+                <a16:creationId xmlns:a16="http://schemas.microsoft.com/office/drawing/2014/main" id="{13C86144-A422-097F-5ABC-33BB14716837}"/>
+              </a:ext>
+            </a:extLst>
+          </p:cNvPr>
+          <p:cNvPicPr>
+            <a:picLocks noChangeAspect="1"/>
+          </p:cNvPicPr>
+          <p:nvPr>
+            <p:custDataLst>
+              <p:tags r:id="rId1"/>
+            </p:custDataLst>
+          </p:nvPr>
+        </p:nvPicPr>
+        <p:blipFill>
+          <a:blip r:embed="rId6"/>
+          <a:stretch>
+            <a:fillRect/>
+          </a:stretch>
+        </p:blipFill>
+        <p:spPr>
+          <a:xfrm>
+            <a:off x="4642729" y="2384594"/>
+            <a:ext cx="1190095" cy="193524"/>
+          </a:xfrm>
+          <a:prstGeom prst="rect">
+            <a:avLst/>
+          </a:prstGeom>
+        </p:spPr>
+      </p:pic>
+      <p:pic>
+        <p:nvPicPr>
+          <p:cNvPr id="10" name="Picture 9" descr="\documentclass{article}&#10;\usepackage{amsmath}&#10;\pagestyle{empty}&#10;\begin{document}&#10;\begin{equation*}&#10;T^o=50^{\circ}C&#10;\end{equation*}&#10;\end{document}" title="IguanaTex Bitmap Display">
+            <a:extLst>
+              <a:ext uri="{FF2B5EF4-FFF2-40B4-BE49-F238E27FC236}">
+                <a16:creationId xmlns:a16="http://schemas.microsoft.com/office/drawing/2014/main" id="{9A027BDD-6CB9-D42A-07C7-8DB97BD6BC92}"/>
+              </a:ext>
+            </a:extLst>
+          </p:cNvPr>
+          <p:cNvPicPr>
+            <a:picLocks noChangeAspect="1"/>
+          </p:cNvPicPr>
+          <p:nvPr>
+            <p:custDataLst>
+              <p:tags r:id="rId2"/>
+            </p:custDataLst>
+          </p:nvPr>
+        </p:nvPicPr>
+        <p:blipFill>
+          <a:blip r:embed="rId7"/>
+          <a:stretch>
+            <a:fillRect/>
+          </a:stretch>
+        </p:blipFill>
+        <p:spPr>
+          <a:xfrm>
+            <a:off x="10326989" y="2384594"/>
+            <a:ext cx="1190095" cy="193524"/>
+          </a:xfrm>
+          <a:prstGeom prst="rect">
+            <a:avLst/>
+          </a:prstGeom>
+        </p:spPr>
+      </p:pic>
+    </p:spTree>
+    <p:extLst>
+      <p:ext uri="{BB962C8B-B14F-4D97-AF65-F5344CB8AC3E}">
+        <p14:creationId xmlns:p14="http://schemas.microsoft.com/office/powerpoint/2010/main" val="3671401032"/>
+      </p:ext>
+    </p:extLst>
+  </p:cSld>
+  <p:clrMapOvr>
+    <a:masterClrMapping/>
+  </p:clrMapOvr>
+  <mc:AlternateContent xmlns:mc="http://schemas.openxmlformats.org/markup-compatibility/2006" xmlns:p14="http://schemas.microsoft.com/office/powerpoint/2010/main">
+    <mc:Choice Requires="p14">
+      <p:transition spd="med" p14:dur="700">
+        <p:fade/>
+      </p:transition>
+    </mc:Choice>
+    <mc:Fallback xmlns="">
+      <p:transition spd="med">
+        <p:fade/>
+      </p:transition>
+    </mc:Fallback>
+  </mc:AlternateContent>
+</p:sld>
+</file>
+
+<file path=ppt/slides/slide23.xml><?xml version="1.0" encoding="utf-8"?>
+<p:sld xmlns:a="http://schemas.openxmlformats.org/drawingml/2006/main" xmlns:r="http://schemas.openxmlformats.org/officeDocument/2006/relationships" xmlns:p="http://schemas.openxmlformats.org/presentationml/2006/main">
+  <p:cSld>
+    <p:spTree>
+      <p:nvGrpSpPr>
+        <p:cNvPr id="1" name=""/>
+        <p:cNvGrpSpPr/>
+        <p:nvPr/>
+      </p:nvGrpSpPr>
+      <p:grpSpPr>
+        <a:xfrm>
+          <a:off x="0" y="0"/>
+          <a:ext cx="0" cy="0"/>
+          <a:chOff x="0" y="0"/>
+          <a:chExt cx="0" cy="0"/>
+        </a:xfrm>
+      </p:grpSpPr>
+      <p:sp>
+        <p:nvSpPr>
+          <p:cNvPr id="3" name="Segnaposto piè di pagina 2">
+            <a:extLst>
+              <a:ext uri="{FF2B5EF4-FFF2-40B4-BE49-F238E27FC236}">
+                <a16:creationId xmlns:a16="http://schemas.microsoft.com/office/drawing/2014/main" id="{40DA9E81-8302-ACF8-0225-335F0205CE43}"/>
+              </a:ext>
+            </a:extLst>
+          </p:cNvPr>
+          <p:cNvSpPr>
+            <a:spLocks noGrp="1"/>
+          </p:cNvSpPr>
+          <p:nvPr>
+            <p:ph type="ftr" sz="quarter" idx="17"/>
+          </p:nvPr>
+        </p:nvSpPr>
+        <p:spPr/>
+        <p:txBody>
+          <a:bodyPr/>
+          <a:lstStyle/>
+          <a:p>
+            <a:pPr rtl="0"/>
+            <a:r>
+              <a:rPr lang="it-IT" noProof="0" dirty="0"/>
+              <a:t>Aggiungere un piè di pagina</a:t>
+            </a:r>
+          </a:p>
+        </p:txBody>
+      </p:sp>
+      <p:sp>
+        <p:nvSpPr>
+          <p:cNvPr id="4" name="Segnaposto numero diapositiva 3">
+            <a:extLst>
+              <a:ext uri="{FF2B5EF4-FFF2-40B4-BE49-F238E27FC236}">
+                <a16:creationId xmlns:a16="http://schemas.microsoft.com/office/drawing/2014/main" id="{5D4309CA-12AE-A66E-86CC-7FFC4EDD29C7}"/>
+              </a:ext>
+            </a:extLst>
+          </p:cNvPr>
+          <p:cNvSpPr>
+            <a:spLocks noGrp="1"/>
+          </p:cNvSpPr>
+          <p:nvPr>
+            <p:ph type="sldNum" sz="quarter" idx="18"/>
+          </p:nvPr>
+        </p:nvSpPr>
+        <p:spPr/>
+        <p:txBody>
+          <a:bodyPr/>
+          <a:lstStyle/>
+          <a:p>
+            <a:pPr rtl="0"/>
+            <a:fld id="{8699F50C-BE38-4BD0-BA84-9B090E1F2B9B}" type="slidenum">
+              <a:rPr lang="it-IT" noProof="0" smtClean="0"/>
+              <a:t>23</a:t>
+            </a:fld>
+            <a:endParaRPr lang="it-IT" noProof="0" dirty="0"/>
+          </a:p>
+        </p:txBody>
+      </p:sp>
+      <p:sp>
+        <p:nvSpPr>
+          <p:cNvPr id="5" name="Titolo 4">
+            <a:extLst>
+              <a:ext uri="{FF2B5EF4-FFF2-40B4-BE49-F238E27FC236}">
+                <a16:creationId xmlns:a16="http://schemas.microsoft.com/office/drawing/2014/main" id="{D4093925-7FB1-5E1F-15EE-A673F6FFDA15}"/>
+              </a:ext>
+            </a:extLst>
+          </p:cNvPr>
+          <p:cNvSpPr>
+            <a:spLocks noGrp="1"/>
+          </p:cNvSpPr>
+          <p:nvPr>
+            <p:ph type="title"/>
+          </p:nvPr>
+        </p:nvSpPr>
+        <p:spPr>
+          <a:xfrm>
+            <a:off x="518677" y="767768"/>
+            <a:ext cx="10482697" cy="851482"/>
+          </a:xfrm>
+        </p:spPr>
+        <p:txBody>
+          <a:bodyPr>
+            <a:normAutofit fontScale="90000"/>
+          </a:bodyPr>
+          <a:lstStyle/>
+          <a:p>
+            <a:r>
+              <a:rPr lang="it-IT" sz="3600" dirty="0"/>
+              <a:t>Power </a:t>
+            </a:r>
+            <a:r>
+              <a:rPr lang="it-IT" sz="3600" dirty="0" err="1"/>
+              <a:t>consumption</a:t>
+            </a:r>
+            <a:r>
+              <a:rPr lang="it-IT" sz="3600" dirty="0"/>
+              <a:t> with </a:t>
+            </a:r>
+            <a:r>
+              <a:rPr lang="it-IT" sz="3600" dirty="0" err="1"/>
+              <a:t>different</a:t>
+            </a:r>
+            <a:r>
+              <a:rPr lang="it-IT" sz="3600" dirty="0"/>
+              <a:t> outlet pressure in day/night mode</a:t>
+            </a:r>
+          </a:p>
+        </p:txBody>
+      </p:sp>
+      <p:sp>
+        <p:nvSpPr>
+          <p:cNvPr id="6" name="Segnaposto testo 5">
+            <a:extLst>
+              <a:ext uri="{FF2B5EF4-FFF2-40B4-BE49-F238E27FC236}">
+                <a16:creationId xmlns:a16="http://schemas.microsoft.com/office/drawing/2014/main" id="{5D9566AB-7F37-B9D0-5E5F-982F275C1DC1}"/>
+              </a:ext>
+            </a:extLst>
+          </p:cNvPr>
+          <p:cNvSpPr>
+            <a:spLocks noGrp="1"/>
+          </p:cNvSpPr>
+          <p:nvPr>
+            <p:ph type="body" sz="quarter" idx="19"/>
+          </p:nvPr>
+        </p:nvSpPr>
+        <p:spPr>
+          <a:xfrm>
+            <a:off x="531813" y="5324474"/>
+            <a:ext cx="10615157" cy="765175"/>
+          </a:xfrm>
+        </p:spPr>
+        <p:txBody>
+          <a:bodyPr/>
+          <a:lstStyle/>
+          <a:p>
+            <a:r>
+              <a:rPr lang="it-IT" sz="1800" dirty="0"/>
+              <a:t>As in the other case, higher pressure references mean more utilization of the pump instead of the heater. As during the night one of our objectives is to minimize the heater usage, we are more inclined to consider the second option.</a:t>
+            </a:r>
+          </a:p>
+        </p:txBody>
+      </p:sp>
+      <p:pic>
+        <p:nvPicPr>
+          <p:cNvPr id="9" name="Immagine 8">
+            <a:extLst>
+              <a:ext uri="{FF2B5EF4-FFF2-40B4-BE49-F238E27FC236}">
+                <a16:creationId xmlns:a16="http://schemas.microsoft.com/office/drawing/2014/main" id="{72B18C46-2F3A-D4AF-84EF-D21358F58AEE}"/>
+              </a:ext>
+            </a:extLst>
+          </p:cNvPr>
+          <p:cNvPicPr>
+            <a:picLocks noChangeAspect="1"/>
+          </p:cNvPicPr>
+          <p:nvPr/>
+        </p:nvPicPr>
+        <p:blipFill>
+          <a:blip r:embed="rId4"/>
+          <a:stretch>
+            <a:fillRect/>
+          </a:stretch>
+        </p:blipFill>
+        <p:spPr>
+          <a:xfrm>
+            <a:off x="531814" y="1666875"/>
+            <a:ext cx="5571429" cy="3314286"/>
+          </a:xfrm>
+          <a:prstGeom prst="rect">
+            <a:avLst/>
+          </a:prstGeom>
+        </p:spPr>
+      </p:pic>
+      <p:pic>
+        <p:nvPicPr>
+          <p:cNvPr id="11" name="Immagine 10">
+            <a:extLst>
+              <a:ext uri="{FF2B5EF4-FFF2-40B4-BE49-F238E27FC236}">
+                <a16:creationId xmlns:a16="http://schemas.microsoft.com/office/drawing/2014/main" id="{EC76F8BA-7D1D-6455-3DFB-88F46E8E7AF4}"/>
+              </a:ext>
+            </a:extLst>
+          </p:cNvPr>
+          <p:cNvPicPr>
+            <a:picLocks noChangeAspect="1"/>
+          </p:cNvPicPr>
+          <p:nvPr/>
+        </p:nvPicPr>
+        <p:blipFill>
+          <a:blip r:embed="rId5"/>
+          <a:stretch>
+            <a:fillRect/>
+          </a:stretch>
+        </p:blipFill>
+        <p:spPr>
+          <a:xfrm>
+            <a:off x="6103243" y="1666875"/>
+            <a:ext cx="5571429" cy="3314286"/>
+          </a:xfrm>
+          <a:prstGeom prst="rect">
+            <a:avLst/>
+          </a:prstGeom>
+        </p:spPr>
+      </p:pic>
+      <p:pic>
+        <p:nvPicPr>
+          <p:cNvPr id="8" name="Picture 7" descr="\documentclass{article}&#10;\usepackage{amsmath}&#10;\pagestyle{empty}&#10;\begin{document}&#10;\begin{equation*}&#10;\Delta p^o = 1 \, bar&#10;\end{equation*}&#10;\end{document}" title="IguanaTex Bitmap Display">
+            <a:extLst>
+              <a:ext uri="{FF2B5EF4-FFF2-40B4-BE49-F238E27FC236}">
+                <a16:creationId xmlns:a16="http://schemas.microsoft.com/office/drawing/2014/main" id="{3A7B6878-6EEB-5CBC-0E29-D8058CEECD18}"/>
+              </a:ext>
+            </a:extLst>
+          </p:cNvPr>
+          <p:cNvPicPr>
+            <a:picLocks noChangeAspect="1"/>
+          </p:cNvPicPr>
+          <p:nvPr>
+            <p:custDataLst>
+              <p:tags r:id="rId1"/>
+            </p:custDataLst>
+          </p:nvPr>
+        </p:nvPicPr>
+        <p:blipFill>
+          <a:blip r:embed="rId6"/>
+          <a:stretch>
+            <a:fillRect/>
+          </a:stretch>
+        </p:blipFill>
+        <p:spPr>
+          <a:xfrm>
+            <a:off x="4541105" y="2138295"/>
+            <a:ext cx="1298286" cy="231619"/>
+          </a:xfrm>
+          <a:prstGeom prst="rect">
+            <a:avLst/>
+          </a:prstGeom>
+        </p:spPr>
+      </p:pic>
+      <p:pic>
+        <p:nvPicPr>
+          <p:cNvPr id="10" name="Picture 9" descr="\documentclass{article}&#10;\usepackage{amsmath}&#10;\pagestyle{empty}&#10;\begin{document}&#10;\begin{equation*}&#10;\Delta p^o = 3 \, bar&#10;\end{equation*}&#10;\end{document}" title="IguanaTex Bitmap Display">
+            <a:extLst>
+              <a:ext uri="{FF2B5EF4-FFF2-40B4-BE49-F238E27FC236}">
+                <a16:creationId xmlns:a16="http://schemas.microsoft.com/office/drawing/2014/main" id="{D93040EB-1827-0833-05C2-EDABB1AB6557}"/>
+              </a:ext>
+            </a:extLst>
+          </p:cNvPr>
+          <p:cNvPicPr>
+            <a:picLocks noChangeAspect="1"/>
+          </p:cNvPicPr>
+          <p:nvPr>
+            <p:custDataLst>
+              <p:tags r:id="rId2"/>
+            </p:custDataLst>
+          </p:nvPr>
+        </p:nvPicPr>
+        <p:blipFill>
+          <a:blip r:embed="rId7"/>
+          <a:stretch>
+            <a:fillRect/>
+          </a:stretch>
+        </p:blipFill>
+        <p:spPr>
+          <a:xfrm>
+            <a:off x="10033243" y="2138294"/>
+            <a:ext cx="1298286" cy="231619"/>
+          </a:xfrm>
+          <a:prstGeom prst="rect">
+            <a:avLst/>
+          </a:prstGeom>
+        </p:spPr>
+      </p:pic>
+    </p:spTree>
+    <p:extLst>
+      <p:ext uri="{BB962C8B-B14F-4D97-AF65-F5344CB8AC3E}">
+        <p14:creationId xmlns:p14="http://schemas.microsoft.com/office/powerpoint/2010/main" val="2811123625"/>
       </p:ext>
     </p:extLst>
   </p:cSld>
@@ -17459,15 +19240,81 @@
                   </a:rPr>
                   <a:t> volume of water in the network, </a:t>
                 </a:r>
-                <a:r>
-                  <a:rPr lang="it-IT" sz="1800" dirty="0" err="1">
-                    <a:effectLst/>
-                    <a:latin typeface="Calibri" panose="020F0502020204030204" pitchFamily="34" charset="0"/>
-                    <a:ea typeface="Calibri" panose="020F0502020204030204" pitchFamily="34" charset="0"/>
-                    <a:cs typeface="Times New Roman" panose="02020603050405020304" pitchFamily="18" charset="0"/>
-                  </a:rPr>
-                  <a:t>wn</a:t>
-                </a:r>
+                <a14:m>
+                  <m:oMath xmlns:m="http://schemas.openxmlformats.org/officeDocument/2006/math">
+                    <m:sSub>
+                      <m:sSubPr>
+                        <m:ctrlPr>
+                          <a:rPr lang="it-IT" sz="1800" i="1" dirty="0" smtClean="0">
+                            <a:effectLst/>
+                            <a:latin typeface="Cambria Math" panose="02040503050406030204" pitchFamily="18" charset="0"/>
+                            <a:cs typeface="Times New Roman" panose="02020603050405020304" pitchFamily="18" charset="0"/>
+                          </a:rPr>
+                        </m:ctrlPr>
+                      </m:sSubPr>
+                      <m:e>
+                        <m:r>
+                          <a:rPr lang="it-IT" sz="1800" b="0" i="1" dirty="0" smtClean="0">
+                            <a:effectLst/>
+                            <a:latin typeface="Cambria Math" panose="02040503050406030204" pitchFamily="18" charset="0"/>
+                            <a:cs typeface="Times New Roman" panose="02020603050405020304" pitchFamily="18" charset="0"/>
+                          </a:rPr>
+                          <m:t>𝑤</m:t>
+                        </m:r>
+                      </m:e>
+                      <m:sub>
+                        <m:r>
+                          <a:rPr lang="it-IT" sz="1800" b="0" i="1" dirty="0" smtClean="0">
+                            <a:effectLst/>
+                            <a:latin typeface="Cambria Math" panose="02040503050406030204" pitchFamily="18" charset="0"/>
+                            <a:cs typeface="Times New Roman" panose="02020603050405020304" pitchFamily="18" charset="0"/>
+                          </a:rPr>
+                          <m:t>𝑛</m:t>
+                        </m:r>
+                      </m:sub>
+                    </m:sSub>
+                    <m:r>
+                      <a:rPr lang="it-IT" sz="1800" i="1" dirty="0">
+                        <a:effectLst/>
+                        <a:latin typeface="Cambria Math" panose="02040503050406030204" pitchFamily="18" charset="0"/>
+                        <a:ea typeface="Calibri" panose="020F0502020204030204" pitchFamily="34" charset="0"/>
+                        <a:cs typeface="Times New Roman" panose="02020603050405020304" pitchFamily="18" charset="0"/>
+                      </a:rPr>
+                      <m:t>= 0.5</m:t>
+                    </m:r>
+                    <m:f>
+                      <m:fPr>
+                        <m:ctrlPr>
+                          <a:rPr lang="it-IT" sz="1800" i="1" dirty="0" smtClean="0">
+                            <a:effectLst/>
+                            <a:latin typeface="Cambria Math" panose="02040503050406030204" pitchFamily="18" charset="0"/>
+                            <a:cs typeface="Times New Roman" panose="02020603050405020304" pitchFamily="18" charset="0"/>
+                          </a:rPr>
+                        </m:ctrlPr>
+                      </m:fPr>
+                      <m:num>
+                        <m:r>
+                          <a:rPr lang="it-IT" sz="1800" b="0" i="1" dirty="0" smtClean="0">
+                            <a:effectLst/>
+                            <a:latin typeface="Cambria Math" panose="02040503050406030204" pitchFamily="18" charset="0"/>
+                            <a:cs typeface="Times New Roman" panose="02020603050405020304" pitchFamily="18" charset="0"/>
+                          </a:rPr>
+                          <m:t>𝑘𝑔</m:t>
+                        </m:r>
+                      </m:num>
+                      <m:den>
+                        <m:r>
+                          <a:rPr lang="it-IT" sz="1800" b="0" i="1" dirty="0" smtClean="0">
+                            <a:effectLst/>
+                            <a:latin typeface="Cambria Math" panose="02040503050406030204" pitchFamily="18" charset="0"/>
+                            <a:cs typeface="Times New Roman" panose="02020603050405020304" pitchFamily="18" charset="0"/>
+                          </a:rPr>
+                          <m:t>𝑠</m:t>
+                        </m:r>
+                      </m:den>
+                    </m:f>
+                  </m:oMath>
+                </a14:m>
                 <a:r>
                   <a:rPr lang="it-IT" sz="1800" dirty="0">
                     <a:effectLst/>
@@ -17475,51 +19322,119 @@
                     <a:ea typeface="Calibri" panose="020F0502020204030204" pitchFamily="34" charset="0"/>
                     <a:cs typeface="Times New Roman" panose="02020603050405020304" pitchFamily="18" charset="0"/>
                   </a:rPr>
-                  <a:t> = 0.5kg/s  </a:t>
+                  <a:t> nominal  flow rate</a:t>
                 </a:r>
-                <a:r>
-                  <a:rPr lang="it-IT" sz="1800" dirty="0" err="1">
-                    <a:effectLst/>
-                    <a:latin typeface="Calibri" panose="020F0502020204030204" pitchFamily="34" charset="0"/>
-                    <a:ea typeface="Calibri" panose="020F0502020204030204" pitchFamily="34" charset="0"/>
-                    <a:cs typeface="Times New Roman" panose="02020603050405020304" pitchFamily="18" charset="0"/>
-                  </a:rPr>
-                  <a:t>nominal</a:t>
-                </a:r>
-                <a:r>
-                  <a:rPr lang="it-IT" sz="1800" dirty="0">
-                    <a:effectLst/>
-                    <a:latin typeface="Calibri" panose="020F0502020204030204" pitchFamily="34" charset="0"/>
-                    <a:ea typeface="Calibri" panose="020F0502020204030204" pitchFamily="34" charset="0"/>
-                    <a:cs typeface="Times New Roman" panose="02020603050405020304" pitchFamily="18" charset="0"/>
-                  </a:rPr>
-                  <a:t>  flow rate</a:t>
-                </a:r>
-              </a:p>
-              <a:p>
                 <a:endParaRPr lang="en-GB" dirty="0"/>
               </a:p>
               <a:p>
                 <a:r>
                   <a:rPr lang="en-GB" sz="2000" dirty="0"/>
-                  <a:t>Try impose a Settling time (not exact, since the model is approximated) Ta = 10min</a:t>
+                  <a:t>Try impose a Settling time (not exact, since the model is approximated) </a:t>
                 </a:r>
+                <a14:m>
+                  <m:oMath xmlns:m="http://schemas.openxmlformats.org/officeDocument/2006/math">
+                    <m:r>
+                      <a:rPr lang="en-GB" sz="2000" i="1" dirty="0" smtClean="0">
+                        <a:latin typeface="Cambria Math" panose="02040503050406030204" pitchFamily="18" charset="0"/>
+                      </a:rPr>
+                      <m:t>𝑇𝑎</m:t>
+                    </m:r>
+                    <m:r>
+                      <a:rPr lang="en-GB" sz="2000" i="1" dirty="0" smtClean="0">
+                        <a:latin typeface="Cambria Math" panose="02040503050406030204" pitchFamily="18" charset="0"/>
+                      </a:rPr>
+                      <m:t> = 10 </m:t>
+                    </m:r>
+                    <m:r>
+                      <a:rPr lang="it-IT" sz="2000" b="0" i="1" dirty="0" smtClean="0">
+                        <a:latin typeface="Cambria Math" panose="02040503050406030204" pitchFamily="18" charset="0"/>
+                      </a:rPr>
+                      <m:t>𝑚𝑖𝑛</m:t>
+                    </m:r>
+                    <m:r>
+                      <a:rPr lang="en-GB" sz="2000" i="1" dirty="0" smtClean="0">
+                        <a:latin typeface="Cambria Math" panose="02040503050406030204" pitchFamily="18" charset="0"/>
+                      </a:rPr>
+                      <m:t>⁡</m:t>
+                    </m:r>
+                  </m:oMath>
+                </a14:m>
+                <a:endParaRPr lang="en-GB" sz="2000" dirty="0"/>
               </a:p>
               <a:p>
-                <a:r>
-                  <a:rPr lang="en-GB" sz="2000" dirty="0" err="1"/>
-                  <a:t>Ti</a:t>
-                </a:r>
-                <a:r>
-                  <a:rPr lang="en-GB" sz="2000" dirty="0"/>
-                  <a:t>  = 1,145*10^3</a:t>
-                </a:r>
+                <a14:m>
+                  <m:oMath xmlns:m="http://schemas.openxmlformats.org/officeDocument/2006/math">
+                    <m:r>
+                      <a:rPr lang="it-IT" sz="2000" b="0" i="1" smtClean="0">
+                        <a:latin typeface="Cambria Math" panose="02040503050406030204" pitchFamily="18" charset="0"/>
+                      </a:rPr>
+                      <m:t>𝑇𝑖</m:t>
+                    </m:r>
+                    <m:r>
+                      <a:rPr lang="it-IT" sz="2000" b="0" i="1" smtClean="0">
+                        <a:latin typeface="Cambria Math" panose="02040503050406030204" pitchFamily="18" charset="0"/>
+                      </a:rPr>
+                      <m:t>=1.145∙</m:t>
+                    </m:r>
+                    <m:sSup>
+                      <m:sSupPr>
+                        <m:ctrlPr>
+                          <a:rPr lang="it-IT" sz="2000" b="0" i="1" smtClean="0">
+                            <a:latin typeface="Cambria Math" panose="02040503050406030204" pitchFamily="18" charset="0"/>
+                          </a:rPr>
+                        </m:ctrlPr>
+                      </m:sSupPr>
+                      <m:e>
+                        <m:r>
+                          <a:rPr lang="it-IT" sz="2000" b="0" i="1" smtClean="0">
+                            <a:latin typeface="Cambria Math" panose="02040503050406030204" pitchFamily="18" charset="0"/>
+                          </a:rPr>
+                          <m:t>10</m:t>
+                        </m:r>
+                      </m:e>
+                      <m:sup>
+                        <m:r>
+                          <a:rPr lang="it-IT" sz="2000" b="0" i="1" smtClean="0">
+                            <a:latin typeface="Cambria Math" panose="02040503050406030204" pitchFamily="18" charset="0"/>
+                          </a:rPr>
+                          <m:t>3</m:t>
+                        </m:r>
+                      </m:sup>
+                    </m:sSup>
+                  </m:oMath>
+                </a14:m>
+                <a:endParaRPr lang="it-IT" sz="2000" b="0" i="1" dirty="0">
+                  <a:latin typeface="Cambria Math" panose="02040503050406030204" pitchFamily="18" charset="0"/>
+                </a:endParaRPr>
               </a:p>
               <a:p>
-                <a:r>
-                  <a:rPr lang="en-GB" sz="2000" dirty="0"/>
-                  <a:t>K = 8,287</a:t>
-                </a:r>
+                <a14:m>
+                  <m:oMath xmlns:m="http://schemas.openxmlformats.org/officeDocument/2006/math">
+                    <m:r>
+                      <a:rPr lang="it-IT" sz="2000" b="0" i="1" smtClean="0">
+                        <a:latin typeface="Cambria Math" panose="02040503050406030204" pitchFamily="18" charset="0"/>
+                      </a:rPr>
+                      <m:t>𝐾</m:t>
+                    </m:r>
+                    <m:r>
+                      <a:rPr lang="it-IT" sz="2000" b="0" i="1" smtClean="0">
+                        <a:latin typeface="Cambria Math" panose="02040503050406030204" pitchFamily="18" charset="0"/>
+                      </a:rPr>
+                      <m:t>=</m:t>
+                    </m:r>
+                    <m:r>
+                      <m:rPr>
+                        <m:nor/>
+                      </m:rPr>
+                      <a:rPr lang="en-GB" sz="2000" dirty="0"/>
+                      <m:t>8,287</m:t>
+                    </m:r>
+                  </m:oMath>
+                </a14:m>
+                <a:endParaRPr lang="en-GB" sz="2000" dirty="0"/>
+              </a:p>
+              <a:p>
+                <a:endParaRPr lang="en-GB" sz="2000" dirty="0"/>
               </a:p>
             </p:txBody>
           </p:sp>
@@ -17548,7 +19463,7 @@
               <a:lstStyle/>
               <a:p>
                 <a:r>
-                  <a:rPr lang="it-IT">
+                  <a:rPr lang="en-GB">
                     <a:noFill/>
                   </a:rPr>
                   <a:t> </a:t>
@@ -20187,10 +22102,10 @@
       </p:sp>
       <p:pic>
         <p:nvPicPr>
-          <p:cNvPr id="8" name="Picture 7" descr="\documentclass{article}&#10;\usepackage{amsmath}&#10;\pagestyle{empty}&#10;\begin{document}&#10;&#10;\begin{equation}&#10;\delta \bar{T}_{z}=\left[-\frac{\bar{\alpha} G}{c_{z}}-\frac{G_{\text {Loss }}}{c_{z}}\right] \delta T_{s}+\left[\frac{G}{c_{z}}\left(T_{\mathrm{Grid}}-\bar{T}_{z}\right) \frac{K_{\mathrm{he}}}{c_{z}}\right]\left[\begin{array}{l}&#10;\delta \alpha \\&#10;\delta \beta&#10;\end{array}\right]&#10;\end{equation}&#10;&#10;&#10;\end{document}" title="IguanaTex Bitmap Display">
-            <a:extLst>
-              <a:ext uri="{FF2B5EF4-FFF2-40B4-BE49-F238E27FC236}">
-                <a16:creationId xmlns:a16="http://schemas.microsoft.com/office/drawing/2014/main" id="{9F9C7C88-9188-F4DF-2A53-4D15F31EAA6F}"/>
+          <p:cNvPr id="13" name="Picture 12" descr="\documentclass{article}&#10;\usepackage{amsmath}&#10;\pagestyle{empty}&#10;\begin{document}&#10;&#10;\begin{equation*}&#10;\delta \bar{T}_{z}=\left[-\frac{\bar{\alpha} G}{c_{z}}-\frac{G_{\text {Loss }}}{c_{z}}\right] \delta T_{s}+\left[\frac{G}{c_{z}}\left(T_{\mathrm{Grid}}-\bar{T}_{z}\right)\: \frac{K_{\mathrm{he}}}{c_{z}}\right]\left[\begin{array}{l}&#10;\delta \alpha \\&#10;\delta \beta&#10;\end{array}\right]&#10;\end{equation*}&#10;&#10;&#10;\end{document}" title="IguanaTex Bitmap Display">
+            <a:extLst>
+              <a:ext uri="{FF2B5EF4-FFF2-40B4-BE49-F238E27FC236}">
+                <a16:creationId xmlns:a16="http://schemas.microsoft.com/office/drawing/2014/main" id="{23FA9A32-C8C7-39F8-2278-705F591302A0}"/>
               </a:ext>
             </a:extLst>
           </p:cNvPr>
@@ -20203,15 +22118,16 @@
             </p:custDataLst>
           </p:nvPr>
         </p:nvPicPr>
-        <p:blipFill rotWithShape="1">
+        <p:blipFill>
           <a:blip r:embed="rId6"/>
-          <a:srcRect r="12787"/>
-          <a:stretch/>
+          <a:stretch>
+            <a:fillRect/>
+          </a:stretch>
         </p:blipFill>
         <p:spPr>
           <a:xfrm>
-            <a:off x="2395930" y="5234818"/>
-            <a:ext cx="6705920" cy="608000"/>
+            <a:off x="3017776" y="5258382"/>
+            <a:ext cx="5846084" cy="608000"/>
           </a:xfrm>
           <a:prstGeom prst="rect">
             <a:avLst/>
@@ -20639,7 +22555,7 @@
                   <pslz:sldZmObj sldId="283" cId="2700837890">
                     <pslz:zmPr id="{EB590B66-7C4A-481E-8359-A14F527EE35E}" imageType="cover" transitionDur="1000">
                       <p166:blipFill xmlns:p166="http://schemas.microsoft.com/office/powerpoint/2016/6/main">
-                        <a:blip r:embed="rId4">
+                        <a:blip r:embed="rId7">
                           <a:extLst>
                             <a:ext uri="{96DAC541-7B7A-43D3-8B79-37D633B846F1}">
                               <asvg:svgBlip xmlns:asvg="http://schemas.microsoft.com/office/drawing/2016/SVG/main" r:embed="rId5"/>
@@ -21162,10 +23078,10 @@
 <p:tagLst xmlns:a="http://schemas.openxmlformats.org/drawingml/2006/main" xmlns:r="http://schemas.openxmlformats.org/officeDocument/2006/relationships" xmlns:p="http://schemas.openxmlformats.org/presentationml/2006/main">
   <p:tag name="OUTPUTDPI" val="1200"/>
   <p:tag name="ORIGINALHEIGHT" val="299.2126"/>
-  <p:tag name="ORIGINALWIDTH" val="3784.027"/>
-  <p:tag name="LATEXADDIN" val="\documentclass{article}&#10;\usepackage{amsmath}&#10;\pagestyle{empty}&#10;\begin{document}&#10;&#10;\begin{equation}&#10;\delta \bar{T}_{z}=\left[-\frac{\bar{\alpha} G}{c_{z}}-\frac{G_{\text {Loss }}}{c_{z}}\right] \delta T_{s}+\left[\frac{G}{c_{z}}\left(T_{\mathrm{Grid}}-\bar{T}_{z}\right) \frac{K_{\mathrm{he}}}{c_{z}}\right]\left[\begin{array}{l}&#10;\delta \alpha \\&#10;\delta \beta&#10;\end{array}\right]&#10;\end{equation}&#10;&#10;&#10;\end{document}"/>
+  <p:tag name="ORIGINALWIDTH" val="3298.838"/>
+  <p:tag name="LATEXADDIN" val="\documentclass{article}&#10;\usepackage{amsmath}&#10;\pagestyle{empty}&#10;\begin{document}&#10;&#10;\begin{equation*}&#10;\delta \bar{T}_{z}=\left[-\frac{\bar{\alpha} G}{c_{z}}-\frac{G_{\text {Loss }}}{c_{z}}\right] \delta T_{s}+\left[\frac{G}{c_{z}}\left(T_{\mathrm{Grid}}-\bar{T}_{z}\right)\: \frac{K_{\mathrm{he}}}{c_{z}}\right]\left[\begin{array}{l}&#10;\delta \alpha \\&#10;\delta \beta&#10;\end{array}\right]&#10;\end{equation*}&#10;&#10;&#10;\end{document}"/>
   <p:tag name="IGUANATEXSIZE" val="20"/>
-  <p:tag name="IGUANATEXCURSOR" val="391"/>
+  <p:tag name="IGUANATEXCURSOR" val="271"/>
   <p:tag name="TRANSPARENCY" val="True"/>
   <p:tag name="LATEXENGINEID" val="0"/>
   <p:tag name="TEMPFOLDER" val=".\"/>
@@ -21271,6 +23187,96 @@
 </p:tagLst>
 </file>
 
+<file path=ppt/tags/tag15.xml><?xml version="1.0" encoding="utf-8"?>
+<p:tagLst xmlns:a="http://schemas.openxmlformats.org/drawingml/2006/main" xmlns:r="http://schemas.openxmlformats.org/officeDocument/2006/relationships" xmlns:p="http://schemas.openxmlformats.org/presentationml/2006/main">
+  <p:tag name="OUTPUTDPI" val="1200"/>
+  <p:tag name="ORIGINALHEIGHT" val="95.23811"/>
+  <p:tag name="ORIGINALWIDTH" val="585.6768"/>
+  <p:tag name="LATEXADDIN" val="\documentclass{article}&#10;\usepackage{amsmath}&#10;\pagestyle{empty}&#10;\begin{document}&#10;\begin{equation*}&#10;T^o=40^{\circ}C&#10;\end{equation*}&#10;\end{document}"/>
+  <p:tag name="IGUANATEXSIZE" val="20"/>
+  <p:tag name="IGUANATEXCURSOR" val="113"/>
+  <p:tag name="TRANSPARENCY" val="True"/>
+  <p:tag name="LATEXENGINEID" val="0"/>
+  <p:tag name="TEMPFOLDER" val=".\"/>
+  <p:tag name="LATEXFORMHEIGHT" val="312"/>
+  <p:tag name="LATEXFORMWIDTH" val="384"/>
+  <p:tag name="LATEXFORMWRAP" val="True"/>
+  <p:tag name="BITMAPVECTOR" val="0"/>
+</p:tagLst>
+</file>
+
+<file path=ppt/tags/tag16.xml><?xml version="1.0" encoding="utf-8"?>
+<p:tagLst xmlns:a="http://schemas.openxmlformats.org/drawingml/2006/main" xmlns:r="http://schemas.openxmlformats.org/officeDocument/2006/relationships" xmlns:p="http://schemas.openxmlformats.org/presentationml/2006/main">
+  <p:tag name="OUTPUTDPI" val="1200"/>
+  <p:tag name="ORIGINALHEIGHT" val="95.23811"/>
+  <p:tag name="ORIGINALWIDTH" val="585.6768"/>
+  <p:tag name="LATEXADDIN" val="\documentclass{article}&#10;\usepackage{amsmath}&#10;\pagestyle{empty}&#10;\begin{document}&#10;\begin{equation*}&#10;T^o=50^{\circ}C&#10;\end{equation*}&#10;\end{document}"/>
+  <p:tag name="IGUANATEXSIZE" val="20"/>
+  <p:tag name="IGUANATEXCURSOR" val="113"/>
+  <p:tag name="TRANSPARENCY" val="True"/>
+  <p:tag name="LATEXENGINEID" val="0"/>
+  <p:tag name="TEMPFOLDER" val=".\"/>
+  <p:tag name="LATEXFORMHEIGHT" val="312"/>
+  <p:tag name="LATEXFORMWIDTH" val="384"/>
+  <p:tag name="LATEXFORMWRAP" val="True"/>
+  <p:tag name="BITMAPVECTOR" val="0"/>
+</p:tagLst>
+</file>
+
+<file path=ppt/tags/tag17.xml><?xml version="1.0" encoding="utf-8"?>
+<p:tagLst xmlns:a="http://schemas.openxmlformats.org/drawingml/2006/main" xmlns:r="http://schemas.openxmlformats.org/officeDocument/2006/relationships" xmlns:p="http://schemas.openxmlformats.org/presentationml/2006/main">
+  <p:tag name="OUTPUTDPI" val="1200"/>
+  <p:tag name="ORIGINALHEIGHT" val="126.7342"/>
+  <p:tag name="ORIGINALWIDTH" val="991.376"/>
+  <p:tag name="LATEXADDIN" val="\documentclass{article}&#10;\usepackage{amsmath}&#10;\pagestyle{empty}&#10;\begin{document}&#10;\begin{equation*}&#10;T^o \uparrow \; \Rightarrow \, P_{average}\uparrow&#10;\end{equation*}&#10;\end{document}"/>
+  <p:tag name="IGUANATEXSIZE" val="20"/>
+  <p:tag name="IGUANATEXCURSOR" val="129"/>
+  <p:tag name="TRANSPARENCY" val="True"/>
+  <p:tag name="LATEXENGINEID" val="0"/>
+  <p:tag name="TEMPFOLDER" val=".\"/>
+  <p:tag name="LATEXFORMHEIGHT" val="312"/>
+  <p:tag name="LATEXFORMWIDTH" val="384"/>
+  <p:tag name="LATEXFORMWRAP" val="True"/>
+  <p:tag name="BITMAPVECTOR" val="0"/>
+</p:tagLst>
+</file>
+
+<file path=ppt/tags/tag18.xml><?xml version="1.0" encoding="utf-8"?>
+<p:tagLst xmlns:a="http://schemas.openxmlformats.org/drawingml/2006/main" xmlns:r="http://schemas.openxmlformats.org/officeDocument/2006/relationships" xmlns:p="http://schemas.openxmlformats.org/presentationml/2006/main">
+  <p:tag name="OUTPUTDPI" val="1200"/>
+  <p:tag name="ORIGINALHEIGHT" val="113.9857"/>
+  <p:tag name="ORIGINALWIDTH" val="638.9202"/>
+  <p:tag name="LATEXADDIN" val="\documentclass{article}&#10;\usepackage{amsmath}&#10;\pagestyle{empty}&#10;\begin{document}&#10;\begin{equation*}&#10;\Delta p^o = 1 \, bar&#10;\end{equation*}&#10;\end{document}"/>
+  <p:tag name="IGUANATEXSIZE" val="20"/>
+  <p:tag name="IGUANATEXCURSOR" val="115"/>
+  <p:tag name="TRANSPARENCY" val="True"/>
+  <p:tag name="LATEXENGINEID" val="0"/>
+  <p:tag name="TEMPFOLDER" val=".\"/>
+  <p:tag name="LATEXFORMHEIGHT" val="312"/>
+  <p:tag name="LATEXFORMWIDTH" val="384"/>
+  <p:tag name="LATEXFORMWRAP" val="True"/>
+  <p:tag name="BITMAPVECTOR" val="0"/>
+</p:tagLst>
+</file>
+
+<file path=ppt/tags/tag19.xml><?xml version="1.0" encoding="utf-8"?>
+<p:tagLst xmlns:a="http://schemas.openxmlformats.org/drawingml/2006/main" xmlns:r="http://schemas.openxmlformats.org/officeDocument/2006/relationships" xmlns:p="http://schemas.openxmlformats.org/presentationml/2006/main">
+  <p:tag name="OUTPUTDPI" val="1200"/>
+  <p:tag name="ORIGINALHEIGHT" val="113.9857"/>
+  <p:tag name="ORIGINALWIDTH" val="638.9202"/>
+  <p:tag name="LATEXADDIN" val="\documentclass{article}&#10;\usepackage{amsmath}&#10;\pagestyle{empty}&#10;\begin{document}&#10;\begin{equation*}&#10;\Delta p^o = 3 \, bar&#10;\end{equation*}&#10;\end{document}"/>
+  <p:tag name="IGUANATEXSIZE" val="20"/>
+  <p:tag name="IGUANATEXCURSOR" val="112"/>
+  <p:tag name="TRANSPARENCY" val="True"/>
+  <p:tag name="LATEXENGINEID" val="0"/>
+  <p:tag name="TEMPFOLDER" val=".\"/>
+  <p:tag name="LATEXFORMHEIGHT" val="312"/>
+  <p:tag name="LATEXFORMWIDTH" val="384"/>
+  <p:tag name="LATEXFORMWRAP" val="True"/>
+  <p:tag name="BITMAPVECTOR" val="0"/>
+</p:tagLst>
+</file>
+
 <file path=ppt/tags/tag2.xml><?xml version="1.0" encoding="utf-8"?>
 <p:tagLst xmlns:a="http://schemas.openxmlformats.org/drawingml/2006/main" xmlns:r="http://schemas.openxmlformats.org/officeDocument/2006/relationships" xmlns:p="http://schemas.openxmlformats.org/presentationml/2006/main">
   <p:tag name="OUTPUTDPI" val="1200"/>
@@ -21281,6 +23287,114 @@
   <p:tag name="IGUANATEXCURSOR" val="191"/>
   <p:tag name="TRANSPARENCY" val="True"/>
   <p:tag name="FILENAME" val="D:\PoliMi\Magistrale\Primo anno\Secondo semestre\AUTOMATION OF ENERGY SYSTEMS (LEVA ALBERTO) {055511 - MODELLING AND CONTROL OF ENERGY SYSTEMS\Project theme\AES_project_2021_2022\Images\Assignment 1\Latex\equations.tex"/>
+  <p:tag name="LATEXENGINEID" val="0"/>
+  <p:tag name="TEMPFOLDER" val=".\"/>
+  <p:tag name="LATEXFORMHEIGHT" val="312"/>
+  <p:tag name="LATEXFORMWIDTH" val="384"/>
+  <p:tag name="LATEXFORMWRAP" val="True"/>
+  <p:tag name="BITMAPVECTOR" val="0"/>
+</p:tagLst>
+</file>
+
+<file path=ppt/tags/tag20.xml><?xml version="1.0" encoding="utf-8"?>
+<p:tagLst xmlns:a="http://schemas.openxmlformats.org/drawingml/2006/main" xmlns:r="http://schemas.openxmlformats.org/officeDocument/2006/relationships" xmlns:p="http://schemas.openxmlformats.org/presentationml/2006/main">
+  <p:tag name="OUTPUTDPI" val="1200"/>
+  <p:tag name="ORIGINALHEIGHT" val="113.9857"/>
+  <p:tag name="ORIGINALWIDTH" val="638.9202"/>
+  <p:tag name="LATEXADDIN" val="\documentclass{article}&#10;\usepackage{amsmath}&#10;\pagestyle{empty}&#10;\begin{document}&#10;\begin{equation*}&#10;\Delta p^o = 1 \, bar&#10;\end{equation*}&#10;\end{document}"/>
+  <p:tag name="IGUANATEXSIZE" val="20"/>
+  <p:tag name="IGUANATEXCURSOR" val="115"/>
+  <p:tag name="TRANSPARENCY" val="True"/>
+  <p:tag name="LATEXENGINEID" val="0"/>
+  <p:tag name="TEMPFOLDER" val=".\"/>
+  <p:tag name="LATEXFORMHEIGHT" val="312"/>
+  <p:tag name="LATEXFORMWIDTH" val="384"/>
+  <p:tag name="LATEXFORMWRAP" val="True"/>
+  <p:tag name="BITMAPVECTOR" val="0"/>
+</p:tagLst>
+</file>
+
+<file path=ppt/tags/tag21.xml><?xml version="1.0" encoding="utf-8"?>
+<p:tagLst xmlns:a="http://schemas.openxmlformats.org/drawingml/2006/main" xmlns:r="http://schemas.openxmlformats.org/officeDocument/2006/relationships" xmlns:p="http://schemas.openxmlformats.org/presentationml/2006/main">
+  <p:tag name="OUTPUTDPI" val="1200"/>
+  <p:tag name="ORIGINALHEIGHT" val="113.9857"/>
+  <p:tag name="ORIGINALWIDTH" val="638.9202"/>
+  <p:tag name="LATEXADDIN" val="\documentclass{article}&#10;\usepackage{amsmath}&#10;\pagestyle{empty}&#10;\begin{document}&#10;\begin{equation*}&#10;\Delta p^o = 3 \, bar&#10;\end{equation*}&#10;\end{document}"/>
+  <p:tag name="IGUANATEXSIZE" val="20"/>
+  <p:tag name="IGUANATEXCURSOR" val="112"/>
+  <p:tag name="TRANSPARENCY" val="True"/>
+  <p:tag name="LATEXENGINEID" val="0"/>
+  <p:tag name="TEMPFOLDER" val=".\"/>
+  <p:tag name="LATEXFORMHEIGHT" val="312"/>
+  <p:tag name="LATEXFORMWIDTH" val="384"/>
+  <p:tag name="LATEXFORMWRAP" val="True"/>
+  <p:tag name="BITMAPVECTOR" val="0"/>
+</p:tagLst>
+</file>
+
+<file path=ppt/tags/tag22.xml><?xml version="1.0" encoding="utf-8"?>
+<p:tagLst xmlns:a="http://schemas.openxmlformats.org/drawingml/2006/main" xmlns:r="http://schemas.openxmlformats.org/officeDocument/2006/relationships" xmlns:p="http://schemas.openxmlformats.org/presentationml/2006/main">
+  <p:tag name="OUTPUTDPI" val="1200"/>
+  <p:tag name="ORIGINALHEIGHT" val="95.23811"/>
+  <p:tag name="ORIGINALWIDTH" val="585.6768"/>
+  <p:tag name="LATEXADDIN" val="\documentclass{article}&#10;\usepackage{amsmath}&#10;\pagestyle{empty}&#10;\begin{document}&#10;\begin{equation*}&#10;T^o=40^{\circ}C&#10;\end{equation*}&#10;\end{document}"/>
+  <p:tag name="IGUANATEXSIZE" val="20"/>
+  <p:tag name="IGUANATEXCURSOR" val="113"/>
+  <p:tag name="TRANSPARENCY" val="True"/>
+  <p:tag name="LATEXENGINEID" val="0"/>
+  <p:tag name="TEMPFOLDER" val=".\"/>
+  <p:tag name="LATEXFORMHEIGHT" val="312"/>
+  <p:tag name="LATEXFORMWIDTH" val="384"/>
+  <p:tag name="LATEXFORMWRAP" val="True"/>
+  <p:tag name="BITMAPVECTOR" val="0"/>
+</p:tagLst>
+</file>
+
+<file path=ppt/tags/tag23.xml><?xml version="1.0" encoding="utf-8"?>
+<p:tagLst xmlns:a="http://schemas.openxmlformats.org/drawingml/2006/main" xmlns:r="http://schemas.openxmlformats.org/officeDocument/2006/relationships" xmlns:p="http://schemas.openxmlformats.org/presentationml/2006/main">
+  <p:tag name="OUTPUTDPI" val="1200"/>
+  <p:tag name="ORIGINALHEIGHT" val="95.23811"/>
+  <p:tag name="ORIGINALWIDTH" val="585.6768"/>
+  <p:tag name="LATEXADDIN" val="\documentclass{article}&#10;\usepackage{amsmath}&#10;\pagestyle{empty}&#10;\begin{document}&#10;\begin{equation*}&#10;T^o=50^{\circ}C&#10;\end{equation*}&#10;\end{document}"/>
+  <p:tag name="IGUANATEXSIZE" val="20"/>
+  <p:tag name="IGUANATEXCURSOR" val="113"/>
+  <p:tag name="TRANSPARENCY" val="True"/>
+  <p:tag name="LATEXENGINEID" val="0"/>
+  <p:tag name="TEMPFOLDER" val=".\"/>
+  <p:tag name="LATEXFORMHEIGHT" val="312"/>
+  <p:tag name="LATEXFORMWIDTH" val="384"/>
+  <p:tag name="LATEXFORMWRAP" val="True"/>
+  <p:tag name="BITMAPVECTOR" val="0"/>
+</p:tagLst>
+</file>
+
+<file path=ppt/tags/tag24.xml><?xml version="1.0" encoding="utf-8"?>
+<p:tagLst xmlns:a="http://schemas.openxmlformats.org/drawingml/2006/main" xmlns:r="http://schemas.openxmlformats.org/officeDocument/2006/relationships" xmlns:p="http://schemas.openxmlformats.org/presentationml/2006/main">
+  <p:tag name="OUTPUTDPI" val="1200"/>
+  <p:tag name="ORIGINALHEIGHT" val="113.9857"/>
+  <p:tag name="ORIGINALWIDTH" val="638.9202"/>
+  <p:tag name="LATEXADDIN" val="\documentclass{article}&#10;\usepackage{amsmath}&#10;\pagestyle{empty}&#10;\begin{document}&#10;\begin{equation*}&#10;\Delta p^o = 1 \, bar&#10;\end{equation*}&#10;\end{document}"/>
+  <p:tag name="IGUANATEXSIZE" val="20"/>
+  <p:tag name="IGUANATEXCURSOR" val="115"/>
+  <p:tag name="TRANSPARENCY" val="True"/>
+  <p:tag name="LATEXENGINEID" val="0"/>
+  <p:tag name="TEMPFOLDER" val=".\"/>
+  <p:tag name="LATEXFORMHEIGHT" val="312"/>
+  <p:tag name="LATEXFORMWIDTH" val="384"/>
+  <p:tag name="LATEXFORMWRAP" val="True"/>
+  <p:tag name="BITMAPVECTOR" val="0"/>
+</p:tagLst>
+</file>
+
+<file path=ppt/tags/tag25.xml><?xml version="1.0" encoding="utf-8"?>
+<p:tagLst xmlns:a="http://schemas.openxmlformats.org/drawingml/2006/main" xmlns:r="http://schemas.openxmlformats.org/officeDocument/2006/relationships" xmlns:p="http://schemas.openxmlformats.org/presentationml/2006/main">
+  <p:tag name="OUTPUTDPI" val="1200"/>
+  <p:tag name="ORIGINALHEIGHT" val="113.9857"/>
+  <p:tag name="ORIGINALWIDTH" val="638.9202"/>
+  <p:tag name="LATEXADDIN" val="\documentclass{article}&#10;\usepackage{amsmath}&#10;\pagestyle{empty}&#10;\begin{document}&#10;\begin{equation*}&#10;\Delta p^o = 3 \, bar&#10;\end{equation*}&#10;\end{document}"/>
+  <p:tag name="IGUANATEXSIZE" val="20"/>
+  <p:tag name="IGUANATEXCURSOR" val="112"/>
+  <p:tag name="TRANSPARENCY" val="True"/>
   <p:tag name="LATEXENGINEID" val="0"/>
   <p:tag name="TEMPFOLDER" val=".\"/>
   <p:tag name="LATEXFORMHEIGHT" val="312"/>

</xml_diff>

<commit_message>
Video pt1 + small correction on pptx
</commit_message>
<xml_diff>
--- a/Aes_Project_2021_2022.pptx
+++ b/Aes_Project_2021_2022.pptx
@@ -159,6 +159,12 @@
 </p:presentation>
 </file>
 
+<file path=ppt/authors.xml><?xml version="1.0" encoding="utf-8"?>
+<p188:authorLst xmlns:a="http://schemas.openxmlformats.org/drawingml/2006/main" xmlns:r="http://schemas.openxmlformats.org/officeDocument/2006/relationships" xmlns:p188="http://schemas.microsoft.com/office/powerpoint/2018/8/main">
+  <p188:author id="{2754E8C9-D538-9AD2-91BA-108807AE3079}" name="Alessandro Riva" initials="AR" userId="S::10629356@polimi.it::821d4274-ff1a-4832-a0a7-d7f3c5b9977c" providerId="AD"/>
+</p188:authorLst>
+</file>
+
 <file path=ppt/handoutMasters/handoutMaster1.xml><?xml version="1.0" encoding="utf-8"?>
 <p:handoutMaster xmlns:a="http://schemas.openxmlformats.org/drawingml/2006/main" xmlns:r="http://schemas.openxmlformats.org/officeDocument/2006/relationships" xmlns:p="http://schemas.openxmlformats.org/presentationml/2006/main">
   <p:cSld>
@@ -335,7 +341,7 @@
             <a:pPr rtl="0"/>
             <a:fld id="{9F1072A3-100F-40A9-915F-8D2D9E6962D8}" type="slidenum">
               <a:rPr lang="it-IT" smtClean="0"/>
-              <a:t>‹#›</a:t>
+              <a:t>‹N›</a:t>
             </a:fld>
             <a:endParaRPr lang="it-IT" dirty="0"/>
           </a:p>
@@ -598,7 +604,7 @@
             <a:pPr rtl="0"/>
             <a:fld id="{79230CFA-805A-4FD3-B3A0-DAAA5993DA17}" type="slidenum">
               <a:rPr lang="it-IT" noProof="0" smtClean="0"/>
-              <a:t>‹#›</a:t>
+              <a:t>‹N›</a:t>
             </a:fld>
             <a:endParaRPr lang="it-IT" noProof="0" dirty="0"/>
           </a:p>
@@ -861,7 +867,7 @@
             <a:pPr rtl="0"/>
             <a:fld id="{79230CFA-805A-4FD3-B3A0-DAAA5993DA17}" type="slidenum">
               <a:rPr lang="it-IT" smtClean="0"/>
-              <a:t>15</a:t>
+              <a:t>14</a:t>
             </a:fld>
             <a:endParaRPr lang="it-IT" dirty="0"/>
           </a:p>
@@ -870,7 +876,7 @@
     </p:spTree>
     <p:extLst>
       <p:ext uri="{BB962C8B-B14F-4D97-AF65-F5344CB8AC3E}">
-        <p14:creationId xmlns:p14="http://schemas.microsoft.com/office/powerpoint/2010/main" val="2771122920"/>
+        <p14:creationId xmlns:p14="http://schemas.microsoft.com/office/powerpoint/2010/main" val="2325599298"/>
       </p:ext>
     </p:extLst>
   </p:cSld>
@@ -947,6 +953,92 @@
             <a:pPr rtl="0"/>
             <a:fld id="{79230CFA-805A-4FD3-B3A0-DAAA5993DA17}" type="slidenum">
               <a:rPr lang="it-IT" smtClean="0"/>
+              <a:t>15</a:t>
+            </a:fld>
+            <a:endParaRPr lang="it-IT" dirty="0"/>
+          </a:p>
+        </p:txBody>
+      </p:sp>
+    </p:spTree>
+    <p:extLst>
+      <p:ext uri="{BB962C8B-B14F-4D97-AF65-F5344CB8AC3E}">
+        <p14:creationId xmlns:p14="http://schemas.microsoft.com/office/powerpoint/2010/main" val="2771122920"/>
+      </p:ext>
+    </p:extLst>
+  </p:cSld>
+  <p:clrMapOvr>
+    <a:masterClrMapping/>
+  </p:clrMapOvr>
+</p:notes>
+</file>
+
+<file path=ppt/notesSlides/notesSlide12.xml><?xml version="1.0" encoding="utf-8"?>
+<p:notes xmlns:a="http://schemas.openxmlformats.org/drawingml/2006/main" xmlns:r="http://schemas.openxmlformats.org/officeDocument/2006/relationships" xmlns:p="http://schemas.openxmlformats.org/presentationml/2006/main">
+  <p:cSld>
+    <p:spTree>
+      <p:nvGrpSpPr>
+        <p:cNvPr id="1" name=""/>
+        <p:cNvGrpSpPr/>
+        <p:nvPr/>
+      </p:nvGrpSpPr>
+      <p:grpSpPr>
+        <a:xfrm>
+          <a:off x="0" y="0"/>
+          <a:ext cx="0" cy="0"/>
+          <a:chOff x="0" y="0"/>
+          <a:chExt cx="0" cy="0"/>
+        </a:xfrm>
+      </p:grpSpPr>
+      <p:sp>
+        <p:nvSpPr>
+          <p:cNvPr id="2" name="Segnaposto immagine diapositiva 1"/>
+          <p:cNvSpPr>
+            <a:spLocks noGrp="1" noRot="1" noChangeAspect="1"/>
+          </p:cNvSpPr>
+          <p:nvPr>
+            <p:ph type="sldImg"/>
+          </p:nvPr>
+        </p:nvSpPr>
+        <p:spPr/>
+      </p:sp>
+      <p:sp>
+        <p:nvSpPr>
+          <p:cNvPr id="3" name="Segnaposto note 2"/>
+          <p:cNvSpPr>
+            <a:spLocks noGrp="1"/>
+          </p:cNvSpPr>
+          <p:nvPr>
+            <p:ph type="body" idx="1"/>
+          </p:nvPr>
+        </p:nvSpPr>
+        <p:spPr/>
+        <p:txBody>
+          <a:bodyPr rtlCol="0"/>
+          <a:lstStyle/>
+          <a:p>
+            <a:pPr rtl="0"/>
+            <a:endParaRPr lang="it-IT" dirty="0"/>
+          </a:p>
+        </p:txBody>
+      </p:sp>
+      <p:sp>
+        <p:nvSpPr>
+          <p:cNvPr id="4" name="Segnaposto numero diapositiva 3"/>
+          <p:cNvSpPr>
+            <a:spLocks noGrp="1"/>
+          </p:cNvSpPr>
+          <p:nvPr>
+            <p:ph type="sldNum" sz="quarter" idx="5"/>
+          </p:nvPr>
+        </p:nvSpPr>
+        <p:spPr/>
+        <p:txBody>
+          <a:bodyPr rtlCol="0"/>
+          <a:lstStyle/>
+          <a:p>
+            <a:pPr rtl="0"/>
+            <a:fld id="{79230CFA-805A-4FD3-B3A0-DAAA5993DA17}" type="slidenum">
+              <a:rPr lang="it-IT" smtClean="0"/>
               <a:t>16</a:t>
             </a:fld>
             <a:endParaRPr lang="it-IT" dirty="0"/>
@@ -966,7 +1058,7 @@
 </p:notes>
 </file>
 
-<file path=ppt/notesSlides/notesSlide12.xml><?xml version="1.0" encoding="utf-8"?>
+<file path=ppt/notesSlides/notesSlide13.xml><?xml version="1.0" encoding="utf-8"?>
 <p:notes xmlns:a="http://schemas.openxmlformats.org/drawingml/2006/main" xmlns:r="http://schemas.openxmlformats.org/officeDocument/2006/relationships" xmlns:p="http://schemas.openxmlformats.org/presentationml/2006/main">
   <p:cSld>
     <p:spTree>
@@ -1268,8 +1360,29 @@
           <a:bodyPr rtlCol="0"/>
           <a:lstStyle/>
           <a:p>
-            <a:pPr rtl="0"/>
-            <a:endParaRPr lang="it-IT" dirty="0"/>
+            <a:pPr marL="0" marR="0" lvl="0" indent="0" algn="l" defTabSz="914400" rtl="0" eaLnBrk="1" fontAlgn="auto" latinLnBrk="0" hangingPunct="1">
+              <a:lnSpc>
+                <a:spcPct val="100000"/>
+              </a:lnSpc>
+              <a:spcBef>
+                <a:spcPts val="0"/>
+              </a:spcBef>
+              <a:spcAft>
+                <a:spcPts val="0"/>
+              </a:spcAft>
+              <a:buClrTx/>
+              <a:buSzTx/>
+              <a:buFontTx/>
+              <a:buNone/>
+              <a:tabLst/>
+              <a:defRPr/>
+            </a:pPr>
+            <a:endParaRPr lang="it-IT" sz="1800" u="sng" dirty="0">
+              <a:effectLst/>
+              <a:latin typeface="Calibri" panose="020F0502020204030204" pitchFamily="34" charset="0"/>
+              <a:ea typeface="Calibri" panose="020F0502020204030204" pitchFamily="34" charset="0"/>
+              <a:cs typeface="Times New Roman" panose="02020603050405020304" pitchFamily="18" charset="0"/>
+            </a:endParaRPr>
           </a:p>
         </p:txBody>
       </p:sp>
@@ -1351,10 +1464,123 @@
         </p:nvSpPr>
         <p:spPr/>
         <p:txBody>
-          <a:bodyPr rtlCol="0"/>
+          <a:bodyPr/>
           <a:lstStyle/>
           <a:p>
-            <a:pPr rtl="0"/>
+            <a:r>
+              <a:rPr lang="it-IT" dirty="0" err="1"/>
+              <a:t>As</a:t>
+            </a:r>
+            <a:r>
+              <a:rPr lang="it-IT" dirty="0"/>
+              <a:t> </a:t>
+            </a:r>
+            <a:r>
+              <a:rPr lang="it-IT" dirty="0" err="1"/>
+              <a:t>we</a:t>
+            </a:r>
+            <a:r>
+              <a:rPr lang="it-IT" dirty="0"/>
+              <a:t> can </a:t>
+            </a:r>
+            <a:r>
+              <a:rPr lang="it-IT" dirty="0" err="1"/>
+              <a:t>see</a:t>
+            </a:r>
+            <a:r>
+              <a:rPr lang="it-IT" dirty="0"/>
+              <a:t>, the pressure </a:t>
+            </a:r>
+            <a:r>
+              <a:rPr lang="it-IT" dirty="0" err="1"/>
+              <a:t>value</a:t>
+            </a:r>
+            <a:r>
+              <a:rPr lang="it-IT" dirty="0"/>
+              <a:t> </a:t>
+            </a:r>
+            <a:r>
+              <a:rPr lang="it-IT" dirty="0" err="1"/>
+              <a:t>quickly</a:t>
+            </a:r>
+            <a:r>
+              <a:rPr lang="it-IT" dirty="0"/>
+              <a:t> </a:t>
+            </a:r>
+            <a:r>
+              <a:rPr lang="it-IT" dirty="0" err="1"/>
+              <a:t>settles</a:t>
+            </a:r>
+            <a:r>
+              <a:rPr lang="it-IT" dirty="0"/>
+              <a:t> to </a:t>
+            </a:r>
+            <a:r>
+              <a:rPr lang="it-IT" dirty="0" err="1"/>
+              <a:t>its</a:t>
+            </a:r>
+            <a:r>
+              <a:rPr lang="it-IT" dirty="0"/>
+              <a:t> </a:t>
+            </a:r>
+            <a:r>
+              <a:rPr lang="it-IT" dirty="0" err="1"/>
+              <a:t>reference</a:t>
+            </a:r>
+            <a:r>
+              <a:rPr lang="it-IT" dirty="0"/>
+              <a:t>, with the </a:t>
+            </a:r>
+            <a:r>
+              <a:rPr lang="it-IT" dirty="0" err="1"/>
+              <a:t>imposed</a:t>
+            </a:r>
+            <a:r>
+              <a:rPr lang="it-IT" dirty="0"/>
+              <a:t> </a:t>
+            </a:r>
+            <a:r>
+              <a:rPr lang="it-IT" dirty="0" err="1"/>
+              <a:t>Settling</a:t>
+            </a:r>
+            <a:r>
+              <a:rPr lang="it-IT" dirty="0"/>
+              <a:t> time. </a:t>
+            </a:r>
+            <a:r>
+              <a:rPr lang="it-IT" dirty="0" err="1"/>
+              <a:t>As</a:t>
+            </a:r>
+            <a:r>
+              <a:rPr lang="it-IT" dirty="0"/>
+              <a:t> </a:t>
+            </a:r>
+            <a:r>
+              <a:rPr lang="it-IT" dirty="0" err="1"/>
+              <a:t>before</a:t>
+            </a:r>
+            <a:r>
+              <a:rPr lang="it-IT" dirty="0"/>
+              <a:t>, small spikes in the </a:t>
+            </a:r>
+            <a:r>
+              <a:rPr lang="it-IT" dirty="0" err="1"/>
+              <a:t>profile</a:t>
+            </a:r>
+            <a:r>
+              <a:rPr lang="it-IT" dirty="0"/>
+              <a:t> </a:t>
+            </a:r>
+            <a:r>
+              <a:rPr lang="it-IT" dirty="0" err="1"/>
+              <a:t>appear</a:t>
+            </a:r>
+            <a:r>
+              <a:rPr lang="it-IT" dirty="0"/>
+              <a:t> in the case of Night and day switch</a:t>
+            </a:r>
+          </a:p>
+          <a:p>
             <a:endParaRPr lang="it-IT" dirty="0"/>
           </a:p>
         </p:txBody>
@@ -1371,22 +1597,22 @@
         </p:nvSpPr>
         <p:spPr/>
         <p:txBody>
-          <a:bodyPr rtlCol="0"/>
+          <a:bodyPr/>
           <a:lstStyle/>
           <a:p>
             <a:pPr rtl="0"/>
             <a:fld id="{79230CFA-805A-4FD3-B3A0-DAAA5993DA17}" type="slidenum">
-              <a:rPr lang="it-IT" smtClean="0"/>
-              <a:t>8</a:t>
+              <a:rPr lang="it-IT" noProof="0" smtClean="0"/>
+              <a:t>6</a:t>
             </a:fld>
-            <a:endParaRPr lang="it-IT" dirty="0"/>
+            <a:endParaRPr lang="it-IT" noProof="0" dirty="0"/>
           </a:p>
         </p:txBody>
       </p:sp>
     </p:spTree>
     <p:extLst>
       <p:ext uri="{BB962C8B-B14F-4D97-AF65-F5344CB8AC3E}">
-        <p14:creationId xmlns:p14="http://schemas.microsoft.com/office/powerpoint/2010/main" val="3009333175"/>
+        <p14:creationId xmlns:p14="http://schemas.microsoft.com/office/powerpoint/2010/main" val="2085547519"/>
       </p:ext>
     </p:extLst>
   </p:cSld>
@@ -1463,7 +1689,7 @@
             <a:pPr rtl="0"/>
             <a:fld id="{79230CFA-805A-4FD3-B3A0-DAAA5993DA17}" type="slidenum">
               <a:rPr lang="it-IT" smtClean="0"/>
-              <a:t>9</a:t>
+              <a:t>8</a:t>
             </a:fld>
             <a:endParaRPr lang="it-IT" dirty="0"/>
           </a:p>
@@ -1472,7 +1698,7 @@
     </p:spTree>
     <p:extLst>
       <p:ext uri="{BB962C8B-B14F-4D97-AF65-F5344CB8AC3E}">
-        <p14:creationId xmlns:p14="http://schemas.microsoft.com/office/powerpoint/2010/main" val="3463671399"/>
+        <p14:creationId xmlns:p14="http://schemas.microsoft.com/office/powerpoint/2010/main" val="3009333175"/>
       </p:ext>
     </p:extLst>
   </p:cSld>
@@ -1549,7 +1775,7 @@
             <a:pPr rtl="0"/>
             <a:fld id="{79230CFA-805A-4FD3-B3A0-DAAA5993DA17}" type="slidenum">
               <a:rPr lang="it-IT" smtClean="0"/>
-              <a:t>10</a:t>
+              <a:t>9</a:t>
             </a:fld>
             <a:endParaRPr lang="it-IT" dirty="0"/>
           </a:p>
@@ -1558,7 +1784,7 @@
     </p:spTree>
     <p:extLst>
       <p:ext uri="{BB962C8B-B14F-4D97-AF65-F5344CB8AC3E}">
-        <p14:creationId xmlns:p14="http://schemas.microsoft.com/office/powerpoint/2010/main" val="2201537546"/>
+        <p14:creationId xmlns:p14="http://schemas.microsoft.com/office/powerpoint/2010/main" val="3463671399"/>
       </p:ext>
     </p:extLst>
   </p:cSld>
@@ -1635,7 +1861,7 @@
             <a:pPr rtl="0"/>
             <a:fld id="{79230CFA-805A-4FD3-B3A0-DAAA5993DA17}" type="slidenum">
               <a:rPr lang="it-IT" smtClean="0"/>
-              <a:t>11</a:t>
+              <a:t>10</a:t>
             </a:fld>
             <a:endParaRPr lang="it-IT" dirty="0"/>
           </a:p>
@@ -1644,7 +1870,7 @@
     </p:spTree>
     <p:extLst>
       <p:ext uri="{BB962C8B-B14F-4D97-AF65-F5344CB8AC3E}">
-        <p14:creationId xmlns:p14="http://schemas.microsoft.com/office/powerpoint/2010/main" val="1407038931"/>
+        <p14:creationId xmlns:p14="http://schemas.microsoft.com/office/powerpoint/2010/main" val="2201537546"/>
       </p:ext>
     </p:extLst>
   </p:cSld>
@@ -1721,7 +1947,7 @@
             <a:pPr rtl="0"/>
             <a:fld id="{79230CFA-805A-4FD3-B3A0-DAAA5993DA17}" type="slidenum">
               <a:rPr lang="it-IT" smtClean="0"/>
-              <a:t>14</a:t>
+              <a:t>11</a:t>
             </a:fld>
             <a:endParaRPr lang="it-IT" dirty="0"/>
           </a:p>
@@ -1730,7 +1956,7 @@
     </p:spTree>
     <p:extLst>
       <p:ext uri="{BB962C8B-B14F-4D97-AF65-F5344CB8AC3E}">
-        <p14:creationId xmlns:p14="http://schemas.microsoft.com/office/powerpoint/2010/main" val="2325599298"/>
+        <p14:creationId xmlns:p14="http://schemas.microsoft.com/office/powerpoint/2010/main" val="1407038931"/>
       </p:ext>
     </p:extLst>
   </p:cSld>
@@ -3640,7 +3866,7 @@
             <a:pPr rtl="0"/>
             <a:fld id="{8699F50C-BE38-4BD0-BA84-9B090E1F2B9B}" type="slidenum">
               <a:rPr lang="it-IT" noProof="0" smtClean="0"/>
-              <a:t>‹#›</a:t>
+              <a:t>‹N›</a:t>
             </a:fld>
             <a:endParaRPr lang="it-IT" noProof="0" dirty="0"/>
           </a:p>
@@ -4220,7 +4446,7 @@
             <a:pPr rtl="0"/>
             <a:fld id="{8699F50C-BE38-4BD0-BA84-9B090E1F2B9B}" type="slidenum">
               <a:rPr lang="it-IT" noProof="0" smtClean="0"/>
-              <a:t>‹#›</a:t>
+              <a:t>‹N›</a:t>
             </a:fld>
             <a:endParaRPr lang="it-IT" noProof="0" dirty="0"/>
           </a:p>
@@ -4917,7 +5143,7 @@
             <a:pPr rtl="0"/>
             <a:fld id="{8699F50C-BE38-4BD0-BA84-9B090E1F2B9B}" type="slidenum">
               <a:rPr lang="it-IT" noProof="0" smtClean="0"/>
-              <a:t>‹#›</a:t>
+              <a:t>‹N›</a:t>
             </a:fld>
             <a:endParaRPr lang="it-IT" noProof="0" dirty="0"/>
           </a:p>
@@ -6663,7 +6889,7 @@
             <a:pPr rtl="0"/>
             <a:fld id="{8699F50C-BE38-4BD0-BA84-9B090E1F2B9B}" type="slidenum">
               <a:rPr lang="it-IT" noProof="0" smtClean="0"/>
-              <a:t>‹#›</a:t>
+              <a:t>‹N›</a:t>
             </a:fld>
             <a:endParaRPr lang="it-IT" noProof="0" dirty="0"/>
           </a:p>
@@ -7069,7 +7295,7 @@
             <a:pPr rtl="0"/>
             <a:fld id="{8699F50C-BE38-4BD0-BA84-9B090E1F2B9B}" type="slidenum">
               <a:rPr lang="it-IT" noProof="0" smtClean="0"/>
-              <a:t>‹#›</a:t>
+              <a:t>‹N›</a:t>
             </a:fld>
             <a:endParaRPr lang="it-IT" noProof="0" dirty="0"/>
           </a:p>
@@ -8598,7 +8824,7 @@
             <a:pPr rtl="0"/>
             <a:fld id="{8699F50C-BE38-4BD0-BA84-9B090E1F2B9B}" type="slidenum">
               <a:rPr lang="it-IT" noProof="0" smtClean="0"/>
-              <a:t>‹#›</a:t>
+              <a:t>‹N›</a:t>
             </a:fld>
             <a:endParaRPr lang="it-IT" noProof="0" dirty="0"/>
           </a:p>
@@ -9227,7 +9453,7 @@
             <a:pPr rtl="0"/>
             <a:fld id="{8699F50C-BE38-4BD0-BA84-9B090E1F2B9B}" type="slidenum">
               <a:rPr lang="it-IT" noProof="0" smtClean="0"/>
-              <a:t>‹#›</a:t>
+              <a:t>‹N›</a:t>
             </a:fld>
             <a:endParaRPr lang="it-IT" noProof="0" dirty="0"/>
           </a:p>
@@ -10101,7 +10327,7 @@
             <a:pPr rtl="0"/>
             <a:fld id="{8699F50C-BE38-4BD0-BA84-9B090E1F2B9B}" type="slidenum">
               <a:rPr lang="it-IT" noProof="0" smtClean="0"/>
-              <a:t>‹#›</a:t>
+              <a:t>‹N›</a:t>
             </a:fld>
             <a:endParaRPr lang="it-IT" noProof="0" dirty="0"/>
           </a:p>
@@ -10567,7 +10793,7 @@
             <a:pPr rtl="0"/>
             <a:fld id="{8699F50C-BE38-4BD0-BA84-9B090E1F2B9B}" type="slidenum">
               <a:rPr lang="it-IT" noProof="0" smtClean="0"/>
-              <a:t>‹#›</a:t>
+              <a:t>‹N›</a:t>
             </a:fld>
             <a:endParaRPr lang="it-IT" noProof="0" dirty="0"/>
           </a:p>
@@ -11202,7 +11428,7 @@
             <a:pPr rtl="0"/>
             <a:fld id="{8699F50C-BE38-4BD0-BA84-9B090E1F2B9B}" type="slidenum">
               <a:rPr lang="it-IT" noProof="0" smtClean="0"/>
-              <a:t>‹#›</a:t>
+              <a:t>‹N›</a:t>
             </a:fld>
             <a:endParaRPr lang="it-IT" noProof="0" dirty="0"/>
           </a:p>
@@ -13597,7 +13823,7 @@
             <a:fld id="{8699F50C-BE38-4BD0-BA84-9B090E1F2B9B}" type="slidenum">
               <a:rPr lang="it-IT" noProof="0" smtClean="0"/>
               <a:pPr rtl="0"/>
-              <a:t>‹#›</a:t>
+              <a:t>‹N›</a:t>
             </a:fld>
             <a:endParaRPr lang="it-IT" noProof="0" dirty="0"/>
           </a:p>
@@ -18676,8 +18902,8 @@
           </a:p>
         </p:txBody>
       </p:sp>
-      <mc:AlternateContent xmlns:mc="http://schemas.openxmlformats.org/markup-compatibility/2006" xmlns:a14="http://schemas.microsoft.com/office/drawing/2010/main">
-        <mc:Choice Requires="a14">
+      <mc:AlternateContent xmlns:mc="http://schemas.openxmlformats.org/markup-compatibility/2006">
+        <mc:Choice xmlns:a14="http://schemas.microsoft.com/office/drawing/2010/main" Requires="a14">
           <p:sp>
             <p:nvSpPr>
               <p:cNvPr id="5" name="Segnaposto contenuto 4"/>
@@ -19329,37 +19555,83 @@
               <a:p>
                 <a:r>
                   <a:rPr lang="en-GB" sz="2000" dirty="0"/>
-                  <a:t>Try impose a Settling time (not exact, since the model is approximated) </a:t>
+                  <a:t>Select experimentally a </a:t>
+                </a:r>
+                <a:r>
+                  <a:rPr lang="en-GB" sz="2000" dirty="0" err="1"/>
+                  <a:t>wc</a:t>
+                </a:r>
+                <a:r>
+                  <a:rPr lang="en-GB" sz="2000" dirty="0"/>
+                  <a:t> </a:t>
+                </a:r>
+                <a:r>
+                  <a:rPr lang="en-GB" sz="2000" dirty="0">
+                    <a:sym typeface="Wingdings" panose="05000000000000000000" pitchFamily="2" charset="2"/>
+                  </a:rPr>
+                  <a:t> </a:t>
                 </a:r>
                 <a14:m>
                   <m:oMath xmlns:m="http://schemas.openxmlformats.org/officeDocument/2006/math">
                     <m:r>
-                      <a:rPr lang="en-GB" sz="2000" i="1" dirty="0" smtClean="0">
+                      <m:rPr>
+                        <m:sty m:val="p"/>
+                      </m:rPr>
+                      <a:rPr lang="it-IT" sz="2000" b="0" i="0" dirty="0" smtClean="0">
                         <a:latin typeface="Cambria Math" panose="02040503050406030204" pitchFamily="18" charset="0"/>
                       </a:rPr>
-                      <m:t>𝑇𝑎</m:t>
+                      <m:t>wc</m:t>
                     </m:r>
                     <m:r>
                       <a:rPr lang="en-GB" sz="2000" i="1" dirty="0" smtClean="0">
                         <a:latin typeface="Cambria Math" panose="02040503050406030204" pitchFamily="18" charset="0"/>
                       </a:rPr>
-                      <m:t> = 10 </m:t>
+                      <m:t> =</m:t>
                     </m:r>
                     <m:r>
                       <a:rPr lang="it-IT" sz="2000" b="0" i="1" dirty="0" smtClean="0">
                         <a:latin typeface="Cambria Math" panose="02040503050406030204" pitchFamily="18" charset="0"/>
                       </a:rPr>
-                      <m:t>𝑚𝑖𝑛</m:t>
+                      <m:t>0,008</m:t>
                     </m:r>
                     <m:r>
                       <a:rPr lang="en-GB" sz="2000" i="1" dirty="0" smtClean="0">
                         <a:latin typeface="Cambria Math" panose="02040503050406030204" pitchFamily="18" charset="0"/>
                       </a:rPr>
-                      <m:t>⁡</m:t>
+                      <m:t> </m:t>
+                    </m:r>
+                    <m:r>
+                      <a:rPr lang="it-IT" sz="2000" b="0" i="1" dirty="0" smtClean="0">
+                        <a:latin typeface="Cambria Math" panose="02040503050406030204" pitchFamily="18" charset="0"/>
+                      </a:rPr>
+                      <m:t>𝑟𝑎𝑑</m:t>
+                    </m:r>
+                    <m:r>
+                      <a:rPr lang="it-IT" sz="2000" b="0" i="1" dirty="0" smtClean="0">
+                        <a:latin typeface="Cambria Math" panose="02040503050406030204" pitchFamily="18" charset="0"/>
+                      </a:rPr>
+                      <m:t>/</m:t>
+                    </m:r>
+                    <m:r>
+                      <a:rPr lang="it-IT" sz="2000" b="0" i="1" dirty="0" smtClean="0">
+                        <a:latin typeface="Cambria Math" panose="02040503050406030204" pitchFamily="18" charset="0"/>
+                      </a:rPr>
+                      <m:t>𝑠</m:t>
                     </m:r>
                   </m:oMath>
                 </a14:m>
-                <a:endParaRPr lang="en-GB" sz="2000" dirty="0"/>
+                <a:r>
+                  <a:rPr lang="en-GB" sz="2000" dirty="0"/>
+                  <a:t> (good </a:t>
+                </a:r>
+                <a:r>
+                  <a:rPr lang="en-GB" sz="2000" dirty="0" err="1"/>
+                  <a:t>tradeoff</a:t>
+                </a:r>
+                <a:r>
+                  <a:rPr lang="en-GB" sz="2000" dirty="0"/>
+                  <a:t>)</a:t>
+                </a:r>
               </a:p>
               <a:p>
                 <a14:m>
@@ -19374,7 +19646,7 @@
                       <a:rPr lang="it-IT" sz="2000" b="0" i="1" smtClean="0">
                         <a:latin typeface="Cambria Math" panose="02040503050406030204" pitchFamily="18" charset="0"/>
                       </a:rPr>
-                      <m:t>=1.145∙</m:t>
+                      <m:t>=4,7517∙</m:t>
                     </m:r>
                     <m:sSup>
                       <m:sSupPr>
@@ -19434,12 +19706,12 @@
                 <a:endParaRPr lang="en-GB" sz="2000" dirty="0"/>
               </a:p>
               <a:p>
-                <a:endParaRPr lang="en-GB" sz="2000" dirty="0"/>
+                <a:endParaRPr lang="en-GB" sz="2000" u="sng" dirty="0"/>
               </a:p>
             </p:txBody>
           </p:sp>
         </mc:Choice>
-        <mc:Fallback xmlns="">
+        <mc:Fallback>
           <p:sp>
             <p:nvSpPr>
               <p:cNvPr id="5" name="Segnaposto contenuto 4"/>
@@ -19463,7 +19735,7 @@
               <a:lstStyle/>
               <a:p>
                 <a:r>
-                  <a:rPr lang="en-GB">
+                  <a:rPr lang="it-IT">
                     <a:noFill/>
                   </a:rPr>
                   <a:t> </a:t>
@@ -19609,10 +19881,10 @@
       </p:sp>
       <p:pic>
         <p:nvPicPr>
-          <p:cNvPr id="7" name="Segnaposto contenuto 6">
-            <a:extLst>
-              <a:ext uri="{FF2B5EF4-FFF2-40B4-BE49-F238E27FC236}">
-                <a16:creationId xmlns:a16="http://schemas.microsoft.com/office/drawing/2014/main" id="{61AC59B8-5780-2A40-4164-8376A92D6808}"/>
+          <p:cNvPr id="10" name="Segnaposto contenuto 9">
+            <a:extLst>
+              <a:ext uri="{FF2B5EF4-FFF2-40B4-BE49-F238E27FC236}">
+                <a16:creationId xmlns:a16="http://schemas.microsoft.com/office/drawing/2014/main" id="{B02D8E2E-0D6F-D21B-3740-00B3747BCF57}"/>
               </a:ext>
             </a:extLst>
           </p:cNvPr>
@@ -19631,62 +19903,41 @@
         </p:blipFill>
         <p:spPr>
           <a:xfrm>
-            <a:off x="733932" y="1356997"/>
-            <a:ext cx="10723949" cy="5291975"/>
+            <a:off x="430854" y="1469022"/>
+            <a:ext cx="6697242" cy="3304905"/>
           </a:xfrm>
         </p:spPr>
       </p:pic>
-      <p:sp>
-        <p:nvSpPr>
-          <p:cNvPr id="8" name="CasellaDiTesto 7">
-            <a:extLst>
-              <a:ext uri="{FF2B5EF4-FFF2-40B4-BE49-F238E27FC236}">
-                <a16:creationId xmlns:a16="http://schemas.microsoft.com/office/drawing/2014/main" id="{26B0D1A2-2F7B-A3DF-B3CC-2396DB4BDB2C}"/>
-              </a:ext>
-            </a:extLst>
-          </p:cNvPr>
-          <p:cNvSpPr txBox="1"/>
+      <p:pic>
+        <p:nvPicPr>
+          <p:cNvPr id="12" name="Immagine 11">
+            <a:extLst>
+              <a:ext uri="{FF2B5EF4-FFF2-40B4-BE49-F238E27FC236}">
+                <a16:creationId xmlns:a16="http://schemas.microsoft.com/office/drawing/2014/main" id="{032E6319-C6D3-9DDE-834A-FE7C55441F94}"/>
+              </a:ext>
+            </a:extLst>
+          </p:cNvPr>
+          <p:cNvPicPr>
+            <a:picLocks noChangeAspect="1"/>
+          </p:cNvPicPr>
           <p:nvPr/>
-        </p:nvSpPr>
+        </p:nvPicPr>
+        <p:blipFill>
+          <a:blip r:embed="rId3"/>
+          <a:stretch>
+            <a:fillRect/>
+          </a:stretch>
+        </p:blipFill>
         <p:spPr>
           <a:xfrm>
-            <a:off x="4061012" y="4464424"/>
-            <a:ext cx="5472953" cy="369332"/>
+            <a:off x="4705418" y="3121475"/>
+            <a:ext cx="7295238" cy="3600000"/>
           </a:xfrm>
           <a:prstGeom prst="rect">
             <a:avLst/>
           </a:prstGeom>
-          <a:noFill/>
         </p:spPr>
-        <p:txBody>
-          <a:bodyPr wrap="square" rtlCol="0">
-            <a:spAutoFit/>
-          </a:bodyPr>
-          <a:lstStyle/>
-          <a:p>
-            <a:r>
-              <a:rPr lang="it-IT" dirty="0"/>
-              <a:t>Spikes are </a:t>
-            </a:r>
-            <a:r>
-              <a:rPr lang="it-IT" dirty="0" err="1"/>
-              <a:t>caused</a:t>
-            </a:r>
-            <a:r>
-              <a:rPr lang="it-IT" dirty="0"/>
-              <a:t> by switch </a:t>
-            </a:r>
-            <a:r>
-              <a:rPr lang="it-IT" dirty="0" err="1"/>
-              <a:t>between</a:t>
-            </a:r>
-            <a:r>
-              <a:rPr lang="it-IT" dirty="0"/>
-              <a:t> night and day</a:t>
-            </a:r>
-          </a:p>
-        </p:txBody>
-      </p:sp>
+      </p:pic>
     </p:spTree>
     <p:extLst>
       <p:ext uri="{BB962C8B-B14F-4D97-AF65-F5344CB8AC3E}">
@@ -21372,216 +21623,14 @@
           </a:ln>
         </p:spPr>
       </p:pic>
-    </p:spTree>
-    <p:extLst>
-      <p:ext uri="{BB962C8B-B14F-4D97-AF65-F5344CB8AC3E}">
-        <p14:creationId xmlns:p14="http://schemas.microsoft.com/office/powerpoint/2010/main" val="2146184994"/>
-      </p:ext>
-    </p:extLst>
-  </p:cSld>
-  <p:clrMapOvr>
-    <a:masterClrMapping/>
-  </p:clrMapOvr>
-  <mc:AlternateContent xmlns:mc="http://schemas.openxmlformats.org/markup-compatibility/2006" xmlns:p14="http://schemas.microsoft.com/office/powerpoint/2010/main">
-    <mc:Choice Requires="p14">
-      <p:transition spd="med" p14:dur="700">
-        <p:fade/>
-      </p:transition>
-    </mc:Choice>
-    <mc:Fallback xmlns="">
-      <p:transition spd="med">
-        <p:fade/>
-      </p:transition>
-    </mc:Fallback>
-  </mc:AlternateContent>
-</p:sld>
-</file>
-
-<file path=ppt/slides/slide6.xml><?xml version="1.0" encoding="utf-8"?>
-<p:sld xmlns:a="http://schemas.openxmlformats.org/drawingml/2006/main" xmlns:r="http://schemas.openxmlformats.org/officeDocument/2006/relationships" xmlns:p="http://schemas.openxmlformats.org/presentationml/2006/main">
-  <p:cSld>
-    <p:spTree>
-      <p:nvGrpSpPr>
-        <p:cNvPr id="1" name=""/>
-        <p:cNvGrpSpPr/>
-        <p:nvPr/>
-      </p:nvGrpSpPr>
-      <p:grpSpPr>
-        <a:xfrm>
-          <a:off x="0" y="0"/>
-          <a:ext cx="0" cy="0"/>
-          <a:chOff x="0" y="0"/>
-          <a:chExt cx="0" cy="0"/>
-        </a:xfrm>
-      </p:grpSpPr>
-      <p:pic>
-        <p:nvPicPr>
-          <p:cNvPr id="13" name="Immagine 12">
-            <a:extLst>
-              <a:ext uri="{FF2B5EF4-FFF2-40B4-BE49-F238E27FC236}">
-                <a16:creationId xmlns:a16="http://schemas.microsoft.com/office/drawing/2014/main" id="{F0DA40D6-1F83-F71C-170C-2CBFFBAB5692}"/>
-              </a:ext>
-            </a:extLst>
-          </p:cNvPr>
-          <p:cNvPicPr>
-            <a:picLocks noChangeAspect="1"/>
-          </p:cNvPicPr>
-          <p:nvPr/>
-        </p:nvPicPr>
-        <p:blipFill>
-          <a:blip r:embed="rId2"/>
-          <a:stretch>
-            <a:fillRect/>
-          </a:stretch>
-        </p:blipFill>
-        <p:spPr>
-          <a:xfrm>
-            <a:off x="338530" y="1184378"/>
-            <a:ext cx="11741823" cy="4992586"/>
-          </a:xfrm>
-          <a:prstGeom prst="rect">
-            <a:avLst/>
-          </a:prstGeom>
-        </p:spPr>
-      </p:pic>
-      <p:sp>
-        <p:nvSpPr>
-          <p:cNvPr id="2" name="Segnaposto piè di pagina 1">
-            <a:extLst>
-              <a:ext uri="{FF2B5EF4-FFF2-40B4-BE49-F238E27FC236}">
-                <a16:creationId xmlns:a16="http://schemas.microsoft.com/office/drawing/2014/main" id="{7ECF0201-274F-CB13-84A4-EC01CA3B47A1}"/>
-              </a:ext>
-            </a:extLst>
-          </p:cNvPr>
-          <p:cNvSpPr>
-            <a:spLocks noGrp="1"/>
-          </p:cNvSpPr>
-          <p:nvPr>
-            <p:ph type="ftr" sz="quarter" idx="17"/>
-          </p:nvPr>
-        </p:nvSpPr>
-        <p:spPr/>
-        <p:txBody>
-          <a:bodyPr/>
-          <a:lstStyle/>
-          <a:p>
-            <a:pPr rtl="0"/>
-            <a:r>
-              <a:rPr lang="it-IT" noProof="0"/>
-              <a:t>Aggiungere un piè di pagina</a:t>
-            </a:r>
-            <a:endParaRPr lang="it-IT" noProof="0" dirty="0"/>
-          </a:p>
-        </p:txBody>
-      </p:sp>
-      <p:sp>
-        <p:nvSpPr>
-          <p:cNvPr id="3" name="Segnaposto numero diapositiva 2">
-            <a:extLst>
-              <a:ext uri="{FF2B5EF4-FFF2-40B4-BE49-F238E27FC236}">
-                <a16:creationId xmlns:a16="http://schemas.microsoft.com/office/drawing/2014/main" id="{72060108-C654-5DE3-9502-9556DDB2347B}"/>
-              </a:ext>
-            </a:extLst>
-          </p:cNvPr>
-          <p:cNvSpPr>
-            <a:spLocks noGrp="1"/>
-          </p:cNvSpPr>
-          <p:nvPr>
-            <p:ph type="sldNum" sz="quarter" idx="18"/>
-          </p:nvPr>
-        </p:nvSpPr>
-        <p:spPr/>
-        <p:txBody>
-          <a:bodyPr/>
-          <a:lstStyle/>
-          <a:p>
-            <a:pPr rtl="0"/>
-            <a:fld id="{8699F50C-BE38-4BD0-BA84-9B090E1F2B9B}" type="slidenum">
-              <a:rPr lang="it-IT" noProof="0" smtClean="0"/>
-              <a:t>6</a:t>
-            </a:fld>
-            <a:endParaRPr lang="it-IT" noProof="0" dirty="0"/>
-          </a:p>
-        </p:txBody>
-      </p:sp>
-      <p:sp>
-        <p:nvSpPr>
-          <p:cNvPr id="4" name="Titolo 3">
-            <a:extLst>
-              <a:ext uri="{FF2B5EF4-FFF2-40B4-BE49-F238E27FC236}">
-                <a16:creationId xmlns:a16="http://schemas.microsoft.com/office/drawing/2014/main" id="{70E95F49-3ED3-C270-628D-B167CE7C4893}"/>
-              </a:ext>
-            </a:extLst>
-          </p:cNvPr>
-          <p:cNvSpPr>
-            <a:spLocks noGrp="1"/>
-          </p:cNvSpPr>
-          <p:nvPr>
-            <p:ph type="title"/>
-          </p:nvPr>
-        </p:nvSpPr>
-        <p:spPr>
-          <a:xfrm>
-            <a:off x="518678" y="499135"/>
-            <a:ext cx="8333222" cy="864628"/>
-          </a:xfrm>
-        </p:spPr>
-        <p:txBody>
-          <a:bodyPr/>
-          <a:lstStyle/>
-          <a:p>
-            <a:r>
-              <a:rPr lang="it-IT" dirty="0"/>
-              <a:t>Pump Control</a:t>
-            </a:r>
-          </a:p>
-        </p:txBody>
-      </p:sp>
-      <p:sp>
-        <p:nvSpPr>
-          <p:cNvPr id="5" name="Segnaposto contenuto 4">
-            <a:extLst>
-              <a:ext uri="{FF2B5EF4-FFF2-40B4-BE49-F238E27FC236}">
-                <a16:creationId xmlns:a16="http://schemas.microsoft.com/office/drawing/2014/main" id="{1D1A0C0D-6910-81B4-8B75-83066C315415}"/>
-              </a:ext>
-            </a:extLst>
-          </p:cNvPr>
-          <p:cNvSpPr>
-            <a:spLocks noGrp="1"/>
-          </p:cNvSpPr>
-          <p:nvPr>
-            <p:ph idx="1"/>
-          </p:nvPr>
-        </p:nvSpPr>
-        <p:spPr>
-          <a:xfrm>
-            <a:off x="518678" y="1363764"/>
-            <a:ext cx="10835122" cy="4813200"/>
-          </a:xfrm>
-        </p:spPr>
-        <p:txBody>
-          <a:bodyPr/>
-          <a:lstStyle/>
-          <a:p>
-            <a:endParaRPr lang="it-IT" sz="2000" dirty="0">
-              <a:sym typeface="Wingdings" panose="05000000000000000000" pitchFamily="2" charset="2"/>
-            </a:endParaRPr>
-          </a:p>
-          <a:p>
-            <a:endParaRPr lang="it-IT" sz="2000" dirty="0">
-              <a:sym typeface="Wingdings" panose="05000000000000000000" pitchFamily="2" charset="2"/>
-            </a:endParaRPr>
-          </a:p>
-        </p:txBody>
-      </p:sp>
-      <mc:AlternateContent xmlns:mc="http://schemas.openxmlformats.org/markup-compatibility/2006" xmlns:a14="http://schemas.microsoft.com/office/drawing/2010/main">
-        <mc:Choice Requires="a14">
+      <mc:AlternateContent xmlns:mc="http://schemas.openxmlformats.org/markup-compatibility/2006">
+        <mc:Choice xmlns:a14="http://schemas.microsoft.com/office/drawing/2010/main" Requires="a14">
           <p:sp>
             <p:nvSpPr>
-              <p:cNvPr id="11" name="CasellaDiTesto 10">
+              <p:cNvPr id="9" name="CasellaDiTesto 8">
                 <a:extLst>
                   <a:ext uri="{FF2B5EF4-FFF2-40B4-BE49-F238E27FC236}">
-                    <a16:creationId xmlns:a16="http://schemas.microsoft.com/office/drawing/2014/main" id="{92F8BF0A-052E-67D8-CA7D-799748D51D9B}"/>
+                    <a16:creationId xmlns:a16="http://schemas.microsoft.com/office/drawing/2014/main" id="{0DA46477-79A8-E186-B329-32931B068886}"/>
                   </a:ext>
                 </a:extLst>
               </p:cNvPr>
@@ -21590,7 +21639,7 @@
             </p:nvSpPr>
             <p:spPr>
               <a:xfrm>
-                <a:off x="3598040" y="3355821"/>
+                <a:off x="3098370" y="5158137"/>
                 <a:ext cx="8255430" cy="1198213"/>
               </a:xfrm>
               <a:prstGeom prst="rect">
@@ -21924,13 +21973,13 @@
             </p:txBody>
           </p:sp>
         </mc:Choice>
-        <mc:Fallback xmlns="">
+        <mc:Fallback>
           <p:sp>
             <p:nvSpPr>
-              <p:cNvPr id="11" name="CasellaDiTesto 10">
+              <p:cNvPr id="9" name="CasellaDiTesto 8">
                 <a:extLst>
                   <a:ext uri="{FF2B5EF4-FFF2-40B4-BE49-F238E27FC236}">
-                    <a16:creationId xmlns:a16="http://schemas.microsoft.com/office/drawing/2014/main" id="{92F8BF0A-052E-67D8-CA7D-799748D51D9B}"/>
+                    <a16:creationId xmlns:a16="http://schemas.microsoft.com/office/drawing/2014/main" id="{0DA46477-79A8-E186-B329-32931B068886}"/>
                   </a:ext>
                 </a:extLst>
               </p:cNvPr>
@@ -21941,16 +21990,16 @@
             </p:nvSpPr>
             <p:spPr>
               <a:xfrm>
-                <a:off x="3598040" y="3355821"/>
+                <a:off x="3098370" y="5158137"/>
                 <a:ext cx="8255430" cy="1198213"/>
               </a:xfrm>
               <a:prstGeom prst="rect">
                 <a:avLst/>
               </a:prstGeom>
               <a:blipFill>
-                <a:blip r:embed="rId3"/>
+                <a:blip r:embed="rId5"/>
                 <a:stretch>
-                  <a:fillRect l="-739" r="-222" b="-8122"/>
+                  <a:fillRect l="-738" r="-148" b="-8122"/>
                 </a:stretch>
               </a:blipFill>
             </p:spPr>
@@ -21959,7 +22008,7 @@
               <a:lstStyle/>
               <a:p>
                 <a:r>
-                  <a:rPr lang="en-GB">
+                  <a:rPr lang="it-IT">
                     <a:noFill/>
                   </a:rPr>
                   <a:t> </a:t>
@@ -21969,6 +22018,208 @@
           </p:sp>
         </mc:Fallback>
       </mc:AlternateContent>
+    </p:spTree>
+    <p:extLst>
+      <p:ext uri="{BB962C8B-B14F-4D97-AF65-F5344CB8AC3E}">
+        <p14:creationId xmlns:p14="http://schemas.microsoft.com/office/powerpoint/2010/main" val="2146184994"/>
+      </p:ext>
+    </p:extLst>
+  </p:cSld>
+  <p:clrMapOvr>
+    <a:masterClrMapping/>
+  </p:clrMapOvr>
+  <mc:AlternateContent xmlns:mc="http://schemas.openxmlformats.org/markup-compatibility/2006" xmlns:p14="http://schemas.microsoft.com/office/powerpoint/2010/main">
+    <mc:Choice Requires="p14">
+      <p:transition spd="med" p14:dur="700">
+        <p:fade/>
+      </p:transition>
+    </mc:Choice>
+    <mc:Fallback xmlns="">
+      <p:transition spd="med">
+        <p:fade/>
+      </p:transition>
+    </mc:Fallback>
+  </mc:AlternateContent>
+</p:sld>
+</file>
+
+<file path=ppt/slides/slide6.xml><?xml version="1.0" encoding="utf-8"?>
+<p:sld xmlns:a="http://schemas.openxmlformats.org/drawingml/2006/main" xmlns:r="http://schemas.openxmlformats.org/officeDocument/2006/relationships" xmlns:p="http://schemas.openxmlformats.org/presentationml/2006/main">
+  <p:cSld>
+    <p:spTree>
+      <p:nvGrpSpPr>
+        <p:cNvPr id="1" name=""/>
+        <p:cNvGrpSpPr/>
+        <p:nvPr/>
+      </p:nvGrpSpPr>
+      <p:grpSpPr>
+        <a:xfrm>
+          <a:off x="0" y="0"/>
+          <a:ext cx="0" cy="0"/>
+          <a:chOff x="0" y="0"/>
+          <a:chExt cx="0" cy="0"/>
+        </a:xfrm>
+      </p:grpSpPr>
+      <p:pic>
+        <p:nvPicPr>
+          <p:cNvPr id="13" name="Immagine 12">
+            <a:extLst>
+              <a:ext uri="{FF2B5EF4-FFF2-40B4-BE49-F238E27FC236}">
+                <a16:creationId xmlns:a16="http://schemas.microsoft.com/office/drawing/2014/main" id="{F0DA40D6-1F83-F71C-170C-2CBFFBAB5692}"/>
+              </a:ext>
+            </a:extLst>
+          </p:cNvPr>
+          <p:cNvPicPr>
+            <a:picLocks noChangeAspect="1"/>
+          </p:cNvPicPr>
+          <p:nvPr/>
+        </p:nvPicPr>
+        <p:blipFill>
+          <a:blip r:embed="rId3"/>
+          <a:stretch>
+            <a:fillRect/>
+          </a:stretch>
+        </p:blipFill>
+        <p:spPr>
+          <a:xfrm>
+            <a:off x="338530" y="1184378"/>
+            <a:ext cx="11741823" cy="4992586"/>
+          </a:xfrm>
+          <a:prstGeom prst="rect">
+            <a:avLst/>
+          </a:prstGeom>
+        </p:spPr>
+      </p:pic>
+      <p:sp>
+        <p:nvSpPr>
+          <p:cNvPr id="2" name="Segnaposto piè di pagina 1">
+            <a:extLst>
+              <a:ext uri="{FF2B5EF4-FFF2-40B4-BE49-F238E27FC236}">
+                <a16:creationId xmlns:a16="http://schemas.microsoft.com/office/drawing/2014/main" id="{7ECF0201-274F-CB13-84A4-EC01CA3B47A1}"/>
+              </a:ext>
+            </a:extLst>
+          </p:cNvPr>
+          <p:cNvSpPr>
+            <a:spLocks noGrp="1"/>
+          </p:cNvSpPr>
+          <p:nvPr>
+            <p:ph type="ftr" sz="quarter" idx="17"/>
+          </p:nvPr>
+        </p:nvSpPr>
+        <p:spPr/>
+        <p:txBody>
+          <a:bodyPr/>
+          <a:lstStyle/>
+          <a:p>
+            <a:pPr rtl="0"/>
+            <a:r>
+              <a:rPr lang="it-IT" noProof="0"/>
+              <a:t>Aggiungere un piè di pagina</a:t>
+            </a:r>
+            <a:endParaRPr lang="it-IT" noProof="0" dirty="0"/>
+          </a:p>
+        </p:txBody>
+      </p:sp>
+      <p:sp>
+        <p:nvSpPr>
+          <p:cNvPr id="3" name="Segnaposto numero diapositiva 2">
+            <a:extLst>
+              <a:ext uri="{FF2B5EF4-FFF2-40B4-BE49-F238E27FC236}">
+                <a16:creationId xmlns:a16="http://schemas.microsoft.com/office/drawing/2014/main" id="{72060108-C654-5DE3-9502-9556DDB2347B}"/>
+              </a:ext>
+            </a:extLst>
+          </p:cNvPr>
+          <p:cNvSpPr>
+            <a:spLocks noGrp="1"/>
+          </p:cNvSpPr>
+          <p:nvPr>
+            <p:ph type="sldNum" sz="quarter" idx="18"/>
+          </p:nvPr>
+        </p:nvSpPr>
+        <p:spPr/>
+        <p:txBody>
+          <a:bodyPr/>
+          <a:lstStyle/>
+          <a:p>
+            <a:pPr rtl="0"/>
+            <a:fld id="{8699F50C-BE38-4BD0-BA84-9B090E1F2B9B}" type="slidenum">
+              <a:rPr lang="it-IT" noProof="0" smtClean="0"/>
+              <a:t>6</a:t>
+            </a:fld>
+            <a:endParaRPr lang="it-IT" noProof="0" dirty="0"/>
+          </a:p>
+        </p:txBody>
+      </p:sp>
+      <p:sp>
+        <p:nvSpPr>
+          <p:cNvPr id="4" name="Titolo 3">
+            <a:extLst>
+              <a:ext uri="{FF2B5EF4-FFF2-40B4-BE49-F238E27FC236}">
+                <a16:creationId xmlns:a16="http://schemas.microsoft.com/office/drawing/2014/main" id="{70E95F49-3ED3-C270-628D-B167CE7C4893}"/>
+              </a:ext>
+            </a:extLst>
+          </p:cNvPr>
+          <p:cNvSpPr>
+            <a:spLocks noGrp="1"/>
+          </p:cNvSpPr>
+          <p:nvPr>
+            <p:ph type="title"/>
+          </p:nvPr>
+        </p:nvSpPr>
+        <p:spPr>
+          <a:xfrm>
+            <a:off x="518678" y="499135"/>
+            <a:ext cx="8333222" cy="864628"/>
+          </a:xfrm>
+        </p:spPr>
+        <p:txBody>
+          <a:bodyPr/>
+          <a:lstStyle/>
+          <a:p>
+            <a:r>
+              <a:rPr lang="it-IT" dirty="0"/>
+              <a:t>Pump Control</a:t>
+            </a:r>
+          </a:p>
+        </p:txBody>
+      </p:sp>
+      <p:sp>
+        <p:nvSpPr>
+          <p:cNvPr id="5" name="Segnaposto contenuto 4">
+            <a:extLst>
+              <a:ext uri="{FF2B5EF4-FFF2-40B4-BE49-F238E27FC236}">
+                <a16:creationId xmlns:a16="http://schemas.microsoft.com/office/drawing/2014/main" id="{1D1A0C0D-6910-81B4-8B75-83066C315415}"/>
+              </a:ext>
+            </a:extLst>
+          </p:cNvPr>
+          <p:cNvSpPr>
+            <a:spLocks noGrp="1"/>
+          </p:cNvSpPr>
+          <p:nvPr>
+            <p:ph idx="1"/>
+          </p:nvPr>
+        </p:nvSpPr>
+        <p:spPr>
+          <a:xfrm>
+            <a:off x="518678" y="1363764"/>
+            <a:ext cx="10835122" cy="4813200"/>
+          </a:xfrm>
+        </p:spPr>
+        <p:txBody>
+          <a:bodyPr/>
+          <a:lstStyle/>
+          <a:p>
+            <a:endParaRPr lang="it-IT" sz="2000" dirty="0">
+              <a:sym typeface="Wingdings" panose="05000000000000000000" pitchFamily="2" charset="2"/>
+            </a:endParaRPr>
+          </a:p>
+          <a:p>
+            <a:endParaRPr lang="it-IT" sz="2000" dirty="0">
+              <a:sym typeface="Wingdings" panose="05000000000000000000" pitchFamily="2" charset="2"/>
+            </a:endParaRPr>
+          </a:p>
+        </p:txBody>
+      </p:sp>
     </p:spTree>
     <p:extLst>
       <p:ext uri="{BB962C8B-B14F-4D97-AF65-F5344CB8AC3E}">
@@ -22555,7 +22806,7 @@
                   <pslz:sldZmObj sldId="283" cId="2700837890">
                     <pslz:zmPr id="{EB590B66-7C4A-481E-8359-A14F527EE35E}" imageType="cover" transitionDur="1000">
                       <p166:blipFill xmlns:p166="http://schemas.microsoft.com/office/powerpoint/2016/6/main">
-                        <a:blip r:embed="rId7">
+                        <a:blip r:embed="rId4">
                           <a:extLst>
                             <a:ext uri="{96DAC541-7B7A-43D3-8B79-37D633B846F1}">
                               <asvg:svgBlip xmlns:asvg="http://schemas.microsoft.com/office/drawing/2016/SVG/main" r:embed="rId5"/>
@@ -24388,6 +24639,15 @@
 </file>
 
 <file path=customXml/item1.xml><?xml version="1.0" encoding="utf-8"?>
+<p:properties xmlns:p="http://schemas.microsoft.com/office/2006/metadata/properties" xmlns:xsi="http://www.w3.org/2001/XMLSchema-instance" xmlns:pc="http://schemas.microsoft.com/office/infopath/2007/PartnerControls">
+  <documentManagement>
+    <_ip_UnifiedCompliancePolicyUIAction xmlns="http://schemas.microsoft.com/sharepoint/v3" xsi:nil="true"/>
+    <_ip_UnifiedCompliancePolicyProperties xmlns="http://schemas.microsoft.com/sharepoint/v3" xsi:nil="true"/>
+  </documentManagement>
+</p:properties>
+</file>
+
+<file path=customXml/item2.xml><?xml version="1.0" encoding="utf-8"?>
 <ct:contentTypeSchema xmlns:ct="http://schemas.microsoft.com/office/2006/metadata/contentType" xmlns:ma="http://schemas.microsoft.com/office/2006/metadata/properties/metaAttributes" ct:_="" ma:_="" ma:contentTypeName="Document" ma:contentTypeID="0x010100DEEA25CC0A0AC24199CDC46C25B8B0BC" ma:contentTypeVersion="10" ma:contentTypeDescription="Create a new document." ma:contentTypeScope="" ma:versionID="e3b47856d4cf355c0dacb39e1084d14f">
   <xsd:schema xmlns:xsd="http://www.w3.org/2001/XMLSchema" xmlns:xs="http://www.w3.org/2001/XMLSchema" xmlns:p="http://schemas.microsoft.com/office/2006/metadata/properties" xmlns:ns1="http://schemas.microsoft.com/sharepoint/v3" xmlns:ns2="6dc4bcd6-49db-4c07-9060-8acfc67cef9f" xmlns:ns3="fb0879af-3eba-417a-a55a-ffe6dcd6ca77" targetNamespace="http://schemas.microsoft.com/office/2006/metadata/properties" ma:root="true" ma:fieldsID="a845a615265fdb1f7b12cc65ac20ecbd" ns1:_="" ns2:_="" ns3:_="">
     <xsd:import namespace="http://schemas.microsoft.com/sharepoint/v3"/>
@@ -24595,15 +24855,6 @@
 </ct:contentTypeSchema>
 </file>
 
-<file path=customXml/item2.xml><?xml version="1.0" encoding="utf-8"?>
-<p:properties xmlns:p="http://schemas.microsoft.com/office/2006/metadata/properties" xmlns:xsi="http://www.w3.org/2001/XMLSchema-instance" xmlns:pc="http://schemas.microsoft.com/office/infopath/2007/PartnerControls">
-  <documentManagement>
-    <_ip_UnifiedCompliancePolicyUIAction xmlns="http://schemas.microsoft.com/sharepoint/v3" xsi:nil="true"/>
-    <_ip_UnifiedCompliancePolicyProperties xmlns="http://schemas.microsoft.com/sharepoint/v3" xsi:nil="true"/>
-  </documentManagement>
-</p:properties>
-</file>
-
 <file path=customXml/item3.xml><?xml version="1.0" encoding="utf-8"?>
 <?mso-contentType ?>
 <FormTemplates xmlns="http://schemas.microsoft.com/sharepoint/v3/contenttype/forms">
@@ -24614,6 +24865,16 @@
 </file>
 
 <file path=customXml/itemProps1.xml><?xml version="1.0" encoding="utf-8"?>
+<ds:datastoreItem xmlns:ds="http://schemas.openxmlformats.org/officeDocument/2006/customXml" ds:itemID="{374D15D6-87BC-477C-8E91-9F90829C2FC8}">
+  <ds:schemaRefs>
+    <ds:schemaRef ds:uri="http://schemas.microsoft.com/office/2006/metadata/properties"/>
+    <ds:schemaRef ds:uri="http://schemas.microsoft.com/office/infopath/2007/PartnerControls"/>
+    <ds:schemaRef ds:uri="http://schemas.microsoft.com/sharepoint/v3"/>
+  </ds:schemaRefs>
+</ds:datastoreItem>
+</file>
+
+<file path=customXml/itemProps2.xml><?xml version="1.0" encoding="utf-8"?>
 <ds:datastoreItem xmlns:ds="http://schemas.openxmlformats.org/officeDocument/2006/customXml" ds:itemID="{D19A80A7-0DD1-4CF4-ABD5-362A6549C557}">
   <ds:schemaRefs>
     <ds:schemaRef ds:uri="http://schemas.microsoft.com/office/2006/metadata/contentType"/>
@@ -24633,16 +24894,6 @@
 </ds:datastoreItem>
 </file>
 
-<file path=customXml/itemProps2.xml><?xml version="1.0" encoding="utf-8"?>
-<ds:datastoreItem xmlns:ds="http://schemas.openxmlformats.org/officeDocument/2006/customXml" ds:itemID="{374D15D6-87BC-477C-8E91-9F90829C2FC8}">
-  <ds:schemaRefs>
-    <ds:schemaRef ds:uri="http://schemas.microsoft.com/office/2006/metadata/properties"/>
-    <ds:schemaRef ds:uri="http://schemas.microsoft.com/office/infopath/2007/PartnerControls"/>
-    <ds:schemaRef ds:uri="http://schemas.microsoft.com/sharepoint/v3"/>
-  </ds:schemaRefs>
-</ds:datastoreItem>
-</file>
-
 <file path=customXml/itemProps3.xml><?xml version="1.0" encoding="utf-8"?>
 <ds:datastoreItem xmlns:ds="http://schemas.openxmlformats.org/officeDocument/2006/customXml" ds:itemID="{F79AA90D-A39D-4F83-B1BD-92099B1CAD0D}">
   <ds:schemaRefs>

</xml_diff>

<commit_message>
new video AleRiva + addes 1 slide
</commit_message>
<xml_diff>
--- a/Aes_Project_2021_2022.pptx
+++ b/Aes_Project_2021_2022.pptx
@@ -5,10 +5,10 @@
     <p:sldMasterId id="2147483648" r:id="rId4"/>
   </p:sldMasterIdLst>
   <p:notesMasterIdLst>
-    <p:notesMasterId r:id="rId28"/>
+    <p:notesMasterId r:id="rId29"/>
   </p:notesMasterIdLst>
   <p:handoutMasterIdLst>
-    <p:handoutMasterId r:id="rId29"/>
+    <p:handoutMasterId r:id="rId30"/>
   </p:handoutMasterIdLst>
   <p:sldIdLst>
     <p:sldId id="256" r:id="rId5"/>
@@ -16,24 +16,25 @@
     <p:sldId id="287" r:id="rId7"/>
     <p:sldId id="288" r:id="rId8"/>
     <p:sldId id="289" r:id="rId9"/>
-    <p:sldId id="290" r:id="rId10"/>
-    <p:sldId id="286" r:id="rId11"/>
-    <p:sldId id="274" r:id="rId12"/>
-    <p:sldId id="270" r:id="rId13"/>
-    <p:sldId id="283" r:id="rId14"/>
-    <p:sldId id="275" r:id="rId15"/>
-    <p:sldId id="284" r:id="rId16"/>
-    <p:sldId id="285" r:id="rId17"/>
-    <p:sldId id="291" r:id="rId18"/>
-    <p:sldId id="301" r:id="rId19"/>
-    <p:sldId id="293" r:id="rId20"/>
-    <p:sldId id="294" r:id="rId21"/>
-    <p:sldId id="295" r:id="rId22"/>
-    <p:sldId id="296" r:id="rId23"/>
-    <p:sldId id="297" r:id="rId24"/>
-    <p:sldId id="298" r:id="rId25"/>
-    <p:sldId id="299" r:id="rId26"/>
-    <p:sldId id="300" r:id="rId27"/>
+    <p:sldId id="302" r:id="rId10"/>
+    <p:sldId id="290" r:id="rId11"/>
+    <p:sldId id="286" r:id="rId12"/>
+    <p:sldId id="274" r:id="rId13"/>
+    <p:sldId id="270" r:id="rId14"/>
+    <p:sldId id="283" r:id="rId15"/>
+    <p:sldId id="275" r:id="rId16"/>
+    <p:sldId id="284" r:id="rId17"/>
+    <p:sldId id="285" r:id="rId18"/>
+    <p:sldId id="291" r:id="rId19"/>
+    <p:sldId id="301" r:id="rId20"/>
+    <p:sldId id="293" r:id="rId21"/>
+    <p:sldId id="294" r:id="rId22"/>
+    <p:sldId id="295" r:id="rId23"/>
+    <p:sldId id="296" r:id="rId24"/>
+    <p:sldId id="297" r:id="rId25"/>
+    <p:sldId id="298" r:id="rId26"/>
+    <p:sldId id="299" r:id="rId27"/>
+    <p:sldId id="300" r:id="rId28"/>
   </p:sldIdLst>
   <p:sldSz cx="12192000" cy="6858000"/>
   <p:notesSz cx="6858000" cy="9144000"/>
@@ -261,7 +262,7 @@
             <a:pPr rtl="0"/>
             <a:fld id="{14E13FA4-5A6A-4920-8854-843EBE8DDFDE}" type="datetime1">
               <a:rPr lang="it-IT" smtClean="0"/>
-              <a:t>13/06/2022</a:t>
+              <a:t>14/06/2022</a:t>
             </a:fld>
             <a:endParaRPr lang="it-IT" dirty="0"/>
           </a:p>
@@ -443,7 +444,7 @@
             <a:fld id="{3952339E-5782-4E34-93C0-C2AC43169E1F}" type="datetime1">
               <a:rPr lang="it-IT" smtClean="0"/>
               <a:pPr/>
-              <a:t>13/06/2022</a:t>
+              <a:t>14/06/2022</a:t>
             </a:fld>
             <a:endParaRPr lang="it-IT" dirty="0"/>
           </a:p>
@@ -867,7 +868,7 @@
             <a:pPr rtl="0"/>
             <a:fld id="{79230CFA-805A-4FD3-B3A0-DAAA5993DA17}" type="slidenum">
               <a:rPr lang="it-IT" smtClean="0"/>
-              <a:t>14</a:t>
+              <a:t>12</a:t>
             </a:fld>
             <a:endParaRPr lang="it-IT" dirty="0"/>
           </a:p>
@@ -876,7 +877,7 @@
     </p:spTree>
     <p:extLst>
       <p:ext uri="{BB962C8B-B14F-4D97-AF65-F5344CB8AC3E}">
-        <p14:creationId xmlns:p14="http://schemas.microsoft.com/office/powerpoint/2010/main" val="2325599298"/>
+        <p14:creationId xmlns:p14="http://schemas.microsoft.com/office/powerpoint/2010/main" val="1407038931"/>
       </p:ext>
     </p:extLst>
   </p:cSld>
@@ -962,7 +963,7 @@
     </p:spTree>
     <p:extLst>
       <p:ext uri="{BB962C8B-B14F-4D97-AF65-F5344CB8AC3E}">
-        <p14:creationId xmlns:p14="http://schemas.microsoft.com/office/powerpoint/2010/main" val="2771122920"/>
+        <p14:creationId xmlns:p14="http://schemas.microsoft.com/office/powerpoint/2010/main" val="2325599298"/>
       </p:ext>
     </p:extLst>
   </p:cSld>
@@ -1048,7 +1049,7 @@
     </p:spTree>
     <p:extLst>
       <p:ext uri="{BB962C8B-B14F-4D97-AF65-F5344CB8AC3E}">
-        <p14:creationId xmlns:p14="http://schemas.microsoft.com/office/powerpoint/2010/main" val="2824478265"/>
+        <p14:creationId xmlns:p14="http://schemas.microsoft.com/office/powerpoint/2010/main" val="2771122920"/>
       </p:ext>
     </p:extLst>
   </p:cSld>
@@ -1126,6 +1127,92 @@
             <a:fld id="{79230CFA-805A-4FD3-B3A0-DAAA5993DA17}" type="slidenum">
               <a:rPr lang="it-IT" smtClean="0"/>
               <a:t>17</a:t>
+            </a:fld>
+            <a:endParaRPr lang="it-IT" dirty="0"/>
+          </a:p>
+        </p:txBody>
+      </p:sp>
+    </p:spTree>
+    <p:extLst>
+      <p:ext uri="{BB962C8B-B14F-4D97-AF65-F5344CB8AC3E}">
+        <p14:creationId xmlns:p14="http://schemas.microsoft.com/office/powerpoint/2010/main" val="2824478265"/>
+      </p:ext>
+    </p:extLst>
+  </p:cSld>
+  <p:clrMapOvr>
+    <a:masterClrMapping/>
+  </p:clrMapOvr>
+</p:notes>
+</file>
+
+<file path=ppt/notesSlides/notesSlide14.xml><?xml version="1.0" encoding="utf-8"?>
+<p:notes xmlns:a="http://schemas.openxmlformats.org/drawingml/2006/main" xmlns:r="http://schemas.openxmlformats.org/officeDocument/2006/relationships" xmlns:p="http://schemas.openxmlformats.org/presentationml/2006/main">
+  <p:cSld>
+    <p:spTree>
+      <p:nvGrpSpPr>
+        <p:cNvPr id="1" name=""/>
+        <p:cNvGrpSpPr/>
+        <p:nvPr/>
+      </p:nvGrpSpPr>
+      <p:grpSpPr>
+        <a:xfrm>
+          <a:off x="0" y="0"/>
+          <a:ext cx="0" cy="0"/>
+          <a:chOff x="0" y="0"/>
+          <a:chExt cx="0" cy="0"/>
+        </a:xfrm>
+      </p:grpSpPr>
+      <p:sp>
+        <p:nvSpPr>
+          <p:cNvPr id="2" name="Segnaposto immagine diapositiva 1"/>
+          <p:cNvSpPr>
+            <a:spLocks noGrp="1" noRot="1" noChangeAspect="1"/>
+          </p:cNvSpPr>
+          <p:nvPr>
+            <p:ph type="sldImg"/>
+          </p:nvPr>
+        </p:nvSpPr>
+        <p:spPr/>
+      </p:sp>
+      <p:sp>
+        <p:nvSpPr>
+          <p:cNvPr id="3" name="Segnaposto note 2"/>
+          <p:cNvSpPr>
+            <a:spLocks noGrp="1"/>
+          </p:cNvSpPr>
+          <p:nvPr>
+            <p:ph type="body" idx="1"/>
+          </p:nvPr>
+        </p:nvSpPr>
+        <p:spPr/>
+        <p:txBody>
+          <a:bodyPr rtlCol="0"/>
+          <a:lstStyle/>
+          <a:p>
+            <a:pPr rtl="0"/>
+            <a:endParaRPr lang="it-IT" dirty="0"/>
+          </a:p>
+        </p:txBody>
+      </p:sp>
+      <p:sp>
+        <p:nvSpPr>
+          <p:cNvPr id="4" name="Segnaposto numero diapositiva 3"/>
+          <p:cNvSpPr>
+            <a:spLocks noGrp="1"/>
+          </p:cNvSpPr>
+          <p:nvPr>
+            <p:ph type="sldNum" sz="quarter" idx="5"/>
+          </p:nvPr>
+        </p:nvSpPr>
+        <p:spPr/>
+        <p:txBody>
+          <a:bodyPr rtlCol="0"/>
+          <a:lstStyle/>
+          <a:p>
+            <a:pPr rtl="0"/>
+            <a:fld id="{79230CFA-805A-4FD3-B3A0-DAAA5993DA17}" type="slidenum">
+              <a:rPr lang="it-IT" smtClean="0"/>
+              <a:t>18</a:t>
             </a:fld>
             <a:endParaRPr lang="it-IT" dirty="0"/>
           </a:p>
@@ -1274,6 +1361,31 @@
           <a:bodyPr rtlCol="0"/>
           <a:lstStyle/>
           <a:p>
+            <a:pPr algn="just">
+              <a:lnSpc>
+                <a:spcPct val="107000"/>
+              </a:lnSpc>
+              <a:spcAft>
+                <a:spcPts val="800"/>
+              </a:spcAft>
+            </a:pPr>
+            <a:r>
+              <a:rPr lang="en-US" sz="1800" dirty="0">
+                <a:effectLst/>
+                <a:latin typeface="Calibri" panose="020F0502020204030204" pitchFamily="34" charset="0"/>
+                <a:ea typeface="Calibri" panose="020F0502020204030204" pitchFamily="34" charset="0"/>
+                <a:cs typeface="Times New Roman" panose="02020603050405020304" pitchFamily="18" charset="0"/>
+              </a:rPr>
+              <a:t> </a:t>
+            </a:r>
+            <a:endParaRPr lang="it-IT" sz="1800" dirty="0">
+              <a:effectLst/>
+              <a:latin typeface="Calibri" panose="020F0502020204030204" pitchFamily="34" charset="0"/>
+              <a:ea typeface="Calibri" panose="020F0502020204030204" pitchFamily="34" charset="0"/>
+              <a:cs typeface="Times New Roman" panose="02020603050405020304" pitchFamily="18" charset="0"/>
+            </a:endParaRPr>
+          </a:p>
+          <a:p>
             <a:pPr rtl="0"/>
             <a:endParaRPr lang="it-IT" dirty="0"/>
           </a:p>
@@ -1467,120 +1579,6 @@
           <a:bodyPr/>
           <a:lstStyle/>
           <a:p>
-            <a:r>
-              <a:rPr lang="it-IT" dirty="0" err="1"/>
-              <a:t>As</a:t>
-            </a:r>
-            <a:r>
-              <a:rPr lang="it-IT" dirty="0"/>
-              <a:t> </a:t>
-            </a:r>
-            <a:r>
-              <a:rPr lang="it-IT" dirty="0" err="1"/>
-              <a:t>we</a:t>
-            </a:r>
-            <a:r>
-              <a:rPr lang="it-IT" dirty="0"/>
-              <a:t> can </a:t>
-            </a:r>
-            <a:r>
-              <a:rPr lang="it-IT" dirty="0" err="1"/>
-              <a:t>see</a:t>
-            </a:r>
-            <a:r>
-              <a:rPr lang="it-IT" dirty="0"/>
-              <a:t>, the pressure </a:t>
-            </a:r>
-            <a:r>
-              <a:rPr lang="it-IT" dirty="0" err="1"/>
-              <a:t>value</a:t>
-            </a:r>
-            <a:r>
-              <a:rPr lang="it-IT" dirty="0"/>
-              <a:t> </a:t>
-            </a:r>
-            <a:r>
-              <a:rPr lang="it-IT" dirty="0" err="1"/>
-              <a:t>quickly</a:t>
-            </a:r>
-            <a:r>
-              <a:rPr lang="it-IT" dirty="0"/>
-              <a:t> </a:t>
-            </a:r>
-            <a:r>
-              <a:rPr lang="it-IT" dirty="0" err="1"/>
-              <a:t>settles</a:t>
-            </a:r>
-            <a:r>
-              <a:rPr lang="it-IT" dirty="0"/>
-              <a:t> to </a:t>
-            </a:r>
-            <a:r>
-              <a:rPr lang="it-IT" dirty="0" err="1"/>
-              <a:t>its</a:t>
-            </a:r>
-            <a:r>
-              <a:rPr lang="it-IT" dirty="0"/>
-              <a:t> </a:t>
-            </a:r>
-            <a:r>
-              <a:rPr lang="it-IT" dirty="0" err="1"/>
-              <a:t>reference</a:t>
-            </a:r>
-            <a:r>
-              <a:rPr lang="it-IT" dirty="0"/>
-              <a:t>, with the </a:t>
-            </a:r>
-            <a:r>
-              <a:rPr lang="it-IT" dirty="0" err="1"/>
-              <a:t>imposed</a:t>
-            </a:r>
-            <a:r>
-              <a:rPr lang="it-IT" dirty="0"/>
-              <a:t> </a:t>
-            </a:r>
-            <a:r>
-              <a:rPr lang="it-IT" dirty="0" err="1"/>
-              <a:t>Settling</a:t>
-            </a:r>
-            <a:r>
-              <a:rPr lang="it-IT" dirty="0"/>
-              <a:t> time. </a:t>
-            </a:r>
-            <a:r>
-              <a:rPr lang="it-IT" dirty="0" err="1"/>
-              <a:t>As</a:t>
-            </a:r>
-            <a:r>
-              <a:rPr lang="it-IT" dirty="0"/>
-              <a:t> </a:t>
-            </a:r>
-            <a:r>
-              <a:rPr lang="it-IT" dirty="0" err="1"/>
-              <a:t>before</a:t>
-            </a:r>
-            <a:r>
-              <a:rPr lang="it-IT" dirty="0"/>
-              <a:t>, small spikes in the </a:t>
-            </a:r>
-            <a:r>
-              <a:rPr lang="it-IT" dirty="0" err="1"/>
-              <a:t>profile</a:t>
-            </a:r>
-            <a:r>
-              <a:rPr lang="it-IT" dirty="0"/>
-              <a:t> </a:t>
-            </a:r>
-            <a:r>
-              <a:rPr lang="it-IT" dirty="0" err="1"/>
-              <a:t>appear</a:t>
-            </a:r>
-            <a:r>
-              <a:rPr lang="it-IT" dirty="0"/>
-              <a:t> in the case of Night and day switch</a:t>
-            </a:r>
-          </a:p>
-          <a:p>
             <a:endParaRPr lang="it-IT" dirty="0"/>
           </a:p>
         </p:txBody>
@@ -1612,7 +1610,7 @@
     </p:spTree>
     <p:extLst>
       <p:ext uri="{BB962C8B-B14F-4D97-AF65-F5344CB8AC3E}">
-        <p14:creationId xmlns:p14="http://schemas.microsoft.com/office/powerpoint/2010/main" val="2085547519"/>
+        <p14:creationId xmlns:p14="http://schemas.microsoft.com/office/powerpoint/2010/main" val="1281325033"/>
       </p:ext>
     </p:extLst>
   </p:cSld>
@@ -1663,10 +1661,9 @@
         </p:nvSpPr>
         <p:spPr/>
         <p:txBody>
-          <a:bodyPr rtlCol="0"/>
+          <a:bodyPr/>
           <a:lstStyle/>
           <a:p>
-            <a:pPr rtl="0"/>
             <a:endParaRPr lang="it-IT" dirty="0"/>
           </a:p>
         </p:txBody>
@@ -1683,22 +1680,22 @@
         </p:nvSpPr>
         <p:spPr/>
         <p:txBody>
-          <a:bodyPr rtlCol="0"/>
+          <a:bodyPr/>
           <a:lstStyle/>
           <a:p>
             <a:pPr rtl="0"/>
             <a:fld id="{79230CFA-805A-4FD3-B3A0-DAAA5993DA17}" type="slidenum">
-              <a:rPr lang="it-IT" smtClean="0"/>
-              <a:t>8</a:t>
+              <a:rPr lang="it-IT" noProof="0" smtClean="0"/>
+              <a:t>7</a:t>
             </a:fld>
-            <a:endParaRPr lang="it-IT" dirty="0"/>
+            <a:endParaRPr lang="it-IT" noProof="0" dirty="0"/>
           </a:p>
         </p:txBody>
       </p:sp>
     </p:spTree>
     <p:extLst>
       <p:ext uri="{BB962C8B-B14F-4D97-AF65-F5344CB8AC3E}">
-        <p14:creationId xmlns:p14="http://schemas.microsoft.com/office/powerpoint/2010/main" val="3009333175"/>
+        <p14:creationId xmlns:p14="http://schemas.microsoft.com/office/powerpoint/2010/main" val="2085547519"/>
       </p:ext>
     </p:extLst>
   </p:cSld>
@@ -1784,7 +1781,7 @@
     </p:spTree>
     <p:extLst>
       <p:ext uri="{BB962C8B-B14F-4D97-AF65-F5344CB8AC3E}">
-        <p14:creationId xmlns:p14="http://schemas.microsoft.com/office/powerpoint/2010/main" val="3463671399"/>
+        <p14:creationId xmlns:p14="http://schemas.microsoft.com/office/powerpoint/2010/main" val="3009333175"/>
       </p:ext>
     </p:extLst>
   </p:cSld>
@@ -1870,7 +1867,7 @@
     </p:spTree>
     <p:extLst>
       <p:ext uri="{BB962C8B-B14F-4D97-AF65-F5344CB8AC3E}">
-        <p14:creationId xmlns:p14="http://schemas.microsoft.com/office/powerpoint/2010/main" val="2201537546"/>
+        <p14:creationId xmlns:p14="http://schemas.microsoft.com/office/powerpoint/2010/main" val="3463671399"/>
       </p:ext>
     </p:extLst>
   </p:cSld>
@@ -1956,7 +1953,7 @@
     </p:spTree>
     <p:extLst>
       <p:ext uri="{BB962C8B-B14F-4D97-AF65-F5344CB8AC3E}">
-        <p14:creationId xmlns:p14="http://schemas.microsoft.com/office/powerpoint/2010/main" val="1407038931"/>
+        <p14:creationId xmlns:p14="http://schemas.microsoft.com/office/powerpoint/2010/main" val="2201537546"/>
       </p:ext>
     </p:extLst>
   </p:cSld>
@@ -14720,6 +14717,427 @@
       </p:sp>
       <p:pic>
         <p:nvPicPr>
+          <p:cNvPr id="13" name="Content Placeholder 12" descr="Chart, line chart&#10;&#10;Description automatically generated">
+            <a:extLst>
+              <a:ext uri="{FF2B5EF4-FFF2-40B4-BE49-F238E27FC236}">
+                <a16:creationId xmlns:a16="http://schemas.microsoft.com/office/drawing/2014/main" id="{F087F167-91C9-CC7A-5C5C-282208F83EF7}"/>
+              </a:ext>
+            </a:extLst>
+          </p:cNvPr>
+          <p:cNvPicPr>
+            <a:picLocks noGrp="1" noChangeAspect="1"/>
+          </p:cNvPicPr>
+          <p:nvPr>
+            <p:ph idx="1"/>
+          </p:nvPr>
+        </p:nvPicPr>
+        <p:blipFill>
+          <a:blip r:embed="rId6"/>
+          <a:stretch>
+            <a:fillRect/>
+          </a:stretch>
+        </p:blipFill>
+        <p:spPr>
+          <a:xfrm>
+            <a:off x="1216120" y="1080655"/>
+            <a:ext cx="9759759" cy="5114781"/>
+          </a:xfrm>
+        </p:spPr>
+      </p:pic>
+      <p:sp>
+        <p:nvSpPr>
+          <p:cNvPr id="2" name="Left Brace 1">
+            <a:extLst>
+              <a:ext uri="{FF2B5EF4-FFF2-40B4-BE49-F238E27FC236}">
+                <a16:creationId xmlns:a16="http://schemas.microsoft.com/office/drawing/2014/main" id="{E63F16A6-032D-EF99-EC35-F94798032DE9}"/>
+              </a:ext>
+            </a:extLst>
+          </p:cNvPr>
+          <p:cNvSpPr/>
+          <p:nvPr/>
+        </p:nvSpPr>
+        <p:spPr>
+          <a:xfrm>
+            <a:off x="4194495" y="4823670"/>
+            <a:ext cx="75501" cy="662730"/>
+          </a:xfrm>
+          <a:prstGeom prst="leftBrace">
+            <a:avLst/>
+          </a:prstGeom>
+        </p:spPr>
+        <p:style>
+          <a:lnRef idx="1">
+            <a:schemeClr val="accent1"/>
+          </a:lnRef>
+          <a:fillRef idx="0">
+            <a:schemeClr val="accent1"/>
+          </a:fillRef>
+          <a:effectRef idx="0">
+            <a:schemeClr val="accent1"/>
+          </a:effectRef>
+          <a:fontRef idx="minor">
+            <a:schemeClr val="tx1"/>
+          </a:fontRef>
+        </p:style>
+        <p:txBody>
+          <a:bodyPr rtlCol="0" anchor="ctr"/>
+          <a:lstStyle/>
+          <a:p>
+            <a:pPr algn="ctr"/>
+            <a:endParaRPr lang="en-GB"/>
+          </a:p>
+        </p:txBody>
+      </p:sp>
+      <p:sp>
+        <p:nvSpPr>
+          <p:cNvPr id="5" name="TextBox 4">
+            <a:extLst>
+              <a:ext uri="{FF2B5EF4-FFF2-40B4-BE49-F238E27FC236}">
+                <a16:creationId xmlns:a16="http://schemas.microsoft.com/office/drawing/2014/main" id="{84993BF0-C628-77B5-3004-5AB4A214A1A0}"/>
+              </a:ext>
+            </a:extLst>
+          </p:cNvPr>
+          <p:cNvSpPr txBox="1"/>
+          <p:nvPr/>
+        </p:nvSpPr>
+        <p:spPr>
+          <a:xfrm>
+            <a:off x="2877424" y="4764947"/>
+            <a:ext cx="1115736" cy="511728"/>
+          </a:xfrm>
+          <a:prstGeom prst="rect">
+            <a:avLst/>
+          </a:prstGeom>
+          <a:noFill/>
+        </p:spPr>
+        <p:txBody>
+          <a:bodyPr wrap="square" rtlCol="0">
+            <a:spAutoFit/>
+          </a:bodyPr>
+          <a:lstStyle/>
+          <a:p>
+            <a:endParaRPr lang="en-GB" dirty="0"/>
+          </a:p>
+        </p:txBody>
+      </p:sp>
+      <p:pic>
+        <p:nvPicPr>
+          <p:cNvPr id="11" name="Picture 10" descr="\documentclass{article}&#10;\usepackage{amsmath}&#10;\pagestyle{empty}&#10;\begin{document}&#10;&#10;\begin{equation}&#10;    \Delta T = 0.489 \, ^{\circ} C&#10;\end{equation}&#10;&#10;&#10;\end{document}" title="IguanaTex Bitmap Display">
+            <a:extLst>
+              <a:ext uri="{FF2B5EF4-FFF2-40B4-BE49-F238E27FC236}">
+                <a16:creationId xmlns:a16="http://schemas.microsoft.com/office/drawing/2014/main" id="{4D2B8BE7-8D76-0282-7F09-5F7A7FE86E44}"/>
+              </a:ext>
+            </a:extLst>
+          </p:cNvPr>
+          <p:cNvPicPr>
+            <a:picLocks noChangeAspect="1"/>
+          </p:cNvPicPr>
+          <p:nvPr>
+            <p:custDataLst>
+              <p:tags r:id="rId1"/>
+            </p:custDataLst>
+          </p:nvPr>
+        </p:nvPicPr>
+        <p:blipFill rotWithShape="1">
+          <a:blip r:embed="rId7"/>
+          <a:srcRect t="-1" r="66805" b="2200"/>
+          <a:stretch/>
+        </p:blipFill>
+        <p:spPr>
+          <a:xfrm>
+            <a:off x="2279941" y="5030596"/>
+            <a:ext cx="1713219" cy="248878"/>
+          </a:xfrm>
+          <a:prstGeom prst="rect">
+            <a:avLst/>
+          </a:prstGeom>
+        </p:spPr>
+      </p:pic>
+      <p:sp>
+        <p:nvSpPr>
+          <p:cNvPr id="12" name="Left Brace 11">
+            <a:extLst>
+              <a:ext uri="{FF2B5EF4-FFF2-40B4-BE49-F238E27FC236}">
+                <a16:creationId xmlns:a16="http://schemas.microsoft.com/office/drawing/2014/main" id="{A9D7F22D-D07F-63A5-4892-9B9B1432DEC6}"/>
+              </a:ext>
+            </a:extLst>
+          </p:cNvPr>
+          <p:cNvSpPr/>
+          <p:nvPr/>
+        </p:nvSpPr>
+        <p:spPr>
+          <a:xfrm rot="5400000">
+            <a:off x="4535946" y="4442140"/>
+            <a:ext cx="73976" cy="384029"/>
+          </a:xfrm>
+          <a:prstGeom prst="leftBrace">
+            <a:avLst/>
+          </a:prstGeom>
+        </p:spPr>
+        <p:style>
+          <a:lnRef idx="1">
+            <a:schemeClr val="accent1"/>
+          </a:lnRef>
+          <a:fillRef idx="0">
+            <a:schemeClr val="accent1"/>
+          </a:fillRef>
+          <a:effectRef idx="0">
+            <a:schemeClr val="accent1"/>
+          </a:effectRef>
+          <a:fontRef idx="minor">
+            <a:schemeClr val="tx1"/>
+          </a:fontRef>
+        </p:style>
+        <p:txBody>
+          <a:bodyPr rtlCol="0" anchor="ctr"/>
+          <a:lstStyle/>
+          <a:p>
+            <a:pPr algn="ctr"/>
+            <a:endParaRPr lang="en-GB"/>
+          </a:p>
+        </p:txBody>
+      </p:sp>
+      <p:pic>
+        <p:nvPicPr>
+          <p:cNvPr id="15" name="Picture 14" descr="\documentclass{article}&#10;\usepackage{amsmath}&#10;\pagestyle{empty}&#10;\begin{document}&#10;&#10;\begin{equation}&#10;    \Delta t \approx 39 \, min&#10;\end{equation}&#10;&#10;&#10;\end{document}" title="IguanaTex Bitmap Display">
+            <a:extLst>
+              <a:ext uri="{FF2B5EF4-FFF2-40B4-BE49-F238E27FC236}">
+                <a16:creationId xmlns:a16="http://schemas.microsoft.com/office/drawing/2014/main" id="{9A364F44-F6E4-6B92-D671-1483A52935FE}"/>
+              </a:ext>
+            </a:extLst>
+          </p:cNvPr>
+          <p:cNvPicPr>
+            <a:picLocks noChangeAspect="1"/>
+          </p:cNvPicPr>
+          <p:nvPr>
+            <p:custDataLst>
+              <p:tags r:id="rId2"/>
+            </p:custDataLst>
+          </p:nvPr>
+        </p:nvPicPr>
+        <p:blipFill rotWithShape="1">
+          <a:blip r:embed="rId8"/>
+          <a:srcRect t="-1" r="71116" b="2200"/>
+          <a:stretch/>
+        </p:blipFill>
+        <p:spPr>
+          <a:xfrm>
+            <a:off x="3922646" y="4323052"/>
+            <a:ext cx="1320474" cy="226400"/>
+          </a:xfrm>
+          <a:prstGeom prst="rect">
+            <a:avLst/>
+          </a:prstGeom>
+        </p:spPr>
+      </p:pic>
+      <p:pic>
+        <p:nvPicPr>
+          <p:cNvPr id="19" name="Picture 18" descr="\documentclass{article}&#10;\usepackage{amsmath}&#10;\pagestyle{empty}&#10;\begin{document}&#10;&#10;\begin{equation*}&#10;    \Delta T = 0.306 \, ^{\circ} C \\&#10;\end{equation*}&#10;&#10;&#10;\end{document}" title="IguanaTex Bitmap Display">
+            <a:extLst>
+              <a:ext uri="{FF2B5EF4-FFF2-40B4-BE49-F238E27FC236}">
+                <a16:creationId xmlns:a16="http://schemas.microsoft.com/office/drawing/2014/main" id="{A2287FC6-E867-60C5-9978-A549B9BD2D4B}"/>
+              </a:ext>
+            </a:extLst>
+          </p:cNvPr>
+          <p:cNvPicPr>
+            <a:picLocks noChangeAspect="1"/>
+          </p:cNvPicPr>
+          <p:nvPr>
+            <p:custDataLst>
+              <p:tags r:id="rId3"/>
+            </p:custDataLst>
+          </p:nvPr>
+        </p:nvPicPr>
+        <p:blipFill>
+          <a:blip r:embed="rId9"/>
+          <a:stretch>
+            <a:fillRect/>
+          </a:stretch>
+        </p:blipFill>
+        <p:spPr>
+          <a:xfrm>
+            <a:off x="9210391" y="4440630"/>
+            <a:ext cx="1648762" cy="193524"/>
+          </a:xfrm>
+          <a:prstGeom prst="rect">
+            <a:avLst/>
+          </a:prstGeom>
+        </p:spPr>
+      </p:pic>
+      <p:sp>
+        <p:nvSpPr>
+          <p:cNvPr id="20" name="Right Brace 19">
+            <a:extLst>
+              <a:ext uri="{FF2B5EF4-FFF2-40B4-BE49-F238E27FC236}">
+                <a16:creationId xmlns:a16="http://schemas.microsoft.com/office/drawing/2014/main" id="{7450EAA7-E140-8B0C-D5FF-DA4EBEAE5A1A}"/>
+              </a:ext>
+            </a:extLst>
+          </p:cNvPr>
+          <p:cNvSpPr/>
+          <p:nvPr/>
+        </p:nvSpPr>
+        <p:spPr>
+          <a:xfrm>
+            <a:off x="9018165" y="4349417"/>
+            <a:ext cx="75501" cy="441895"/>
+          </a:xfrm>
+          <a:prstGeom prst="rightBrace">
+            <a:avLst/>
+          </a:prstGeom>
+        </p:spPr>
+        <p:style>
+          <a:lnRef idx="1">
+            <a:schemeClr val="accent1"/>
+          </a:lnRef>
+          <a:fillRef idx="0">
+            <a:schemeClr val="accent1"/>
+          </a:fillRef>
+          <a:effectRef idx="0">
+            <a:schemeClr val="accent1"/>
+          </a:effectRef>
+          <a:fontRef idx="minor">
+            <a:schemeClr val="tx1"/>
+          </a:fontRef>
+        </p:style>
+        <p:txBody>
+          <a:bodyPr rtlCol="0" anchor="ctr"/>
+          <a:lstStyle/>
+          <a:p>
+            <a:pPr algn="ctr"/>
+            <a:endParaRPr lang="en-GB"/>
+          </a:p>
+        </p:txBody>
+      </p:sp>
+    </p:spTree>
+    <p:extLst>
+      <p:ext uri="{BB962C8B-B14F-4D97-AF65-F5344CB8AC3E}">
+        <p14:creationId xmlns:p14="http://schemas.microsoft.com/office/powerpoint/2010/main" val="311471150"/>
+      </p:ext>
+    </p:extLst>
+  </p:cSld>
+  <p:clrMapOvr>
+    <a:masterClrMapping/>
+  </p:clrMapOvr>
+  <mc:AlternateContent xmlns:mc="http://schemas.openxmlformats.org/markup-compatibility/2006" xmlns:p14="http://schemas.microsoft.com/office/powerpoint/2010/main">
+    <mc:Choice Requires="p14">
+      <p:transition spd="med" p14:dur="700">
+        <p:fade/>
+      </p:transition>
+    </mc:Choice>
+    <mc:Fallback xmlns="">
+      <p:transition spd="med">
+        <p:fade/>
+      </p:transition>
+    </mc:Fallback>
+  </mc:AlternateContent>
+</p:sld>
+</file>
+
+<file path=ppt/slides/slide11.xml><?xml version="1.0" encoding="utf-8"?>
+<p:sld xmlns:a="http://schemas.openxmlformats.org/drawingml/2006/main" xmlns:r="http://schemas.openxmlformats.org/officeDocument/2006/relationships" xmlns:p="http://schemas.openxmlformats.org/presentationml/2006/main">
+  <p:cSld>
+    <p:spTree>
+      <p:nvGrpSpPr>
+        <p:cNvPr id="1" name=""/>
+        <p:cNvGrpSpPr/>
+        <p:nvPr/>
+      </p:nvGrpSpPr>
+      <p:grpSpPr>
+        <a:xfrm>
+          <a:off x="0" y="0"/>
+          <a:ext cx="0" cy="0"/>
+          <a:chOff x="0" y="0"/>
+          <a:chExt cx="0" cy="0"/>
+        </a:xfrm>
+      </p:grpSpPr>
+      <p:sp>
+        <p:nvSpPr>
+          <p:cNvPr id="3" name="Segnaposto piè di pagina 2">
+            <a:extLst>
+              <a:ext uri="{FF2B5EF4-FFF2-40B4-BE49-F238E27FC236}">
+                <a16:creationId xmlns:a16="http://schemas.microsoft.com/office/drawing/2014/main" id="{B04C11C9-3DF6-471E-87C0-4DCED41031D4}"/>
+              </a:ext>
+            </a:extLst>
+          </p:cNvPr>
+          <p:cNvSpPr>
+            <a:spLocks noGrp="1"/>
+          </p:cNvSpPr>
+          <p:nvPr>
+            <p:ph type="ftr" sz="quarter" idx="17"/>
+          </p:nvPr>
+        </p:nvSpPr>
+        <p:spPr>
+          <a:xfrm>
+            <a:off x="338530" y="6356350"/>
+            <a:ext cx="4114800" cy="365125"/>
+          </a:xfrm>
+        </p:spPr>
+        <p:txBody>
+          <a:bodyPr rtlCol="0" anchor="ctr">
+            <a:normAutofit/>
+          </a:bodyPr>
+          <a:lstStyle/>
+          <a:p>
+            <a:pPr rtl="0">
+              <a:spcAft>
+                <a:spcPts val="600"/>
+              </a:spcAft>
+            </a:pPr>
+            <a:r>
+              <a:rPr lang="it-IT"/>
+              <a:t>Aggiungere un piè di pagina</a:t>
+            </a:r>
+          </a:p>
+        </p:txBody>
+      </p:sp>
+      <p:sp>
+        <p:nvSpPr>
+          <p:cNvPr id="4" name="Segnaposto numero diapositiva 3">
+            <a:extLst>
+              <a:ext uri="{FF2B5EF4-FFF2-40B4-BE49-F238E27FC236}">
+                <a16:creationId xmlns:a16="http://schemas.microsoft.com/office/drawing/2014/main" id="{B2228214-87DB-4B3A-BD81-9A709A69BAAC}"/>
+              </a:ext>
+            </a:extLst>
+          </p:cNvPr>
+          <p:cNvSpPr>
+            <a:spLocks noGrp="1"/>
+          </p:cNvSpPr>
+          <p:nvPr>
+            <p:ph type="sldNum" sz="quarter" idx="18"/>
+          </p:nvPr>
+        </p:nvSpPr>
+        <p:spPr>
+          <a:xfrm>
+            <a:off x="11146971" y="6356350"/>
+            <a:ext cx="740227" cy="365125"/>
+          </a:xfrm>
+        </p:spPr>
+        <p:txBody>
+          <a:bodyPr rtlCol="0" anchor="ctr">
+            <a:normAutofit/>
+          </a:bodyPr>
+          <a:lstStyle/>
+          <a:p>
+            <a:pPr rtl="0">
+              <a:spcAft>
+                <a:spcPts val="600"/>
+              </a:spcAft>
+            </a:pPr>
+            <a:fld id="{8699F50C-BE38-4BD0-BA84-9B090E1F2B9B}" type="slidenum">
+              <a:rPr lang="it-IT" smtClean="0"/>
+              <a:pPr rtl="0">
+                <a:spcAft>
+                  <a:spcPts val="600"/>
+                </a:spcAft>
+              </a:pPr>
+              <a:t>11</a:t>
+            </a:fld>
+            <a:endParaRPr lang="it-IT"/>
+          </a:p>
+        </p:txBody>
+      </p:sp>
+      <p:pic>
+        <p:nvPicPr>
           <p:cNvPr id="16" name="Content Placeholder 15" descr="Chart, line chart&#10;&#10;Description automatically generated">
             <a:extLst>
               <a:ext uri="{FF2B5EF4-FFF2-40B4-BE49-F238E27FC236}">
@@ -15084,7 +15502,7 @@
 </p:sld>
 </file>
 
-<file path=ppt/slides/slide11.xml><?xml version="1.0" encoding="utf-8"?>
+<file path=ppt/slides/slide12.xml><?xml version="1.0" encoding="utf-8"?>
 <p:sld xmlns:a="http://schemas.openxmlformats.org/drawingml/2006/main" xmlns:r="http://schemas.openxmlformats.org/officeDocument/2006/relationships" xmlns:p="http://schemas.openxmlformats.org/presentationml/2006/main">
   <p:cSld>
     <p:spTree>
@@ -15181,7 +15599,7 @@
                   <a:spcPts val="600"/>
                 </a:spcAft>
               </a:pPr>
-              <a:t>11</a:t>
+              <a:t>12</a:t>
             </a:fld>
             <a:endParaRPr lang="it-IT"/>
           </a:p>
@@ -15335,7 +15753,7 @@
 </p:sld>
 </file>
 
-<file path=ppt/slides/slide12.xml><?xml version="1.0" encoding="utf-8"?>
+<file path=ppt/slides/slide13.xml><?xml version="1.0" encoding="utf-8"?>
 <p:sld xmlns:a="http://schemas.openxmlformats.org/drawingml/2006/main" xmlns:r="http://schemas.openxmlformats.org/officeDocument/2006/relationships" xmlns:p="http://schemas.openxmlformats.org/presentationml/2006/main">
   <p:cSld>
     <p:spTree>
@@ -15460,7 +15878,7 @@
                   <a:spcPts val="600"/>
                 </a:spcAft>
               </a:pPr>
-              <a:t>12</a:t>
+              <a:t>13</a:t>
             </a:fld>
             <a:endParaRPr lang="it-IT" noProof="0"/>
           </a:p>
@@ -15558,7 +15976,7 @@
 </p:sld>
 </file>
 
-<file path=ppt/slides/slide13.xml><?xml version="1.0" encoding="utf-8"?>
+<file path=ppt/slides/slide14.xml><?xml version="1.0" encoding="utf-8"?>
 <p:sld xmlns:a="http://schemas.openxmlformats.org/drawingml/2006/main" xmlns:r="http://schemas.openxmlformats.org/officeDocument/2006/relationships" xmlns:p="http://schemas.openxmlformats.org/presentationml/2006/main">
   <p:cSld>
     <p:spTree>
@@ -15657,7 +16075,7 @@
             <a:pPr rtl="0"/>
             <a:fld id="{8699F50C-BE38-4BD0-BA84-9B090E1F2B9B}" type="slidenum">
               <a:rPr lang="it-IT" noProof="0" smtClean="0"/>
-              <a:t>13</a:t>
+              <a:t>14</a:t>
             </a:fld>
             <a:endParaRPr lang="it-IT" noProof="0" dirty="0"/>
           </a:p>
@@ -15751,7 +16169,7 @@
 </p:sld>
 </file>
 
-<file path=ppt/slides/slide14.xml><?xml version="1.0" encoding="utf-8"?>
+<file path=ppt/slides/slide15.xml><?xml version="1.0" encoding="utf-8"?>
 <p:sld xmlns:a="http://schemas.openxmlformats.org/drawingml/2006/main" xmlns:r="http://schemas.openxmlformats.org/officeDocument/2006/relationships" xmlns:p="http://schemas.openxmlformats.org/presentationml/2006/main">
   <p:cSld>
     <p:spTree>
@@ -15822,7 +16240,7 @@
             <a:fld id="{8699F50C-BE38-4BD0-BA84-9B090E1F2B9B}" type="slidenum">
               <a:rPr lang="it-IT" smtClean="0"/>
               <a:pPr rtl="0"/>
-              <a:t>14</a:t>
+              <a:t>15</a:t>
             </a:fld>
             <a:endParaRPr lang="it-IT" dirty="0"/>
           </a:p>
@@ -15925,7 +16343,7 @@
 </p:sld>
 </file>
 
-<file path=ppt/slides/slide15.xml><?xml version="1.0" encoding="utf-8"?>
+<file path=ppt/slides/slide16.xml><?xml version="1.0" encoding="utf-8"?>
 <p:sld xmlns:a="http://schemas.openxmlformats.org/drawingml/2006/main" xmlns:r="http://schemas.openxmlformats.org/officeDocument/2006/relationships" xmlns:p="http://schemas.openxmlformats.org/presentationml/2006/main">
   <p:cSld>
     <p:spTree>
@@ -15996,7 +16414,7 @@
             <a:fld id="{8699F50C-BE38-4BD0-BA84-9B090E1F2B9B}" type="slidenum">
               <a:rPr lang="it-IT" smtClean="0"/>
               <a:pPr rtl="0"/>
-              <a:t>15</a:t>
+              <a:t>16</a:t>
             </a:fld>
             <a:endParaRPr lang="it-IT" dirty="0"/>
           </a:p>
@@ -16189,7 +16607,7 @@
 </p:sld>
 </file>
 
-<file path=ppt/slides/slide16.xml><?xml version="1.0" encoding="utf-8"?>
+<file path=ppt/slides/slide17.xml><?xml version="1.0" encoding="utf-8"?>
 <p:sld xmlns:a="http://schemas.openxmlformats.org/drawingml/2006/main" xmlns:r="http://schemas.openxmlformats.org/officeDocument/2006/relationships" xmlns:p="http://schemas.openxmlformats.org/presentationml/2006/main">
   <p:cSld>
     <p:spTree>
@@ -16260,7 +16678,7 @@
             <a:fld id="{8699F50C-BE38-4BD0-BA84-9B090E1F2B9B}" type="slidenum">
               <a:rPr lang="it-IT" smtClean="0"/>
               <a:pPr rtl="0"/>
-              <a:t>16</a:t>
+              <a:t>17</a:t>
             </a:fld>
             <a:endParaRPr lang="it-IT" dirty="0"/>
           </a:p>
@@ -16378,7 +16796,7 @@
 </p:sld>
 </file>
 
-<file path=ppt/slides/slide17.xml><?xml version="1.0" encoding="utf-8"?>
+<file path=ppt/slides/slide18.xml><?xml version="1.0" encoding="utf-8"?>
 <p:sld xmlns:a="http://schemas.openxmlformats.org/drawingml/2006/main" xmlns:r="http://schemas.openxmlformats.org/officeDocument/2006/relationships" xmlns:p="http://schemas.openxmlformats.org/presentationml/2006/main">
   <p:cSld>
     <p:spTree>
@@ -16449,7 +16867,7 @@
             <a:fld id="{8699F50C-BE38-4BD0-BA84-9B090E1F2B9B}" type="slidenum">
               <a:rPr lang="it-IT" smtClean="0"/>
               <a:pPr rtl="0"/>
-              <a:t>17</a:t>
+              <a:t>18</a:t>
             </a:fld>
             <a:endParaRPr lang="it-IT" dirty="0"/>
           </a:p>
@@ -16567,7 +16985,7 @@
 </p:sld>
 </file>
 
-<file path=ppt/slides/slide18.xml><?xml version="1.0" encoding="utf-8"?>
+<file path=ppt/slides/slide19.xml><?xml version="1.0" encoding="utf-8"?>
 <p:sld xmlns:a="http://schemas.openxmlformats.org/drawingml/2006/main" xmlns:r="http://schemas.openxmlformats.org/officeDocument/2006/relationships" xmlns:p="http://schemas.openxmlformats.org/presentationml/2006/main">
   <p:cSld>
     <p:spTree>
@@ -16638,7 +17056,7 @@
             <a:pPr rtl="0"/>
             <a:fld id="{8699F50C-BE38-4BD0-BA84-9B090E1F2B9B}" type="slidenum">
               <a:rPr lang="it-IT" noProof="0" smtClean="0"/>
-              <a:t>18</a:t>
+              <a:t>19</a:t>
             </a:fld>
             <a:endParaRPr lang="it-IT" noProof="0" dirty="0"/>
           </a:p>
@@ -16857,7 +17275,7 @@
 </p:sld>
 </file>
 
-<file path=ppt/slides/slide19.xml><?xml version="1.0" encoding="utf-8"?>
+<file path=ppt/slides/slide2.xml><?xml version="1.0" encoding="utf-8"?>
 <p:sld xmlns:a="http://schemas.openxmlformats.org/drawingml/2006/main" xmlns:r="http://schemas.openxmlformats.org/officeDocument/2006/relationships" xmlns:p="http://schemas.openxmlformats.org/presentationml/2006/main">
   <p:cSld>
     <p:spTree>
@@ -16879,6 +17297,167 @@
           <p:cNvPr id="3" name="Segnaposto piè di pagina 2">
             <a:extLst>
               <a:ext uri="{FF2B5EF4-FFF2-40B4-BE49-F238E27FC236}">
+                <a16:creationId xmlns:a16="http://schemas.microsoft.com/office/drawing/2014/main" id="{B04C11C9-3DF6-471E-87C0-4DCED41031D4}"/>
+              </a:ext>
+            </a:extLst>
+          </p:cNvPr>
+          <p:cNvSpPr>
+            <a:spLocks noGrp="1"/>
+          </p:cNvSpPr>
+          <p:nvPr>
+            <p:ph type="ftr" sz="quarter" idx="17"/>
+          </p:nvPr>
+        </p:nvSpPr>
+        <p:spPr/>
+        <p:txBody>
+          <a:bodyPr rtlCol="0"/>
+          <a:lstStyle/>
+          <a:p>
+            <a:pPr rtl="0"/>
+            <a:r>
+              <a:rPr lang="it-IT" dirty="0"/>
+              <a:t>Aggiungere un piè di pagina</a:t>
+            </a:r>
+          </a:p>
+        </p:txBody>
+      </p:sp>
+      <p:sp>
+        <p:nvSpPr>
+          <p:cNvPr id="4" name="Segnaposto numero diapositiva 3">
+            <a:extLst>
+              <a:ext uri="{FF2B5EF4-FFF2-40B4-BE49-F238E27FC236}">
+                <a16:creationId xmlns:a16="http://schemas.microsoft.com/office/drawing/2014/main" id="{B2228214-87DB-4B3A-BD81-9A709A69BAAC}"/>
+              </a:ext>
+            </a:extLst>
+          </p:cNvPr>
+          <p:cNvSpPr>
+            <a:spLocks noGrp="1"/>
+          </p:cNvSpPr>
+          <p:nvPr>
+            <p:ph type="sldNum" sz="quarter" idx="18"/>
+          </p:nvPr>
+        </p:nvSpPr>
+        <p:spPr/>
+        <p:txBody>
+          <a:bodyPr rtlCol="0"/>
+          <a:lstStyle/>
+          <a:p>
+            <a:pPr rtl="0"/>
+            <a:fld id="{8699F50C-BE38-4BD0-BA84-9B090E1F2B9B}" type="slidenum">
+              <a:rPr lang="it-IT" smtClean="0"/>
+              <a:pPr rtl="0"/>
+              <a:t>2</a:t>
+            </a:fld>
+            <a:endParaRPr lang="it-IT" dirty="0"/>
+          </a:p>
+        </p:txBody>
+      </p:sp>
+      <p:sp>
+        <p:nvSpPr>
+          <p:cNvPr id="6" name="Titolo 5"/>
+          <p:cNvSpPr>
+            <a:spLocks noGrp="1"/>
+          </p:cNvSpPr>
+          <p:nvPr>
+            <p:ph type="title"/>
+          </p:nvPr>
+        </p:nvSpPr>
+        <p:spPr/>
+        <p:txBody>
+          <a:bodyPr/>
+          <a:lstStyle/>
+          <a:p>
+            <a:r>
+              <a:rPr lang="it-IT" dirty="0" err="1"/>
+              <a:t>Controlled</a:t>
+            </a:r>
+            <a:r>
+              <a:rPr lang="it-IT" dirty="0"/>
+              <a:t> </a:t>
+            </a:r>
+            <a:r>
+              <a:rPr lang="it-IT" dirty="0" err="1"/>
+              <a:t>system</a:t>
+            </a:r>
+            <a:endParaRPr lang="en-GB" dirty="0"/>
+          </a:p>
+        </p:txBody>
+      </p:sp>
+      <p:pic>
+        <p:nvPicPr>
+          <p:cNvPr id="8" name="Segnaposto contenuto 7"/>
+          <p:cNvPicPr>
+            <a:picLocks noGrp="1" noChangeAspect="1"/>
+          </p:cNvPicPr>
+          <p:nvPr>
+            <p:ph idx="1"/>
+          </p:nvPr>
+        </p:nvPicPr>
+        <p:blipFill rotWithShape="1">
+          <a:blip r:embed="rId3">
+            <a:extLst>
+              <a:ext uri="{28A0092B-C50C-407E-A947-70E740481C1C}">
+                <a14:useLocalDpi xmlns:a14="http://schemas.microsoft.com/office/drawing/2010/main" val="0"/>
+              </a:ext>
+            </a:extLst>
+          </a:blip>
+          <a:srcRect r="677"/>
+          <a:stretch/>
+        </p:blipFill>
+        <p:spPr>
+          <a:xfrm>
+            <a:off x="585616" y="2040144"/>
+            <a:ext cx="10761258" cy="3768313"/>
+          </a:xfrm>
+        </p:spPr>
+      </p:pic>
+    </p:spTree>
+    <p:extLst>
+      <p:ext uri="{BB962C8B-B14F-4D97-AF65-F5344CB8AC3E}">
+        <p14:creationId xmlns:p14="http://schemas.microsoft.com/office/powerpoint/2010/main" val="2367392682"/>
+      </p:ext>
+    </p:extLst>
+  </p:cSld>
+  <p:clrMapOvr>
+    <a:masterClrMapping/>
+  </p:clrMapOvr>
+  <mc:AlternateContent xmlns:mc="http://schemas.openxmlformats.org/markup-compatibility/2006" xmlns:p14="http://schemas.microsoft.com/office/powerpoint/2010/main">
+    <mc:Choice Requires="p14">
+      <p:transition spd="med" p14:dur="700">
+        <p:fade/>
+      </p:transition>
+    </mc:Choice>
+    <mc:Fallback xmlns="">
+      <p:transition spd="med">
+        <p:fade/>
+      </p:transition>
+    </mc:Fallback>
+  </mc:AlternateContent>
+</p:sld>
+</file>
+
+<file path=ppt/slides/slide20.xml><?xml version="1.0" encoding="utf-8"?>
+<p:sld xmlns:a="http://schemas.openxmlformats.org/drawingml/2006/main" xmlns:r="http://schemas.openxmlformats.org/officeDocument/2006/relationships" xmlns:p="http://schemas.openxmlformats.org/presentationml/2006/main">
+  <p:cSld>
+    <p:spTree>
+      <p:nvGrpSpPr>
+        <p:cNvPr id="1" name=""/>
+        <p:cNvGrpSpPr/>
+        <p:nvPr/>
+      </p:nvGrpSpPr>
+      <p:grpSpPr>
+        <a:xfrm>
+          <a:off x="0" y="0"/>
+          <a:ext cx="0" cy="0"/>
+          <a:chOff x="0" y="0"/>
+          <a:chExt cx="0" cy="0"/>
+        </a:xfrm>
+      </p:grpSpPr>
+      <p:sp>
+        <p:nvSpPr>
+          <p:cNvPr id="3" name="Segnaposto piè di pagina 2">
+            <a:extLst>
+              <a:ext uri="{FF2B5EF4-FFF2-40B4-BE49-F238E27FC236}">
                 <a16:creationId xmlns:a16="http://schemas.microsoft.com/office/drawing/2014/main" id="{99E8B753-8F9B-FB27-A65B-8B8775D38FCE}"/>
               </a:ext>
             </a:extLst>
@@ -16927,7 +17506,7 @@
             <a:pPr rtl="0"/>
             <a:fld id="{8699F50C-BE38-4BD0-BA84-9B090E1F2B9B}" type="slidenum">
               <a:rPr lang="it-IT" noProof="0" smtClean="0"/>
-              <a:t>19</a:t>
+              <a:t>20</a:t>
             </a:fld>
             <a:endParaRPr lang="it-IT" noProof="0" dirty="0"/>
           </a:p>
@@ -17375,7 +17954,7 @@
 </p:sld>
 </file>
 
-<file path=ppt/slides/slide2.xml><?xml version="1.0" encoding="utf-8"?>
+<file path=ppt/slides/slide21.xml><?xml version="1.0" encoding="utf-8"?>
 <p:sld xmlns:a="http://schemas.openxmlformats.org/drawingml/2006/main" xmlns:r="http://schemas.openxmlformats.org/officeDocument/2006/relationships" xmlns:p="http://schemas.openxmlformats.org/presentationml/2006/main">
   <p:cSld>
     <p:spTree>
@@ -17397,167 +17976,6 @@
           <p:cNvPr id="3" name="Segnaposto piè di pagina 2">
             <a:extLst>
               <a:ext uri="{FF2B5EF4-FFF2-40B4-BE49-F238E27FC236}">
-                <a16:creationId xmlns:a16="http://schemas.microsoft.com/office/drawing/2014/main" id="{B04C11C9-3DF6-471E-87C0-4DCED41031D4}"/>
-              </a:ext>
-            </a:extLst>
-          </p:cNvPr>
-          <p:cNvSpPr>
-            <a:spLocks noGrp="1"/>
-          </p:cNvSpPr>
-          <p:nvPr>
-            <p:ph type="ftr" sz="quarter" idx="17"/>
-          </p:nvPr>
-        </p:nvSpPr>
-        <p:spPr/>
-        <p:txBody>
-          <a:bodyPr rtlCol="0"/>
-          <a:lstStyle/>
-          <a:p>
-            <a:pPr rtl="0"/>
-            <a:r>
-              <a:rPr lang="it-IT" dirty="0"/>
-              <a:t>Aggiungere un piè di pagina</a:t>
-            </a:r>
-          </a:p>
-        </p:txBody>
-      </p:sp>
-      <p:sp>
-        <p:nvSpPr>
-          <p:cNvPr id="4" name="Segnaposto numero diapositiva 3">
-            <a:extLst>
-              <a:ext uri="{FF2B5EF4-FFF2-40B4-BE49-F238E27FC236}">
-                <a16:creationId xmlns:a16="http://schemas.microsoft.com/office/drawing/2014/main" id="{B2228214-87DB-4B3A-BD81-9A709A69BAAC}"/>
-              </a:ext>
-            </a:extLst>
-          </p:cNvPr>
-          <p:cNvSpPr>
-            <a:spLocks noGrp="1"/>
-          </p:cNvSpPr>
-          <p:nvPr>
-            <p:ph type="sldNum" sz="quarter" idx="18"/>
-          </p:nvPr>
-        </p:nvSpPr>
-        <p:spPr/>
-        <p:txBody>
-          <a:bodyPr rtlCol="0"/>
-          <a:lstStyle/>
-          <a:p>
-            <a:pPr rtl="0"/>
-            <a:fld id="{8699F50C-BE38-4BD0-BA84-9B090E1F2B9B}" type="slidenum">
-              <a:rPr lang="it-IT" smtClean="0"/>
-              <a:pPr rtl="0"/>
-              <a:t>2</a:t>
-            </a:fld>
-            <a:endParaRPr lang="it-IT" dirty="0"/>
-          </a:p>
-        </p:txBody>
-      </p:sp>
-      <p:sp>
-        <p:nvSpPr>
-          <p:cNvPr id="6" name="Titolo 5"/>
-          <p:cNvSpPr>
-            <a:spLocks noGrp="1"/>
-          </p:cNvSpPr>
-          <p:nvPr>
-            <p:ph type="title"/>
-          </p:nvPr>
-        </p:nvSpPr>
-        <p:spPr/>
-        <p:txBody>
-          <a:bodyPr/>
-          <a:lstStyle/>
-          <a:p>
-            <a:r>
-              <a:rPr lang="it-IT" dirty="0" err="1"/>
-              <a:t>Controlled</a:t>
-            </a:r>
-            <a:r>
-              <a:rPr lang="it-IT" dirty="0"/>
-              <a:t> </a:t>
-            </a:r>
-            <a:r>
-              <a:rPr lang="it-IT" dirty="0" err="1"/>
-              <a:t>system</a:t>
-            </a:r>
-            <a:endParaRPr lang="en-GB" dirty="0"/>
-          </a:p>
-        </p:txBody>
-      </p:sp>
-      <p:pic>
-        <p:nvPicPr>
-          <p:cNvPr id="8" name="Segnaposto contenuto 7"/>
-          <p:cNvPicPr>
-            <a:picLocks noGrp="1" noChangeAspect="1"/>
-          </p:cNvPicPr>
-          <p:nvPr>
-            <p:ph idx="1"/>
-          </p:nvPr>
-        </p:nvPicPr>
-        <p:blipFill rotWithShape="1">
-          <a:blip r:embed="rId3">
-            <a:extLst>
-              <a:ext uri="{28A0092B-C50C-407E-A947-70E740481C1C}">
-                <a14:useLocalDpi xmlns:a14="http://schemas.microsoft.com/office/drawing/2010/main" val="0"/>
-              </a:ext>
-            </a:extLst>
-          </a:blip>
-          <a:srcRect r="677"/>
-          <a:stretch/>
-        </p:blipFill>
-        <p:spPr>
-          <a:xfrm>
-            <a:off x="585616" y="2040144"/>
-            <a:ext cx="10761258" cy="3768313"/>
-          </a:xfrm>
-        </p:spPr>
-      </p:pic>
-    </p:spTree>
-    <p:extLst>
-      <p:ext uri="{BB962C8B-B14F-4D97-AF65-F5344CB8AC3E}">
-        <p14:creationId xmlns:p14="http://schemas.microsoft.com/office/powerpoint/2010/main" val="2367392682"/>
-      </p:ext>
-    </p:extLst>
-  </p:cSld>
-  <p:clrMapOvr>
-    <a:masterClrMapping/>
-  </p:clrMapOvr>
-  <mc:AlternateContent xmlns:mc="http://schemas.openxmlformats.org/markup-compatibility/2006" xmlns:p14="http://schemas.microsoft.com/office/powerpoint/2010/main">
-    <mc:Choice Requires="p14">
-      <p:transition spd="med" p14:dur="700">
-        <p:fade/>
-      </p:transition>
-    </mc:Choice>
-    <mc:Fallback xmlns="">
-      <p:transition spd="med">
-        <p:fade/>
-      </p:transition>
-    </mc:Fallback>
-  </mc:AlternateContent>
-</p:sld>
-</file>
-
-<file path=ppt/slides/slide20.xml><?xml version="1.0" encoding="utf-8"?>
-<p:sld xmlns:a="http://schemas.openxmlformats.org/drawingml/2006/main" xmlns:r="http://schemas.openxmlformats.org/officeDocument/2006/relationships" xmlns:p="http://schemas.openxmlformats.org/presentationml/2006/main">
-  <p:cSld>
-    <p:spTree>
-      <p:nvGrpSpPr>
-        <p:cNvPr id="1" name=""/>
-        <p:cNvGrpSpPr/>
-        <p:nvPr/>
-      </p:nvGrpSpPr>
-      <p:grpSpPr>
-        <a:xfrm>
-          <a:off x="0" y="0"/>
-          <a:ext cx="0" cy="0"/>
-          <a:chOff x="0" y="0"/>
-          <a:chExt cx="0" cy="0"/>
-        </a:xfrm>
-      </p:grpSpPr>
-      <p:sp>
-        <p:nvSpPr>
-          <p:cNvPr id="3" name="Segnaposto piè di pagina 2">
-            <a:extLst>
-              <a:ext uri="{FF2B5EF4-FFF2-40B4-BE49-F238E27FC236}">
                 <a16:creationId xmlns:a16="http://schemas.microsoft.com/office/drawing/2014/main" id="{ACBC0392-A449-DD19-5455-22BD88D5F610}"/>
               </a:ext>
             </a:extLst>
@@ -17607,7 +18025,7 @@
             <a:pPr rtl="0"/>
             <a:fld id="{8699F50C-BE38-4BD0-BA84-9B090E1F2B9B}" type="slidenum">
               <a:rPr lang="it-IT" noProof="0" smtClean="0"/>
-              <a:t>20</a:t>
+              <a:t>21</a:t>
             </a:fld>
             <a:endParaRPr lang="it-IT" noProof="0" dirty="0"/>
           </a:p>
@@ -17859,7 +18277,7 @@
 </p:sld>
 </file>
 
-<file path=ppt/slides/slide21.xml><?xml version="1.0" encoding="utf-8"?>
+<file path=ppt/slides/slide22.xml><?xml version="1.0" encoding="utf-8"?>
 <p:sld xmlns:a="http://schemas.openxmlformats.org/drawingml/2006/main" xmlns:r="http://schemas.openxmlformats.org/officeDocument/2006/relationships" xmlns:p="http://schemas.openxmlformats.org/presentationml/2006/main">
   <p:cSld>
     <p:spTree>
@@ -17929,7 +18347,7 @@
             <a:pPr rtl="0"/>
             <a:fld id="{8699F50C-BE38-4BD0-BA84-9B090E1F2B9B}" type="slidenum">
               <a:rPr lang="it-IT" noProof="0" smtClean="0"/>
-              <a:t>21</a:t>
+              <a:t>22</a:t>
             </a:fld>
             <a:endParaRPr lang="it-IT" noProof="0" dirty="0"/>
           </a:p>
@@ -18184,7 +18602,7 @@
 </p:sld>
 </file>
 
-<file path=ppt/slides/slide22.xml><?xml version="1.0" encoding="utf-8"?>
+<file path=ppt/slides/slide23.xml><?xml version="1.0" encoding="utf-8"?>
 <p:sld xmlns:a="http://schemas.openxmlformats.org/drawingml/2006/main" xmlns:r="http://schemas.openxmlformats.org/officeDocument/2006/relationships" xmlns:p="http://schemas.openxmlformats.org/presentationml/2006/main">
   <p:cSld>
     <p:spTree>
@@ -18254,7 +18672,7 @@
             <a:pPr rtl="0"/>
             <a:fld id="{8699F50C-BE38-4BD0-BA84-9B090E1F2B9B}" type="slidenum">
               <a:rPr lang="it-IT" noProof="0" smtClean="0"/>
-              <a:t>22</a:t>
+              <a:t>23</a:t>
             </a:fld>
             <a:endParaRPr lang="it-IT" noProof="0" dirty="0"/>
           </a:p>
@@ -18481,7 +18899,7 @@
 </p:sld>
 </file>
 
-<file path=ppt/slides/slide23.xml><?xml version="1.0" encoding="utf-8"?>
+<file path=ppt/slides/slide24.xml><?xml version="1.0" encoding="utf-8"?>
 <p:sld xmlns:a="http://schemas.openxmlformats.org/drawingml/2006/main" xmlns:r="http://schemas.openxmlformats.org/officeDocument/2006/relationships" xmlns:p="http://schemas.openxmlformats.org/presentationml/2006/main">
   <p:cSld>
     <p:spTree>
@@ -18551,7 +18969,7 @@
             <a:pPr rtl="0"/>
             <a:fld id="{8699F50C-BE38-4BD0-BA84-9B090E1F2B9B}" type="slidenum">
               <a:rPr lang="it-IT" noProof="0" smtClean="0"/>
-              <a:t>23</a:t>
+              <a:t>24</a:t>
             </a:fld>
             <a:endParaRPr lang="it-IT" noProof="0" dirty="0"/>
           </a:p>
@@ -18902,8 +19320,8 @@
           </a:p>
         </p:txBody>
       </p:sp>
-      <mc:AlternateContent xmlns:mc="http://schemas.openxmlformats.org/markup-compatibility/2006">
-        <mc:Choice xmlns:a14="http://schemas.microsoft.com/office/drawing/2010/main" Requires="a14">
+      <mc:AlternateContent xmlns:mc="http://schemas.openxmlformats.org/markup-compatibility/2006" xmlns:a14="http://schemas.microsoft.com/office/drawing/2010/main">
+        <mc:Choice Requires="a14">
           <p:sp>
             <p:nvSpPr>
               <p:cNvPr id="5" name="Segnaposto contenuto 4"/>
@@ -19711,7 +20129,7 @@
             </p:txBody>
           </p:sp>
         </mc:Choice>
-        <mc:Fallback>
+        <mc:Fallback xmlns="">
           <p:sp>
             <p:nvSpPr>
               <p:cNvPr id="5" name="Segnaposto contenuto 4"/>
@@ -20067,8 +20485,8 @@
           </a:p>
         </p:txBody>
       </p:sp>
-      <mc:AlternateContent xmlns:mc="http://schemas.openxmlformats.org/markup-compatibility/2006" xmlns:a14="http://schemas.microsoft.com/office/drawing/2010/main">
-        <mc:Choice Requires="a14">
+      <mc:AlternateContent xmlns:mc="http://schemas.openxmlformats.org/markup-compatibility/2006">
+        <mc:Choice xmlns:a14="http://schemas.microsoft.com/office/drawing/2010/main" Requires="a14">
           <p:sp>
             <p:nvSpPr>
               <p:cNvPr id="5" name="Segnaposto contenuto 4"/>
@@ -20100,7 +20518,7 @@
                   <a:buChar char="•"/>
                 </a:pPr>
                 <a:r>
-                  <a:rPr lang="it-IT" sz="1800" kern="1200" dirty="0">
+                  <a:rPr lang="it-IT" sz="2000" kern="1200" dirty="0">
                     <a:solidFill>
                       <a:srgbClr val="000000"/>
                     </a:solidFill>
@@ -20115,7 +20533,7 @@
                       <m:rPr>
                         <m:sty m:val="p"/>
                       </m:rPr>
-                      <a:rPr lang="en-GB" sz="1800" kern="1200">
+                      <a:rPr lang="en-GB" sz="2000" kern="1200">
                         <a:solidFill>
                           <a:srgbClr val="000000"/>
                         </a:solidFill>
@@ -20127,7 +20545,7 @@
                       <m:t>Δp</m:t>
                     </m:r>
                     <m:r>
-                      <a:rPr lang="en-GB" sz="1800" kern="1200">
+                      <a:rPr lang="en-GB" sz="2000" kern="1200">
                         <a:solidFill>
                           <a:srgbClr val="000000"/>
                         </a:solidFill>
@@ -20141,7 +20559,7 @@
                     <m:sSub>
                       <m:sSubPr>
                         <m:ctrlPr>
-                          <a:rPr lang="it-IT" sz="1800" i="1" kern="1200">
+                          <a:rPr lang="it-IT" sz="2000" i="1" kern="1200">
                             <a:solidFill>
                               <a:srgbClr val="000000"/>
                             </a:solidFill>
@@ -20152,7 +20570,7 @@
                       </m:sSubPr>
                       <m:e>
                         <m:r>
-                          <a:rPr lang="en-GB" sz="1800" i="1" kern="1200">
+                          <a:rPr lang="en-GB" sz="2000" i="1" kern="1200">
                             <a:solidFill>
                               <a:srgbClr val="000000"/>
                             </a:solidFill>
@@ -20166,7 +20584,7 @@
                       </m:e>
                       <m:sub>
                         <m:r>
-                          <a:rPr lang="en-GB" sz="1800" i="1" kern="1200">
+                          <a:rPr lang="en-GB" sz="2000" i="1" kern="1200">
                             <a:solidFill>
                               <a:srgbClr val="000000"/>
                             </a:solidFill>
@@ -20182,7 +20600,7 @@
                     <m:d>
                       <m:dPr>
                         <m:ctrlPr>
-                          <a:rPr lang="it-IT" sz="1800" i="1" kern="1200">
+                          <a:rPr lang="it-IT" sz="2000" i="1" kern="1200">
                             <a:solidFill>
                               <a:srgbClr val="000000"/>
                             </a:solidFill>
@@ -20196,7 +20614,7 @@
                           <m:rPr>
                             <m:sty m:val="p"/>
                           </m:rPr>
-                          <a:rPr lang="en-GB" sz="1800" kern="1200">
+                          <a:rPr lang="en-GB" sz="2000" kern="1200">
                             <a:solidFill>
                               <a:srgbClr val="000000"/>
                             </a:solidFill>
@@ -20210,7 +20628,7 @@
                       </m:e>
                     </m:d>
                     <m:r>
-                      <a:rPr lang="en-GB" sz="1800" i="1" kern="1200">
+                      <a:rPr lang="en-GB" sz="2000" i="1" kern="1200">
                         <a:solidFill>
                           <a:srgbClr val="000000"/>
                         </a:solidFill>
@@ -20224,7 +20642,7 @@
                     <m:sSub>
                       <m:sSubPr>
                         <m:ctrlPr>
-                          <a:rPr lang="it-IT" sz="1800" i="1" kern="1200">
+                          <a:rPr lang="it-IT" sz="2000" i="1" kern="1200">
                             <a:solidFill>
                               <a:srgbClr val="000000"/>
                             </a:solidFill>
@@ -20235,7 +20653,7 @@
                       </m:sSubPr>
                       <m:e>
                         <m:r>
-                          <a:rPr lang="en-GB" sz="1800" i="1" kern="1200">
+                          <a:rPr lang="en-GB" sz="2000" i="1" kern="1200">
                             <a:solidFill>
                               <a:srgbClr val="000000"/>
                             </a:solidFill>
@@ -20249,7 +20667,7 @@
                       </m:e>
                       <m:sub>
                         <m:r>
-                          <a:rPr lang="en-GB" sz="1800" i="1" kern="1200">
+                          <a:rPr lang="en-GB" sz="2000" i="1" kern="1200">
                             <a:solidFill>
                               <a:srgbClr val="000000"/>
                             </a:solidFill>
@@ -20265,7 +20683,7 @@
                     <m:d>
                       <m:dPr>
                         <m:ctrlPr>
-                          <a:rPr lang="it-IT" sz="1800" i="1" kern="1200">
+                          <a:rPr lang="it-IT" sz="2000" i="1" kern="1200">
                             <a:solidFill>
                               <a:srgbClr val="000000"/>
                             </a:solidFill>
@@ -20276,7 +20694,7 @@
                       </m:dPr>
                       <m:e>
                         <m:r>
-                          <a:rPr lang="en-GB" sz="1800" i="1" kern="1200">
+                          <a:rPr lang="en-GB" sz="2000" i="1" kern="1200">
                             <a:solidFill>
                               <a:srgbClr val="000000"/>
                             </a:solidFill>
@@ -20292,7 +20710,7 @@
                     <m:sSup>
                       <m:sSupPr>
                         <m:ctrlPr>
-                          <a:rPr lang="it-IT" sz="1800" i="1" kern="1200">
+                          <a:rPr lang="it-IT" sz="2000" i="1" kern="1200">
                             <a:solidFill>
                               <a:srgbClr val="000000"/>
                             </a:solidFill>
@@ -20303,7 +20721,7 @@
                       </m:sSupPr>
                       <m:e>
                         <m:r>
-                          <a:rPr lang="en-GB" sz="1800" i="1" kern="1200">
+                          <a:rPr lang="en-GB" sz="2000" i="1" kern="1200">
                             <a:solidFill>
                               <a:srgbClr val="000000"/>
                             </a:solidFill>
@@ -20317,7 +20735,7 @@
                       </m:e>
                       <m:sup>
                         <m:r>
-                          <a:rPr lang="en-GB" sz="1800" i="1" kern="1200">
+                          <a:rPr lang="en-GB" sz="2000" i="1" kern="1200">
                             <a:solidFill>
                               <a:srgbClr val="000000"/>
                             </a:solidFill>
@@ -20333,7 +20751,7 @@
                   </m:oMath>
                 </a14:m>
                 <a:r>
-                  <a:rPr lang="it-IT" sz="1800" kern="1200" dirty="0">
+                  <a:rPr lang="it-IT" sz="2000" kern="1200" dirty="0">
                     <a:solidFill>
                       <a:srgbClr val="000000"/>
                     </a:solidFill>
@@ -20343,7 +20761,7 @@
                   <a:t> </a:t>
                 </a:r>
                 <a:r>
-                  <a:rPr lang="it-IT" sz="1800" kern="1200" dirty="0">
+                  <a:rPr lang="it-IT" sz="2000" kern="1200" dirty="0">
                     <a:solidFill>
                       <a:srgbClr val="000000"/>
                     </a:solidFill>
@@ -20354,7 +20772,7 @@
                   <a:t></a:t>
                 </a:r>
                 <a:r>
-                  <a:rPr lang="en-GB" sz="1800" kern="1200" dirty="0">
+                  <a:rPr lang="en-GB" sz="2000" kern="1200" dirty="0">
                     <a:solidFill>
                       <a:srgbClr val="000000"/>
                     </a:solidFill>
@@ -20371,7 +20789,7 @@
                       <m:rPr>
                         <m:sty m:val="p"/>
                       </m:rPr>
-                      <a:rPr lang="en-GB" sz="1800" kern="1200">
+                      <a:rPr lang="en-GB" sz="2000" kern="1200">
                         <a:solidFill>
                           <a:srgbClr val="000000"/>
                         </a:solidFill>
@@ -20383,7 +20801,7 @@
                       <m:t>Δp</m:t>
                     </m:r>
                     <m:r>
-                      <a:rPr lang="en-GB" sz="1800" kern="1200">
+                      <a:rPr lang="en-GB" sz="2000" kern="1200">
                         <a:solidFill>
                           <a:srgbClr val="000000"/>
                         </a:solidFill>
@@ -20395,7 +20813,7 @@
                       <m:t>=</m:t>
                     </m:r>
                     <m:r>
-                      <a:rPr lang="en-GB" sz="1800" i="1" kern="1200">
+                      <a:rPr lang="en-GB" sz="2000" i="1" kern="1200">
                         <a:solidFill>
                           <a:srgbClr val="000000"/>
                         </a:solidFill>
@@ -20407,7 +20825,7 @@
                     <m:sSup>
                       <m:sSupPr>
                         <m:ctrlPr>
-                          <a:rPr lang="it-IT" sz="1800" i="1" kern="1200">
+                          <a:rPr lang="it-IT" sz="2000" i="1" kern="1200">
                             <a:solidFill>
                               <a:srgbClr val="000000"/>
                             </a:solidFill>
@@ -20418,7 +20836,7 @@
                       </m:sSupPr>
                       <m:e>
                         <m:r>
-                          <a:rPr lang="en-GB" sz="1800" i="1" kern="1200">
+                          <a:rPr lang="en-GB" sz="2000" i="1" kern="1200">
                             <a:solidFill>
                               <a:srgbClr val="000000"/>
                             </a:solidFill>
@@ -20430,7 +20848,7 @@
                       </m:e>
                       <m:sup>
                         <m:r>
-                          <a:rPr lang="en-GB" sz="1800" i="1" kern="1200">
+                          <a:rPr lang="en-GB" sz="2000" i="1" kern="1200">
                             <a:solidFill>
                               <a:srgbClr val="000000"/>
                             </a:solidFill>
@@ -20442,7 +20860,7 @@
                       </m:sup>
                     </m:sSup>
                     <m:r>
-                      <a:rPr lang="it-IT" sz="1800" b="0" i="1" kern="1200">
+                      <a:rPr lang="it-IT" sz="2000" b="0" i="1" kern="1200">
                         <a:solidFill>
                           <a:srgbClr val="000000"/>
                         </a:solidFill>
@@ -20452,7 +20870,7 @@
                       <m:t>𝑛</m:t>
                     </m:r>
                     <m:r>
-                      <a:rPr lang="it-IT" sz="1800" b="0" i="1" kern="1200">
+                      <a:rPr lang="it-IT" sz="2000" b="0" i="1" kern="1200">
                         <a:solidFill>
                           <a:srgbClr val="000000"/>
                         </a:solidFill>
@@ -20462,7 +20880,7 @@
                       <m:t>−666,7</m:t>
                     </m:r>
                     <m:r>
-                      <a:rPr lang="it-IT" sz="1800" b="0" i="1" kern="1200">
+                      <a:rPr lang="it-IT" sz="2000" b="0" i="1" kern="1200">
                         <a:solidFill>
                           <a:srgbClr val="000000"/>
                         </a:solidFill>
@@ -20474,7 +20892,7 @@
                     <m:sSup>
                       <m:sSupPr>
                         <m:ctrlPr>
-                          <a:rPr lang="it-IT" sz="1800" i="1" kern="1200">
+                          <a:rPr lang="it-IT" sz="2000" i="1" kern="1200">
                             <a:solidFill>
                               <a:srgbClr val="000000"/>
                             </a:solidFill>
@@ -20485,7 +20903,7 @@
                       </m:sSupPr>
                       <m:e>
                         <m:r>
-                          <a:rPr lang="en-GB" sz="1800" i="1" kern="1200">
+                          <a:rPr lang="en-GB" sz="2000" i="1" kern="1200">
                             <a:solidFill>
                               <a:srgbClr val="000000"/>
                             </a:solidFill>
@@ -20499,7 +20917,7 @@
                       </m:e>
                       <m:sup>
                         <m:r>
-                          <a:rPr lang="en-GB" sz="1800" i="1" kern="1200">
+                          <a:rPr lang="en-GB" sz="2000" i="1" kern="1200">
                             <a:solidFill>
                               <a:srgbClr val="000000"/>
                             </a:solidFill>
@@ -20514,7 +20932,7 @@
                     </m:sSup>
                   </m:oMath>
                 </a14:m>
-                <a:endParaRPr lang="it-IT" sz="1800" dirty="0">
+                <a:endParaRPr lang="it-IT" sz="2000" dirty="0">
                   <a:effectLst/>
                 </a:endParaRPr>
               </a:p>
@@ -20531,7 +20949,7 @@
                   </a:spcAft>
                 </a:pPr>
                 <a:r>
-                  <a:rPr lang="it-IT" sz="1800" kern="1200" dirty="0">
+                  <a:rPr lang="it-IT" sz="2000" kern="1200" dirty="0">
                     <a:solidFill>
                       <a:srgbClr val="000000"/>
                     </a:solidFill>
@@ -20546,7 +20964,7 @@
                       <m:rPr>
                         <m:sty m:val="p"/>
                       </m:rPr>
-                      <a:rPr lang="en-GB" sz="1800" kern="1200">
+                      <a:rPr lang="en-GB" sz="2000" kern="1200">
                         <a:solidFill>
                           <a:srgbClr val="000000"/>
                         </a:solidFill>
@@ -20558,7 +20976,7 @@
                       <m:t>Δp</m:t>
                     </m:r>
                     <m:r>
-                      <a:rPr lang="it-IT" sz="1800" b="0" i="0" kern="1200">
+                      <a:rPr lang="it-IT" sz="2000" b="0" i="0" kern="1200">
                         <a:solidFill>
                           <a:srgbClr val="000000"/>
                         </a:solidFill>
@@ -20572,7 +20990,7 @@
                     <m:sSub>
                       <m:sSubPr>
                         <m:ctrlPr>
-                          <a:rPr lang="it-IT" sz="1800" b="0" i="1" kern="1200">
+                          <a:rPr lang="it-IT" sz="2000" b="0" i="1" kern="1200">
                             <a:solidFill>
                               <a:srgbClr val="000000"/>
                             </a:solidFill>
@@ -20584,7 +21002,7 @@
                       </m:sSubPr>
                       <m:e>
                         <m:r>
-                          <a:rPr lang="it-IT" sz="1800" b="0" i="1" kern="1200">
+                          <a:rPr lang="it-IT" sz="2000" b="0" i="1" kern="1200">
                             <a:solidFill>
                               <a:srgbClr val="000000"/>
                             </a:solidFill>
@@ -20597,7 +21015,7 @@
                       </m:e>
                       <m:sub>
                         <m:r>
-                          <a:rPr lang="it-IT" sz="1800" b="0" i="1" kern="1200">
+                          <a:rPr lang="it-IT" sz="2000" b="0" i="1" kern="1200">
                             <a:solidFill>
                               <a:srgbClr val="000000"/>
                             </a:solidFill>
@@ -20610,7 +21028,7 @@
                       </m:sub>
                     </m:sSub>
                     <m:r>
-                      <a:rPr lang="it-IT" sz="1800" b="0" i="1" kern="1200">
+                      <a:rPr lang="it-IT" sz="2000" b="0" i="1" kern="1200">
                         <a:solidFill>
                           <a:srgbClr val="000000"/>
                         </a:solidFill>
@@ -20624,7 +21042,7 @@
                     <m:sSup>
                       <m:sSupPr>
                         <m:ctrlPr>
-                          <a:rPr lang="it-IT" sz="1800" i="1" kern="1200">
+                          <a:rPr lang="it-IT" sz="2000" i="1" kern="1200">
                             <a:solidFill>
                               <a:srgbClr val="000000"/>
                             </a:solidFill>
@@ -20635,7 +21053,7 @@
                       </m:sSupPr>
                       <m:e>
                         <m:r>
-                          <a:rPr lang="en-GB" sz="1800" i="1" kern="1200">
+                          <a:rPr lang="en-GB" sz="2000" i="1" kern="1200">
                             <a:solidFill>
                               <a:srgbClr val="000000"/>
                             </a:solidFill>
@@ -20649,7 +21067,7 @@
                       </m:e>
                       <m:sup>
                         <m:r>
-                          <a:rPr lang="en-GB" sz="1800" i="1" kern="1200">
+                          <a:rPr lang="en-GB" sz="2000" i="1" kern="1200">
                             <a:solidFill>
                               <a:srgbClr val="000000"/>
                             </a:solidFill>
@@ -20665,7 +21083,7 @@
                   </m:oMath>
                 </a14:m>
                 <a:r>
-                  <a:rPr lang="it-IT" sz="1800" kern="1200" dirty="0">
+                  <a:rPr lang="it-IT" sz="2000" kern="1200" dirty="0">
                     <a:solidFill>
                       <a:srgbClr val="000000"/>
                     </a:solidFill>
@@ -20675,7 +21093,7 @@
                   <a:t> </a:t>
                 </a:r>
                 <a:r>
-                  <a:rPr lang="it-IT" sz="1800" kern="1200" dirty="0">
+                  <a:rPr lang="it-IT" sz="2000" kern="1200" dirty="0">
                     <a:solidFill>
                       <a:srgbClr val="000000"/>
                     </a:solidFill>
@@ -20691,7 +21109,7 @@
                       <m:rPr>
                         <m:sty m:val="p"/>
                       </m:rPr>
-                      <a:rPr lang="en-GB" sz="1800" kern="1200">
+                      <a:rPr lang="en-GB" sz="2000" kern="1200">
                         <a:solidFill>
                           <a:srgbClr val="000000"/>
                         </a:solidFill>
@@ -20703,7 +21121,7 @@
                       <m:t>Δp</m:t>
                     </m:r>
                     <m:r>
-                      <a:rPr lang="it-IT" sz="1800" b="0" i="0" kern="1200">
+                      <a:rPr lang="it-IT" sz="2000" b="0" i="0" kern="1200">
                         <a:solidFill>
                           <a:srgbClr val="000000"/>
                         </a:solidFill>
@@ -20715,7 +21133,7 @@
                       <m:t>=</m:t>
                     </m:r>
                     <m:r>
-                      <a:rPr lang="it-IT" sz="1800" b="0" i="1" kern="1200">
+                      <a:rPr lang="it-IT" sz="2000" b="0" i="1" kern="1200">
                         <a:solidFill>
                           <a:srgbClr val="000000"/>
                         </a:solidFill>
@@ -20727,7 +21145,7 @@
                       <m:t>4</m:t>
                     </m:r>
                     <m:r>
-                      <a:rPr lang="en-GB" sz="1800" i="1" kern="1200">
+                      <a:rPr lang="en-GB" sz="2000" i="1" kern="1200">
                         <a:solidFill>
                           <a:srgbClr val="000000"/>
                         </a:solidFill>
@@ -20739,7 +21157,7 @@
                     <m:sSup>
                       <m:sSupPr>
                         <m:ctrlPr>
-                          <a:rPr lang="it-IT" sz="1800" i="1" kern="1200">
+                          <a:rPr lang="it-IT" sz="2000" i="1" kern="1200">
                             <a:solidFill>
                               <a:srgbClr val="000000"/>
                             </a:solidFill>
@@ -20750,7 +21168,7 @@
                       </m:sSupPr>
                       <m:e>
                         <m:r>
-                          <a:rPr lang="en-GB" sz="1800" i="1" kern="1200">
+                          <a:rPr lang="en-GB" sz="2000" i="1" kern="1200">
                             <a:solidFill>
                               <a:srgbClr val="000000"/>
                             </a:solidFill>
@@ -20762,7 +21180,7 @@
                       </m:e>
                       <m:sup>
                         <m:r>
-                          <a:rPr lang="it-IT" sz="1800" b="0" i="1" kern="1200">
+                          <a:rPr lang="it-IT" sz="2000" b="0" i="1" kern="1200">
                             <a:solidFill>
                               <a:srgbClr val="000000"/>
                             </a:solidFill>
@@ -20776,7 +21194,7 @@
                   </m:oMath>
                 </a14:m>
                 <a:r>
-                  <a:rPr lang="it-IT" sz="1800" kern="1200" dirty="0">
+                  <a:rPr lang="it-IT" sz="2000" kern="1200" dirty="0">
                     <a:solidFill>
                       <a:srgbClr val="000000"/>
                     </a:solidFill>
@@ -20790,7 +21208,7 @@
                     <m:sSup>
                       <m:sSupPr>
                         <m:ctrlPr>
-                          <a:rPr lang="it-IT" sz="1800" i="1" kern="1200">
+                          <a:rPr lang="it-IT" sz="2000" i="1" kern="1200">
                             <a:solidFill>
                               <a:srgbClr val="000000"/>
                             </a:solidFill>
@@ -20801,7 +21219,7 @@
                       </m:sSupPr>
                       <m:e>
                         <m:r>
-                          <a:rPr lang="en-GB" sz="1800" i="1" kern="1200">
+                          <a:rPr lang="en-GB" sz="2000" i="1" kern="1200">
                             <a:solidFill>
                               <a:srgbClr val="000000"/>
                             </a:solidFill>
@@ -20815,7 +21233,7 @@
                       </m:e>
                       <m:sup>
                         <m:r>
-                          <a:rPr lang="en-GB" sz="1800" i="1" kern="1200">
+                          <a:rPr lang="en-GB" sz="2000" i="1" kern="1200">
                             <a:solidFill>
                               <a:srgbClr val="000000"/>
                             </a:solidFill>
@@ -20831,7 +21249,7 @@
                   </m:oMath>
                 </a14:m>
                 <a:r>
-                  <a:rPr lang="it-IT" sz="1800" kern="1200" dirty="0">
+                  <a:rPr lang="it-IT" sz="2000" kern="1200" dirty="0">
                     <a:solidFill>
                       <a:srgbClr val="000000"/>
                     </a:solidFill>
@@ -20840,7 +21258,7 @@
                   </a:rPr>
                   <a:t> </a:t>
                 </a:r>
-                <a:endParaRPr lang="it-IT" sz="1800" dirty="0">
+                <a:endParaRPr lang="it-IT" sz="2000" dirty="0">
                   <a:effectLst/>
                 </a:endParaRPr>
               </a:p>
@@ -20857,7 +21275,7 @@
                   </a:spcAft>
                 </a:pPr>
                 <a:r>
-                  <a:rPr lang="it-IT" sz="1800" kern="1200" dirty="0">
+                  <a:rPr lang="it-IT" sz="2000" kern="1200" dirty="0">
                     <a:solidFill>
                       <a:srgbClr val="000000"/>
                     </a:solidFill>
@@ -20867,7 +21285,7 @@
                   <a:t>Flow rate </a:t>
                 </a:r>
                 <a:r>
-                  <a:rPr lang="en-US" sz="1800" kern="1200" dirty="0">
+                  <a:rPr lang="en-US" sz="2000" kern="1200" dirty="0">
                     <a:solidFill>
                       <a:srgbClr val="000000"/>
                     </a:solidFill>
@@ -20877,7 +21295,7 @@
                   <a:t>assumed</a:t>
                 </a:r>
                 <a:r>
-                  <a:rPr lang="it-IT" sz="1800" kern="1200" dirty="0">
+                  <a:rPr lang="it-IT" sz="2000" kern="1200" dirty="0">
                     <a:solidFill>
                       <a:srgbClr val="000000"/>
                     </a:solidFill>
@@ -20887,7 +21305,7 @@
                   <a:t> </a:t>
                 </a:r>
                 <a:r>
-                  <a:rPr lang="it-IT" sz="1800" kern="1200" dirty="0" err="1">
+                  <a:rPr lang="it-IT" sz="2000" kern="1200" dirty="0" err="1">
                     <a:solidFill>
                       <a:srgbClr val="000000"/>
                     </a:solidFill>
@@ -20897,7 +21315,7 @@
                   <a:t>equal</a:t>
                 </a:r>
                 <a:r>
-                  <a:rPr lang="it-IT" sz="1800" kern="1200" dirty="0">
+                  <a:rPr lang="it-IT" sz="2000" kern="1200" dirty="0">
                     <a:solidFill>
                       <a:srgbClr val="000000"/>
                     </a:solidFill>
@@ -20907,7 +21325,7 @@
                   <a:t> in the </a:t>
                 </a:r>
                 <a:r>
-                  <a:rPr lang="it-IT" sz="1800" kern="1200" dirty="0" err="1">
+                  <a:rPr lang="it-IT" sz="2000" kern="1200" dirty="0" err="1">
                     <a:solidFill>
                       <a:srgbClr val="000000"/>
                     </a:solidFill>
@@ -20917,7 +21335,7 @@
                   <a:t>whole</a:t>
                 </a:r>
                 <a:r>
-                  <a:rPr lang="it-IT" sz="1800" kern="1200" dirty="0">
+                  <a:rPr lang="it-IT" sz="2000" kern="1200" dirty="0">
                     <a:solidFill>
                       <a:srgbClr val="000000"/>
                     </a:solidFill>
@@ -20927,7 +21345,7 @@
                   <a:t> network </a:t>
                 </a:r>
                 <a:r>
-                  <a:rPr lang="it-IT" sz="1800" kern="1200" dirty="0">
+                  <a:rPr lang="it-IT" sz="2000" kern="1200" dirty="0">
                     <a:solidFill>
                       <a:srgbClr val="000000"/>
                     </a:solidFill>
@@ -20938,7 +21356,7 @@
                   <a:t></a:t>
                 </a:r>
                 <a:r>
-                  <a:rPr lang="it-IT" sz="1800" kern="1200" dirty="0">
+                  <a:rPr lang="it-IT" sz="2000" kern="1200" dirty="0">
                     <a:solidFill>
                       <a:srgbClr val="000000"/>
                     </a:solidFill>
@@ -20948,7 +21366,7 @@
                   <a:t> </a:t>
                 </a:r>
                 <a:r>
-                  <a:rPr lang="it-IT" sz="1800" kern="1200" dirty="0" err="1">
+                  <a:rPr lang="it-IT" sz="2000" kern="1200" dirty="0" err="1">
                     <a:solidFill>
                       <a:srgbClr val="FF0000"/>
                     </a:solidFill>
@@ -20982,8 +21400,87 @@
                     <a:spcPts val="0"/>
                   </a:spcAft>
                 </a:pPr>
+                <a:endParaRPr lang="it-IT" sz="1800" kern="1200" dirty="0">
+                  <a:solidFill>
+                    <a:srgbClr val="FF0000"/>
+                  </a:solidFill>
+                  <a:effectLst/>
+                  <a:latin typeface="Calibri" panose="020F0502020204030204" pitchFamily="34" charset="0"/>
+                </a:endParaRPr>
+              </a:p>
+              <a:p>
+                <a:pPr marL="228600" indent="-228600" algn="l" rtl="0" eaLnBrk="1" latinLnBrk="0" hangingPunct="1">
+                  <a:lnSpc>
+                    <a:spcPct val="90000"/>
+                  </a:lnSpc>
+                  <a:spcBef>
+                    <a:spcPts val="1000"/>
+                  </a:spcBef>
+                  <a:spcAft>
+                    <a:spcPts val="0"/>
+                  </a:spcAft>
+                </a:pPr>
+                <a:endParaRPr lang="it-IT" sz="1800" dirty="0">
+                  <a:solidFill>
+                    <a:srgbClr val="FF0000"/>
+                  </a:solidFill>
+                  <a:latin typeface="Calibri" panose="020F0502020204030204" pitchFamily="34" charset="0"/>
+                </a:endParaRPr>
+              </a:p>
+              <a:p>
+                <a:pPr marL="228600" indent="-228600" algn="l" rtl="0" eaLnBrk="1" latinLnBrk="0" hangingPunct="1">
+                  <a:lnSpc>
+                    <a:spcPct val="90000"/>
+                  </a:lnSpc>
+                  <a:spcBef>
+                    <a:spcPts val="1000"/>
+                  </a:spcBef>
+                  <a:spcAft>
+                    <a:spcPts val="0"/>
+                  </a:spcAft>
+                </a:pPr>
+                <a:endParaRPr lang="it-IT" sz="1800" kern="1200" dirty="0">
+                  <a:solidFill>
+                    <a:srgbClr val="FF0000"/>
+                  </a:solidFill>
+                  <a:effectLst/>
+                  <a:latin typeface="Calibri" panose="020F0502020204030204" pitchFamily="34" charset="0"/>
+                </a:endParaRPr>
+              </a:p>
+              <a:p>
+                <a:pPr marL="228600" indent="-228600" algn="l" rtl="0" eaLnBrk="1" latinLnBrk="0" hangingPunct="1">
+                  <a:lnSpc>
+                    <a:spcPct val="90000"/>
+                  </a:lnSpc>
+                  <a:spcBef>
+                    <a:spcPts val="1000"/>
+                  </a:spcBef>
+                  <a:spcAft>
+                    <a:spcPts val="0"/>
+                  </a:spcAft>
+                </a:pPr>
+                <a:endParaRPr lang="it-IT" sz="2000" kern="1200" dirty="0">
+                  <a:solidFill>
+                    <a:srgbClr val="FF0000"/>
+                  </a:solidFill>
+                  <a:effectLst/>
+                  <a:latin typeface="Calibri" panose="020F0502020204030204" pitchFamily="34" charset="0"/>
+                </a:endParaRPr>
+              </a:p>
+              <a:p>
+                <a:pPr marL="228600" indent="-228600" algn="l" rtl="0" eaLnBrk="1" latinLnBrk="0" hangingPunct="1">
+                  <a:lnSpc>
+                    <a:spcPct val="90000"/>
+                  </a:lnSpc>
+                  <a:spcBef>
+                    <a:spcPts val="1000"/>
+                  </a:spcBef>
+                  <a:spcAft>
+                    <a:spcPts val="0"/>
+                  </a:spcAft>
+                </a:pPr>
                 <a:r>
-                  <a:rPr lang="it-IT" sz="1800" kern="1200" dirty="0">
+                  <a:rPr lang="it-IT" sz="2000" kern="1200" dirty="0">
                     <a:solidFill>
                       <a:srgbClr val="FF0000"/>
                     </a:solidFill>
@@ -20992,7 +21489,7 @@
                   </a:rPr>
                   <a:t>EQUILIBRIUM</a:t>
                 </a:r>
-                <a:endParaRPr lang="it-IT" sz="1800" dirty="0">
+                <a:endParaRPr lang="it-IT" sz="2000" dirty="0">
                   <a:effectLst/>
                 </a:endParaRPr>
               </a:p>
@@ -21003,7 +21500,7 @@
                   </a:spcBef>
                 </a:pPr>
                 <a:r>
-                  <a:rPr lang="it-IT" sz="1800" kern="1200" dirty="0">
+                  <a:rPr lang="it-IT" sz="2000" kern="1200" dirty="0">
                     <a:solidFill>
                       <a:srgbClr val="000000"/>
                     </a:solidFill>
@@ -21013,7 +21510,7 @@
                   <a:t>Compute the </a:t>
                 </a:r>
                 <a:r>
-                  <a:rPr lang="it-IT" sz="1800" kern="1200" dirty="0" err="1">
+                  <a:rPr lang="it-IT" sz="2000" kern="1200" dirty="0" err="1">
                     <a:solidFill>
                       <a:srgbClr val="000000"/>
                     </a:solidFill>
@@ -21023,7 +21520,7 @@
                   <a:t>equilibrium</a:t>
                 </a:r>
                 <a:r>
-                  <a:rPr lang="it-IT" sz="1800" kern="1200" dirty="0">
+                  <a:rPr lang="it-IT" sz="2000" kern="1200" dirty="0">
                     <a:solidFill>
                       <a:srgbClr val="000000"/>
                     </a:solidFill>
@@ -21033,7 +21530,7 @@
                   <a:t> point for n, by </a:t>
                 </a:r>
                 <a:r>
-                  <a:rPr lang="it-IT" sz="1800" kern="1200" dirty="0" err="1">
+                  <a:rPr lang="it-IT" sz="2000" kern="1200" dirty="0" err="1">
                     <a:solidFill>
                       <a:srgbClr val="000000"/>
                     </a:solidFill>
@@ -21043,7 +21540,7 @@
                   <a:t>imposing</a:t>
                 </a:r>
                 <a:r>
-                  <a:rPr lang="it-IT" sz="1800" kern="1200" dirty="0">
+                  <a:rPr lang="it-IT" sz="2000" kern="1200" dirty="0">
                     <a:solidFill>
                       <a:srgbClr val="000000"/>
                     </a:solidFill>
@@ -21058,7 +21555,7 @@
                       <m:rPr>
                         <m:sty m:val="p"/>
                       </m:rPr>
-                      <a:rPr lang="en-GB" sz="1800" kern="1200">
+                      <a:rPr lang="en-GB" sz="2000" kern="1200">
                         <a:solidFill>
                           <a:srgbClr val="000000"/>
                         </a:solidFill>
@@ -21072,7 +21569,7 @@
                   </m:oMath>
                 </a14:m>
                 <a:r>
-                  <a:rPr lang="it-IT" sz="1800" kern="1200" dirty="0">
+                  <a:rPr lang="it-IT" sz="2000" kern="1200" dirty="0">
                     <a:solidFill>
                       <a:srgbClr val="000000"/>
                     </a:solidFill>
@@ -21084,7 +21581,7 @@
                 <a14:m>
                   <m:oMath xmlns:m="http://schemas.openxmlformats.org/officeDocument/2006/math">
                     <m:r>
-                      <a:rPr lang="en-GB" sz="1800" i="1" kern="1200">
+                      <a:rPr lang="en-GB" sz="2000" i="1" kern="1200">
                         <a:solidFill>
                           <a:srgbClr val="000000"/>
                         </a:solidFill>
@@ -21096,7 +21593,7 @@
                     <m:sSup>
                       <m:sSupPr>
                         <m:ctrlPr>
-                          <a:rPr lang="it-IT" sz="1800" i="1" kern="1200">
+                          <a:rPr lang="it-IT" sz="2000" i="1" kern="1200">
                             <a:solidFill>
                               <a:srgbClr val="000000"/>
                             </a:solidFill>
@@ -21107,7 +21604,7 @@
                       </m:sSupPr>
                       <m:e>
                         <m:r>
-                          <a:rPr lang="en-GB" sz="1800" i="1" kern="1200">
+                          <a:rPr lang="en-GB" sz="2000" i="1" kern="1200">
                             <a:solidFill>
                               <a:srgbClr val="000000"/>
                             </a:solidFill>
@@ -21119,7 +21616,7 @@
                       </m:e>
                       <m:sup>
                         <m:r>
-                          <a:rPr lang="en-GB" sz="1800" i="1" kern="1200">
+                          <a:rPr lang="en-GB" sz="2000" i="1" kern="1200">
                             <a:solidFill>
                               <a:srgbClr val="000000"/>
                             </a:solidFill>
@@ -21131,7 +21628,7 @@
                       </m:sup>
                     </m:sSup>
                     <m:r>
-                      <a:rPr lang="en-GB" sz="1800" i="1" kern="1200">
+                      <a:rPr lang="en-GB" sz="2000" i="1" kern="1200">
                         <a:solidFill>
                           <a:srgbClr val="000000"/>
                         </a:solidFill>
@@ -21143,13 +21640,13 @@
                   </m:oMath>
                 </a14:m>
                 <a:r>
-                  <a:rPr lang="it-IT" sz="1800" dirty="0">
+                  <a:rPr lang="it-IT" sz="2000" dirty="0">
                     <a:effectLst/>
                   </a:rPr>
                   <a:t> </a:t>
                 </a:r>
                 <a:r>
-                  <a:rPr lang="it-IT" sz="1800" dirty="0">
+                  <a:rPr lang="it-IT" sz="2000" dirty="0">
                     <a:effectLst/>
                     <a:sym typeface="Wingdings" panose="05000000000000000000" pitchFamily="2" charset="2"/>
                   </a:rPr>
@@ -21161,14 +21658,14 @@
                       <m:accPr>
                         <m:chr m:val="̅"/>
                         <m:ctrlPr>
-                          <a:rPr lang="it-IT" sz="1800" i="1">
+                          <a:rPr lang="it-IT" sz="2000" i="1">
                             <a:latin typeface="Cambria Math" panose="02040503050406030204" pitchFamily="18" charset="0"/>
                           </a:rPr>
                         </m:ctrlPr>
                       </m:accPr>
                       <m:e>
                         <m:r>
-                          <a:rPr lang="en-GB" sz="1800" i="1">
+                          <a:rPr lang="en-GB" sz="2000" i="1">
                             <a:latin typeface="Cambria Math" panose="02040503050406030204" pitchFamily="18" charset="0"/>
                           </a:rPr>
                           <m:t>𝑛</m:t>
@@ -21176,16 +21673,14 @@
                       </m:e>
                     </m:acc>
                     <m:r>
-                      <a:rPr lang="en-GB" sz="1800" i="1">
+                      <a:rPr lang="en-GB" sz="2000" i="1">
                         <a:latin typeface="Cambria Math" panose="02040503050406030204" pitchFamily="18" charset="0"/>
                       </a:rPr>
                       <m:t>=0.338</m:t>
                     </m:r>
                   </m:oMath>
                 </a14:m>
-                <a:endParaRPr lang="it-IT" sz="1800" dirty="0">
-                  <a:effectLst/>
-                </a:endParaRPr>
+                <a:endParaRPr lang="it-IT" sz="2000" dirty="0"/>
               </a:p>
               <a:p>
                 <a:pPr marL="685800">
@@ -21193,354 +21688,15 @@
                     <a:spcPts val="500"/>
                   </a:spcBef>
                 </a:pPr>
-                <a:r>
-                  <a:rPr lang="it-IT" sz="1800" dirty="0" err="1"/>
-                  <a:t>Linearization</a:t>
-                </a:r>
-                <a:r>
-                  <a:rPr lang="it-IT" sz="1800" dirty="0"/>
-                  <a:t> </a:t>
-                </a:r>
-                <a:r>
-                  <a:rPr lang="it-IT" sz="1800" dirty="0">
-                    <a:sym typeface="Wingdings" panose="05000000000000000000" pitchFamily="2" charset="2"/>
-                  </a:rPr>
-                  <a:t> </a:t>
-                </a:r>
-                <a14:m>
-                  <m:oMath xmlns:m="http://schemas.openxmlformats.org/officeDocument/2006/math">
-                    <m:r>
-                      <m:rPr>
-                        <m:sty m:val="p"/>
-                      </m:rPr>
-                      <a:rPr lang="el-GR" sz="1800" i="1" smtClean="0">
-                        <a:latin typeface="Cambria Math" panose="02040503050406030204" pitchFamily="18" charset="0"/>
-                        <a:ea typeface="Cambria Math" panose="02040503050406030204" pitchFamily="18" charset="0"/>
-                      </a:rPr>
-                      <m:t>δ</m:t>
-                    </m:r>
-                    <m:r>
-                      <a:rPr lang="it-IT" sz="1800" b="0" i="1" smtClean="0">
-                        <a:latin typeface="Cambria Math" panose="02040503050406030204" pitchFamily="18" charset="0"/>
-                        <a:ea typeface="Cambria Math" panose="02040503050406030204" pitchFamily="18" charset="0"/>
-                      </a:rPr>
-                      <m:t>𝑝</m:t>
-                    </m:r>
-                    <m:r>
-                      <a:rPr lang="en-GB" sz="1800" i="1" smtClean="0">
-                        <a:latin typeface="Cambria Math" panose="02040503050406030204" pitchFamily="18" charset="0"/>
-                        <a:ea typeface="Cambria Math" panose="02040503050406030204" pitchFamily="18" charset="0"/>
-                      </a:rPr>
-                      <m:t>≅</m:t>
-                    </m:r>
-                    <m:r>
-                      <a:rPr lang="it-IT" sz="1800" b="0" i="1" smtClean="0">
-                        <a:latin typeface="Cambria Math" panose="02040503050406030204" pitchFamily="18" charset="0"/>
-                      </a:rPr>
-                      <m:t>6</m:t>
-                    </m:r>
-                    <m:sSup>
-                      <m:sSupPr>
-                        <m:ctrlPr>
-                          <a:rPr lang="it-IT" sz="1800" b="0" i="1" smtClean="0">
-                            <a:latin typeface="Cambria Math" panose="02040503050406030204" pitchFamily="18" charset="0"/>
-                          </a:rPr>
-                        </m:ctrlPr>
-                      </m:sSupPr>
-                      <m:e>
-                        <m:r>
-                          <a:rPr lang="it-IT" sz="1800" b="0" i="1" smtClean="0">
-                            <a:latin typeface="Cambria Math" panose="02040503050406030204" pitchFamily="18" charset="0"/>
-                            <a:ea typeface="Cambria Math" panose="02040503050406030204" pitchFamily="18" charset="0"/>
-                          </a:rPr>
-                          <m:t>∙</m:t>
-                        </m:r>
-                        <m:r>
-                          <a:rPr lang="it-IT" sz="1800" b="0" i="1" smtClean="0">
-                            <a:latin typeface="Cambria Math" panose="02040503050406030204" pitchFamily="18" charset="0"/>
-                          </a:rPr>
-                          <m:t>10</m:t>
-                        </m:r>
-                      </m:e>
-                      <m:sup>
-                        <m:r>
-                          <a:rPr lang="it-IT" sz="1800" b="0" i="1" smtClean="0">
-                            <a:latin typeface="Cambria Math" panose="02040503050406030204" pitchFamily="18" charset="0"/>
-                          </a:rPr>
-                          <m:t>5</m:t>
-                        </m:r>
-                      </m:sup>
-                    </m:sSup>
-                  </m:oMath>
-                </a14:m>
-                <a:r>
-                  <a:rPr lang="el-GR" sz="1800" dirty="0">
-                    <a:ea typeface="Cambria Math" panose="02040503050406030204" pitchFamily="18" charset="0"/>
-                  </a:rPr>
-                  <a:t> </a:t>
-                </a:r>
-                <a14:m>
-                  <m:oMath xmlns:m="http://schemas.openxmlformats.org/officeDocument/2006/math">
-                    <m:r>
-                      <m:rPr>
-                        <m:sty m:val="p"/>
-                      </m:rPr>
-                      <a:rPr lang="el-GR" sz="1800" i="1">
-                        <a:latin typeface="Cambria Math" panose="02040503050406030204" pitchFamily="18" charset="0"/>
-                        <a:ea typeface="Cambria Math" panose="02040503050406030204" pitchFamily="18" charset="0"/>
-                      </a:rPr>
-                      <m:t>δ</m:t>
-                    </m:r>
-                    <m:r>
-                      <a:rPr lang="it-IT" sz="1800" b="0" i="1" smtClean="0">
-                        <a:latin typeface="Cambria Math" panose="02040503050406030204" pitchFamily="18" charset="0"/>
-                        <a:ea typeface="Cambria Math" panose="02040503050406030204" pitchFamily="18" charset="0"/>
-                      </a:rPr>
-                      <m:t>𝑛</m:t>
-                    </m:r>
-                  </m:oMath>
-                </a14:m>
-                <a:endParaRPr lang="it-IT" sz="1800" dirty="0">
-                  <a:effectLst/>
-                </a:endParaRPr>
+                <a:endParaRPr lang="it-IT" sz="1800" dirty="0"/>
               </a:p>
               <a:p>
-                <a:pPr marL="457200" indent="0">
+                <a:pPr marL="685800">
                   <a:spcBef>
                     <a:spcPts val="500"/>
                   </a:spcBef>
-                  <a:buNone/>
                 </a:pPr>
                 <a:endParaRPr lang="it-IT" sz="1800" dirty="0"/>
-              </a:p>
-              <a:p>
-                <a:pPr marL="457200" indent="0">
-                  <a:spcBef>
-                    <a:spcPts val="500"/>
-                  </a:spcBef>
-                  <a:buNone/>
-                </a:pPr>
-                <a:r>
-                  <a:rPr lang="it-IT" sz="1800" dirty="0"/>
-                  <a:t>«</a:t>
-                </a:r>
-                <a:r>
-                  <a:rPr lang="it-IT" sz="1800" dirty="0" err="1"/>
-                  <a:t>Albegraic</a:t>
-                </a:r>
-                <a:r>
-                  <a:rPr lang="it-IT" sz="1800" dirty="0"/>
-                  <a:t> model» </a:t>
-                </a:r>
-                <a:r>
-                  <a:rPr lang="it-IT" sz="1800" dirty="0">
-                    <a:sym typeface="Wingdings" panose="05000000000000000000" pitchFamily="2" charset="2"/>
-                  </a:rPr>
-                  <a:t> </a:t>
-                </a:r>
-                <a:r>
-                  <a:rPr lang="it-IT" sz="1800" dirty="0" err="1">
-                    <a:sym typeface="Wingdings" panose="05000000000000000000" pitchFamily="2" charset="2"/>
-                  </a:rPr>
-                  <a:t>Hydraulics</a:t>
-                </a:r>
-                <a:r>
-                  <a:rPr lang="it-IT" sz="1800" dirty="0">
-                    <a:sym typeface="Wingdings" panose="05000000000000000000" pitchFamily="2" charset="2"/>
-                  </a:rPr>
-                  <a:t> dynamics </a:t>
-                </a:r>
-                <a:r>
-                  <a:rPr lang="it-IT" sz="1800" dirty="0" err="1">
-                    <a:sym typeface="Wingdings" panose="05000000000000000000" pitchFamily="2" charset="2"/>
-                  </a:rPr>
-                  <a:t>much</a:t>
-                </a:r>
-                <a:r>
-                  <a:rPr lang="it-IT" sz="1800" dirty="0">
-                    <a:sym typeface="Wingdings" panose="05000000000000000000" pitchFamily="2" charset="2"/>
-                  </a:rPr>
-                  <a:t> </a:t>
-                </a:r>
-                <a:r>
-                  <a:rPr lang="it-IT" sz="1800" dirty="0" err="1">
-                    <a:sym typeface="Wingdings" panose="05000000000000000000" pitchFamily="2" charset="2"/>
-                  </a:rPr>
-                  <a:t>faster</a:t>
-                </a:r>
-                <a:r>
-                  <a:rPr lang="it-IT" sz="1800" dirty="0">
-                    <a:sym typeface="Wingdings" panose="05000000000000000000" pitchFamily="2" charset="2"/>
-                  </a:rPr>
-                  <a:t> </a:t>
-                </a:r>
-                <a:r>
-                  <a:rPr lang="it-IT" sz="1800" dirty="0" err="1">
-                    <a:sym typeface="Wingdings" panose="05000000000000000000" pitchFamily="2" charset="2"/>
-                  </a:rPr>
-                  <a:t>than</a:t>
-                </a:r>
-                <a:r>
-                  <a:rPr lang="it-IT" sz="1800" dirty="0">
-                    <a:sym typeface="Wingdings" panose="05000000000000000000" pitchFamily="2" charset="2"/>
-                  </a:rPr>
-                  <a:t> temperature, can be </a:t>
-                </a:r>
-                <a:r>
-                  <a:rPr lang="it-IT" sz="1800" dirty="0" err="1">
-                    <a:sym typeface="Wingdings" panose="05000000000000000000" pitchFamily="2" charset="2"/>
-                  </a:rPr>
-                  <a:t>neglected</a:t>
-                </a:r>
-                <a:endParaRPr lang="it-IT" sz="1800" dirty="0">
-                  <a:sym typeface="Wingdings" panose="05000000000000000000" pitchFamily="2" charset="2"/>
-                </a:endParaRPr>
-              </a:p>
-              <a:p>
-                <a:pPr marL="457200" indent="0">
-                  <a:spcBef>
-                    <a:spcPts val="500"/>
-                  </a:spcBef>
-                  <a:buNone/>
-                </a:pPr>
-                <a:r>
-                  <a:rPr lang="it-IT" sz="1800" dirty="0">
-                    <a:effectLst/>
-                    <a:sym typeface="Wingdings" panose="05000000000000000000" pitchFamily="2" charset="2"/>
-                  </a:rPr>
-                  <a:t>(in reality: G</a:t>
-                </a:r>
-                <a14:m>
-                  <m:oMath xmlns:m="http://schemas.openxmlformats.org/officeDocument/2006/math">
-                    <m:d>
-                      <m:dPr>
-                        <m:ctrlPr>
-                          <a:rPr lang="it-IT" sz="1400" i="1" smtClean="0">
-                            <a:effectLst/>
-                            <a:latin typeface="Cambria Math" panose="02040503050406030204" pitchFamily="18" charset="0"/>
-                          </a:rPr>
-                        </m:ctrlPr>
-                      </m:dPr>
-                      <m:e>
-                        <m:r>
-                          <a:rPr lang="en-GB" sz="1800" i="1">
-                            <a:effectLst/>
-                            <a:latin typeface="Cambria Math" panose="02040503050406030204" pitchFamily="18" charset="0"/>
-                            <a:ea typeface="Calibri" panose="020F0502020204030204" pitchFamily="34" charset="0"/>
-                            <a:cs typeface="Times New Roman" panose="02020603050405020304" pitchFamily="18" charset="0"/>
-                          </a:rPr>
-                          <m:t>𝑠</m:t>
-                        </m:r>
-                      </m:e>
-                    </m:d>
-                    <m:r>
-                      <a:rPr lang="en-GB" sz="1800" i="1">
-                        <a:effectLst/>
-                        <a:latin typeface="Cambria Math" panose="02040503050406030204" pitchFamily="18" charset="0"/>
-                        <a:ea typeface="Calibri" panose="020F0502020204030204" pitchFamily="34" charset="0"/>
-                        <a:cs typeface="Times New Roman" panose="02020603050405020304" pitchFamily="18" charset="0"/>
-                      </a:rPr>
-                      <m:t>= </m:t>
-                    </m:r>
-                    <m:f>
-                      <m:fPr>
-                        <m:ctrlPr>
-                          <a:rPr lang="it-IT" sz="1400" i="1">
-                            <a:effectLst/>
-                            <a:latin typeface="Cambria Math" panose="02040503050406030204" pitchFamily="18" charset="0"/>
-                          </a:rPr>
-                        </m:ctrlPr>
-                      </m:fPr>
-                      <m:num>
-                        <m:r>
-                          <a:rPr lang="en-GB" sz="1800" i="1">
-                            <a:effectLst/>
-                            <a:latin typeface="Cambria Math" panose="02040503050406030204" pitchFamily="18" charset="0"/>
-                            <a:ea typeface="Calibri" panose="020F0502020204030204" pitchFamily="34" charset="0"/>
-                            <a:cs typeface="Times New Roman" panose="02020603050405020304" pitchFamily="18" charset="0"/>
-                          </a:rPr>
-                          <m:t>µ</m:t>
-                        </m:r>
-                      </m:num>
-                      <m:den>
-                        <m:r>
-                          <a:rPr lang="en-GB" sz="1800" i="1">
-                            <a:effectLst/>
-                            <a:latin typeface="Cambria Math" panose="02040503050406030204" pitchFamily="18" charset="0"/>
-                            <a:ea typeface="Calibri" panose="020F0502020204030204" pitchFamily="34" charset="0"/>
-                            <a:cs typeface="Times New Roman" panose="02020603050405020304" pitchFamily="18" charset="0"/>
-                          </a:rPr>
-                          <m:t>1+</m:t>
-                        </m:r>
-                        <m:r>
-                          <a:rPr lang="en-GB" sz="1800" i="1">
-                            <a:effectLst/>
-                            <a:latin typeface="Cambria Math" panose="02040503050406030204" pitchFamily="18" charset="0"/>
-                            <a:ea typeface="Calibri" panose="020F0502020204030204" pitchFamily="34" charset="0"/>
-                            <a:cs typeface="Times New Roman" panose="02020603050405020304" pitchFamily="18" charset="0"/>
-                          </a:rPr>
-                          <m:t>𝑠</m:t>
-                        </m:r>
-                        <m:r>
-                          <a:rPr lang="en-GB" sz="1800" i="1">
-                            <a:effectLst/>
-                            <a:latin typeface="Cambria Math" panose="02040503050406030204" pitchFamily="18" charset="0"/>
-                            <a:ea typeface="Calibri" panose="020F0502020204030204" pitchFamily="34" charset="0"/>
-                            <a:cs typeface="Times New Roman" panose="02020603050405020304" pitchFamily="18" charset="0"/>
-                          </a:rPr>
-                          <m:t>𝜏</m:t>
-                        </m:r>
-                      </m:den>
-                    </m:f>
-                  </m:oMath>
-                </a14:m>
-                <a:r>
-                  <a:rPr lang="en-GB" sz="1800" dirty="0">
-                    <a:effectLst/>
-                    <a:latin typeface="Calibri" panose="020F0502020204030204" pitchFamily="34" charset="0"/>
-                    <a:ea typeface="Times New Roman" panose="02020603050405020304" pitchFamily="18" charset="0"/>
-                    <a:cs typeface="Times New Roman" panose="02020603050405020304" pitchFamily="18" charset="0"/>
-                  </a:rPr>
-                  <a:t> with </a:t>
-                </a:r>
-                <a:r>
-                  <a:rPr lang="en-GB" sz="1800" dirty="0">
-                    <a:effectLst/>
-                    <a:latin typeface="Calibri" panose="020F0502020204030204" pitchFamily="34" charset="0"/>
-                    <a:ea typeface="Times New Roman" panose="02020603050405020304" pitchFamily="18" charset="0"/>
-                  </a:rPr>
-                  <a:t>τ</a:t>
-                </a:r>
-                <a:r>
-                  <a:rPr lang="en-GB" sz="1800" dirty="0">
-                    <a:effectLst/>
-                    <a:latin typeface="Calibri" panose="020F0502020204030204" pitchFamily="34" charset="0"/>
-                    <a:ea typeface="Times New Roman" panose="02020603050405020304" pitchFamily="18" charset="0"/>
-                    <a:cs typeface="Times New Roman" panose="02020603050405020304" pitchFamily="18" charset="0"/>
-                  </a:rPr>
-                  <a:t>  </a:t>
-                </a:r>
-                <a:r>
-                  <a:rPr lang="en-GB" sz="1800" u="sng" dirty="0">
-                    <a:effectLst/>
-                    <a:latin typeface="Calibri" panose="020F0502020204030204" pitchFamily="34" charset="0"/>
-                    <a:ea typeface="Times New Roman" panose="02020603050405020304" pitchFamily="18" charset="0"/>
-                    <a:cs typeface="Times New Roman" panose="02020603050405020304" pitchFamily="18" charset="0"/>
-                  </a:rPr>
-                  <a:t>very small</a:t>
-                </a:r>
-                <a:r>
-                  <a:rPr lang="en-GB" sz="1800" dirty="0">
-                    <a:effectLst/>
-                    <a:latin typeface="Calibri" panose="020F0502020204030204" pitchFamily="34" charset="0"/>
-                    <a:ea typeface="Times New Roman" panose="02020603050405020304" pitchFamily="18" charset="0"/>
-                    <a:cs typeface="Times New Roman" panose="02020603050405020304" pitchFamily="18" charset="0"/>
-                  </a:rPr>
-                  <a:t>) </a:t>
-                </a:r>
-                <a:endParaRPr lang="it-IT" sz="1800" dirty="0">
-                  <a:effectLst/>
-                </a:endParaRPr>
               </a:p>
               <a:p>
                 <a:endParaRPr lang="en-GB" dirty="0"/>
@@ -21548,7 +21704,7 @@
             </p:txBody>
           </p:sp>
         </mc:Choice>
-        <mc:Fallback xmlns="">
+        <mc:Fallback>
           <p:sp>
             <p:nvSpPr>
               <p:cNvPr id="5" name="Segnaposto contenuto 4"/>
@@ -21611,8 +21767,640 @@
         </p:blipFill>
         <p:spPr bwMode="auto">
           <a:xfrm>
-            <a:off x="7186489" y="832757"/>
+            <a:off x="7705167" y="1738418"/>
             <a:ext cx="4486833" cy="2143511"/>
+          </a:xfrm>
+          <a:prstGeom prst="rect">
+            <a:avLst/>
+          </a:prstGeom>
+          <a:noFill/>
+          <a:ln>
+            <a:noFill/>
+          </a:ln>
+        </p:spPr>
+      </p:pic>
+      <p:pic>
+        <p:nvPicPr>
+          <p:cNvPr id="10" name="Segnaposto contenuto 5">
+            <a:extLst>
+              <a:ext uri="{FF2B5EF4-FFF2-40B4-BE49-F238E27FC236}">
+                <a16:creationId xmlns:a16="http://schemas.microsoft.com/office/drawing/2014/main" id="{DB6FCB91-F013-BF8F-5350-FA0107F9B62E}"/>
+              </a:ext>
+            </a:extLst>
+          </p:cNvPr>
+          <p:cNvPicPr>
+            <a:picLocks noChangeAspect="1"/>
+          </p:cNvPicPr>
+          <p:nvPr/>
+        </p:nvPicPr>
+        <p:blipFill>
+          <a:blip r:embed="rId5">
+            <a:extLst>
+              <a:ext uri="{28A0092B-C50C-407E-A947-70E740481C1C}">
+                <a14:useLocalDpi xmlns:a14="http://schemas.microsoft.com/office/drawing/2010/main" val="0"/>
+              </a:ext>
+            </a:extLst>
+          </a:blip>
+          <a:srcRect/>
+          <a:stretch>
+            <a:fillRect/>
+          </a:stretch>
+        </p:blipFill>
+        <p:spPr bwMode="auto">
+          <a:xfrm>
+            <a:off x="696669" y="3204646"/>
+            <a:ext cx="6466131" cy="1031983"/>
+          </a:xfrm>
+          <a:prstGeom prst="rect">
+            <a:avLst/>
+          </a:prstGeom>
+          <a:noFill/>
+          <a:ln>
+            <a:noFill/>
+          </a:ln>
+        </p:spPr>
+      </p:pic>
+    </p:spTree>
+    <p:extLst>
+      <p:ext uri="{BB962C8B-B14F-4D97-AF65-F5344CB8AC3E}">
+        <p14:creationId xmlns:p14="http://schemas.microsoft.com/office/powerpoint/2010/main" val="2146184994"/>
+      </p:ext>
+    </p:extLst>
+  </p:cSld>
+  <p:clrMapOvr>
+    <a:masterClrMapping/>
+  </p:clrMapOvr>
+  <mc:AlternateContent xmlns:mc="http://schemas.openxmlformats.org/markup-compatibility/2006" xmlns:p14="http://schemas.microsoft.com/office/powerpoint/2010/main">
+    <mc:Choice Requires="p14">
+      <p:transition spd="med" p14:dur="700">
+        <p:fade/>
+      </p:transition>
+    </mc:Choice>
+    <mc:Fallback xmlns="">
+      <p:transition spd="med">
+        <p:fade/>
+      </p:transition>
+    </mc:Fallback>
+  </mc:AlternateContent>
+</p:sld>
+</file>
+
+<file path=ppt/slides/slide6.xml><?xml version="1.0" encoding="utf-8"?>
+<p:sld xmlns:a="http://schemas.openxmlformats.org/drawingml/2006/main" xmlns:r="http://schemas.openxmlformats.org/officeDocument/2006/relationships" xmlns:p="http://schemas.openxmlformats.org/presentationml/2006/main">
+  <p:cSld>
+    <p:spTree>
+      <p:nvGrpSpPr>
+        <p:cNvPr id="1" name=""/>
+        <p:cNvGrpSpPr/>
+        <p:nvPr/>
+      </p:nvGrpSpPr>
+      <p:grpSpPr>
+        <a:xfrm>
+          <a:off x="0" y="0"/>
+          <a:ext cx="0" cy="0"/>
+          <a:chOff x="0" y="0"/>
+          <a:chExt cx="0" cy="0"/>
+        </a:xfrm>
+      </p:grpSpPr>
+      <p:sp>
+        <p:nvSpPr>
+          <p:cNvPr id="2" name="Segnaposto piè di pagina 1">
+            <a:extLst>
+              <a:ext uri="{FF2B5EF4-FFF2-40B4-BE49-F238E27FC236}">
+                <a16:creationId xmlns:a16="http://schemas.microsoft.com/office/drawing/2014/main" id="{9B0C102D-383D-B010-4406-85C32B8CFFEB}"/>
+              </a:ext>
+            </a:extLst>
+          </p:cNvPr>
+          <p:cNvSpPr>
+            <a:spLocks noGrp="1"/>
+          </p:cNvSpPr>
+          <p:nvPr>
+            <p:ph type="ftr" sz="quarter" idx="17"/>
+          </p:nvPr>
+        </p:nvSpPr>
+        <p:spPr/>
+        <p:txBody>
+          <a:bodyPr/>
+          <a:lstStyle/>
+          <a:p>
+            <a:pPr rtl="0"/>
+            <a:r>
+              <a:rPr lang="it-IT" noProof="0"/>
+              <a:t>Aggiungere un piè di pagina</a:t>
+            </a:r>
+            <a:endParaRPr lang="it-IT" noProof="0" dirty="0"/>
+          </a:p>
+        </p:txBody>
+      </p:sp>
+      <p:sp>
+        <p:nvSpPr>
+          <p:cNvPr id="3" name="Segnaposto numero diapositiva 2">
+            <a:extLst>
+              <a:ext uri="{FF2B5EF4-FFF2-40B4-BE49-F238E27FC236}">
+                <a16:creationId xmlns:a16="http://schemas.microsoft.com/office/drawing/2014/main" id="{87DEC9FC-E11B-D088-8FD0-8C85CEC5C3F1}"/>
+              </a:ext>
+            </a:extLst>
+          </p:cNvPr>
+          <p:cNvSpPr>
+            <a:spLocks noGrp="1"/>
+          </p:cNvSpPr>
+          <p:nvPr>
+            <p:ph type="sldNum" sz="quarter" idx="18"/>
+          </p:nvPr>
+        </p:nvSpPr>
+        <p:spPr/>
+        <p:txBody>
+          <a:bodyPr/>
+          <a:lstStyle/>
+          <a:p>
+            <a:pPr rtl="0"/>
+            <a:fld id="{8699F50C-BE38-4BD0-BA84-9B090E1F2B9B}" type="slidenum">
+              <a:rPr lang="it-IT" noProof="0" smtClean="0"/>
+              <a:t>6</a:t>
+            </a:fld>
+            <a:endParaRPr lang="it-IT" noProof="0" dirty="0"/>
+          </a:p>
+        </p:txBody>
+      </p:sp>
+      <p:sp>
+        <p:nvSpPr>
+          <p:cNvPr id="4" name="Titolo 3">
+            <a:extLst>
+              <a:ext uri="{FF2B5EF4-FFF2-40B4-BE49-F238E27FC236}">
+                <a16:creationId xmlns:a16="http://schemas.microsoft.com/office/drawing/2014/main" id="{92DF5A20-4EC6-5AB3-4170-EB335F754713}"/>
+              </a:ext>
+            </a:extLst>
+          </p:cNvPr>
+          <p:cNvSpPr>
+            <a:spLocks noGrp="1"/>
+          </p:cNvSpPr>
+          <p:nvPr>
+            <p:ph type="title"/>
+          </p:nvPr>
+        </p:nvSpPr>
+        <p:spPr/>
+        <p:txBody>
+          <a:bodyPr/>
+          <a:lstStyle/>
+          <a:p>
+            <a:r>
+              <a:rPr lang="it-IT" dirty="0"/>
+              <a:t>Pump Model</a:t>
+            </a:r>
+          </a:p>
+        </p:txBody>
+      </p:sp>
+      <p:pic>
+        <p:nvPicPr>
+          <p:cNvPr id="11" name="Immagine 10">
+            <a:extLst>
+              <a:ext uri="{FF2B5EF4-FFF2-40B4-BE49-F238E27FC236}">
+                <a16:creationId xmlns:a16="http://schemas.microsoft.com/office/drawing/2014/main" id="{0904B10D-E4CE-9512-6C99-AD7A46BE5F4C}"/>
+              </a:ext>
+            </a:extLst>
+          </p:cNvPr>
+          <p:cNvPicPr>
+            <a:picLocks noChangeAspect="1"/>
+          </p:cNvPicPr>
+          <p:nvPr/>
+        </p:nvPicPr>
+        <p:blipFill>
+          <a:blip r:embed="rId3">
+            <a:extLst>
+              <a:ext uri="{28A0092B-C50C-407E-A947-70E740481C1C}">
+                <a14:useLocalDpi xmlns:a14="http://schemas.microsoft.com/office/drawing/2010/main" val="0"/>
+              </a:ext>
+            </a:extLst>
+          </a:blip>
+          <a:srcRect/>
+          <a:stretch>
+            <a:fillRect/>
+          </a:stretch>
+        </p:blipFill>
+        <p:spPr bwMode="auto">
+          <a:xfrm>
+            <a:off x="1204478" y="3231542"/>
+            <a:ext cx="8640562" cy="698643"/>
+          </a:xfrm>
+          <a:prstGeom prst="rect">
+            <a:avLst/>
+          </a:prstGeom>
+          <a:noFill/>
+          <a:ln>
+            <a:noFill/>
+          </a:ln>
+        </p:spPr>
+      </p:pic>
+      <p:sp>
+        <p:nvSpPr>
+          <p:cNvPr id="13" name="Segnaposto contenuto 12">
+            <a:extLst>
+              <a:ext uri="{FF2B5EF4-FFF2-40B4-BE49-F238E27FC236}">
+                <a16:creationId xmlns:a16="http://schemas.microsoft.com/office/drawing/2014/main" id="{73344CE4-73AB-B62D-FF2C-A6ACEA79D85E}"/>
+              </a:ext>
+            </a:extLst>
+          </p:cNvPr>
+          <p:cNvSpPr>
+            <a:spLocks noGrp="1"/>
+          </p:cNvSpPr>
+          <p:nvPr>
+            <p:ph idx="1"/>
+          </p:nvPr>
+        </p:nvSpPr>
+        <p:spPr>
+          <a:xfrm>
+            <a:off x="167640" y="1406384"/>
+            <a:ext cx="10835122" cy="500962"/>
+          </a:xfrm>
+        </p:spPr>
+        <p:txBody>
+          <a:bodyPr/>
+          <a:lstStyle/>
+          <a:p>
+            <a:pPr marL="685800">
+              <a:spcBef>
+                <a:spcPts val="500"/>
+              </a:spcBef>
+            </a:pPr>
+            <a:r>
+              <a:rPr lang="it-IT" sz="2000" dirty="0" err="1">
+                <a:solidFill>
+                  <a:srgbClr val="FF0000"/>
+                </a:solidFill>
+                <a:effectLst/>
+              </a:rPr>
+              <a:t>Linearization</a:t>
+            </a:r>
+            <a:endParaRPr lang="it-IT" sz="2000" dirty="0">
+              <a:solidFill>
+                <a:srgbClr val="FF0000"/>
+              </a:solidFill>
+              <a:effectLst/>
+            </a:endParaRPr>
+          </a:p>
+          <a:p>
+            <a:pPr marL="685800">
+              <a:spcBef>
+                <a:spcPts val="500"/>
+              </a:spcBef>
+            </a:pPr>
+            <a:endParaRPr lang="it-IT" dirty="0"/>
+          </a:p>
+          <a:p>
+            <a:pPr marL="685800">
+              <a:spcBef>
+                <a:spcPts val="500"/>
+              </a:spcBef>
+            </a:pPr>
+            <a:endParaRPr lang="it-IT" sz="2400" dirty="0">
+              <a:effectLst/>
+            </a:endParaRPr>
+          </a:p>
+          <a:p>
+            <a:endParaRPr lang="it-IT" sz="1800" dirty="0"/>
+          </a:p>
+        </p:txBody>
+      </p:sp>
+      <mc:AlternateContent xmlns:mc="http://schemas.openxmlformats.org/markup-compatibility/2006">
+        <mc:Choice xmlns:a14="http://schemas.microsoft.com/office/drawing/2010/main" Requires="a14">
+          <p:sp>
+            <p:nvSpPr>
+              <p:cNvPr id="16" name="CasellaDiTesto 15">
+                <a:extLst>
+                  <a:ext uri="{FF2B5EF4-FFF2-40B4-BE49-F238E27FC236}">
+                    <a16:creationId xmlns:a16="http://schemas.microsoft.com/office/drawing/2014/main" id="{88A00B41-3167-3454-0DED-5AC64951891A}"/>
+                  </a:ext>
+                </a:extLst>
+              </p:cNvPr>
+              <p:cNvSpPr txBox="1"/>
+              <p:nvPr/>
+            </p:nvSpPr>
+            <p:spPr>
+              <a:xfrm>
+                <a:off x="430488" y="4131213"/>
+                <a:ext cx="10835122" cy="1083758"/>
+              </a:xfrm>
+              <a:prstGeom prst="rect">
+                <a:avLst/>
+              </a:prstGeom>
+              <a:noFill/>
+            </p:spPr>
+            <p:txBody>
+              <a:bodyPr wrap="square" rtlCol="0">
+                <a:spAutoFit/>
+              </a:bodyPr>
+              <a:lstStyle/>
+              <a:p>
+                <a:pPr marL="457200" indent="0">
+                  <a:spcBef>
+                    <a:spcPts val="500"/>
+                  </a:spcBef>
+                  <a:buNone/>
+                </a:pPr>
+                <a:r>
+                  <a:rPr lang="it-IT" sz="2000" dirty="0"/>
+                  <a:t>«</a:t>
+                </a:r>
+                <a:r>
+                  <a:rPr lang="it-IT" sz="2000" dirty="0" err="1"/>
+                  <a:t>Albegraic</a:t>
+                </a:r>
+                <a:r>
+                  <a:rPr lang="it-IT" sz="2000" dirty="0"/>
+                  <a:t> model» </a:t>
+                </a:r>
+                <a:r>
+                  <a:rPr lang="it-IT" sz="2000" dirty="0">
+                    <a:sym typeface="Wingdings" panose="05000000000000000000" pitchFamily="2" charset="2"/>
+                  </a:rPr>
+                  <a:t> </a:t>
+                </a:r>
+                <a:r>
+                  <a:rPr lang="it-IT" sz="2000" dirty="0" err="1">
+                    <a:sym typeface="Wingdings" panose="05000000000000000000" pitchFamily="2" charset="2"/>
+                  </a:rPr>
+                  <a:t>Hydraulics</a:t>
+                </a:r>
+                <a:r>
+                  <a:rPr lang="it-IT" sz="2000" dirty="0">
+                    <a:sym typeface="Wingdings" panose="05000000000000000000" pitchFamily="2" charset="2"/>
+                  </a:rPr>
+                  <a:t> dynamics </a:t>
+                </a:r>
+                <a:r>
+                  <a:rPr lang="it-IT" sz="2000" dirty="0" err="1">
+                    <a:sym typeface="Wingdings" panose="05000000000000000000" pitchFamily="2" charset="2"/>
+                  </a:rPr>
+                  <a:t>much</a:t>
+                </a:r>
+                <a:r>
+                  <a:rPr lang="it-IT" sz="2000" dirty="0">
+                    <a:sym typeface="Wingdings" panose="05000000000000000000" pitchFamily="2" charset="2"/>
+                  </a:rPr>
+                  <a:t> </a:t>
+                </a:r>
+                <a:r>
+                  <a:rPr lang="it-IT" sz="2000" dirty="0" err="1">
+                    <a:sym typeface="Wingdings" panose="05000000000000000000" pitchFamily="2" charset="2"/>
+                  </a:rPr>
+                  <a:t>faster</a:t>
+                </a:r>
+                <a:r>
+                  <a:rPr lang="it-IT" sz="2000" dirty="0">
+                    <a:sym typeface="Wingdings" panose="05000000000000000000" pitchFamily="2" charset="2"/>
+                  </a:rPr>
+                  <a:t> </a:t>
+                </a:r>
+                <a:r>
+                  <a:rPr lang="it-IT" sz="2000" dirty="0" err="1">
+                    <a:sym typeface="Wingdings" panose="05000000000000000000" pitchFamily="2" charset="2"/>
+                  </a:rPr>
+                  <a:t>than</a:t>
+                </a:r>
+                <a:r>
+                  <a:rPr lang="it-IT" sz="2000" dirty="0">
+                    <a:sym typeface="Wingdings" panose="05000000000000000000" pitchFamily="2" charset="2"/>
+                  </a:rPr>
+                  <a:t> temperature, can be </a:t>
+                </a:r>
+                <a:r>
+                  <a:rPr lang="it-IT" sz="2000" dirty="0" err="1">
+                    <a:sym typeface="Wingdings" panose="05000000000000000000" pitchFamily="2" charset="2"/>
+                  </a:rPr>
+                  <a:t>neglected</a:t>
+                </a:r>
+                <a:endParaRPr lang="it-IT" sz="2000" dirty="0">
+                  <a:sym typeface="Wingdings" panose="05000000000000000000" pitchFamily="2" charset="2"/>
+                </a:endParaRPr>
+              </a:p>
+              <a:p>
+                <a:pPr marL="457200" indent="0">
+                  <a:spcBef>
+                    <a:spcPts val="500"/>
+                  </a:spcBef>
+                  <a:buNone/>
+                </a:pPr>
+                <a:r>
+                  <a:rPr lang="it-IT" sz="2000" dirty="0">
+                    <a:effectLst/>
+                    <a:sym typeface="Wingdings" panose="05000000000000000000" pitchFamily="2" charset="2"/>
+                  </a:rPr>
+                  <a:t>(in reality: G</a:t>
+                </a:r>
+                <a14:m>
+                  <m:oMath xmlns:m="http://schemas.openxmlformats.org/officeDocument/2006/math">
+                    <m:d>
+                      <m:dPr>
+                        <m:ctrlPr>
+                          <a:rPr lang="it-IT" sz="1600" i="1" smtClean="0">
+                            <a:effectLst/>
+                            <a:latin typeface="Cambria Math" panose="02040503050406030204" pitchFamily="18" charset="0"/>
+                          </a:rPr>
+                        </m:ctrlPr>
+                      </m:dPr>
+                      <m:e>
+                        <m:r>
+                          <a:rPr lang="en-GB" sz="2000" i="1">
+                            <a:effectLst/>
+                            <a:latin typeface="Cambria Math" panose="02040503050406030204" pitchFamily="18" charset="0"/>
+                            <a:ea typeface="Calibri" panose="020F0502020204030204" pitchFamily="34" charset="0"/>
+                            <a:cs typeface="Times New Roman" panose="02020603050405020304" pitchFamily="18" charset="0"/>
+                          </a:rPr>
+                          <m:t>𝑠</m:t>
+                        </m:r>
+                      </m:e>
+                    </m:d>
+                    <m:r>
+                      <a:rPr lang="en-GB" sz="2000" i="1">
+                        <a:effectLst/>
+                        <a:latin typeface="Cambria Math" panose="02040503050406030204" pitchFamily="18" charset="0"/>
+                        <a:ea typeface="Calibri" panose="020F0502020204030204" pitchFamily="34" charset="0"/>
+                        <a:cs typeface="Times New Roman" panose="02020603050405020304" pitchFamily="18" charset="0"/>
+                      </a:rPr>
+                      <m:t>= </m:t>
+                    </m:r>
+                    <m:f>
+                      <m:fPr>
+                        <m:ctrlPr>
+                          <a:rPr lang="it-IT" sz="1600" i="1">
+                            <a:effectLst/>
+                            <a:latin typeface="Cambria Math" panose="02040503050406030204" pitchFamily="18" charset="0"/>
+                          </a:rPr>
+                        </m:ctrlPr>
+                      </m:fPr>
+                      <m:num>
+                        <m:r>
+                          <a:rPr lang="en-GB" sz="2000" i="1">
+                            <a:effectLst/>
+                            <a:latin typeface="Cambria Math" panose="02040503050406030204" pitchFamily="18" charset="0"/>
+                            <a:ea typeface="Calibri" panose="020F0502020204030204" pitchFamily="34" charset="0"/>
+                            <a:cs typeface="Times New Roman" panose="02020603050405020304" pitchFamily="18" charset="0"/>
+                          </a:rPr>
+                          <m:t>µ</m:t>
+                        </m:r>
+                      </m:num>
+                      <m:den>
+                        <m:r>
+                          <a:rPr lang="en-GB" sz="2000" i="1">
+                            <a:effectLst/>
+                            <a:latin typeface="Cambria Math" panose="02040503050406030204" pitchFamily="18" charset="0"/>
+                            <a:ea typeface="Calibri" panose="020F0502020204030204" pitchFamily="34" charset="0"/>
+                            <a:cs typeface="Times New Roman" panose="02020603050405020304" pitchFamily="18" charset="0"/>
+                          </a:rPr>
+                          <m:t>1+</m:t>
+                        </m:r>
+                        <m:r>
+                          <a:rPr lang="en-GB" sz="2000" i="1">
+                            <a:effectLst/>
+                            <a:latin typeface="Cambria Math" panose="02040503050406030204" pitchFamily="18" charset="0"/>
+                            <a:ea typeface="Calibri" panose="020F0502020204030204" pitchFamily="34" charset="0"/>
+                            <a:cs typeface="Times New Roman" panose="02020603050405020304" pitchFamily="18" charset="0"/>
+                          </a:rPr>
+                          <m:t>𝑠</m:t>
+                        </m:r>
+                        <m:r>
+                          <a:rPr lang="en-GB" sz="2000" i="1">
+                            <a:effectLst/>
+                            <a:latin typeface="Cambria Math" panose="02040503050406030204" pitchFamily="18" charset="0"/>
+                            <a:ea typeface="Calibri" panose="020F0502020204030204" pitchFamily="34" charset="0"/>
+                            <a:cs typeface="Times New Roman" panose="02020603050405020304" pitchFamily="18" charset="0"/>
+                          </a:rPr>
+                          <m:t>𝜏</m:t>
+                        </m:r>
+                      </m:den>
+                    </m:f>
+                  </m:oMath>
+                </a14:m>
+                <a:r>
+                  <a:rPr lang="en-GB" sz="2000" dirty="0">
+                    <a:effectLst/>
+                    <a:latin typeface="Calibri" panose="020F0502020204030204" pitchFamily="34" charset="0"/>
+                    <a:ea typeface="Times New Roman" panose="02020603050405020304" pitchFamily="18" charset="0"/>
+                    <a:cs typeface="Times New Roman" panose="02020603050405020304" pitchFamily="18" charset="0"/>
+                  </a:rPr>
+                  <a:t> with </a:t>
+                </a:r>
+                <a:r>
+                  <a:rPr lang="en-GB" sz="2000" dirty="0">
+                    <a:effectLst/>
+                    <a:latin typeface="Calibri" panose="020F0502020204030204" pitchFamily="34" charset="0"/>
+                    <a:ea typeface="Times New Roman" panose="02020603050405020304" pitchFamily="18" charset="0"/>
+                  </a:rPr>
+                  <a:t>τ</a:t>
+                </a:r>
+                <a:r>
+                  <a:rPr lang="en-GB" sz="2000" dirty="0">
+                    <a:effectLst/>
+                    <a:latin typeface="Calibri" panose="020F0502020204030204" pitchFamily="34" charset="0"/>
+                    <a:ea typeface="Times New Roman" panose="02020603050405020304" pitchFamily="18" charset="0"/>
+                    <a:cs typeface="Times New Roman" panose="02020603050405020304" pitchFamily="18" charset="0"/>
+                  </a:rPr>
+                  <a:t>  </a:t>
+                </a:r>
+                <a:r>
+                  <a:rPr lang="en-GB" sz="2000" u="sng" dirty="0">
+                    <a:effectLst/>
+                    <a:latin typeface="Calibri" panose="020F0502020204030204" pitchFamily="34" charset="0"/>
+                    <a:ea typeface="Times New Roman" panose="02020603050405020304" pitchFamily="18" charset="0"/>
+                    <a:cs typeface="Times New Roman" panose="02020603050405020304" pitchFamily="18" charset="0"/>
+                  </a:rPr>
+                  <a:t>very small</a:t>
+                </a:r>
+                <a:r>
+                  <a:rPr lang="en-GB" sz="2000" dirty="0">
+                    <a:effectLst/>
+                    <a:latin typeface="Calibri" panose="020F0502020204030204" pitchFamily="34" charset="0"/>
+                    <a:ea typeface="Times New Roman" panose="02020603050405020304" pitchFamily="18" charset="0"/>
+                    <a:cs typeface="Times New Roman" panose="02020603050405020304" pitchFamily="18" charset="0"/>
+                  </a:rPr>
+                  <a:t>) </a:t>
+                </a:r>
+                <a:endParaRPr lang="it-IT" sz="2000" dirty="0">
+                  <a:effectLst/>
+                </a:endParaRPr>
+              </a:p>
+              <a:p>
+                <a:endParaRPr lang="it-IT" dirty="0"/>
+              </a:p>
+            </p:txBody>
+          </p:sp>
+        </mc:Choice>
+        <mc:Fallback>
+          <p:sp>
+            <p:nvSpPr>
+              <p:cNvPr id="16" name="CasellaDiTesto 15">
+                <a:extLst>
+                  <a:ext uri="{FF2B5EF4-FFF2-40B4-BE49-F238E27FC236}">
+                    <a16:creationId xmlns:a16="http://schemas.microsoft.com/office/drawing/2014/main" id="{88A00B41-3167-3454-0DED-5AC64951891A}"/>
+                  </a:ext>
+                </a:extLst>
+              </p:cNvPr>
+              <p:cNvSpPr txBox="1">
+                <a:spLocks noRot="1" noChangeAspect="1" noMove="1" noResize="1" noEditPoints="1" noAdjustHandles="1" noChangeArrowheads="1" noChangeShapeType="1" noTextEdit="1"/>
+              </p:cNvSpPr>
+              <p:nvPr/>
+            </p:nvSpPr>
+            <p:spPr>
+              <a:xfrm>
+                <a:off x="430488" y="4131213"/>
+                <a:ext cx="10835122" cy="1083758"/>
+              </a:xfrm>
+              <a:prstGeom prst="rect">
+                <a:avLst/>
+              </a:prstGeom>
+              <a:blipFill>
+                <a:blip r:embed="rId4"/>
+                <a:stretch>
+                  <a:fillRect t="-3955"/>
+                </a:stretch>
+              </a:blipFill>
+            </p:spPr>
+            <p:txBody>
+              <a:bodyPr/>
+              <a:lstStyle/>
+              <a:p>
+                <a:r>
+                  <a:rPr lang="it-IT">
+                    <a:noFill/>
+                  </a:rPr>
+                  <a:t> </a:t>
+                </a:r>
+              </a:p>
+            </p:txBody>
+          </p:sp>
+        </mc:Fallback>
+      </mc:AlternateContent>
+      <p:pic>
+        <p:nvPicPr>
+          <p:cNvPr id="10" name="Immagine 9">
+            <a:extLst>
+              <a:ext uri="{FF2B5EF4-FFF2-40B4-BE49-F238E27FC236}">
+                <a16:creationId xmlns:a16="http://schemas.microsoft.com/office/drawing/2014/main" id="{3A34440B-6F2A-8AE2-9010-59768A32B5BB}"/>
+              </a:ext>
+            </a:extLst>
+          </p:cNvPr>
+          <p:cNvPicPr>
+            <a:picLocks noChangeAspect="1"/>
+          </p:cNvPicPr>
+          <p:nvPr/>
+        </p:nvPicPr>
+        <p:blipFill>
+          <a:blip r:embed="rId5">
+            <a:extLst>
+              <a:ext uri="{28A0092B-C50C-407E-A947-70E740481C1C}">
+                <a14:useLocalDpi xmlns:a14="http://schemas.microsoft.com/office/drawing/2010/main" val="0"/>
+              </a:ext>
+            </a:extLst>
+          </a:blip>
+          <a:srcRect/>
+          <a:stretch>
+            <a:fillRect/>
+          </a:stretch>
+        </p:blipFill>
+        <p:spPr bwMode="auto">
+          <a:xfrm>
+            <a:off x="1737879" y="2164532"/>
+            <a:ext cx="6583162" cy="922011"/>
           </a:xfrm>
           <a:prstGeom prst="rect">
             <a:avLst/>
@@ -21627,10 +22415,10 @@
         <mc:Choice xmlns:a14="http://schemas.microsoft.com/office/drawing/2010/main" Requires="a14">
           <p:sp>
             <p:nvSpPr>
-              <p:cNvPr id="9" name="CasellaDiTesto 8">
+              <p:cNvPr id="17" name="CasellaDiTesto 16">
                 <a:extLst>
                   <a:ext uri="{FF2B5EF4-FFF2-40B4-BE49-F238E27FC236}">
-                    <a16:creationId xmlns:a16="http://schemas.microsoft.com/office/drawing/2014/main" id="{0DA46477-79A8-E186-B329-32931B068886}"/>
+                    <a16:creationId xmlns:a16="http://schemas.microsoft.com/office/drawing/2014/main" id="{1735B867-C850-84E4-FEA2-F073FF3265C5}"/>
                   </a:ext>
                 </a:extLst>
               </p:cNvPr>
@@ -21639,7 +22427,7 @@
             </p:nvSpPr>
             <p:spPr>
               <a:xfrm>
-                <a:off x="3098370" y="5158137"/>
+                <a:off x="2090463" y="5214971"/>
                 <a:ext cx="8255430" cy="1198213"/>
               </a:xfrm>
               <a:prstGeom prst="rect">
@@ -21976,10 +22764,10 @@
         <mc:Fallback>
           <p:sp>
             <p:nvSpPr>
-              <p:cNvPr id="9" name="CasellaDiTesto 8">
+              <p:cNvPr id="17" name="CasellaDiTesto 16">
                 <a:extLst>
                   <a:ext uri="{FF2B5EF4-FFF2-40B4-BE49-F238E27FC236}">
-                    <a16:creationId xmlns:a16="http://schemas.microsoft.com/office/drawing/2014/main" id="{0DA46477-79A8-E186-B329-32931B068886}"/>
+                    <a16:creationId xmlns:a16="http://schemas.microsoft.com/office/drawing/2014/main" id="{1735B867-C850-84E4-FEA2-F073FF3265C5}"/>
                   </a:ext>
                 </a:extLst>
               </p:cNvPr>
@@ -21990,16 +22778,16 @@
             </p:nvSpPr>
             <p:spPr>
               <a:xfrm>
-                <a:off x="3098370" y="5158137"/>
+                <a:off x="2090463" y="5214971"/>
                 <a:ext cx="8255430" cy="1198213"/>
               </a:xfrm>
               <a:prstGeom prst="rect">
                 <a:avLst/>
               </a:prstGeom>
               <a:blipFill>
-                <a:blip r:embed="rId5"/>
+                <a:blip r:embed="rId6"/>
                 <a:stretch>
-                  <a:fillRect l="-738" r="-148" b="-8122"/>
+                  <a:fillRect l="-812" r="-148" b="-8122"/>
                 </a:stretch>
               </a:blipFill>
             </p:spPr>
@@ -22021,209 +22809,7 @@
     </p:spTree>
     <p:extLst>
       <p:ext uri="{BB962C8B-B14F-4D97-AF65-F5344CB8AC3E}">
-        <p14:creationId xmlns:p14="http://schemas.microsoft.com/office/powerpoint/2010/main" val="2146184994"/>
-      </p:ext>
-    </p:extLst>
-  </p:cSld>
-  <p:clrMapOvr>
-    <a:masterClrMapping/>
-  </p:clrMapOvr>
-  <mc:AlternateContent xmlns:mc="http://schemas.openxmlformats.org/markup-compatibility/2006" xmlns:p14="http://schemas.microsoft.com/office/powerpoint/2010/main">
-    <mc:Choice Requires="p14">
-      <p:transition spd="med" p14:dur="700">
-        <p:fade/>
-      </p:transition>
-    </mc:Choice>
-    <mc:Fallback xmlns="">
-      <p:transition spd="med">
-        <p:fade/>
-      </p:transition>
-    </mc:Fallback>
-  </mc:AlternateContent>
-</p:sld>
-</file>
-
-<file path=ppt/slides/slide6.xml><?xml version="1.0" encoding="utf-8"?>
-<p:sld xmlns:a="http://schemas.openxmlformats.org/drawingml/2006/main" xmlns:r="http://schemas.openxmlformats.org/officeDocument/2006/relationships" xmlns:p="http://schemas.openxmlformats.org/presentationml/2006/main">
-  <p:cSld>
-    <p:spTree>
-      <p:nvGrpSpPr>
-        <p:cNvPr id="1" name=""/>
-        <p:cNvGrpSpPr/>
-        <p:nvPr/>
-      </p:nvGrpSpPr>
-      <p:grpSpPr>
-        <a:xfrm>
-          <a:off x="0" y="0"/>
-          <a:ext cx="0" cy="0"/>
-          <a:chOff x="0" y="0"/>
-          <a:chExt cx="0" cy="0"/>
-        </a:xfrm>
-      </p:grpSpPr>
-      <p:pic>
-        <p:nvPicPr>
-          <p:cNvPr id="13" name="Immagine 12">
-            <a:extLst>
-              <a:ext uri="{FF2B5EF4-FFF2-40B4-BE49-F238E27FC236}">
-                <a16:creationId xmlns:a16="http://schemas.microsoft.com/office/drawing/2014/main" id="{F0DA40D6-1F83-F71C-170C-2CBFFBAB5692}"/>
-              </a:ext>
-            </a:extLst>
-          </p:cNvPr>
-          <p:cNvPicPr>
-            <a:picLocks noChangeAspect="1"/>
-          </p:cNvPicPr>
-          <p:nvPr/>
-        </p:nvPicPr>
-        <p:blipFill>
-          <a:blip r:embed="rId3"/>
-          <a:stretch>
-            <a:fillRect/>
-          </a:stretch>
-        </p:blipFill>
-        <p:spPr>
-          <a:xfrm>
-            <a:off x="338530" y="1184378"/>
-            <a:ext cx="11741823" cy="4992586"/>
-          </a:xfrm>
-          <a:prstGeom prst="rect">
-            <a:avLst/>
-          </a:prstGeom>
-        </p:spPr>
-      </p:pic>
-      <p:sp>
-        <p:nvSpPr>
-          <p:cNvPr id="2" name="Segnaposto piè di pagina 1">
-            <a:extLst>
-              <a:ext uri="{FF2B5EF4-FFF2-40B4-BE49-F238E27FC236}">
-                <a16:creationId xmlns:a16="http://schemas.microsoft.com/office/drawing/2014/main" id="{7ECF0201-274F-CB13-84A4-EC01CA3B47A1}"/>
-              </a:ext>
-            </a:extLst>
-          </p:cNvPr>
-          <p:cNvSpPr>
-            <a:spLocks noGrp="1"/>
-          </p:cNvSpPr>
-          <p:nvPr>
-            <p:ph type="ftr" sz="quarter" idx="17"/>
-          </p:nvPr>
-        </p:nvSpPr>
-        <p:spPr/>
-        <p:txBody>
-          <a:bodyPr/>
-          <a:lstStyle/>
-          <a:p>
-            <a:pPr rtl="0"/>
-            <a:r>
-              <a:rPr lang="it-IT" noProof="0"/>
-              <a:t>Aggiungere un piè di pagina</a:t>
-            </a:r>
-            <a:endParaRPr lang="it-IT" noProof="0" dirty="0"/>
-          </a:p>
-        </p:txBody>
-      </p:sp>
-      <p:sp>
-        <p:nvSpPr>
-          <p:cNvPr id="3" name="Segnaposto numero diapositiva 2">
-            <a:extLst>
-              <a:ext uri="{FF2B5EF4-FFF2-40B4-BE49-F238E27FC236}">
-                <a16:creationId xmlns:a16="http://schemas.microsoft.com/office/drawing/2014/main" id="{72060108-C654-5DE3-9502-9556DDB2347B}"/>
-              </a:ext>
-            </a:extLst>
-          </p:cNvPr>
-          <p:cNvSpPr>
-            <a:spLocks noGrp="1"/>
-          </p:cNvSpPr>
-          <p:nvPr>
-            <p:ph type="sldNum" sz="quarter" idx="18"/>
-          </p:nvPr>
-        </p:nvSpPr>
-        <p:spPr/>
-        <p:txBody>
-          <a:bodyPr/>
-          <a:lstStyle/>
-          <a:p>
-            <a:pPr rtl="0"/>
-            <a:fld id="{8699F50C-BE38-4BD0-BA84-9B090E1F2B9B}" type="slidenum">
-              <a:rPr lang="it-IT" noProof="0" smtClean="0"/>
-              <a:t>6</a:t>
-            </a:fld>
-            <a:endParaRPr lang="it-IT" noProof="0" dirty="0"/>
-          </a:p>
-        </p:txBody>
-      </p:sp>
-      <p:sp>
-        <p:nvSpPr>
-          <p:cNvPr id="4" name="Titolo 3">
-            <a:extLst>
-              <a:ext uri="{FF2B5EF4-FFF2-40B4-BE49-F238E27FC236}">
-                <a16:creationId xmlns:a16="http://schemas.microsoft.com/office/drawing/2014/main" id="{70E95F49-3ED3-C270-628D-B167CE7C4893}"/>
-              </a:ext>
-            </a:extLst>
-          </p:cNvPr>
-          <p:cNvSpPr>
-            <a:spLocks noGrp="1"/>
-          </p:cNvSpPr>
-          <p:nvPr>
-            <p:ph type="title"/>
-          </p:nvPr>
-        </p:nvSpPr>
-        <p:spPr>
-          <a:xfrm>
-            <a:off x="518678" y="499135"/>
-            <a:ext cx="8333222" cy="864628"/>
-          </a:xfrm>
-        </p:spPr>
-        <p:txBody>
-          <a:bodyPr/>
-          <a:lstStyle/>
-          <a:p>
-            <a:r>
-              <a:rPr lang="it-IT" dirty="0"/>
-              <a:t>Pump Control</a:t>
-            </a:r>
-          </a:p>
-        </p:txBody>
-      </p:sp>
-      <p:sp>
-        <p:nvSpPr>
-          <p:cNvPr id="5" name="Segnaposto contenuto 4">
-            <a:extLst>
-              <a:ext uri="{FF2B5EF4-FFF2-40B4-BE49-F238E27FC236}">
-                <a16:creationId xmlns:a16="http://schemas.microsoft.com/office/drawing/2014/main" id="{1D1A0C0D-6910-81B4-8B75-83066C315415}"/>
-              </a:ext>
-            </a:extLst>
-          </p:cNvPr>
-          <p:cNvSpPr>
-            <a:spLocks noGrp="1"/>
-          </p:cNvSpPr>
-          <p:nvPr>
-            <p:ph idx="1"/>
-          </p:nvPr>
-        </p:nvSpPr>
-        <p:spPr>
-          <a:xfrm>
-            <a:off x="518678" y="1363764"/>
-            <a:ext cx="10835122" cy="4813200"/>
-          </a:xfrm>
-        </p:spPr>
-        <p:txBody>
-          <a:bodyPr/>
-          <a:lstStyle/>
-          <a:p>
-            <a:endParaRPr lang="it-IT" sz="2000" dirty="0">
-              <a:sym typeface="Wingdings" panose="05000000000000000000" pitchFamily="2" charset="2"/>
-            </a:endParaRPr>
-          </a:p>
-          <a:p>
-            <a:endParaRPr lang="it-IT" sz="2000" dirty="0">
-              <a:sym typeface="Wingdings" panose="05000000000000000000" pitchFamily="2" charset="2"/>
-            </a:endParaRPr>
-          </a:p>
-        </p:txBody>
-      </p:sp>
-    </p:spTree>
-    <p:extLst>
-      <p:ext uri="{BB962C8B-B14F-4D97-AF65-F5344CB8AC3E}">
-        <p14:creationId xmlns:p14="http://schemas.microsoft.com/office/powerpoint/2010/main" val="533265028"/>
+        <p14:creationId xmlns:p14="http://schemas.microsoft.com/office/powerpoint/2010/main" val="1529528071"/>
       </p:ext>
     </p:extLst>
   </p:cSld>
@@ -22262,12 +22848,42 @@
           <a:chExt cx="0" cy="0"/>
         </a:xfrm>
       </p:grpSpPr>
+      <p:pic>
+        <p:nvPicPr>
+          <p:cNvPr id="13" name="Immagine 12">
+            <a:extLst>
+              <a:ext uri="{FF2B5EF4-FFF2-40B4-BE49-F238E27FC236}">
+                <a16:creationId xmlns:a16="http://schemas.microsoft.com/office/drawing/2014/main" id="{F0DA40D6-1F83-F71C-170C-2CBFFBAB5692}"/>
+              </a:ext>
+            </a:extLst>
+          </p:cNvPr>
+          <p:cNvPicPr>
+            <a:picLocks noChangeAspect="1"/>
+          </p:cNvPicPr>
+          <p:nvPr/>
+        </p:nvPicPr>
+        <p:blipFill>
+          <a:blip r:embed="rId3"/>
+          <a:stretch>
+            <a:fillRect/>
+          </a:stretch>
+        </p:blipFill>
+        <p:spPr>
+          <a:xfrm>
+            <a:off x="338530" y="1184378"/>
+            <a:ext cx="11741823" cy="4992586"/>
+          </a:xfrm>
+          <a:prstGeom prst="rect">
+            <a:avLst/>
+          </a:prstGeom>
+        </p:spPr>
+      </p:pic>
       <p:sp>
         <p:nvSpPr>
-          <p:cNvPr id="2" name="Footer Placeholder 1">
-            <a:extLst>
-              <a:ext uri="{FF2B5EF4-FFF2-40B4-BE49-F238E27FC236}">
-                <a16:creationId xmlns:a16="http://schemas.microsoft.com/office/drawing/2014/main" id="{F80DE34E-72F6-EA85-47BE-E78FF0A21945}"/>
+          <p:cNvPr id="2" name="Segnaposto piè di pagina 1">
+            <a:extLst>
+              <a:ext uri="{FF2B5EF4-FFF2-40B4-BE49-F238E27FC236}">
+                <a16:creationId xmlns:a16="http://schemas.microsoft.com/office/drawing/2014/main" id="{7ECF0201-274F-CB13-84A4-EC01CA3B47A1}"/>
               </a:ext>
             </a:extLst>
           </p:cNvPr>
@@ -22294,10 +22910,10 @@
       </p:sp>
       <p:sp>
         <p:nvSpPr>
-          <p:cNvPr id="3" name="Slide Number Placeholder 2">
-            <a:extLst>
-              <a:ext uri="{FF2B5EF4-FFF2-40B4-BE49-F238E27FC236}">
-                <a16:creationId xmlns:a16="http://schemas.microsoft.com/office/drawing/2014/main" id="{2A9C04E3-4CF9-6773-20A4-B9D83ED8DF5F}"/>
+          <p:cNvPr id="3" name="Segnaposto numero diapositiva 2">
+            <a:extLst>
+              <a:ext uri="{FF2B5EF4-FFF2-40B4-BE49-F238E27FC236}">
+                <a16:creationId xmlns:a16="http://schemas.microsoft.com/office/drawing/2014/main" id="{72060108-C654-5DE3-9502-9556DDB2347B}"/>
               </a:ext>
             </a:extLst>
           </p:cNvPr>
@@ -22317,6 +22933,178 @@
             <a:fld id="{8699F50C-BE38-4BD0-BA84-9B090E1F2B9B}" type="slidenum">
               <a:rPr lang="it-IT" noProof="0" smtClean="0"/>
               <a:t>7</a:t>
+            </a:fld>
+            <a:endParaRPr lang="it-IT" noProof="0" dirty="0"/>
+          </a:p>
+        </p:txBody>
+      </p:sp>
+      <p:sp>
+        <p:nvSpPr>
+          <p:cNvPr id="4" name="Titolo 3">
+            <a:extLst>
+              <a:ext uri="{FF2B5EF4-FFF2-40B4-BE49-F238E27FC236}">
+                <a16:creationId xmlns:a16="http://schemas.microsoft.com/office/drawing/2014/main" id="{70E95F49-3ED3-C270-628D-B167CE7C4893}"/>
+              </a:ext>
+            </a:extLst>
+          </p:cNvPr>
+          <p:cNvSpPr>
+            <a:spLocks noGrp="1"/>
+          </p:cNvSpPr>
+          <p:nvPr>
+            <p:ph type="title"/>
+          </p:nvPr>
+        </p:nvSpPr>
+        <p:spPr>
+          <a:xfrm>
+            <a:off x="518678" y="499135"/>
+            <a:ext cx="8333222" cy="864628"/>
+          </a:xfrm>
+        </p:spPr>
+        <p:txBody>
+          <a:bodyPr/>
+          <a:lstStyle/>
+          <a:p>
+            <a:r>
+              <a:rPr lang="it-IT" dirty="0"/>
+              <a:t>Pump Control</a:t>
+            </a:r>
+          </a:p>
+        </p:txBody>
+      </p:sp>
+      <p:sp>
+        <p:nvSpPr>
+          <p:cNvPr id="5" name="Segnaposto contenuto 4">
+            <a:extLst>
+              <a:ext uri="{FF2B5EF4-FFF2-40B4-BE49-F238E27FC236}">
+                <a16:creationId xmlns:a16="http://schemas.microsoft.com/office/drawing/2014/main" id="{1D1A0C0D-6910-81B4-8B75-83066C315415}"/>
+              </a:ext>
+            </a:extLst>
+          </p:cNvPr>
+          <p:cNvSpPr>
+            <a:spLocks noGrp="1"/>
+          </p:cNvSpPr>
+          <p:nvPr>
+            <p:ph idx="1"/>
+          </p:nvPr>
+        </p:nvSpPr>
+        <p:spPr>
+          <a:xfrm>
+            <a:off x="518678" y="1363764"/>
+            <a:ext cx="10835122" cy="4813200"/>
+          </a:xfrm>
+        </p:spPr>
+        <p:txBody>
+          <a:bodyPr/>
+          <a:lstStyle/>
+          <a:p>
+            <a:endParaRPr lang="it-IT" sz="2000" dirty="0">
+              <a:sym typeface="Wingdings" panose="05000000000000000000" pitchFamily="2" charset="2"/>
+            </a:endParaRPr>
+          </a:p>
+          <a:p>
+            <a:endParaRPr lang="it-IT" sz="2000" dirty="0">
+              <a:sym typeface="Wingdings" panose="05000000000000000000" pitchFamily="2" charset="2"/>
+            </a:endParaRPr>
+          </a:p>
+        </p:txBody>
+      </p:sp>
+    </p:spTree>
+    <p:extLst>
+      <p:ext uri="{BB962C8B-B14F-4D97-AF65-F5344CB8AC3E}">
+        <p14:creationId xmlns:p14="http://schemas.microsoft.com/office/powerpoint/2010/main" val="533265028"/>
+      </p:ext>
+    </p:extLst>
+  </p:cSld>
+  <p:clrMapOvr>
+    <a:masterClrMapping/>
+  </p:clrMapOvr>
+  <mc:AlternateContent xmlns:mc="http://schemas.openxmlformats.org/markup-compatibility/2006" xmlns:p14="http://schemas.microsoft.com/office/powerpoint/2010/main">
+    <mc:Choice Requires="p14">
+      <p:transition spd="med" p14:dur="700">
+        <p:fade/>
+      </p:transition>
+    </mc:Choice>
+    <mc:Fallback xmlns="">
+      <p:transition spd="med">
+        <p:fade/>
+      </p:transition>
+    </mc:Fallback>
+  </mc:AlternateContent>
+</p:sld>
+</file>
+
+<file path=ppt/slides/slide8.xml><?xml version="1.0" encoding="utf-8"?>
+<p:sld xmlns:a="http://schemas.openxmlformats.org/drawingml/2006/main" xmlns:r="http://schemas.openxmlformats.org/officeDocument/2006/relationships" xmlns:p="http://schemas.openxmlformats.org/presentationml/2006/main">
+  <p:cSld>
+    <p:spTree>
+      <p:nvGrpSpPr>
+        <p:cNvPr id="1" name=""/>
+        <p:cNvGrpSpPr/>
+        <p:nvPr/>
+      </p:nvGrpSpPr>
+      <p:grpSpPr>
+        <a:xfrm>
+          <a:off x="0" y="0"/>
+          <a:ext cx="0" cy="0"/>
+          <a:chOff x="0" y="0"/>
+          <a:chExt cx="0" cy="0"/>
+        </a:xfrm>
+      </p:grpSpPr>
+      <p:sp>
+        <p:nvSpPr>
+          <p:cNvPr id="2" name="Footer Placeholder 1">
+            <a:extLst>
+              <a:ext uri="{FF2B5EF4-FFF2-40B4-BE49-F238E27FC236}">
+                <a16:creationId xmlns:a16="http://schemas.microsoft.com/office/drawing/2014/main" id="{F80DE34E-72F6-EA85-47BE-E78FF0A21945}"/>
+              </a:ext>
+            </a:extLst>
+          </p:cNvPr>
+          <p:cNvSpPr>
+            <a:spLocks noGrp="1"/>
+          </p:cNvSpPr>
+          <p:nvPr>
+            <p:ph type="ftr" sz="quarter" idx="17"/>
+          </p:nvPr>
+        </p:nvSpPr>
+        <p:spPr/>
+        <p:txBody>
+          <a:bodyPr/>
+          <a:lstStyle/>
+          <a:p>
+            <a:pPr rtl="0"/>
+            <a:r>
+              <a:rPr lang="it-IT" noProof="0"/>
+              <a:t>Aggiungere un piè di pagina</a:t>
+            </a:r>
+            <a:endParaRPr lang="it-IT" noProof="0" dirty="0"/>
+          </a:p>
+        </p:txBody>
+      </p:sp>
+      <p:sp>
+        <p:nvSpPr>
+          <p:cNvPr id="3" name="Slide Number Placeholder 2">
+            <a:extLst>
+              <a:ext uri="{FF2B5EF4-FFF2-40B4-BE49-F238E27FC236}">
+                <a16:creationId xmlns:a16="http://schemas.microsoft.com/office/drawing/2014/main" id="{2A9C04E3-4CF9-6773-20A4-B9D83ED8DF5F}"/>
+              </a:ext>
+            </a:extLst>
+          </p:cNvPr>
+          <p:cNvSpPr>
+            <a:spLocks noGrp="1"/>
+          </p:cNvSpPr>
+          <p:nvPr>
+            <p:ph type="sldNum" sz="quarter" idx="18"/>
+          </p:nvPr>
+        </p:nvSpPr>
+        <p:spPr/>
+        <p:txBody>
+          <a:bodyPr/>
+          <a:lstStyle/>
+          <a:p>
+            <a:pPr rtl="0"/>
+            <a:fld id="{8699F50C-BE38-4BD0-BA84-9B090E1F2B9B}" type="slidenum">
+              <a:rPr lang="it-IT" noProof="0" smtClean="0"/>
+              <a:t>8</a:t>
             </a:fld>
             <a:endParaRPr lang="it-IT" noProof="0" dirty="0"/>
           </a:p>
@@ -22539,7 +23327,7 @@
 </p:sld>
 </file>
 
-<file path=ppt/slides/slide8.xml><?xml version="1.0" encoding="utf-8"?>
+<file path=ppt/slides/slide9.xml><?xml version="1.0" encoding="utf-8"?>
 <p:sld xmlns:a="http://schemas.openxmlformats.org/drawingml/2006/main" xmlns:r="http://schemas.openxmlformats.org/officeDocument/2006/relationships" xmlns:p="http://schemas.openxmlformats.org/presentationml/2006/main">
   <p:cSld>
     <p:spTree>
@@ -22610,7 +23398,7 @@
             <a:fld id="{8699F50C-BE38-4BD0-BA84-9B090E1F2B9B}" type="slidenum">
               <a:rPr lang="it-IT" smtClean="0"/>
               <a:pPr rtl="0"/>
-              <a:t>8</a:t>
+              <a:t>9</a:t>
             </a:fld>
             <a:endParaRPr lang="it-IT" dirty="0"/>
           </a:p>
@@ -22883,427 +23671,6 @@
     <p:extLst>
       <p:ext uri="{BB962C8B-B14F-4D97-AF65-F5344CB8AC3E}">
         <p14:creationId xmlns:p14="http://schemas.microsoft.com/office/powerpoint/2010/main" val="1669235655"/>
-      </p:ext>
-    </p:extLst>
-  </p:cSld>
-  <p:clrMapOvr>
-    <a:masterClrMapping/>
-  </p:clrMapOvr>
-  <mc:AlternateContent xmlns:mc="http://schemas.openxmlformats.org/markup-compatibility/2006" xmlns:p14="http://schemas.microsoft.com/office/powerpoint/2010/main">
-    <mc:Choice Requires="p14">
-      <p:transition spd="med" p14:dur="700">
-        <p:fade/>
-      </p:transition>
-    </mc:Choice>
-    <mc:Fallback xmlns="">
-      <p:transition spd="med">
-        <p:fade/>
-      </p:transition>
-    </mc:Fallback>
-  </mc:AlternateContent>
-</p:sld>
-</file>
-
-<file path=ppt/slides/slide9.xml><?xml version="1.0" encoding="utf-8"?>
-<p:sld xmlns:a="http://schemas.openxmlformats.org/drawingml/2006/main" xmlns:r="http://schemas.openxmlformats.org/officeDocument/2006/relationships" xmlns:p="http://schemas.openxmlformats.org/presentationml/2006/main">
-  <p:cSld>
-    <p:spTree>
-      <p:nvGrpSpPr>
-        <p:cNvPr id="1" name=""/>
-        <p:cNvGrpSpPr/>
-        <p:nvPr/>
-      </p:nvGrpSpPr>
-      <p:grpSpPr>
-        <a:xfrm>
-          <a:off x="0" y="0"/>
-          <a:ext cx="0" cy="0"/>
-          <a:chOff x="0" y="0"/>
-          <a:chExt cx="0" cy="0"/>
-        </a:xfrm>
-      </p:grpSpPr>
-      <p:sp>
-        <p:nvSpPr>
-          <p:cNvPr id="3" name="Segnaposto piè di pagina 2">
-            <a:extLst>
-              <a:ext uri="{FF2B5EF4-FFF2-40B4-BE49-F238E27FC236}">
-                <a16:creationId xmlns:a16="http://schemas.microsoft.com/office/drawing/2014/main" id="{B04C11C9-3DF6-471E-87C0-4DCED41031D4}"/>
-              </a:ext>
-            </a:extLst>
-          </p:cNvPr>
-          <p:cNvSpPr>
-            <a:spLocks noGrp="1"/>
-          </p:cNvSpPr>
-          <p:nvPr>
-            <p:ph type="ftr" sz="quarter" idx="17"/>
-          </p:nvPr>
-        </p:nvSpPr>
-        <p:spPr>
-          <a:xfrm>
-            <a:off x="338530" y="6356350"/>
-            <a:ext cx="4114800" cy="365125"/>
-          </a:xfrm>
-        </p:spPr>
-        <p:txBody>
-          <a:bodyPr rtlCol="0" anchor="ctr">
-            <a:normAutofit/>
-          </a:bodyPr>
-          <a:lstStyle/>
-          <a:p>
-            <a:pPr rtl="0">
-              <a:spcAft>
-                <a:spcPts val="600"/>
-              </a:spcAft>
-            </a:pPr>
-            <a:r>
-              <a:rPr lang="it-IT"/>
-              <a:t>Aggiungere un piè di pagina</a:t>
-            </a:r>
-          </a:p>
-        </p:txBody>
-      </p:sp>
-      <p:sp>
-        <p:nvSpPr>
-          <p:cNvPr id="4" name="Segnaposto numero diapositiva 3">
-            <a:extLst>
-              <a:ext uri="{FF2B5EF4-FFF2-40B4-BE49-F238E27FC236}">
-                <a16:creationId xmlns:a16="http://schemas.microsoft.com/office/drawing/2014/main" id="{B2228214-87DB-4B3A-BD81-9A709A69BAAC}"/>
-              </a:ext>
-            </a:extLst>
-          </p:cNvPr>
-          <p:cNvSpPr>
-            <a:spLocks noGrp="1"/>
-          </p:cNvSpPr>
-          <p:nvPr>
-            <p:ph type="sldNum" sz="quarter" idx="18"/>
-          </p:nvPr>
-        </p:nvSpPr>
-        <p:spPr>
-          <a:xfrm>
-            <a:off x="11146971" y="6356350"/>
-            <a:ext cx="740227" cy="365125"/>
-          </a:xfrm>
-        </p:spPr>
-        <p:txBody>
-          <a:bodyPr rtlCol="0" anchor="ctr">
-            <a:normAutofit/>
-          </a:bodyPr>
-          <a:lstStyle/>
-          <a:p>
-            <a:pPr rtl="0">
-              <a:spcAft>
-                <a:spcPts val="600"/>
-              </a:spcAft>
-            </a:pPr>
-            <a:fld id="{8699F50C-BE38-4BD0-BA84-9B090E1F2B9B}" type="slidenum">
-              <a:rPr lang="it-IT" smtClean="0"/>
-              <a:pPr rtl="0">
-                <a:spcAft>
-                  <a:spcPts val="600"/>
-                </a:spcAft>
-              </a:pPr>
-              <a:t>9</a:t>
-            </a:fld>
-            <a:endParaRPr lang="it-IT"/>
-          </a:p>
-        </p:txBody>
-      </p:sp>
-      <p:pic>
-        <p:nvPicPr>
-          <p:cNvPr id="13" name="Content Placeholder 12" descr="Chart, line chart&#10;&#10;Description automatically generated">
-            <a:extLst>
-              <a:ext uri="{FF2B5EF4-FFF2-40B4-BE49-F238E27FC236}">
-                <a16:creationId xmlns:a16="http://schemas.microsoft.com/office/drawing/2014/main" id="{F087F167-91C9-CC7A-5C5C-282208F83EF7}"/>
-              </a:ext>
-            </a:extLst>
-          </p:cNvPr>
-          <p:cNvPicPr>
-            <a:picLocks noGrp="1" noChangeAspect="1"/>
-          </p:cNvPicPr>
-          <p:nvPr>
-            <p:ph idx="1"/>
-          </p:nvPr>
-        </p:nvPicPr>
-        <p:blipFill>
-          <a:blip r:embed="rId6"/>
-          <a:stretch>
-            <a:fillRect/>
-          </a:stretch>
-        </p:blipFill>
-        <p:spPr>
-          <a:xfrm>
-            <a:off x="1216120" y="1080655"/>
-            <a:ext cx="9759759" cy="5114781"/>
-          </a:xfrm>
-        </p:spPr>
-      </p:pic>
-      <p:sp>
-        <p:nvSpPr>
-          <p:cNvPr id="2" name="Left Brace 1">
-            <a:extLst>
-              <a:ext uri="{FF2B5EF4-FFF2-40B4-BE49-F238E27FC236}">
-                <a16:creationId xmlns:a16="http://schemas.microsoft.com/office/drawing/2014/main" id="{E63F16A6-032D-EF99-EC35-F94798032DE9}"/>
-              </a:ext>
-            </a:extLst>
-          </p:cNvPr>
-          <p:cNvSpPr/>
-          <p:nvPr/>
-        </p:nvSpPr>
-        <p:spPr>
-          <a:xfrm>
-            <a:off x="4194495" y="4823670"/>
-            <a:ext cx="75501" cy="662730"/>
-          </a:xfrm>
-          <a:prstGeom prst="leftBrace">
-            <a:avLst/>
-          </a:prstGeom>
-        </p:spPr>
-        <p:style>
-          <a:lnRef idx="1">
-            <a:schemeClr val="accent1"/>
-          </a:lnRef>
-          <a:fillRef idx="0">
-            <a:schemeClr val="accent1"/>
-          </a:fillRef>
-          <a:effectRef idx="0">
-            <a:schemeClr val="accent1"/>
-          </a:effectRef>
-          <a:fontRef idx="minor">
-            <a:schemeClr val="tx1"/>
-          </a:fontRef>
-        </p:style>
-        <p:txBody>
-          <a:bodyPr rtlCol="0" anchor="ctr"/>
-          <a:lstStyle/>
-          <a:p>
-            <a:pPr algn="ctr"/>
-            <a:endParaRPr lang="en-GB"/>
-          </a:p>
-        </p:txBody>
-      </p:sp>
-      <p:sp>
-        <p:nvSpPr>
-          <p:cNvPr id="5" name="TextBox 4">
-            <a:extLst>
-              <a:ext uri="{FF2B5EF4-FFF2-40B4-BE49-F238E27FC236}">
-                <a16:creationId xmlns:a16="http://schemas.microsoft.com/office/drawing/2014/main" id="{84993BF0-C628-77B5-3004-5AB4A214A1A0}"/>
-              </a:ext>
-            </a:extLst>
-          </p:cNvPr>
-          <p:cNvSpPr txBox="1"/>
-          <p:nvPr/>
-        </p:nvSpPr>
-        <p:spPr>
-          <a:xfrm>
-            <a:off x="2877424" y="4764947"/>
-            <a:ext cx="1115736" cy="511728"/>
-          </a:xfrm>
-          <a:prstGeom prst="rect">
-            <a:avLst/>
-          </a:prstGeom>
-          <a:noFill/>
-        </p:spPr>
-        <p:txBody>
-          <a:bodyPr wrap="square" rtlCol="0">
-            <a:spAutoFit/>
-          </a:bodyPr>
-          <a:lstStyle/>
-          <a:p>
-            <a:endParaRPr lang="en-GB" dirty="0"/>
-          </a:p>
-        </p:txBody>
-      </p:sp>
-      <p:pic>
-        <p:nvPicPr>
-          <p:cNvPr id="11" name="Picture 10" descr="\documentclass{article}&#10;\usepackage{amsmath}&#10;\pagestyle{empty}&#10;\begin{document}&#10;&#10;\begin{equation}&#10;    \Delta T = 0.489 \, ^{\circ} C&#10;\end{equation}&#10;&#10;&#10;\end{document}" title="IguanaTex Bitmap Display">
-            <a:extLst>
-              <a:ext uri="{FF2B5EF4-FFF2-40B4-BE49-F238E27FC236}">
-                <a16:creationId xmlns:a16="http://schemas.microsoft.com/office/drawing/2014/main" id="{4D2B8BE7-8D76-0282-7F09-5F7A7FE86E44}"/>
-              </a:ext>
-            </a:extLst>
-          </p:cNvPr>
-          <p:cNvPicPr>
-            <a:picLocks noChangeAspect="1"/>
-          </p:cNvPicPr>
-          <p:nvPr>
-            <p:custDataLst>
-              <p:tags r:id="rId1"/>
-            </p:custDataLst>
-          </p:nvPr>
-        </p:nvPicPr>
-        <p:blipFill rotWithShape="1">
-          <a:blip r:embed="rId7"/>
-          <a:srcRect t="-1" r="66805" b="2200"/>
-          <a:stretch/>
-        </p:blipFill>
-        <p:spPr>
-          <a:xfrm>
-            <a:off x="2279941" y="5030596"/>
-            <a:ext cx="1713219" cy="248878"/>
-          </a:xfrm>
-          <a:prstGeom prst="rect">
-            <a:avLst/>
-          </a:prstGeom>
-        </p:spPr>
-      </p:pic>
-      <p:sp>
-        <p:nvSpPr>
-          <p:cNvPr id="12" name="Left Brace 11">
-            <a:extLst>
-              <a:ext uri="{FF2B5EF4-FFF2-40B4-BE49-F238E27FC236}">
-                <a16:creationId xmlns:a16="http://schemas.microsoft.com/office/drawing/2014/main" id="{A9D7F22D-D07F-63A5-4892-9B9B1432DEC6}"/>
-              </a:ext>
-            </a:extLst>
-          </p:cNvPr>
-          <p:cNvSpPr/>
-          <p:nvPr/>
-        </p:nvSpPr>
-        <p:spPr>
-          <a:xfrm rot="5400000">
-            <a:off x="4535946" y="4442140"/>
-            <a:ext cx="73976" cy="384029"/>
-          </a:xfrm>
-          <a:prstGeom prst="leftBrace">
-            <a:avLst/>
-          </a:prstGeom>
-        </p:spPr>
-        <p:style>
-          <a:lnRef idx="1">
-            <a:schemeClr val="accent1"/>
-          </a:lnRef>
-          <a:fillRef idx="0">
-            <a:schemeClr val="accent1"/>
-          </a:fillRef>
-          <a:effectRef idx="0">
-            <a:schemeClr val="accent1"/>
-          </a:effectRef>
-          <a:fontRef idx="minor">
-            <a:schemeClr val="tx1"/>
-          </a:fontRef>
-        </p:style>
-        <p:txBody>
-          <a:bodyPr rtlCol="0" anchor="ctr"/>
-          <a:lstStyle/>
-          <a:p>
-            <a:pPr algn="ctr"/>
-            <a:endParaRPr lang="en-GB"/>
-          </a:p>
-        </p:txBody>
-      </p:sp>
-      <p:pic>
-        <p:nvPicPr>
-          <p:cNvPr id="15" name="Picture 14" descr="\documentclass{article}&#10;\usepackage{amsmath}&#10;\pagestyle{empty}&#10;\begin{document}&#10;&#10;\begin{equation}&#10;    \Delta t \approx 39 \, min&#10;\end{equation}&#10;&#10;&#10;\end{document}" title="IguanaTex Bitmap Display">
-            <a:extLst>
-              <a:ext uri="{FF2B5EF4-FFF2-40B4-BE49-F238E27FC236}">
-                <a16:creationId xmlns:a16="http://schemas.microsoft.com/office/drawing/2014/main" id="{9A364F44-F6E4-6B92-D671-1483A52935FE}"/>
-              </a:ext>
-            </a:extLst>
-          </p:cNvPr>
-          <p:cNvPicPr>
-            <a:picLocks noChangeAspect="1"/>
-          </p:cNvPicPr>
-          <p:nvPr>
-            <p:custDataLst>
-              <p:tags r:id="rId2"/>
-            </p:custDataLst>
-          </p:nvPr>
-        </p:nvPicPr>
-        <p:blipFill rotWithShape="1">
-          <a:blip r:embed="rId8"/>
-          <a:srcRect t="-1" r="71116" b="2200"/>
-          <a:stretch/>
-        </p:blipFill>
-        <p:spPr>
-          <a:xfrm>
-            <a:off x="3922646" y="4323052"/>
-            <a:ext cx="1320474" cy="226400"/>
-          </a:xfrm>
-          <a:prstGeom prst="rect">
-            <a:avLst/>
-          </a:prstGeom>
-        </p:spPr>
-      </p:pic>
-      <p:pic>
-        <p:nvPicPr>
-          <p:cNvPr id="19" name="Picture 18" descr="\documentclass{article}&#10;\usepackage{amsmath}&#10;\pagestyle{empty}&#10;\begin{document}&#10;&#10;\begin{equation*}&#10;    \Delta T = 0.306 \, ^{\circ} C \\&#10;\end{equation*}&#10;&#10;&#10;\end{document}" title="IguanaTex Bitmap Display">
-            <a:extLst>
-              <a:ext uri="{FF2B5EF4-FFF2-40B4-BE49-F238E27FC236}">
-                <a16:creationId xmlns:a16="http://schemas.microsoft.com/office/drawing/2014/main" id="{A2287FC6-E867-60C5-9978-A549B9BD2D4B}"/>
-              </a:ext>
-            </a:extLst>
-          </p:cNvPr>
-          <p:cNvPicPr>
-            <a:picLocks noChangeAspect="1"/>
-          </p:cNvPicPr>
-          <p:nvPr>
-            <p:custDataLst>
-              <p:tags r:id="rId3"/>
-            </p:custDataLst>
-          </p:nvPr>
-        </p:nvPicPr>
-        <p:blipFill>
-          <a:blip r:embed="rId9"/>
-          <a:stretch>
-            <a:fillRect/>
-          </a:stretch>
-        </p:blipFill>
-        <p:spPr>
-          <a:xfrm>
-            <a:off x="9210391" y="4440630"/>
-            <a:ext cx="1648762" cy="193524"/>
-          </a:xfrm>
-          <a:prstGeom prst="rect">
-            <a:avLst/>
-          </a:prstGeom>
-        </p:spPr>
-      </p:pic>
-      <p:sp>
-        <p:nvSpPr>
-          <p:cNvPr id="20" name="Right Brace 19">
-            <a:extLst>
-              <a:ext uri="{FF2B5EF4-FFF2-40B4-BE49-F238E27FC236}">
-                <a16:creationId xmlns:a16="http://schemas.microsoft.com/office/drawing/2014/main" id="{7450EAA7-E140-8B0C-D5FF-DA4EBEAE5A1A}"/>
-              </a:ext>
-            </a:extLst>
-          </p:cNvPr>
-          <p:cNvSpPr/>
-          <p:nvPr/>
-        </p:nvSpPr>
-        <p:spPr>
-          <a:xfrm>
-            <a:off x="9018165" y="4349417"/>
-            <a:ext cx="75501" cy="441895"/>
-          </a:xfrm>
-          <a:prstGeom prst="rightBrace">
-            <a:avLst/>
-          </a:prstGeom>
-        </p:spPr>
-        <p:style>
-          <a:lnRef idx="1">
-            <a:schemeClr val="accent1"/>
-          </a:lnRef>
-          <a:fillRef idx="0">
-            <a:schemeClr val="accent1"/>
-          </a:fillRef>
-          <a:effectRef idx="0">
-            <a:schemeClr val="accent1"/>
-          </a:effectRef>
-          <a:fontRef idx="minor">
-            <a:schemeClr val="tx1"/>
-          </a:fontRef>
-        </p:style>
-        <p:txBody>
-          <a:bodyPr rtlCol="0" anchor="ctr"/>
-          <a:lstStyle/>
-          <a:p>
-            <a:pPr algn="ctr"/>
-            <a:endParaRPr lang="en-GB"/>
-          </a:p>
-        </p:txBody>
-      </p:sp>
-    </p:spTree>
-    <p:extLst>
-      <p:ext uri="{BB962C8B-B14F-4D97-AF65-F5344CB8AC3E}">
-        <p14:creationId xmlns:p14="http://schemas.microsoft.com/office/powerpoint/2010/main" val="311471150"/>
       </p:ext>
     </p:extLst>
   </p:cSld>
@@ -24639,15 +25006,6 @@
 </file>
 
 <file path=customXml/item1.xml><?xml version="1.0" encoding="utf-8"?>
-<p:properties xmlns:p="http://schemas.microsoft.com/office/2006/metadata/properties" xmlns:xsi="http://www.w3.org/2001/XMLSchema-instance" xmlns:pc="http://schemas.microsoft.com/office/infopath/2007/PartnerControls">
-  <documentManagement>
-    <_ip_UnifiedCompliancePolicyUIAction xmlns="http://schemas.microsoft.com/sharepoint/v3" xsi:nil="true"/>
-    <_ip_UnifiedCompliancePolicyProperties xmlns="http://schemas.microsoft.com/sharepoint/v3" xsi:nil="true"/>
-  </documentManagement>
-</p:properties>
-</file>
-
-<file path=customXml/item2.xml><?xml version="1.0" encoding="utf-8"?>
 <ct:contentTypeSchema xmlns:ct="http://schemas.microsoft.com/office/2006/metadata/contentType" xmlns:ma="http://schemas.microsoft.com/office/2006/metadata/properties/metaAttributes" ct:_="" ma:_="" ma:contentTypeName="Document" ma:contentTypeID="0x010100DEEA25CC0A0AC24199CDC46C25B8B0BC" ma:contentTypeVersion="10" ma:contentTypeDescription="Create a new document." ma:contentTypeScope="" ma:versionID="e3b47856d4cf355c0dacb39e1084d14f">
   <xsd:schema xmlns:xsd="http://www.w3.org/2001/XMLSchema" xmlns:xs="http://www.w3.org/2001/XMLSchema" xmlns:p="http://schemas.microsoft.com/office/2006/metadata/properties" xmlns:ns1="http://schemas.microsoft.com/sharepoint/v3" xmlns:ns2="6dc4bcd6-49db-4c07-9060-8acfc67cef9f" xmlns:ns3="fb0879af-3eba-417a-a55a-ffe6dcd6ca77" targetNamespace="http://schemas.microsoft.com/office/2006/metadata/properties" ma:root="true" ma:fieldsID="a845a615265fdb1f7b12cc65ac20ecbd" ns1:_="" ns2:_="" ns3:_="">
     <xsd:import namespace="http://schemas.microsoft.com/sharepoint/v3"/>
@@ -24855,6 +25213,15 @@
 </ct:contentTypeSchema>
 </file>
 
+<file path=customXml/item2.xml><?xml version="1.0" encoding="utf-8"?>
+<p:properties xmlns:p="http://schemas.microsoft.com/office/2006/metadata/properties" xmlns:xsi="http://www.w3.org/2001/XMLSchema-instance" xmlns:pc="http://schemas.microsoft.com/office/infopath/2007/PartnerControls">
+  <documentManagement>
+    <_ip_UnifiedCompliancePolicyUIAction xmlns="http://schemas.microsoft.com/sharepoint/v3" xsi:nil="true"/>
+    <_ip_UnifiedCompliancePolicyProperties xmlns="http://schemas.microsoft.com/sharepoint/v3" xsi:nil="true"/>
+  </documentManagement>
+</p:properties>
+</file>
+
 <file path=customXml/item3.xml><?xml version="1.0" encoding="utf-8"?>
 <?mso-contentType ?>
 <FormTemplates xmlns="http://schemas.microsoft.com/sharepoint/v3/contenttype/forms">
@@ -24865,16 +25232,6 @@
 </file>
 
 <file path=customXml/itemProps1.xml><?xml version="1.0" encoding="utf-8"?>
-<ds:datastoreItem xmlns:ds="http://schemas.openxmlformats.org/officeDocument/2006/customXml" ds:itemID="{374D15D6-87BC-477C-8E91-9F90829C2FC8}">
-  <ds:schemaRefs>
-    <ds:schemaRef ds:uri="http://schemas.microsoft.com/office/2006/metadata/properties"/>
-    <ds:schemaRef ds:uri="http://schemas.microsoft.com/office/infopath/2007/PartnerControls"/>
-    <ds:schemaRef ds:uri="http://schemas.microsoft.com/sharepoint/v3"/>
-  </ds:schemaRefs>
-</ds:datastoreItem>
-</file>
-
-<file path=customXml/itemProps2.xml><?xml version="1.0" encoding="utf-8"?>
 <ds:datastoreItem xmlns:ds="http://schemas.openxmlformats.org/officeDocument/2006/customXml" ds:itemID="{D19A80A7-0DD1-4CF4-ABD5-362A6549C557}">
   <ds:schemaRefs>
     <ds:schemaRef ds:uri="http://schemas.microsoft.com/office/2006/metadata/contentType"/>
@@ -24894,6 +25251,16 @@
 </ds:datastoreItem>
 </file>
 
+<file path=customXml/itemProps2.xml><?xml version="1.0" encoding="utf-8"?>
+<ds:datastoreItem xmlns:ds="http://schemas.openxmlformats.org/officeDocument/2006/customXml" ds:itemID="{374D15D6-87BC-477C-8E91-9F90829C2FC8}">
+  <ds:schemaRefs>
+    <ds:schemaRef ds:uri="http://schemas.microsoft.com/office/2006/metadata/properties"/>
+    <ds:schemaRef ds:uri="http://schemas.microsoft.com/office/infopath/2007/PartnerControls"/>
+    <ds:schemaRef ds:uri="http://schemas.microsoft.com/sharepoint/v3"/>
+  </ds:schemaRefs>
+</ds:datastoreItem>
+</file>
+
 <file path=customXml/itemProps3.xml><?xml version="1.0" encoding="utf-8"?>
 <ds:datastoreItem xmlns:ds="http://schemas.openxmlformats.org/officeDocument/2006/customXml" ds:itemID="{F79AA90D-A39D-4F83-B1BD-92099B1CAD0D}">
   <ds:schemaRefs>

</xml_diff>

<commit_message>
Edited Michele's part on ppt.
</commit_message>
<xml_diff>
--- a/Aes_Project_2021_2022.pptx
+++ b/Aes_Project_2021_2022.pptx
@@ -342,7 +342,7 @@
             <a:pPr rtl="0"/>
             <a:fld id="{9F1072A3-100F-40A9-915F-8D2D9E6962D8}" type="slidenum">
               <a:rPr lang="it-IT" smtClean="0"/>
-              <a:t>‹N›</a:t>
+              <a:t>‹#›</a:t>
             </a:fld>
             <a:endParaRPr lang="it-IT" dirty="0"/>
           </a:p>
@@ -605,7 +605,7 @@
             <a:pPr rtl="0"/>
             <a:fld id="{79230CFA-805A-4FD3-B3A0-DAAA5993DA17}" type="slidenum">
               <a:rPr lang="it-IT" noProof="0" smtClean="0"/>
-              <a:t>‹N›</a:t>
+              <a:t>‹#›</a:t>
             </a:fld>
             <a:endParaRPr lang="it-IT" noProof="0" dirty="0"/>
           </a:p>
@@ -3863,7 +3863,7 @@
             <a:pPr rtl="0"/>
             <a:fld id="{8699F50C-BE38-4BD0-BA84-9B090E1F2B9B}" type="slidenum">
               <a:rPr lang="it-IT" noProof="0" smtClean="0"/>
-              <a:t>‹N›</a:t>
+              <a:t>‹#›</a:t>
             </a:fld>
             <a:endParaRPr lang="it-IT" noProof="0" dirty="0"/>
           </a:p>
@@ -4443,7 +4443,7 @@
             <a:pPr rtl="0"/>
             <a:fld id="{8699F50C-BE38-4BD0-BA84-9B090E1F2B9B}" type="slidenum">
               <a:rPr lang="it-IT" noProof="0" smtClean="0"/>
-              <a:t>‹N›</a:t>
+              <a:t>‹#›</a:t>
             </a:fld>
             <a:endParaRPr lang="it-IT" noProof="0" dirty="0"/>
           </a:p>
@@ -5140,7 +5140,7 @@
             <a:pPr rtl="0"/>
             <a:fld id="{8699F50C-BE38-4BD0-BA84-9B090E1F2B9B}" type="slidenum">
               <a:rPr lang="it-IT" noProof="0" smtClean="0"/>
-              <a:t>‹N›</a:t>
+              <a:t>‹#›</a:t>
             </a:fld>
             <a:endParaRPr lang="it-IT" noProof="0" dirty="0"/>
           </a:p>
@@ -6886,7 +6886,7 @@
             <a:pPr rtl="0"/>
             <a:fld id="{8699F50C-BE38-4BD0-BA84-9B090E1F2B9B}" type="slidenum">
               <a:rPr lang="it-IT" noProof="0" smtClean="0"/>
-              <a:t>‹N›</a:t>
+              <a:t>‹#›</a:t>
             </a:fld>
             <a:endParaRPr lang="it-IT" noProof="0" dirty="0"/>
           </a:p>
@@ -7292,7 +7292,7 @@
             <a:pPr rtl="0"/>
             <a:fld id="{8699F50C-BE38-4BD0-BA84-9B090E1F2B9B}" type="slidenum">
               <a:rPr lang="it-IT" noProof="0" smtClean="0"/>
-              <a:t>‹N›</a:t>
+              <a:t>‹#›</a:t>
             </a:fld>
             <a:endParaRPr lang="it-IT" noProof="0" dirty="0"/>
           </a:p>
@@ -8821,7 +8821,7 @@
             <a:pPr rtl="0"/>
             <a:fld id="{8699F50C-BE38-4BD0-BA84-9B090E1F2B9B}" type="slidenum">
               <a:rPr lang="it-IT" noProof="0" smtClean="0"/>
-              <a:t>‹N›</a:t>
+              <a:t>‹#›</a:t>
             </a:fld>
             <a:endParaRPr lang="it-IT" noProof="0" dirty="0"/>
           </a:p>
@@ -9450,7 +9450,7 @@
             <a:pPr rtl="0"/>
             <a:fld id="{8699F50C-BE38-4BD0-BA84-9B090E1F2B9B}" type="slidenum">
               <a:rPr lang="it-IT" noProof="0" smtClean="0"/>
-              <a:t>‹N›</a:t>
+              <a:t>‹#›</a:t>
             </a:fld>
             <a:endParaRPr lang="it-IT" noProof="0" dirty="0"/>
           </a:p>
@@ -10324,7 +10324,7 @@
             <a:pPr rtl="0"/>
             <a:fld id="{8699F50C-BE38-4BD0-BA84-9B090E1F2B9B}" type="slidenum">
               <a:rPr lang="it-IT" noProof="0" smtClean="0"/>
-              <a:t>‹N›</a:t>
+              <a:t>‹#›</a:t>
             </a:fld>
             <a:endParaRPr lang="it-IT" noProof="0" dirty="0"/>
           </a:p>
@@ -10790,7 +10790,7 @@
             <a:pPr rtl="0"/>
             <a:fld id="{8699F50C-BE38-4BD0-BA84-9B090E1F2B9B}" type="slidenum">
               <a:rPr lang="it-IT" noProof="0" smtClean="0"/>
-              <a:t>‹N›</a:t>
+              <a:t>‹#›</a:t>
             </a:fld>
             <a:endParaRPr lang="it-IT" noProof="0" dirty="0"/>
           </a:p>
@@ -11425,7 +11425,7 @@
             <a:pPr rtl="0"/>
             <a:fld id="{8699F50C-BE38-4BD0-BA84-9B090E1F2B9B}" type="slidenum">
               <a:rPr lang="it-IT" noProof="0" smtClean="0"/>
-              <a:t>‹N›</a:t>
+              <a:t>‹#›</a:t>
             </a:fld>
             <a:endParaRPr lang="it-IT" noProof="0" dirty="0"/>
           </a:p>
@@ -13820,7 +13820,7 @@
             <a:fld id="{8699F50C-BE38-4BD0-BA84-9B090E1F2B9B}" type="slidenum">
               <a:rPr lang="it-IT" noProof="0" smtClean="0"/>
               <a:pPr rtl="0"/>
-              <a:t>‹N›</a:t>
+              <a:t>‹#›</a:t>
             </a:fld>
             <a:endParaRPr lang="it-IT" noProof="0" dirty="0"/>
           </a:p>
@@ -14631,46 +14631,6 @@
       </p:grpSpPr>
       <p:sp>
         <p:nvSpPr>
-          <p:cNvPr id="3" name="Segnaposto piè di pagina 2">
-            <a:extLst>
-              <a:ext uri="{FF2B5EF4-FFF2-40B4-BE49-F238E27FC236}">
-                <a16:creationId xmlns:a16="http://schemas.microsoft.com/office/drawing/2014/main" id="{B04C11C9-3DF6-471E-87C0-4DCED41031D4}"/>
-              </a:ext>
-            </a:extLst>
-          </p:cNvPr>
-          <p:cNvSpPr>
-            <a:spLocks noGrp="1"/>
-          </p:cNvSpPr>
-          <p:nvPr>
-            <p:ph type="ftr" sz="quarter" idx="17"/>
-          </p:nvPr>
-        </p:nvSpPr>
-        <p:spPr>
-          <a:xfrm>
-            <a:off x="338530" y="6356350"/>
-            <a:ext cx="4114800" cy="365125"/>
-          </a:xfrm>
-        </p:spPr>
-        <p:txBody>
-          <a:bodyPr rtlCol="0" anchor="ctr">
-            <a:normAutofit/>
-          </a:bodyPr>
-          <a:lstStyle/>
-          <a:p>
-            <a:pPr rtl="0">
-              <a:spcAft>
-                <a:spcPts val="600"/>
-              </a:spcAft>
-            </a:pPr>
-            <a:r>
-              <a:rPr lang="it-IT"/>
-              <a:t>Aggiungere un piè di pagina</a:t>
-            </a:r>
-          </a:p>
-        </p:txBody>
-      </p:sp>
-      <p:sp>
-        <p:nvSpPr>
           <p:cNvPr id="4" name="Segnaposto numero diapositiva 3">
             <a:extLst>
               <a:ext uri="{FF2B5EF4-FFF2-40B4-BE49-F238E27FC236}">
@@ -15050,46 +15010,6 @@
           <a:chExt cx="0" cy="0"/>
         </a:xfrm>
       </p:grpSpPr>
-      <p:sp>
-        <p:nvSpPr>
-          <p:cNvPr id="3" name="Segnaposto piè di pagina 2">
-            <a:extLst>
-              <a:ext uri="{FF2B5EF4-FFF2-40B4-BE49-F238E27FC236}">
-                <a16:creationId xmlns:a16="http://schemas.microsoft.com/office/drawing/2014/main" id="{B04C11C9-3DF6-471E-87C0-4DCED41031D4}"/>
-              </a:ext>
-            </a:extLst>
-          </p:cNvPr>
-          <p:cNvSpPr>
-            <a:spLocks noGrp="1"/>
-          </p:cNvSpPr>
-          <p:nvPr>
-            <p:ph type="ftr" sz="quarter" idx="17"/>
-          </p:nvPr>
-        </p:nvSpPr>
-        <p:spPr>
-          <a:xfrm>
-            <a:off x="338530" y="6356350"/>
-            <a:ext cx="4114800" cy="365125"/>
-          </a:xfrm>
-        </p:spPr>
-        <p:txBody>
-          <a:bodyPr rtlCol="0" anchor="ctr">
-            <a:normAutofit/>
-          </a:bodyPr>
-          <a:lstStyle/>
-          <a:p>
-            <a:pPr rtl="0">
-              <a:spcAft>
-                <a:spcPts val="600"/>
-              </a:spcAft>
-            </a:pPr>
-            <a:r>
-              <a:rPr lang="it-IT"/>
-              <a:t>Aggiungere un piè di pagina</a:t>
-            </a:r>
-          </a:p>
-        </p:txBody>
-      </p:sp>
       <p:sp>
         <p:nvSpPr>
           <p:cNvPr id="4" name="Segnaposto numero diapositiva 3">
@@ -15521,46 +15441,6 @@
       </p:grpSpPr>
       <p:sp>
         <p:nvSpPr>
-          <p:cNvPr id="3" name="Segnaposto piè di pagina 2">
-            <a:extLst>
-              <a:ext uri="{FF2B5EF4-FFF2-40B4-BE49-F238E27FC236}">
-                <a16:creationId xmlns:a16="http://schemas.microsoft.com/office/drawing/2014/main" id="{B04C11C9-3DF6-471E-87C0-4DCED41031D4}"/>
-              </a:ext>
-            </a:extLst>
-          </p:cNvPr>
-          <p:cNvSpPr>
-            <a:spLocks noGrp="1"/>
-          </p:cNvSpPr>
-          <p:nvPr>
-            <p:ph type="ftr" sz="quarter" idx="17"/>
-          </p:nvPr>
-        </p:nvSpPr>
-        <p:spPr>
-          <a:xfrm>
-            <a:off x="338530" y="6356350"/>
-            <a:ext cx="4114800" cy="365125"/>
-          </a:xfrm>
-        </p:spPr>
-        <p:txBody>
-          <a:bodyPr rtlCol="0" anchor="ctr">
-            <a:normAutofit/>
-          </a:bodyPr>
-          <a:lstStyle/>
-          <a:p>
-            <a:pPr rtl="0">
-              <a:spcAft>
-                <a:spcPts val="600"/>
-              </a:spcAft>
-            </a:pPr>
-            <a:r>
-              <a:rPr lang="it-IT"/>
-              <a:t>Aggiungere un piè di pagina</a:t>
-            </a:r>
-          </a:p>
-        </p:txBody>
-      </p:sp>
-      <p:sp>
-        <p:nvSpPr>
           <p:cNvPr id="4" name="Segnaposto numero diapositiva 3">
             <a:extLst>
               <a:ext uri="{FF2B5EF4-FFF2-40B4-BE49-F238E27FC236}">
@@ -15798,46 +15678,6 @@
           </a:xfrm>
         </p:spPr>
       </p:pic>
-      <p:sp>
-        <p:nvSpPr>
-          <p:cNvPr id="2" name="Footer Placeholder 1">
-            <a:extLst>
-              <a:ext uri="{FF2B5EF4-FFF2-40B4-BE49-F238E27FC236}">
-                <a16:creationId xmlns:a16="http://schemas.microsoft.com/office/drawing/2014/main" id="{9D9AD0DD-1112-FD88-8C7E-1DF28D01FFA8}"/>
-              </a:ext>
-            </a:extLst>
-          </p:cNvPr>
-          <p:cNvSpPr>
-            <a:spLocks noGrp="1"/>
-          </p:cNvSpPr>
-          <p:nvPr>
-            <p:ph type="ftr" sz="quarter" idx="17"/>
-          </p:nvPr>
-        </p:nvSpPr>
-        <p:spPr>
-          <a:xfrm>
-            <a:off x="338530" y="6356350"/>
-            <a:ext cx="4114800" cy="365125"/>
-          </a:xfrm>
-        </p:spPr>
-        <p:txBody>
-          <a:bodyPr anchor="ctr">
-            <a:normAutofit/>
-          </a:bodyPr>
-          <a:lstStyle/>
-          <a:p>
-            <a:pPr rtl="0">
-              <a:spcAft>
-                <a:spcPts val="600"/>
-              </a:spcAft>
-            </a:pPr>
-            <a:r>
-              <a:rPr lang="it-IT" noProof="0"/>
-              <a:t>Aggiungere un piè di pagina</a:t>
-            </a:r>
-          </a:p>
-        </p:txBody>
-      </p:sp>
       <p:sp>
         <p:nvSpPr>
           <p:cNvPr id="3" name="Slide Number Placeholder 2">
@@ -16023,36 +15863,6 @@
       </p:pic>
       <p:sp>
         <p:nvSpPr>
-          <p:cNvPr id="2" name="Footer Placeholder 1">
-            <a:extLst>
-              <a:ext uri="{FF2B5EF4-FFF2-40B4-BE49-F238E27FC236}">
-                <a16:creationId xmlns:a16="http://schemas.microsoft.com/office/drawing/2014/main" id="{91EFEE42-AA19-5930-333D-369A707272EB}"/>
-              </a:ext>
-            </a:extLst>
-          </p:cNvPr>
-          <p:cNvSpPr>
-            <a:spLocks noGrp="1"/>
-          </p:cNvSpPr>
-          <p:nvPr>
-            <p:ph type="ftr" sz="quarter" idx="17"/>
-          </p:nvPr>
-        </p:nvSpPr>
-        <p:spPr/>
-        <p:txBody>
-          <a:bodyPr/>
-          <a:lstStyle/>
-          <a:p>
-            <a:pPr rtl="0"/>
-            <a:r>
-              <a:rPr lang="it-IT" noProof="0"/>
-              <a:t>Aggiungere un piè di pagina</a:t>
-            </a:r>
-            <a:endParaRPr lang="it-IT" noProof="0" dirty="0"/>
-          </a:p>
-        </p:txBody>
-      </p:sp>
-      <p:sp>
-        <p:nvSpPr>
           <p:cNvPr id="3" name="Slide Number Placeholder 2">
             <a:extLst>
               <a:ext uri="{FF2B5EF4-FFF2-40B4-BE49-F238E27FC236}">
@@ -16188,35 +15998,6 @@
       </p:grpSpPr>
       <p:sp>
         <p:nvSpPr>
-          <p:cNvPr id="3" name="Segnaposto piè di pagina 2">
-            <a:extLst>
-              <a:ext uri="{FF2B5EF4-FFF2-40B4-BE49-F238E27FC236}">
-                <a16:creationId xmlns:a16="http://schemas.microsoft.com/office/drawing/2014/main" id="{B04C11C9-3DF6-471E-87C0-4DCED41031D4}"/>
-              </a:ext>
-            </a:extLst>
-          </p:cNvPr>
-          <p:cNvSpPr>
-            <a:spLocks noGrp="1"/>
-          </p:cNvSpPr>
-          <p:nvPr>
-            <p:ph type="ftr" sz="quarter" idx="17"/>
-          </p:nvPr>
-        </p:nvSpPr>
-        <p:spPr/>
-        <p:txBody>
-          <a:bodyPr rtlCol="0"/>
-          <a:lstStyle/>
-          <a:p>
-            <a:pPr rtl="0"/>
-            <a:r>
-              <a:rPr lang="it-IT" dirty="0"/>
-              <a:t>Aggiungere un piè di pagina</a:t>
-            </a:r>
-          </a:p>
-        </p:txBody>
-      </p:sp>
-      <p:sp>
-        <p:nvSpPr>
           <p:cNvPr id="4" name="Segnaposto numero diapositiva 3">
             <a:extLst>
               <a:ext uri="{FF2B5EF4-FFF2-40B4-BE49-F238E27FC236}">
@@ -16360,35 +16141,6 @@
           <a:chExt cx="0" cy="0"/>
         </a:xfrm>
       </p:grpSpPr>
-      <p:sp>
-        <p:nvSpPr>
-          <p:cNvPr id="3" name="Segnaposto piè di pagina 2">
-            <a:extLst>
-              <a:ext uri="{FF2B5EF4-FFF2-40B4-BE49-F238E27FC236}">
-                <a16:creationId xmlns:a16="http://schemas.microsoft.com/office/drawing/2014/main" id="{B04C11C9-3DF6-471E-87C0-4DCED41031D4}"/>
-              </a:ext>
-            </a:extLst>
-          </p:cNvPr>
-          <p:cNvSpPr>
-            <a:spLocks noGrp="1"/>
-          </p:cNvSpPr>
-          <p:nvPr>
-            <p:ph type="ftr" sz="quarter" idx="17"/>
-          </p:nvPr>
-        </p:nvSpPr>
-        <p:spPr/>
-        <p:txBody>
-          <a:bodyPr rtlCol="0"/>
-          <a:lstStyle/>
-          <a:p>
-            <a:pPr rtl="0"/>
-            <a:r>
-              <a:rPr lang="it-IT" dirty="0"/>
-              <a:t>Aggiungere un piè di pagina</a:t>
-            </a:r>
-          </a:p>
-        </p:txBody>
-      </p:sp>
       <p:sp>
         <p:nvSpPr>
           <p:cNvPr id="4" name="Segnaposto numero diapositiva 3">
@@ -16626,35 +16378,6 @@
       </p:grpSpPr>
       <p:sp>
         <p:nvSpPr>
-          <p:cNvPr id="3" name="Segnaposto piè di pagina 2">
-            <a:extLst>
-              <a:ext uri="{FF2B5EF4-FFF2-40B4-BE49-F238E27FC236}">
-                <a16:creationId xmlns:a16="http://schemas.microsoft.com/office/drawing/2014/main" id="{B04C11C9-3DF6-471E-87C0-4DCED41031D4}"/>
-              </a:ext>
-            </a:extLst>
-          </p:cNvPr>
-          <p:cNvSpPr>
-            <a:spLocks noGrp="1"/>
-          </p:cNvSpPr>
-          <p:nvPr>
-            <p:ph type="ftr" sz="quarter" idx="17"/>
-          </p:nvPr>
-        </p:nvSpPr>
-        <p:spPr/>
-        <p:txBody>
-          <a:bodyPr rtlCol="0"/>
-          <a:lstStyle/>
-          <a:p>
-            <a:pPr rtl="0"/>
-            <a:r>
-              <a:rPr lang="it-IT" dirty="0"/>
-              <a:t>Aggiungere un piè di pagina</a:t>
-            </a:r>
-          </a:p>
-        </p:txBody>
-      </p:sp>
-      <p:sp>
-        <p:nvSpPr>
           <p:cNvPr id="4" name="Segnaposto numero diapositiva 3">
             <a:extLst>
               <a:ext uri="{FF2B5EF4-FFF2-40B4-BE49-F238E27FC236}">
@@ -16815,35 +16538,6 @@
       </p:grpSpPr>
       <p:sp>
         <p:nvSpPr>
-          <p:cNvPr id="3" name="Segnaposto piè di pagina 2">
-            <a:extLst>
-              <a:ext uri="{FF2B5EF4-FFF2-40B4-BE49-F238E27FC236}">
-                <a16:creationId xmlns:a16="http://schemas.microsoft.com/office/drawing/2014/main" id="{B04C11C9-3DF6-471E-87C0-4DCED41031D4}"/>
-              </a:ext>
-            </a:extLst>
-          </p:cNvPr>
-          <p:cNvSpPr>
-            <a:spLocks noGrp="1"/>
-          </p:cNvSpPr>
-          <p:nvPr>
-            <p:ph type="ftr" sz="quarter" idx="17"/>
-          </p:nvPr>
-        </p:nvSpPr>
-        <p:spPr/>
-        <p:txBody>
-          <a:bodyPr rtlCol="0"/>
-          <a:lstStyle/>
-          <a:p>
-            <a:pPr rtl="0"/>
-            <a:r>
-              <a:rPr lang="it-IT" dirty="0"/>
-              <a:t>Aggiungere un piè di pagina</a:t>
-            </a:r>
-          </a:p>
-        </p:txBody>
-      </p:sp>
-      <p:sp>
-        <p:nvSpPr>
           <p:cNvPr id="4" name="Segnaposto numero diapositiva 3">
             <a:extLst>
               <a:ext uri="{FF2B5EF4-FFF2-40B4-BE49-F238E27FC236}">
@@ -17004,36 +16698,6 @@
       </p:grpSpPr>
       <p:sp>
         <p:nvSpPr>
-          <p:cNvPr id="3" name="Segnaposto piè di pagina 2">
-            <a:extLst>
-              <a:ext uri="{FF2B5EF4-FFF2-40B4-BE49-F238E27FC236}">
-                <a16:creationId xmlns:a16="http://schemas.microsoft.com/office/drawing/2014/main" id="{288FBC4B-6ADC-7D28-1BE9-94EE09E090F9}"/>
-              </a:ext>
-            </a:extLst>
-          </p:cNvPr>
-          <p:cNvSpPr>
-            <a:spLocks noGrp="1"/>
-          </p:cNvSpPr>
-          <p:nvPr>
-            <p:ph type="ftr" sz="quarter" idx="17"/>
-          </p:nvPr>
-        </p:nvSpPr>
-        <p:spPr/>
-        <p:txBody>
-          <a:bodyPr/>
-          <a:lstStyle/>
-          <a:p>
-            <a:pPr rtl="0"/>
-            <a:r>
-              <a:rPr lang="it-IT" noProof="0"/>
-              <a:t>Aggiungere un piè di pagina</a:t>
-            </a:r>
-            <a:endParaRPr lang="it-IT" noProof="0" dirty="0"/>
-          </a:p>
-        </p:txBody>
-      </p:sp>
-      <p:sp>
-        <p:nvSpPr>
           <p:cNvPr id="4" name="Segnaposto numero diapositiva 3">
             <a:extLst>
               <a:ext uri="{FF2B5EF4-FFF2-40B4-BE49-F238E27FC236}">
@@ -17292,35 +16956,6 @@
           <a:chExt cx="0" cy="0"/>
         </a:xfrm>
       </p:grpSpPr>
-      <p:sp>
-        <p:nvSpPr>
-          <p:cNvPr id="3" name="Segnaposto piè di pagina 2">
-            <a:extLst>
-              <a:ext uri="{FF2B5EF4-FFF2-40B4-BE49-F238E27FC236}">
-                <a16:creationId xmlns:a16="http://schemas.microsoft.com/office/drawing/2014/main" id="{B04C11C9-3DF6-471E-87C0-4DCED41031D4}"/>
-              </a:ext>
-            </a:extLst>
-          </p:cNvPr>
-          <p:cNvSpPr>
-            <a:spLocks noGrp="1"/>
-          </p:cNvSpPr>
-          <p:nvPr>
-            <p:ph type="ftr" sz="quarter" idx="17"/>
-          </p:nvPr>
-        </p:nvSpPr>
-        <p:spPr/>
-        <p:txBody>
-          <a:bodyPr rtlCol="0"/>
-          <a:lstStyle/>
-          <a:p>
-            <a:pPr rtl="0"/>
-            <a:r>
-              <a:rPr lang="it-IT" dirty="0"/>
-              <a:t>Aggiungere un piè di pagina</a:t>
-            </a:r>
-          </a:p>
-        </p:txBody>
-      </p:sp>
       <p:sp>
         <p:nvSpPr>
           <p:cNvPr id="4" name="Segnaposto numero diapositiva 3">
@@ -17455,35 +17090,6 @@
       </p:grpSpPr>
       <p:sp>
         <p:nvSpPr>
-          <p:cNvPr id="3" name="Segnaposto piè di pagina 2">
-            <a:extLst>
-              <a:ext uri="{FF2B5EF4-FFF2-40B4-BE49-F238E27FC236}">
-                <a16:creationId xmlns:a16="http://schemas.microsoft.com/office/drawing/2014/main" id="{99E8B753-8F9B-FB27-A65B-8B8775D38FCE}"/>
-              </a:ext>
-            </a:extLst>
-          </p:cNvPr>
-          <p:cNvSpPr>
-            <a:spLocks noGrp="1"/>
-          </p:cNvSpPr>
-          <p:nvPr>
-            <p:ph type="ftr" sz="quarter" idx="17"/>
-          </p:nvPr>
-        </p:nvSpPr>
-        <p:spPr/>
-        <p:txBody>
-          <a:bodyPr/>
-          <a:lstStyle/>
-          <a:p>
-            <a:pPr rtl="0"/>
-            <a:r>
-              <a:rPr lang="it-IT" noProof="0" dirty="0"/>
-              <a:t>Aggiungere un piè di pagina</a:t>
-            </a:r>
-          </a:p>
-        </p:txBody>
-      </p:sp>
-      <p:sp>
-        <p:nvSpPr>
           <p:cNvPr id="4" name="Segnaposto numero diapositiva 3">
             <a:extLst>
               <a:ext uri="{FF2B5EF4-FFF2-40B4-BE49-F238E27FC236}">
@@ -17548,8 +17154,8 @@
           </a:p>
         </p:txBody>
       </p:sp>
-      <mc:AlternateContent xmlns:mc="http://schemas.openxmlformats.org/markup-compatibility/2006" xmlns:a14="http://schemas.microsoft.com/office/drawing/2010/main">
-        <mc:Choice Requires="a14">
+      <mc:AlternateContent xmlns:mc="http://schemas.openxmlformats.org/markup-compatibility/2006">
+        <mc:Choice xmlns:a14="http://schemas.microsoft.com/office/drawing/2010/main" Requires="a14">
           <p:sp>
             <p:nvSpPr>
               <p:cNvPr id="6" name="Segnaposto testo 5">
@@ -17586,7 +17192,7 @@
                 </a:r>
                 <a:r>
                   <a:rPr lang="it-IT" sz="1800" dirty="0"/>
-                  <a:t>I change the reference outlet temperature of the heater I get the following power consumption diagrams, </a:t>
+                  <a:t>I change the reference outlet temperature of the heater, while keeping the reference pressure constant,I get the following power consumption diagrams,</a:t>
                 </a:r>
               </a:p>
               <a:p>
@@ -17723,7 +17329,7 @@
             </p:txBody>
           </p:sp>
         </mc:Choice>
-        <mc:Fallback xmlns="">
+        <mc:Fallback>
           <p:sp>
             <p:nvSpPr>
               <p:cNvPr id="6" name="Segnaposto testo 5">
@@ -17748,7 +17354,7 @@
               <a:blipFill>
                 <a:blip r:embed="rId5"/>
                 <a:stretch>
-                  <a:fillRect l="-427" t="-5587"/>
+                  <a:fillRect l="-427" t="-5587" b="-10615"/>
                 </a:stretch>
               </a:blipFill>
             </p:spPr>
@@ -17973,36 +17579,6 @@
       </p:grpSpPr>
       <p:sp>
         <p:nvSpPr>
-          <p:cNvPr id="3" name="Segnaposto piè di pagina 2">
-            <a:extLst>
-              <a:ext uri="{FF2B5EF4-FFF2-40B4-BE49-F238E27FC236}">
-                <a16:creationId xmlns:a16="http://schemas.microsoft.com/office/drawing/2014/main" id="{ACBC0392-A449-DD19-5455-22BD88D5F610}"/>
-              </a:ext>
-            </a:extLst>
-          </p:cNvPr>
-          <p:cNvSpPr>
-            <a:spLocks noGrp="1"/>
-          </p:cNvSpPr>
-          <p:nvPr>
-            <p:ph type="ftr" sz="quarter" idx="17"/>
-          </p:nvPr>
-        </p:nvSpPr>
-        <p:spPr/>
-        <p:txBody>
-          <a:bodyPr/>
-          <a:lstStyle/>
-          <a:p>
-            <a:pPr rtl="0"/>
-            <a:r>
-              <a:rPr lang="it-IT" noProof="0"/>
-              <a:t>Aggiungere un piè di pagina</a:t>
-            </a:r>
-            <a:endParaRPr lang="it-IT" noProof="0" dirty="0"/>
-          </a:p>
-        </p:txBody>
-      </p:sp>
-      <p:sp>
-        <p:nvSpPr>
           <p:cNvPr id="4" name="Segnaposto numero diapositiva 3">
             <a:extLst>
               <a:ext uri="{FF2B5EF4-FFF2-40B4-BE49-F238E27FC236}">
@@ -18083,47 +17659,133 @@
           </a:p>
         </p:txBody>
       </p:sp>
-      <p:sp>
-        <p:nvSpPr>
-          <p:cNvPr id="6" name="Segnaposto testo 5">
-            <a:extLst>
-              <a:ext uri="{FF2B5EF4-FFF2-40B4-BE49-F238E27FC236}">
-                <a16:creationId xmlns:a16="http://schemas.microsoft.com/office/drawing/2014/main" id="{B642BB4C-A0FB-4F69-9220-8658910171F1}"/>
-              </a:ext>
-            </a:extLst>
-          </p:cNvPr>
-          <p:cNvSpPr>
-            <a:spLocks noGrp="1"/>
-          </p:cNvSpPr>
-          <p:nvPr>
-            <p:ph type="body" sz="quarter" idx="19"/>
-          </p:nvPr>
-        </p:nvSpPr>
-        <p:spPr>
-          <a:xfrm>
-            <a:off x="518678" y="5352039"/>
-            <a:ext cx="11195802" cy="757742"/>
-          </a:xfrm>
-        </p:spPr>
-        <p:txBody>
-          <a:bodyPr/>
-          <a:lstStyle/>
-          <a:p>
-            <a:r>
-              <a:rPr lang="it-IT" sz="1800" dirty="0"/>
-              <a:t>The</a:t>
-            </a:r>
-            <a:r>
-              <a:rPr lang="it-IT" sz="1600" dirty="0"/>
-              <a:t> </a:t>
-            </a:r>
-            <a:r>
-              <a:rPr lang="it-IT" sz="1800" dirty="0"/>
-              <a:t>higher the reference pressure, the more the pump will be used. As the overall consumption remains the same, I can decrease or increase the pressure reference based on the efficiency of the heater and the pump.</a:t>
-            </a:r>
-          </a:p>
-        </p:txBody>
-      </p:sp>
+      <mc:AlternateContent xmlns:mc="http://schemas.openxmlformats.org/markup-compatibility/2006">
+        <mc:Choice xmlns:a14="http://schemas.microsoft.com/office/drawing/2010/main" Requires="a14">
+          <p:sp>
+            <p:nvSpPr>
+              <p:cNvPr id="6" name="Segnaposto testo 5">
+                <a:extLst>
+                  <a:ext uri="{FF2B5EF4-FFF2-40B4-BE49-F238E27FC236}">
+                    <a16:creationId xmlns:a16="http://schemas.microsoft.com/office/drawing/2014/main" id="{B642BB4C-A0FB-4F69-9220-8658910171F1}"/>
+                  </a:ext>
+                </a:extLst>
+              </p:cNvPr>
+              <p:cNvSpPr>
+                <a:spLocks noGrp="1"/>
+              </p:cNvSpPr>
+              <p:nvPr>
+                <p:ph type="body" sz="quarter" idx="19"/>
+              </p:nvPr>
+            </p:nvSpPr>
+            <p:spPr>
+              <a:xfrm>
+                <a:off x="518678" y="5352039"/>
+                <a:ext cx="11195802" cy="757742"/>
+              </a:xfrm>
+            </p:spPr>
+            <p:txBody>
+              <a:bodyPr/>
+              <a:lstStyle/>
+              <a:p>
+                <a:r>
+                  <a:rPr lang="it-IT" sz="1800" dirty="0"/>
+                  <a:t>The</a:t>
+                </a:r>
+                <a:r>
+                  <a:rPr lang="it-IT" sz="1600" dirty="0"/>
+                  <a:t> </a:t>
+                </a:r>
+                <a:r>
+                  <a:rPr lang="it-IT" sz="1800" dirty="0"/>
+                  <a:t>higher the reference pressure, the more the pump will be used. As the overall consumption remains the same, I can decrease or increase the pressure reference based on the efficiency of the heater and the pump. In </a:t>
+                </a:r>
+                <a:r>
+                  <a:rPr lang="it-IT" sz="1800" dirty="0" err="1"/>
+                  <a:t>this</a:t>
+                </a:r>
+                <a:r>
+                  <a:rPr lang="it-IT" sz="1800" dirty="0"/>
+                  <a:t> case I </a:t>
+                </a:r>
+                <a:r>
+                  <a:rPr lang="it-IT" sz="1800" dirty="0" err="1"/>
+                  <a:t>change</a:t>
+                </a:r>
+                <a:r>
+                  <a:rPr lang="it-IT" sz="1800" dirty="0"/>
+                  <a:t> the pressure keeping the temperature </a:t>
+                </a:r>
+                <a:r>
+                  <a:rPr lang="it-IT" sz="1800" dirty="0" err="1"/>
+                  <a:t>at</a:t>
+                </a:r>
+                <a:r>
+                  <a:rPr lang="it-IT" sz="1800" dirty="0"/>
+                  <a:t> 45</a:t>
+                </a:r>
+                <a14:m>
+                  <m:oMath xmlns:m="http://schemas.openxmlformats.org/officeDocument/2006/math">
+                    <m:r>
+                      <a:rPr lang="it-IT" sz="1800" i="1" smtClean="0">
+                        <a:latin typeface="Cambria Math" panose="02040503050406030204" pitchFamily="18" charset="0"/>
+                        <a:ea typeface="Cambria Math" panose="02040503050406030204" pitchFamily="18" charset="0"/>
+                      </a:rPr>
+                      <m:t>℃</m:t>
+                    </m:r>
+                  </m:oMath>
+                </a14:m>
+                <a:r>
+                  <a:rPr lang="it-IT" sz="1800" dirty="0"/>
+                  <a:t>.</a:t>
+                </a:r>
+              </a:p>
+            </p:txBody>
+          </p:sp>
+        </mc:Choice>
+        <mc:Fallback>
+          <p:sp>
+            <p:nvSpPr>
+              <p:cNvPr id="6" name="Segnaposto testo 5">
+                <a:extLst>
+                  <a:ext uri="{FF2B5EF4-FFF2-40B4-BE49-F238E27FC236}">
+                    <a16:creationId xmlns:a16="http://schemas.microsoft.com/office/drawing/2014/main" id="{B642BB4C-A0FB-4F69-9220-8658910171F1}"/>
+                  </a:ext>
+                </a:extLst>
+              </p:cNvPr>
+              <p:cNvSpPr>
+                <a:spLocks noGrp="1" noRot="1" noChangeAspect="1" noMove="1" noResize="1" noEditPoints="1" noAdjustHandles="1" noChangeArrowheads="1" noChangeShapeType="1" noTextEdit="1"/>
+              </p:cNvSpPr>
+              <p:nvPr>
+                <p:ph type="body" sz="quarter" idx="19"/>
+              </p:nvPr>
+            </p:nvSpPr>
+            <p:spPr>
+              <a:xfrm>
+                <a:off x="518678" y="5352039"/>
+                <a:ext cx="11195802" cy="757742"/>
+              </a:xfrm>
+              <a:blipFill>
+                <a:blip r:embed="rId4"/>
+                <a:stretch>
+                  <a:fillRect l="-435" t="-8065" b="-23387"/>
+                </a:stretch>
+              </a:blipFill>
+            </p:spPr>
+            <p:txBody>
+              <a:bodyPr/>
+              <a:lstStyle/>
+              <a:p>
+                <a:r>
+                  <a:rPr lang="en-GB">
+                    <a:noFill/>
+                  </a:rPr>
+                  <a:t> </a:t>
+                </a:r>
+              </a:p>
+            </p:txBody>
+          </p:sp>
+        </mc:Fallback>
+      </mc:AlternateContent>
       <p:pic>
         <p:nvPicPr>
           <p:cNvPr id="9" name="Immagine 8">
@@ -18139,7 +17801,7 @@
           <p:nvPr/>
         </p:nvPicPr>
         <p:blipFill>
-          <a:blip r:embed="rId4"/>
+          <a:blip r:embed="rId5"/>
           <a:stretch>
             <a:fillRect/>
           </a:stretch>
@@ -18169,7 +17831,7 @@
           <p:nvPr/>
         </p:nvPicPr>
         <p:blipFill>
-          <a:blip r:embed="rId5"/>
+          <a:blip r:embed="rId6"/>
           <a:stretch>
             <a:fillRect/>
           </a:stretch>
@@ -18203,7 +17865,7 @@
           </p:nvPr>
         </p:nvPicPr>
         <p:blipFill>
-          <a:blip r:embed="rId6"/>
+          <a:blip r:embed="rId7"/>
           <a:stretch>
             <a:fillRect/>
           </a:stretch>
@@ -18237,7 +17899,7 @@
           </p:nvPr>
         </p:nvPicPr>
         <p:blipFill>
-          <a:blip r:embed="rId7"/>
+          <a:blip r:embed="rId8"/>
           <a:stretch>
             <a:fillRect/>
           </a:stretch>
@@ -18294,35 +17956,6 @@
           <a:chExt cx="0" cy="0"/>
         </a:xfrm>
       </p:grpSpPr>
-      <p:sp>
-        <p:nvSpPr>
-          <p:cNvPr id="3" name="Segnaposto piè di pagina 2">
-            <a:extLst>
-              <a:ext uri="{FF2B5EF4-FFF2-40B4-BE49-F238E27FC236}">
-                <a16:creationId xmlns:a16="http://schemas.microsoft.com/office/drawing/2014/main" id="{127FAE9C-4E5A-44B2-7485-E2B1DBC18D5D}"/>
-              </a:ext>
-            </a:extLst>
-          </p:cNvPr>
-          <p:cNvSpPr>
-            <a:spLocks noGrp="1"/>
-          </p:cNvSpPr>
-          <p:nvPr>
-            <p:ph type="ftr" sz="quarter" idx="17"/>
-          </p:nvPr>
-        </p:nvSpPr>
-        <p:spPr/>
-        <p:txBody>
-          <a:bodyPr/>
-          <a:lstStyle/>
-          <a:p>
-            <a:pPr rtl="0"/>
-            <a:r>
-              <a:rPr lang="it-IT" noProof="0" dirty="0"/>
-              <a:t>Aggiungere un piè di pagina</a:t>
-            </a:r>
-          </a:p>
-        </p:txBody>
-      </p:sp>
       <p:sp>
         <p:nvSpPr>
           <p:cNvPr id="4" name="Segnaposto numero diapositiva 3">
@@ -18621,35 +18254,6 @@
       </p:grpSpPr>
       <p:sp>
         <p:nvSpPr>
-          <p:cNvPr id="3" name="Segnaposto piè di pagina 2">
-            <a:extLst>
-              <a:ext uri="{FF2B5EF4-FFF2-40B4-BE49-F238E27FC236}">
-                <a16:creationId xmlns:a16="http://schemas.microsoft.com/office/drawing/2014/main" id="{75CEE3CA-029A-E4C7-4671-951CC53E6AD7}"/>
-              </a:ext>
-            </a:extLst>
-          </p:cNvPr>
-          <p:cNvSpPr>
-            <a:spLocks noGrp="1"/>
-          </p:cNvSpPr>
-          <p:nvPr>
-            <p:ph type="ftr" sz="quarter" idx="17"/>
-          </p:nvPr>
-        </p:nvSpPr>
-        <p:spPr/>
-        <p:txBody>
-          <a:bodyPr/>
-          <a:lstStyle/>
-          <a:p>
-            <a:pPr rtl="0"/>
-            <a:r>
-              <a:rPr lang="it-IT" noProof="0" dirty="0"/>
-              <a:t>Aggiungere un piè di pagina</a:t>
-            </a:r>
-          </a:p>
-        </p:txBody>
-      </p:sp>
-      <p:sp>
-        <p:nvSpPr>
           <p:cNvPr id="4" name="Segnaposto numero diapositiva 3">
             <a:extLst>
               <a:ext uri="{FF2B5EF4-FFF2-40B4-BE49-F238E27FC236}">
@@ -18918,35 +18522,6 @@
       </p:grpSpPr>
       <p:sp>
         <p:nvSpPr>
-          <p:cNvPr id="3" name="Segnaposto piè di pagina 2">
-            <a:extLst>
-              <a:ext uri="{FF2B5EF4-FFF2-40B4-BE49-F238E27FC236}">
-                <a16:creationId xmlns:a16="http://schemas.microsoft.com/office/drawing/2014/main" id="{40DA9E81-8302-ACF8-0225-335F0205CE43}"/>
-              </a:ext>
-            </a:extLst>
-          </p:cNvPr>
-          <p:cNvSpPr>
-            <a:spLocks noGrp="1"/>
-          </p:cNvSpPr>
-          <p:nvPr>
-            <p:ph type="ftr" sz="quarter" idx="17"/>
-          </p:nvPr>
-        </p:nvSpPr>
-        <p:spPr/>
-        <p:txBody>
-          <a:bodyPr/>
-          <a:lstStyle/>
-          <a:p>
-            <a:pPr rtl="0"/>
-            <a:r>
-              <a:rPr lang="it-IT" noProof="0" dirty="0"/>
-              <a:t>Aggiungere un piè di pagina</a:t>
-            </a:r>
-          </a:p>
-        </p:txBody>
-      </p:sp>
-      <p:sp>
-        <p:nvSpPr>
           <p:cNvPr id="4" name="Segnaposto numero diapositiva 3">
             <a:extLst>
               <a:ext uri="{FF2B5EF4-FFF2-40B4-BE49-F238E27FC236}">
@@ -19229,35 +18804,6 @@
           <a:chExt cx="0" cy="0"/>
         </a:xfrm>
       </p:grpSpPr>
-      <p:sp>
-        <p:nvSpPr>
-          <p:cNvPr id="3" name="Segnaposto piè di pagina 2">
-            <a:extLst>
-              <a:ext uri="{FF2B5EF4-FFF2-40B4-BE49-F238E27FC236}">
-                <a16:creationId xmlns:a16="http://schemas.microsoft.com/office/drawing/2014/main" id="{B04C11C9-3DF6-471E-87C0-4DCED41031D4}"/>
-              </a:ext>
-            </a:extLst>
-          </p:cNvPr>
-          <p:cNvSpPr>
-            <a:spLocks noGrp="1"/>
-          </p:cNvSpPr>
-          <p:nvPr>
-            <p:ph type="ftr" sz="quarter" idx="17"/>
-          </p:nvPr>
-        </p:nvSpPr>
-        <p:spPr/>
-        <p:txBody>
-          <a:bodyPr rtlCol="0"/>
-          <a:lstStyle/>
-          <a:p>
-            <a:pPr rtl="0"/>
-            <a:r>
-              <a:rPr lang="it-IT" dirty="0"/>
-              <a:t>Aggiungere un piè di pagina</a:t>
-            </a:r>
-          </a:p>
-        </p:txBody>
-      </p:sp>
       <p:sp>
         <p:nvSpPr>
           <p:cNvPr id="4" name="Segnaposto numero diapositiva 3">
@@ -20207,36 +19753,6 @@
       </p:grpSpPr>
       <p:sp>
         <p:nvSpPr>
-          <p:cNvPr id="2" name="Segnaposto piè di pagina 1">
-            <a:extLst>
-              <a:ext uri="{FF2B5EF4-FFF2-40B4-BE49-F238E27FC236}">
-                <a16:creationId xmlns:a16="http://schemas.microsoft.com/office/drawing/2014/main" id="{5530B959-A174-C332-BA21-DD99BE59372C}"/>
-              </a:ext>
-            </a:extLst>
-          </p:cNvPr>
-          <p:cNvSpPr>
-            <a:spLocks noGrp="1"/>
-          </p:cNvSpPr>
-          <p:nvPr>
-            <p:ph type="ftr" sz="quarter" idx="17"/>
-          </p:nvPr>
-        </p:nvSpPr>
-        <p:spPr/>
-        <p:txBody>
-          <a:bodyPr/>
-          <a:lstStyle/>
-          <a:p>
-            <a:pPr rtl="0"/>
-            <a:r>
-              <a:rPr lang="it-IT" noProof="0"/>
-              <a:t>Aggiungere un piè di pagina</a:t>
-            </a:r>
-            <a:endParaRPr lang="it-IT" noProof="0" dirty="0"/>
-          </a:p>
-        </p:txBody>
-      </p:sp>
-      <p:sp>
-        <p:nvSpPr>
           <p:cNvPr id="3" name="Segnaposto numero diapositiva 2">
             <a:extLst>
               <a:ext uri="{FF2B5EF4-FFF2-40B4-BE49-F238E27FC236}">
@@ -20400,35 +19916,6 @@
       </p:grpSpPr>
       <p:sp>
         <p:nvSpPr>
-          <p:cNvPr id="3" name="Segnaposto piè di pagina 2">
-            <a:extLst>
-              <a:ext uri="{FF2B5EF4-FFF2-40B4-BE49-F238E27FC236}">
-                <a16:creationId xmlns:a16="http://schemas.microsoft.com/office/drawing/2014/main" id="{B04C11C9-3DF6-471E-87C0-4DCED41031D4}"/>
-              </a:ext>
-            </a:extLst>
-          </p:cNvPr>
-          <p:cNvSpPr>
-            <a:spLocks noGrp="1"/>
-          </p:cNvSpPr>
-          <p:nvPr>
-            <p:ph type="ftr" sz="quarter" idx="17"/>
-          </p:nvPr>
-        </p:nvSpPr>
-        <p:spPr/>
-        <p:txBody>
-          <a:bodyPr rtlCol="0"/>
-          <a:lstStyle/>
-          <a:p>
-            <a:pPr rtl="0"/>
-            <a:r>
-              <a:rPr lang="it-IT" dirty="0"/>
-              <a:t>Aggiungere un piè di pagina</a:t>
-            </a:r>
-          </a:p>
-        </p:txBody>
-      </p:sp>
-      <p:sp>
-        <p:nvSpPr>
           <p:cNvPr id="4" name="Segnaposto numero diapositiva 3">
             <a:extLst>
               <a:ext uri="{FF2B5EF4-FFF2-40B4-BE49-F238E27FC236}">
@@ -20485,8 +19972,8 @@
           </a:p>
         </p:txBody>
       </p:sp>
-      <mc:AlternateContent xmlns:mc="http://schemas.openxmlformats.org/markup-compatibility/2006">
-        <mc:Choice xmlns:a14="http://schemas.microsoft.com/office/drawing/2010/main" Requires="a14">
+      <mc:AlternateContent xmlns:mc="http://schemas.openxmlformats.org/markup-compatibility/2006" xmlns:a14="http://schemas.microsoft.com/office/drawing/2010/main">
+        <mc:Choice Requires="a14">
           <p:sp>
             <p:nvSpPr>
               <p:cNvPr id="5" name="Segnaposto contenuto 4"/>
@@ -21704,7 +21191,7 @@
             </p:txBody>
           </p:sp>
         </mc:Choice>
-        <mc:Fallback>
+        <mc:Fallback xmlns="">
           <p:sp>
             <p:nvSpPr>
               <p:cNvPr id="5" name="Segnaposto contenuto 4"/>
@@ -21864,36 +21351,6 @@
       </p:grpSpPr>
       <p:sp>
         <p:nvSpPr>
-          <p:cNvPr id="2" name="Segnaposto piè di pagina 1">
-            <a:extLst>
-              <a:ext uri="{FF2B5EF4-FFF2-40B4-BE49-F238E27FC236}">
-                <a16:creationId xmlns:a16="http://schemas.microsoft.com/office/drawing/2014/main" id="{9B0C102D-383D-B010-4406-85C32B8CFFEB}"/>
-              </a:ext>
-            </a:extLst>
-          </p:cNvPr>
-          <p:cNvSpPr>
-            <a:spLocks noGrp="1"/>
-          </p:cNvSpPr>
-          <p:nvPr>
-            <p:ph type="ftr" sz="quarter" idx="17"/>
-          </p:nvPr>
-        </p:nvSpPr>
-        <p:spPr/>
-        <p:txBody>
-          <a:bodyPr/>
-          <a:lstStyle/>
-          <a:p>
-            <a:pPr rtl="0"/>
-            <a:r>
-              <a:rPr lang="it-IT" noProof="0"/>
-              <a:t>Aggiungere un piè di pagina</a:t>
-            </a:r>
-            <a:endParaRPr lang="it-IT" noProof="0" dirty="0"/>
-          </a:p>
-        </p:txBody>
-      </p:sp>
-      <p:sp>
-        <p:nvSpPr>
           <p:cNvPr id="3" name="Segnaposto numero diapositiva 2">
             <a:extLst>
               <a:ext uri="{FF2B5EF4-FFF2-40B4-BE49-F238E27FC236}">
@@ -22061,8 +21518,8 @@
           </a:p>
         </p:txBody>
       </p:sp>
-      <mc:AlternateContent xmlns:mc="http://schemas.openxmlformats.org/markup-compatibility/2006">
-        <mc:Choice xmlns:a14="http://schemas.microsoft.com/office/drawing/2010/main" Requires="a14">
+      <mc:AlternateContent xmlns:mc="http://schemas.openxmlformats.org/markup-compatibility/2006" xmlns:a14="http://schemas.microsoft.com/office/drawing/2010/main">
+        <mc:Choice Requires="a14">
           <p:sp>
             <p:nvSpPr>
               <p:cNvPr id="16" name="CasellaDiTesto 15">
@@ -22325,7 +21782,7 @@
             </p:txBody>
           </p:sp>
         </mc:Choice>
-        <mc:Fallback>
+        <mc:Fallback xmlns="">
           <p:sp>
             <p:nvSpPr>
               <p:cNvPr id="16" name="CasellaDiTesto 15">
@@ -22411,8 +21868,8 @@
           </a:ln>
         </p:spPr>
       </p:pic>
-      <mc:AlternateContent xmlns:mc="http://schemas.openxmlformats.org/markup-compatibility/2006">
-        <mc:Choice xmlns:a14="http://schemas.microsoft.com/office/drawing/2010/main" Requires="a14">
+      <mc:AlternateContent xmlns:mc="http://schemas.openxmlformats.org/markup-compatibility/2006" xmlns:a14="http://schemas.microsoft.com/office/drawing/2010/main">
+        <mc:Choice Requires="a14">
           <p:sp>
             <p:nvSpPr>
               <p:cNvPr id="17" name="CasellaDiTesto 16">
@@ -22761,7 +22218,7 @@
             </p:txBody>
           </p:sp>
         </mc:Choice>
-        <mc:Fallback>
+        <mc:Fallback xmlns="">
           <p:sp>
             <p:nvSpPr>
               <p:cNvPr id="17" name="CasellaDiTesto 16">
@@ -22880,36 +22337,6 @@
       </p:pic>
       <p:sp>
         <p:nvSpPr>
-          <p:cNvPr id="2" name="Segnaposto piè di pagina 1">
-            <a:extLst>
-              <a:ext uri="{FF2B5EF4-FFF2-40B4-BE49-F238E27FC236}">
-                <a16:creationId xmlns:a16="http://schemas.microsoft.com/office/drawing/2014/main" id="{7ECF0201-274F-CB13-84A4-EC01CA3B47A1}"/>
-              </a:ext>
-            </a:extLst>
-          </p:cNvPr>
-          <p:cNvSpPr>
-            <a:spLocks noGrp="1"/>
-          </p:cNvSpPr>
-          <p:nvPr>
-            <p:ph type="ftr" sz="quarter" idx="17"/>
-          </p:nvPr>
-        </p:nvSpPr>
-        <p:spPr/>
-        <p:txBody>
-          <a:bodyPr/>
-          <a:lstStyle/>
-          <a:p>
-            <a:pPr rtl="0"/>
-            <a:r>
-              <a:rPr lang="it-IT" noProof="0"/>
-              <a:t>Aggiungere un piè di pagina</a:t>
-            </a:r>
-            <a:endParaRPr lang="it-IT" noProof="0" dirty="0"/>
-          </a:p>
-        </p:txBody>
-      </p:sp>
-      <p:sp>
-        <p:nvSpPr>
           <p:cNvPr id="3" name="Segnaposto numero diapositiva 2">
             <a:extLst>
               <a:ext uri="{FF2B5EF4-FFF2-40B4-BE49-F238E27FC236}">
@@ -23050,36 +22477,6 @@
           <a:chExt cx="0" cy="0"/>
         </a:xfrm>
       </p:grpSpPr>
-      <p:sp>
-        <p:nvSpPr>
-          <p:cNvPr id="2" name="Footer Placeholder 1">
-            <a:extLst>
-              <a:ext uri="{FF2B5EF4-FFF2-40B4-BE49-F238E27FC236}">
-                <a16:creationId xmlns:a16="http://schemas.microsoft.com/office/drawing/2014/main" id="{F80DE34E-72F6-EA85-47BE-E78FF0A21945}"/>
-              </a:ext>
-            </a:extLst>
-          </p:cNvPr>
-          <p:cNvSpPr>
-            <a:spLocks noGrp="1"/>
-          </p:cNvSpPr>
-          <p:nvPr>
-            <p:ph type="ftr" sz="quarter" idx="17"/>
-          </p:nvPr>
-        </p:nvSpPr>
-        <p:spPr/>
-        <p:txBody>
-          <a:bodyPr/>
-          <a:lstStyle/>
-          <a:p>
-            <a:pPr rtl="0"/>
-            <a:r>
-              <a:rPr lang="it-IT" noProof="0"/>
-              <a:t>Aggiungere un piè di pagina</a:t>
-            </a:r>
-            <a:endParaRPr lang="it-IT" noProof="0" dirty="0"/>
-          </a:p>
-        </p:txBody>
-      </p:sp>
       <p:sp>
         <p:nvSpPr>
           <p:cNvPr id="3" name="Slide Number Placeholder 2">
@@ -23344,35 +22741,6 @@
           <a:chExt cx="0" cy="0"/>
         </a:xfrm>
       </p:grpSpPr>
-      <p:sp>
-        <p:nvSpPr>
-          <p:cNvPr id="3" name="Segnaposto piè di pagina 2">
-            <a:extLst>
-              <a:ext uri="{FF2B5EF4-FFF2-40B4-BE49-F238E27FC236}">
-                <a16:creationId xmlns:a16="http://schemas.microsoft.com/office/drawing/2014/main" id="{B04C11C9-3DF6-471E-87C0-4DCED41031D4}"/>
-              </a:ext>
-            </a:extLst>
-          </p:cNvPr>
-          <p:cNvSpPr>
-            <a:spLocks noGrp="1"/>
-          </p:cNvSpPr>
-          <p:nvPr>
-            <p:ph type="ftr" sz="quarter" idx="17"/>
-          </p:nvPr>
-        </p:nvSpPr>
-        <p:spPr/>
-        <p:txBody>
-          <a:bodyPr rtlCol="0"/>
-          <a:lstStyle/>
-          <a:p>
-            <a:pPr rtl="0"/>
-            <a:r>
-              <a:rPr lang="it-IT" dirty="0"/>
-              <a:t>Aggiungere un piè di pagina</a:t>
-            </a:r>
-          </a:p>
-        </p:txBody>
-      </p:sp>
       <p:sp>
         <p:nvSpPr>
           <p:cNvPr id="4" name="Segnaposto numero diapositiva 3">
@@ -23594,7 +22962,7 @@
                   <pslz:sldZmObj sldId="283" cId="2700837890">
                     <pslz:zmPr id="{EB590B66-7C4A-481E-8359-A14F527EE35E}" imageType="cover" transitionDur="1000">
                       <p166:blipFill xmlns:p166="http://schemas.microsoft.com/office/powerpoint/2016/6/main">
-                        <a:blip r:embed="rId4">
+                        <a:blip r:embed="rId7">
                           <a:extLst>
                             <a:ext uri="{96DAC541-7B7A-43D3-8B79-37D633B846F1}">
                               <asvg:svgBlip xmlns:asvg="http://schemas.microsoft.com/office/drawing/2016/SVG/main" r:embed="rId5"/>
@@ -25006,6 +24374,15 @@
 </file>
 
 <file path=customXml/item1.xml><?xml version="1.0" encoding="utf-8"?>
+<p:properties xmlns:p="http://schemas.microsoft.com/office/2006/metadata/properties" xmlns:xsi="http://www.w3.org/2001/XMLSchema-instance" xmlns:pc="http://schemas.microsoft.com/office/infopath/2007/PartnerControls">
+  <documentManagement>
+    <_ip_UnifiedCompliancePolicyUIAction xmlns="http://schemas.microsoft.com/sharepoint/v3" xsi:nil="true"/>
+    <_ip_UnifiedCompliancePolicyProperties xmlns="http://schemas.microsoft.com/sharepoint/v3" xsi:nil="true"/>
+  </documentManagement>
+</p:properties>
+</file>
+
+<file path=customXml/item2.xml><?xml version="1.0" encoding="utf-8"?>
 <ct:contentTypeSchema xmlns:ct="http://schemas.microsoft.com/office/2006/metadata/contentType" xmlns:ma="http://schemas.microsoft.com/office/2006/metadata/properties/metaAttributes" ct:_="" ma:_="" ma:contentTypeName="Document" ma:contentTypeID="0x010100DEEA25CC0A0AC24199CDC46C25B8B0BC" ma:contentTypeVersion="10" ma:contentTypeDescription="Create a new document." ma:contentTypeScope="" ma:versionID="e3b47856d4cf355c0dacb39e1084d14f">
   <xsd:schema xmlns:xsd="http://www.w3.org/2001/XMLSchema" xmlns:xs="http://www.w3.org/2001/XMLSchema" xmlns:p="http://schemas.microsoft.com/office/2006/metadata/properties" xmlns:ns1="http://schemas.microsoft.com/sharepoint/v3" xmlns:ns2="6dc4bcd6-49db-4c07-9060-8acfc67cef9f" xmlns:ns3="fb0879af-3eba-417a-a55a-ffe6dcd6ca77" targetNamespace="http://schemas.microsoft.com/office/2006/metadata/properties" ma:root="true" ma:fieldsID="a845a615265fdb1f7b12cc65ac20ecbd" ns1:_="" ns2:_="" ns3:_="">
     <xsd:import namespace="http://schemas.microsoft.com/sharepoint/v3"/>
@@ -25213,15 +24590,6 @@
 </ct:contentTypeSchema>
 </file>
 
-<file path=customXml/item2.xml><?xml version="1.0" encoding="utf-8"?>
-<p:properties xmlns:p="http://schemas.microsoft.com/office/2006/metadata/properties" xmlns:xsi="http://www.w3.org/2001/XMLSchema-instance" xmlns:pc="http://schemas.microsoft.com/office/infopath/2007/PartnerControls">
-  <documentManagement>
-    <_ip_UnifiedCompliancePolicyUIAction xmlns="http://schemas.microsoft.com/sharepoint/v3" xsi:nil="true"/>
-    <_ip_UnifiedCompliancePolicyProperties xmlns="http://schemas.microsoft.com/sharepoint/v3" xsi:nil="true"/>
-  </documentManagement>
-</p:properties>
-</file>
-
 <file path=customXml/item3.xml><?xml version="1.0" encoding="utf-8"?>
 <?mso-contentType ?>
 <FormTemplates xmlns="http://schemas.microsoft.com/sharepoint/v3/contenttype/forms">
@@ -25232,6 +24600,16 @@
 </file>
 
 <file path=customXml/itemProps1.xml><?xml version="1.0" encoding="utf-8"?>
+<ds:datastoreItem xmlns:ds="http://schemas.openxmlformats.org/officeDocument/2006/customXml" ds:itemID="{374D15D6-87BC-477C-8E91-9F90829C2FC8}">
+  <ds:schemaRefs>
+    <ds:schemaRef ds:uri="http://schemas.microsoft.com/office/2006/metadata/properties"/>
+    <ds:schemaRef ds:uri="http://schemas.microsoft.com/office/infopath/2007/PartnerControls"/>
+    <ds:schemaRef ds:uri="http://schemas.microsoft.com/sharepoint/v3"/>
+  </ds:schemaRefs>
+</ds:datastoreItem>
+</file>
+
+<file path=customXml/itemProps2.xml><?xml version="1.0" encoding="utf-8"?>
 <ds:datastoreItem xmlns:ds="http://schemas.openxmlformats.org/officeDocument/2006/customXml" ds:itemID="{D19A80A7-0DD1-4CF4-ABD5-362A6549C557}">
   <ds:schemaRefs>
     <ds:schemaRef ds:uri="http://schemas.microsoft.com/office/2006/metadata/contentType"/>
@@ -25251,16 +24629,6 @@
 </ds:datastoreItem>
 </file>
 
-<file path=customXml/itemProps2.xml><?xml version="1.0" encoding="utf-8"?>
-<ds:datastoreItem xmlns:ds="http://schemas.openxmlformats.org/officeDocument/2006/customXml" ds:itemID="{374D15D6-87BC-477C-8E91-9F90829C2FC8}">
-  <ds:schemaRefs>
-    <ds:schemaRef ds:uri="http://schemas.microsoft.com/office/2006/metadata/properties"/>
-    <ds:schemaRef ds:uri="http://schemas.microsoft.com/office/infopath/2007/PartnerControls"/>
-    <ds:schemaRef ds:uri="http://schemas.microsoft.com/sharepoint/v3"/>
-  </ds:schemaRefs>
-</ds:datastoreItem>
-</file>
-
 <file path=customXml/itemProps3.xml><?xml version="1.0" encoding="utf-8"?>
 <ds:datastoreItem xmlns:ds="http://schemas.openxmlformats.org/officeDocument/2006/customXml" ds:itemID="{F79AA90D-A39D-4F83-B1BD-92099B1CAD0D}">
   <ds:schemaRefs>

</xml_diff>